<commit_message>
Update gitignore, add some script
</commit_message>
<xml_diff>
--- a/Course Materials/01- Introduction/01_04 - An Overview of Bulma Framework.pptx
+++ b/Course Materials/01- Introduction/01_04 - An Overview of Bulma Framework.pptx
@@ -6,6 +6,7 @@
   </p:sldMasterIdLst>
   <p:sldIdLst>
     <p:sldId id="256" r:id="rId2"/>
+    <p:sldId id="257" r:id="rId3"/>
   </p:sldIdLst>
   <p:sldSz cx="12192000" cy="6858000"/>
   <p:notesSz cx="6858000" cy="9144000"/>
@@ -104,7 +105,24 @@
       </a:defRPr>
     </a:lvl9pPr>
   </p:defaultTextStyle>
+  <p:extLst>
+    <p:ext uri="{EFAFB233-063F-42B5-8137-9DF3F51BA10A}">
+      <p15:sldGuideLst xmlns:p15="http://schemas.microsoft.com/office/powerpoint/2012/main"/>
+    </p:ext>
+  </p:extLst>
 </p:presentation>
+</file>
+
+<file path=ppt/commentAuthors.xml><?xml version="1.0" encoding="utf-8"?>
+<p:cmAuthorLst xmlns:a="http://schemas.openxmlformats.org/drawingml/2006/main" xmlns:r="http://schemas.openxmlformats.org/officeDocument/2006/relationships" xmlns:p="http://schemas.openxmlformats.org/presentationml/2006/main">
+  <p:cmAuthor id="1" name="Mohammad" initials="M" lastIdx="2" clrIdx="0">
+    <p:extLst>
+      <p:ext uri="{19B8F6BF-5375-455C-9EA6-DF929625EA0E}">
+        <p15:presenceInfo xmlns:p15="http://schemas.microsoft.com/office/powerpoint/2012/main" userId="Mohammad" providerId="None"/>
+      </p:ext>
+    </p:extLst>
+  </p:cmAuthor>
+</p:cmAuthorLst>
 </file>
 
 <file path=ppt/slideLayouts/slideLayout1.xml><?xml version="1.0" encoding="utf-8"?>
@@ -3335,45 +3353,28 @@
         </p:nvSpPr>
         <p:spPr>
           <a:xfrm>
-            <a:off x="3048000" y="1166843"/>
-            <a:ext cx="6096000" cy="4524315"/>
+            <a:off x="96520" y="1166843"/>
+            <a:ext cx="11866880" cy="3693319"/>
           </a:xfrm>
           <a:prstGeom prst="rect">
             <a:avLst/>
           </a:prstGeom>
         </p:spPr>
         <p:txBody>
-          <a:bodyPr>
+          <a:bodyPr wrap="square">
             <a:spAutoFit/>
           </a:bodyPr>
           <a:lstStyle/>
           <a:p>
-            <a:r>
-              <a:rPr lang="en-US" dirty="0">
-                <a:latin typeface="SourceSansPro-Regular"/>
-              </a:rPr>
-              <a:t>Here are a few reasons why </a:t>
-            </a:r>
-            <a:r>
-              <a:rPr lang="en-US" dirty="0" err="1">
-                <a:latin typeface="SourceSansPro-Regular"/>
-              </a:rPr>
-              <a:t>Bulma</a:t>
-            </a:r>
-            <a:r>
-              <a:rPr lang="en-US" dirty="0">
-                <a:latin typeface="SourceSansPro-Regular"/>
-              </a:rPr>
-              <a:t> is different than other CSS frameworks:</a:t>
-            </a:r>
-          </a:p>
-          <a:p>
-            <a:r>
-              <a:rPr lang="en-US" dirty="0">
-                <a:latin typeface="SourceSansPro-Regular"/>
-              </a:rPr>
-              <a:t>• </a:t>
-            </a:r>
+            <a:endParaRPr lang="en-US" dirty="0">
+              <a:latin typeface="SourceSansPro-Regular"/>
+            </a:endParaRPr>
+          </a:p>
+          <a:p>
+            <a:pPr marL="285750" indent="-285750">
+              <a:buFont typeface="Wingdings" panose="05000000000000000000" pitchFamily="2" charset="2"/>
+              <a:buChar char="q"/>
+            </a:pPr>
             <a:r>
               <a:rPr lang="en-US" b="1" dirty="0">
                 <a:latin typeface="SourceSansPro-Bold"/>
@@ -3384,28 +3385,21 @@
               <a:rPr lang="en-US" dirty="0">
                 <a:latin typeface="SourceSansPro-Regular"/>
               </a:rPr>
-              <a:t>: All of </a:t>
-            </a:r>
-            <a:r>
-              <a:rPr lang="en-US" dirty="0" err="1">
-                <a:latin typeface="SourceSansPro-Regular"/>
-              </a:rPr>
-              <a:t>Bulma</a:t>
-            </a:r>
-            <a:r>
-              <a:rPr lang="en-US" dirty="0">
-                <a:latin typeface="SourceSansPro-Regular"/>
-              </a:rPr>
-              <a:t> is based on CSS Flexbox.</a:t>
-            </a:r>
-          </a:p>
-          <a:p>
-            <a:r>
-              <a:rPr lang="en-US" dirty="0">
-                <a:latin typeface="SourceSansPro-Regular"/>
-              </a:rPr>
-              <a:t>• </a:t>
-            </a:r>
+              <a:t>: All of Bulma is based on CSS Flexbox.</a:t>
+            </a:r>
+            <a:r>
+              <a:rPr lang="en-US" dirty="0"/>
+              <a:t> A simple way to build responsive columns.</a:t>
+            </a:r>
+            <a:endParaRPr lang="en-US" dirty="0">
+              <a:latin typeface="SourceSansPro-Regular"/>
+            </a:endParaRPr>
+          </a:p>
+          <a:p>
+            <a:pPr marL="342900" indent="-342900">
+              <a:buFont typeface="Wingdings" panose="05000000000000000000" pitchFamily="2" charset="2"/>
+              <a:buChar char="q"/>
+            </a:pPr>
             <a:r>
               <a:rPr lang="en-US" b="1" dirty="0">
                 <a:latin typeface="SourceSansPro-Bold"/>
@@ -3416,28 +3410,104 @@
               <a:rPr lang="en-US" dirty="0">
                 <a:latin typeface="SourceSansPro-Regular"/>
               </a:rPr>
-              <a:t>: </a:t>
-            </a:r>
-            <a:r>
-              <a:rPr lang="en-US" dirty="0" err="1">
-                <a:latin typeface="SourceSansPro-Regular"/>
-              </a:rPr>
-              <a:t>Bulma</a:t>
-            </a:r>
-            <a:r>
-              <a:rPr lang="en-US" dirty="0">
-                <a:latin typeface="SourceSansPro-Regular"/>
-              </a:rPr>
-              <a:t> is designed to be both mobile and desktop friendly.</a:t>
-            </a:r>
-          </a:p>
-          <a:p>
-            <a:r>
-              <a:rPr lang="en-US" dirty="0">
-                <a:latin typeface="SourceSansPro-Regular"/>
-              </a:rPr>
-              <a:t>• </a:t>
-            </a:r>
+              <a:t>: Bulma is designed to be both mobile and desktop friendly. Design</a:t>
+            </a:r>
+            <a:r>
+              <a:rPr lang="en-US" dirty="0"/>
+              <a:t> for a mobile-first.</a:t>
+            </a:r>
+            <a:br>
+              <a:rPr lang="en-US" dirty="0"/>
+            </a:br>
+            <a:r>
+              <a:rPr lang="en-US" dirty="0"/>
+              <a:t>Every element in Bulma is </a:t>
+            </a:r>
+            <a:r>
+              <a:rPr lang="en-US" b="1" dirty="0"/>
+              <a:t>mobile-first</a:t>
+            </a:r>
+            <a:r>
+              <a:rPr lang="en-US" dirty="0"/>
+              <a:t> and optimizes for </a:t>
+            </a:r>
+            <a:r>
+              <a:rPr lang="en-US" b="1" dirty="0"/>
+              <a:t>vertical reading</a:t>
+            </a:r>
+            <a:r>
+              <a:rPr lang="en-US" dirty="0"/>
+              <a:t>, so by default on mobile:</a:t>
+            </a:r>
+          </a:p>
+          <a:p>
+            <a:pPr marL="627063" indent="-285750">
+              <a:buFont typeface="Courier New" panose="02070309020205020404" pitchFamily="49" charset="0"/>
+              <a:buChar char="o"/>
+            </a:pPr>
+            <a:r>
+              <a:rPr lang="en-US" dirty="0"/>
+              <a:t>columns are stacked vertically</a:t>
+            </a:r>
+          </a:p>
+          <a:p>
+            <a:pPr marL="627063" indent="-285750">
+              <a:buFont typeface="Courier New" panose="02070309020205020404" pitchFamily="49" charset="0"/>
+              <a:buChar char="o"/>
+            </a:pPr>
+            <a:r>
+              <a:rPr lang="en-US" dirty="0"/>
+              <a:t>the level component will show its children stacked vertically</a:t>
+            </a:r>
+          </a:p>
+          <a:p>
+            <a:pPr marL="627063" indent="-285750">
+              <a:buFont typeface="Courier New" panose="02070309020205020404" pitchFamily="49" charset="0"/>
+              <a:buChar char="o"/>
+            </a:pPr>
+            <a:r>
+              <a:rPr lang="en-US" dirty="0"/>
+              <a:t>the nav menu will be hidden</a:t>
+            </a:r>
+          </a:p>
+          <a:p>
+            <a:pPr marL="285750" indent="-285750">
+              <a:buFont typeface="Wingdings" panose="05000000000000000000" pitchFamily="2" charset="2"/>
+              <a:buChar char="q"/>
+            </a:pPr>
+            <a:r>
+              <a:rPr lang="en-US" b="1" dirty="0"/>
+              <a:t>Modularity: </a:t>
+            </a:r>
+            <a:r>
+              <a:rPr lang="en-US" dirty="0"/>
+              <a:t>Bulma consists of </a:t>
+            </a:r>
+            <a:r>
+              <a:rPr lang="en-US" b="1" dirty="0"/>
+              <a:t>39</a:t>
+            </a:r>
+            <a:r>
+              <a:rPr lang="en-US" dirty="0"/>
+              <a:t> .sass files that you can import </a:t>
+            </a:r>
+            <a:r>
+              <a:rPr lang="en-US" b="1" dirty="0"/>
+              <a:t>individually. </a:t>
+            </a:r>
+            <a:r>
+              <a:rPr lang="en-US" dirty="0"/>
+              <a:t>Just import what you need.</a:t>
+            </a:r>
+            <a:endParaRPr lang="en-US" dirty="0">
+              <a:latin typeface="SourceSansPro-Regular"/>
+            </a:endParaRPr>
+          </a:p>
+          <a:p>
+            <a:pPr marL="285750" indent="-285750">
+              <a:buFont typeface="Wingdings" panose="05000000000000000000" pitchFamily="2" charset="2"/>
+              <a:buChar char="q"/>
+            </a:pPr>
             <a:r>
               <a:rPr lang="en-US" b="1" dirty="0">
                 <a:latin typeface="SourceSansPro-Bold"/>
@@ -3448,28 +3518,14 @@
               <a:rPr lang="en-US" dirty="0">
                 <a:latin typeface="SourceSansPro-Regular"/>
               </a:rPr>
-              <a:t>: Most users get started within </a:t>
-            </a:r>
-            <a:r>
-              <a:rPr lang="en-US" i="1" dirty="0">
-                <a:latin typeface="SourceSansPro-It"/>
-              </a:rPr>
-              <a:t>minutes</a:t>
-            </a:r>
-            <a:r>
-              <a:rPr lang="en-US" dirty="0">
-                <a:latin typeface="SourceSansPro-Regular"/>
-              </a:rPr>
-              <a:t>.</a:t>
-            </a:r>
-          </a:p>
-          <a:p>
-            <a:r>
-              <a:rPr lang="en-US" dirty="0">
-                <a:latin typeface="SourceSansPro-Regular"/>
-              </a:rPr>
-              <a:t>• </a:t>
-            </a:r>
+              <a:t>: Most users get started within minutes</a:t>
+            </a:r>
+          </a:p>
+          <a:p>
+            <a:pPr marL="285750" indent="-285750">
+              <a:buFont typeface="Wingdings" panose="05000000000000000000" pitchFamily="2" charset="2"/>
+              <a:buChar char="q"/>
+            </a:pPr>
             <a:r>
               <a:rPr lang="en-US" b="1" dirty="0">
                 <a:latin typeface="SourceSansPro-Bold"/>
@@ -3480,36 +3536,14 @@
               <a:rPr lang="en-US" dirty="0">
                 <a:latin typeface="SourceSansPro-Regular"/>
               </a:rPr>
-              <a:t>: </a:t>
-            </a:r>
-            <a:r>
-              <a:rPr lang="en-US" dirty="0" err="1">
-                <a:latin typeface="SourceSansPro-Regular"/>
-              </a:rPr>
-              <a:t>Bulma</a:t>
-            </a:r>
-            <a:r>
-              <a:rPr lang="en-US" dirty="0">
-                <a:latin typeface="SourceSansPro-Regular"/>
-              </a:rPr>
-              <a:t> makes sure to use the minimal HTML required, so your code is</a:t>
-            </a:r>
-          </a:p>
-          <a:p>
-            <a:r>
-              <a:rPr lang="en-US" dirty="0">
-                <a:latin typeface="SourceSansPro-Regular"/>
-              </a:rPr>
-              <a:t>easy to read and write.</a:t>
-            </a:r>
-          </a:p>
-          <a:p>
-            <a:r>
-              <a:rPr lang="en-US" dirty="0">
-                <a:latin typeface="SourceSansPro-Regular"/>
-              </a:rPr>
-              <a:t>• </a:t>
-            </a:r>
+              <a:t>: Bulma makes sure to use the minimal HTML required, so your code is easy to read and write</a:t>
+            </a:r>
+          </a:p>
+          <a:p>
+            <a:pPr marL="285750" indent="-285750">
+              <a:buFont typeface="Wingdings" panose="05000000000000000000" pitchFamily="2" charset="2"/>
+              <a:buChar char="q"/>
+            </a:pPr>
             <a:r>
               <a:rPr lang="en-US" b="1" dirty="0">
                 <a:latin typeface="SourceSansPro-Bold"/>
@@ -3520,30 +3554,14 @@
               <a:rPr lang="en-US" dirty="0">
                 <a:latin typeface="SourceSansPro-Regular"/>
               </a:rPr>
-              <a:t>: With over 300 SASS variables, you can apply your own branding to</a:t>
-            </a:r>
-          </a:p>
-          <a:p>
-            <a:r>
-              <a:rPr lang="en-US" dirty="0" err="1">
-                <a:latin typeface="SourceSansPro-Regular"/>
-              </a:rPr>
-              <a:t>Bulma</a:t>
-            </a:r>
-            <a:r>
-              <a:rPr lang="en-US" dirty="0">
-                <a:latin typeface="SourceSansPro-Regular"/>
-              </a:rPr>
-              <a:t>.</a:t>
-            </a:r>
-          </a:p>
-          <a:p>
-            <a:r>
-              <a:rPr lang="en-US" dirty="0">
-                <a:latin typeface="SourceSansPro-Regular"/>
-              </a:rPr>
-              <a:t>• </a:t>
-            </a:r>
+              <a:t>: With over 300 SASS variables, you can apply your own branding to Bulma</a:t>
+            </a:r>
+          </a:p>
+          <a:p>
+            <a:pPr marL="285750" indent="-285750">
+              <a:buFont typeface="Wingdings" panose="05000000000000000000" pitchFamily="2" charset="2"/>
+              <a:buChar char="q"/>
+            </a:pPr>
             <a:r>
               <a:rPr lang="en-US" b="1" dirty="0">
                 <a:latin typeface="SourceSansPro-Bold"/>
@@ -3554,39 +3572,7 @@
               <a:rPr lang="en-US" dirty="0">
                 <a:latin typeface="SourceSansPro-Regular"/>
               </a:rPr>
-              <a:t>: Because </a:t>
-            </a:r>
-            <a:r>
-              <a:rPr lang="en-US" dirty="0" err="1">
-                <a:latin typeface="SourceSansPro-Regular"/>
-              </a:rPr>
-              <a:t>Bulma</a:t>
-            </a:r>
-            <a:r>
-              <a:rPr lang="en-US" dirty="0">
-                <a:latin typeface="SourceSansPro-Regular"/>
-              </a:rPr>
-              <a:t> is CSS-only, it integrates gracefully with any Java-</a:t>
-            </a:r>
-          </a:p>
-          <a:p>
-            <a:r>
-              <a:rPr lang="en-US" dirty="0">
-                <a:latin typeface="SourceSansPro-Regular"/>
-              </a:rPr>
-              <a:t>Script framework (Angular, </a:t>
-            </a:r>
-            <a:r>
-              <a:rPr lang="en-US" dirty="0" err="1">
-                <a:latin typeface="SourceSansPro-Regular"/>
-              </a:rPr>
-              <a:t>VueJS</a:t>
-            </a:r>
-            <a:r>
-              <a:rPr lang="en-US" dirty="0">
-                <a:latin typeface="SourceSansPro-Regular"/>
-              </a:rPr>
-              <a:t>, React, or just plain Vanilla JavaScript)</a:t>
+              <a:t>: Because Bulma is CSS-only, it integrates gracefully with any JavaScript framework (Angular, VueJS, React, or just plain Vanilla JavaScript)</a:t>
             </a:r>
             <a:endParaRPr lang="en-US" dirty="0"/>
           </a:p>
@@ -3594,10 +3580,10 @@
       </p:sp>
       <p:sp>
         <p:nvSpPr>
-          <p:cNvPr id="5" name="Rectangle 4">
-            <a:extLst>
-              <a:ext uri="{FF2B5EF4-FFF2-40B4-BE49-F238E27FC236}">
-                <a16:creationId xmlns:a16="http://schemas.microsoft.com/office/drawing/2014/main" id="{2D50552E-CCF2-4BF6-A0DD-86987D0310CB}"/>
+          <p:cNvPr id="6" name="Rectangle 5">
+            <a:extLst>
+              <a:ext uri="{FF2B5EF4-FFF2-40B4-BE49-F238E27FC236}">
+                <a16:creationId xmlns:a16="http://schemas.microsoft.com/office/drawing/2014/main" id="{1E0264A4-D6A9-432E-81A9-CAD9C0D7AF36}"/>
               </a:ext>
             </a:extLst>
           </p:cNvPr>
@@ -3606,8 +3592,8 @@
         </p:nvSpPr>
         <p:spPr>
           <a:xfrm>
-            <a:off x="4938696" y="3244334"/>
-            <a:ext cx="2314608" cy="369332"/>
+            <a:off x="192549" y="517230"/>
+            <a:ext cx="7293407" cy="369332"/>
           </a:xfrm>
           <a:prstGeom prst="rect">
             <a:avLst/>
@@ -3621,32 +3607,49 @@
           <a:p>
             <a:r>
               <a:rPr lang="en-US" b="1" dirty="0">
-                <a:latin typeface="Merriweather-Bold"/>
+                <a:latin typeface="SourceSansPro-Regular"/>
               </a:rPr>
-              <a:t>How is </a:t>
-            </a:r>
-            <a:r>
-              <a:rPr lang="en-US" b="1" dirty="0" err="1">
-                <a:latin typeface="Merriweather-Bold"/>
-              </a:rPr>
-              <a:t>Bulma</a:t>
-            </a:r>
-            <a:r>
-              <a:rPr lang="en-US" b="1" dirty="0">
-                <a:latin typeface="Merriweather-Bold"/>
-              </a:rPr>
-              <a:t> unique?</a:t>
-            </a:r>
-            <a:endParaRPr lang="en-US" dirty="0"/>
-          </a:p>
-        </p:txBody>
-      </p:sp>
-      <p:sp>
-        <p:nvSpPr>
-          <p:cNvPr id="6" name="Rectangle 5">
-            <a:extLst>
-              <a:ext uri="{FF2B5EF4-FFF2-40B4-BE49-F238E27FC236}">
-                <a16:creationId xmlns:a16="http://schemas.microsoft.com/office/drawing/2014/main" id="{1E0264A4-D6A9-432E-81A9-CAD9C0D7AF36}"/>
+              <a:t>Here are a few reasons why Bulma is different than other CSS frameworks:</a:t>
+            </a:r>
+          </a:p>
+        </p:txBody>
+      </p:sp>
+    </p:spTree>
+    <p:extLst>
+      <p:ext uri="{BB962C8B-B14F-4D97-AF65-F5344CB8AC3E}">
+        <p14:creationId xmlns:p14="http://schemas.microsoft.com/office/powerpoint/2010/main" val="2289369834"/>
+      </p:ext>
+    </p:extLst>
+  </p:cSld>
+  <p:clrMapOvr>
+    <a:masterClrMapping/>
+  </p:clrMapOvr>
+</p:sld>
+</file>
+
+<file path=ppt/slides/slide2.xml><?xml version="1.0" encoding="utf-8"?>
+<p:sld xmlns:a="http://schemas.openxmlformats.org/drawingml/2006/main" xmlns:r="http://schemas.openxmlformats.org/officeDocument/2006/relationships" xmlns:p="http://schemas.openxmlformats.org/presentationml/2006/main">
+  <p:cSld>
+    <p:spTree>
+      <p:nvGrpSpPr>
+        <p:cNvPr id="1" name=""/>
+        <p:cNvGrpSpPr/>
+        <p:nvPr/>
+      </p:nvGrpSpPr>
+      <p:grpSpPr>
+        <a:xfrm>
+          <a:off x="0" y="0"/>
+          <a:ext cx="0" cy="0"/>
+          <a:chOff x="0" y="0"/>
+          <a:chExt cx="0" cy="0"/>
+        </a:xfrm>
+      </p:grpSpPr>
+      <p:sp>
+        <p:nvSpPr>
+          <p:cNvPr id="2" name="Rectangle 1">
+            <a:extLst>
+              <a:ext uri="{FF2B5EF4-FFF2-40B4-BE49-F238E27FC236}">
+                <a16:creationId xmlns:a16="http://schemas.microsoft.com/office/drawing/2014/main" id="{480BD4E2-D408-446D-BE7C-4535F412EDEE}"/>
               </a:ext>
             </a:extLst>
           </p:cNvPr>
@@ -3655,45 +3658,94 @@
         </p:nvSpPr>
         <p:spPr>
           <a:xfrm>
-            <a:off x="1692576" y="440174"/>
-            <a:ext cx="2314608" cy="369332"/>
+            <a:off x="3048000" y="2828836"/>
+            <a:ext cx="6096000" cy="1754326"/>
           </a:xfrm>
           <a:prstGeom prst="rect">
             <a:avLst/>
           </a:prstGeom>
         </p:spPr>
         <p:txBody>
-          <a:bodyPr wrap="none">
+          <a:bodyPr>
             <a:spAutoFit/>
           </a:bodyPr>
           <a:lstStyle/>
           <a:p>
             <a:r>
               <a:rPr lang="en-US" b="1" dirty="0">
-                <a:latin typeface="Merriweather-Bold"/>
-              </a:rPr>
-              <a:t>How is </a:t>
-            </a:r>
-            <a:r>
-              <a:rPr lang="en-US" b="1" dirty="0" err="1">
-                <a:latin typeface="Merriweather-Bold"/>
+                <a:solidFill>
+                  <a:srgbClr val="222222"/>
+                </a:solidFill>
+                <a:latin typeface="Roboto"/>
               </a:rPr>
               <a:t>Bulma</a:t>
             </a:r>
             <a:r>
+              <a:rPr lang="en-US" dirty="0">
+                <a:solidFill>
+                  <a:srgbClr val="222222"/>
+                </a:solidFill>
+                <a:latin typeface="Roboto"/>
+              </a:rPr>
+              <a:t> is a free, open-source CSS </a:t>
+            </a:r>
+            <a:r>
               <a:rPr lang="en-US" b="1" dirty="0">
-                <a:latin typeface="Merriweather-Bold"/>
+                <a:solidFill>
+                  <a:srgbClr val="222222"/>
+                </a:solidFill>
+                <a:latin typeface="Roboto"/>
               </a:rPr>
-              <a:t> unique?</a:t>
-            </a:r>
-            <a:endParaRPr lang="en-US" dirty="0"/>
+              <a:t>framework</a:t>
+            </a:r>
+            <a:r>
+              <a:rPr lang="en-US" dirty="0">
+                <a:solidFill>
+                  <a:srgbClr val="222222"/>
+                </a:solidFill>
+                <a:latin typeface="Roboto"/>
+              </a:rPr>
+              <a:t> based on Flexbox and used by more than 200,000 developers. The main advantage of using </a:t>
+            </a:r>
+            <a:r>
+              <a:rPr lang="en-US" b="1" dirty="0">
+                <a:solidFill>
+                  <a:srgbClr val="222222"/>
+                </a:solidFill>
+                <a:latin typeface="Roboto"/>
+              </a:rPr>
+              <a:t>Bulma</a:t>
+            </a:r>
+            <a:r>
+              <a:rPr lang="en-US" dirty="0">
+                <a:solidFill>
+                  <a:srgbClr val="222222"/>
+                </a:solidFill>
+                <a:latin typeface="Roboto"/>
+              </a:rPr>
+              <a:t> is that its box model is fully based on Flexbox.</a:t>
+            </a:r>
+            <a:r>
+              <a:rPr lang="en-US" dirty="0"/>
+              <a:t> no more CSS floats and percentages. CSS framework made easy to create </a:t>
+            </a:r>
+            <a:r>
+              <a:rPr lang="en-US" dirty="0">
+                <a:hlinkClick r:id="rId2"/>
+              </a:rPr>
+              <a:t>UI design</a:t>
+            </a:r>
+            <a:r>
+              <a:rPr lang="en-US" dirty="0"/>
+              <a:t> components and patterns.</a:t>
+            </a:r>
           </a:p>
         </p:txBody>
       </p:sp>
     </p:spTree>
     <p:extLst>
       <p:ext uri="{BB962C8B-B14F-4D97-AF65-F5344CB8AC3E}">
-        <p14:creationId xmlns:p14="http://schemas.microsoft.com/office/powerpoint/2010/main" val="2289369834"/>
+        <p14:creationId xmlns:p14="http://schemas.microsoft.com/office/powerpoint/2010/main" val="1345013649"/>
       </p:ext>
     </p:extLst>
   </p:cSld>

</xml_diff>

<commit_message>
Contiue Bulma overview Presentation
</commit_message>
<xml_diff>
--- a/Course Materials/01- Introduction/01_04 - An Overview of Bulma Framework.pptx
+++ b/Course Materials/01- Introduction/01_04 - An Overview of Bulma Framework.pptx
@@ -5,8 +5,15 @@
     <p:sldMasterId id="2147483648" r:id="rId1"/>
   </p:sldMasterIdLst>
   <p:sldIdLst>
-    <p:sldId id="256" r:id="rId2"/>
-    <p:sldId id="257" r:id="rId3"/>
+    <p:sldId id="258" r:id="rId2"/>
+    <p:sldId id="259" r:id="rId3"/>
+    <p:sldId id="260" r:id="rId4"/>
+    <p:sldId id="261" r:id="rId5"/>
+    <p:sldId id="262" r:id="rId6"/>
+    <p:sldId id="263" r:id="rId7"/>
+    <p:sldId id="267" r:id="rId8"/>
+    <p:sldId id="264" r:id="rId9"/>
+    <p:sldId id="256" r:id="rId10"/>
   </p:sldIdLst>
   <p:sldSz cx="12192000" cy="6858000"/>
   <p:notesSz cx="6858000" cy="9144000"/>
@@ -272,7 +279,7 @@
           <a:p>
             <a:fld id="{AE77EB8F-A44A-47BB-9CF9-CF844E8E2DD5}" type="datetimeFigureOut">
               <a:rPr lang="en-US" smtClean="0"/>
-              <a:t>11/29/2019</a:t>
+              <a:t>12/2/2019</a:t>
             </a:fld>
             <a:endParaRPr lang="en-US"/>
           </a:p>
@@ -470,7 +477,7 @@
           <a:p>
             <a:fld id="{AE77EB8F-A44A-47BB-9CF9-CF844E8E2DD5}" type="datetimeFigureOut">
               <a:rPr lang="en-US" smtClean="0"/>
-              <a:t>11/29/2019</a:t>
+              <a:t>12/2/2019</a:t>
             </a:fld>
             <a:endParaRPr lang="en-US"/>
           </a:p>
@@ -678,7 +685,7 @@
           <a:p>
             <a:fld id="{AE77EB8F-A44A-47BB-9CF9-CF844E8E2DD5}" type="datetimeFigureOut">
               <a:rPr lang="en-US" smtClean="0"/>
-              <a:t>11/29/2019</a:t>
+              <a:t>12/2/2019</a:t>
             </a:fld>
             <a:endParaRPr lang="en-US"/>
           </a:p>
@@ -876,7 +883,7 @@
           <a:p>
             <a:fld id="{AE77EB8F-A44A-47BB-9CF9-CF844E8E2DD5}" type="datetimeFigureOut">
               <a:rPr lang="en-US" smtClean="0"/>
-              <a:t>11/29/2019</a:t>
+              <a:t>12/2/2019</a:t>
             </a:fld>
             <a:endParaRPr lang="en-US"/>
           </a:p>
@@ -1151,7 +1158,7 @@
           <a:p>
             <a:fld id="{AE77EB8F-A44A-47BB-9CF9-CF844E8E2DD5}" type="datetimeFigureOut">
               <a:rPr lang="en-US" smtClean="0"/>
-              <a:t>11/29/2019</a:t>
+              <a:t>12/2/2019</a:t>
             </a:fld>
             <a:endParaRPr lang="en-US"/>
           </a:p>
@@ -1416,7 +1423,7 @@
           <a:p>
             <a:fld id="{AE77EB8F-A44A-47BB-9CF9-CF844E8E2DD5}" type="datetimeFigureOut">
               <a:rPr lang="en-US" smtClean="0"/>
-              <a:t>11/29/2019</a:t>
+              <a:t>12/2/2019</a:t>
             </a:fld>
             <a:endParaRPr lang="en-US"/>
           </a:p>
@@ -1828,7 +1835,7 @@
           <a:p>
             <a:fld id="{AE77EB8F-A44A-47BB-9CF9-CF844E8E2DD5}" type="datetimeFigureOut">
               <a:rPr lang="en-US" smtClean="0"/>
-              <a:t>11/29/2019</a:t>
+              <a:t>12/2/2019</a:t>
             </a:fld>
             <a:endParaRPr lang="en-US"/>
           </a:p>
@@ -1969,7 +1976,7 @@
           <a:p>
             <a:fld id="{AE77EB8F-A44A-47BB-9CF9-CF844E8E2DD5}" type="datetimeFigureOut">
               <a:rPr lang="en-US" smtClean="0"/>
-              <a:t>11/29/2019</a:t>
+              <a:t>12/2/2019</a:t>
             </a:fld>
             <a:endParaRPr lang="en-US"/>
           </a:p>
@@ -2082,7 +2089,7 @@
           <a:p>
             <a:fld id="{AE77EB8F-A44A-47BB-9CF9-CF844E8E2DD5}" type="datetimeFigureOut">
               <a:rPr lang="en-US" smtClean="0"/>
-              <a:t>11/29/2019</a:t>
+              <a:t>12/2/2019</a:t>
             </a:fld>
             <a:endParaRPr lang="en-US"/>
           </a:p>
@@ -2393,7 +2400,7 @@
           <a:p>
             <a:fld id="{AE77EB8F-A44A-47BB-9CF9-CF844E8E2DD5}" type="datetimeFigureOut">
               <a:rPr lang="en-US" smtClean="0"/>
-              <a:t>11/29/2019</a:t>
+              <a:t>12/2/2019</a:t>
             </a:fld>
             <a:endParaRPr lang="en-US"/>
           </a:p>
@@ -2681,7 +2688,7 @@
           <a:p>
             <a:fld id="{AE77EB8F-A44A-47BB-9CF9-CF844E8E2DD5}" type="datetimeFigureOut">
               <a:rPr lang="en-US" smtClean="0"/>
-              <a:t>11/29/2019</a:t>
+              <a:t>12/2/2019</a:t>
             </a:fld>
             <a:endParaRPr lang="en-US"/>
           </a:p>
@@ -2922,7 +2929,7 @@
           <a:p>
             <a:fld id="{AE77EB8F-A44A-47BB-9CF9-CF844E8E2DD5}" type="datetimeFigureOut">
               <a:rPr lang="en-US" smtClean="0"/>
-              <a:t>11/29/2019</a:t>
+              <a:t>12/2/2019</a:t>
             </a:fld>
             <a:endParaRPr lang="en-US"/>
           </a:p>
@@ -3341,10 +3348,82 @@
       </p:grpSpPr>
       <p:sp>
         <p:nvSpPr>
+          <p:cNvPr id="2" name="TextBox 1">
+            <a:extLst>
+              <a:ext uri="{FF2B5EF4-FFF2-40B4-BE49-F238E27FC236}">
+                <a16:creationId xmlns:a16="http://schemas.microsoft.com/office/drawing/2014/main" id="{A372C4AE-E5F2-43EE-AD6A-41A05C8E7278}"/>
+              </a:ext>
+            </a:extLst>
+          </p:cNvPr>
+          <p:cNvSpPr txBox="1"/>
+          <p:nvPr/>
+        </p:nvSpPr>
+        <p:spPr>
+          <a:xfrm>
+            <a:off x="4402908" y="383688"/>
+            <a:ext cx="3386183" cy="369332"/>
+          </a:xfrm>
+          <a:prstGeom prst="rect">
+            <a:avLst/>
+          </a:prstGeom>
+          <a:noFill/>
+        </p:spPr>
+        <p:txBody>
+          <a:bodyPr wrap="none" rtlCol="1">
+            <a:spAutoFit/>
+          </a:bodyPr>
+          <a:lstStyle/>
+          <a:p>
+            <a:r>
+              <a:rPr lang="en-US"/>
+              <a:t>An Overview of Bulma Framework</a:t>
+            </a:r>
+            <a:endParaRPr lang="fa-IR"/>
+          </a:p>
+        </p:txBody>
+      </p:sp>
+      <p:sp>
+        <p:nvSpPr>
+          <p:cNvPr id="3" name="TextBox 2">
+            <a:extLst>
+              <a:ext uri="{FF2B5EF4-FFF2-40B4-BE49-F238E27FC236}">
+                <a16:creationId xmlns:a16="http://schemas.microsoft.com/office/drawing/2014/main" id="{14FEC698-A117-43C6-AC4C-874A3974A33C}"/>
+              </a:ext>
+            </a:extLst>
+          </p:cNvPr>
+          <p:cNvSpPr txBox="1"/>
+          <p:nvPr/>
+        </p:nvSpPr>
+        <p:spPr>
+          <a:xfrm>
+            <a:off x="5272150" y="893766"/>
+            <a:ext cx="1647695" cy="369332"/>
+          </a:xfrm>
+          <a:prstGeom prst="rect">
+            <a:avLst/>
+          </a:prstGeom>
+          <a:noFill/>
+        </p:spPr>
+        <p:txBody>
+          <a:bodyPr wrap="none" rtlCol="1">
+            <a:spAutoFit/>
+          </a:bodyPr>
+          <a:lstStyle/>
+          <a:p>
+            <a:r>
+              <a:rPr lang="en-US"/>
+              <a:t>What is Bulma?</a:t>
+            </a:r>
+            <a:endParaRPr lang="fa-IR"/>
+          </a:p>
+        </p:txBody>
+      </p:sp>
+      <p:sp>
+        <p:nvSpPr>
           <p:cNvPr id="4" name="Rectangle 3">
             <a:extLst>
               <a:ext uri="{FF2B5EF4-FFF2-40B4-BE49-F238E27FC236}">
-                <a16:creationId xmlns:a16="http://schemas.microsoft.com/office/drawing/2014/main" id="{FAB9DD94-F73D-4682-BCD2-6221DEDF7E13}"/>
+                <a16:creationId xmlns:a16="http://schemas.microsoft.com/office/drawing/2014/main" id="{69C155D0-68BE-4CAC-AF6A-EF13B080B890}"/>
               </a:ext>
             </a:extLst>
           </p:cNvPr>
@@ -3353,8 +3432,8 @@
         </p:nvSpPr>
         <p:spPr>
           <a:xfrm>
-            <a:off x="96520" y="1166843"/>
-            <a:ext cx="11866880" cy="3693319"/>
+            <a:off x="3266112" y="1411204"/>
+            <a:ext cx="6381228" cy="646331"/>
           </a:xfrm>
           <a:prstGeom prst="rect">
             <a:avLst/>
@@ -3366,258 +3445,176 @@
           </a:bodyPr>
           <a:lstStyle/>
           <a:p>
-            <a:endParaRPr lang="en-US" dirty="0">
-              <a:latin typeface="SourceSansPro-Regular"/>
+            <a:r>
+              <a:rPr lang="en-US" b="1">
+                <a:solidFill>
+                  <a:srgbClr val="363636"/>
+                </a:solidFill>
+                <a:latin typeface="BlinkMacSystemFont"/>
+              </a:rPr>
+              <a:t>Bulma</a:t>
+            </a:r>
+            <a:r>
+              <a:rPr lang="en-US">
+                <a:solidFill>
+                  <a:srgbClr val="363636"/>
+                </a:solidFill>
+                <a:latin typeface="BlinkMacSystemFont"/>
+              </a:rPr>
+              <a:t> is a free, open source CSS framework based on </a:t>
+            </a:r>
+            <a:r>
+              <a:rPr lang="en-US" b="1">
+                <a:solidFill>
+                  <a:srgbClr val="363636"/>
+                </a:solidFill>
+                <a:latin typeface="BlinkMacSystemFont"/>
+              </a:rPr>
+              <a:t>Flexbox</a:t>
+            </a:r>
+            <a:r>
+              <a:rPr lang="en-US">
+                <a:solidFill>
+                  <a:srgbClr val="363636"/>
+                </a:solidFill>
+                <a:latin typeface="BlinkMacSystemFont"/>
+              </a:rPr>
+              <a:t> and used by more than </a:t>
+            </a:r>
+            <a:r>
+              <a:rPr lang="en-US" b="1">
+                <a:solidFill>
+                  <a:srgbClr val="363636"/>
+                </a:solidFill>
+                <a:latin typeface="BlinkMacSystemFont"/>
+              </a:rPr>
+              <a:t>200,000</a:t>
+            </a:r>
+            <a:r>
+              <a:rPr lang="en-US">
+                <a:solidFill>
+                  <a:srgbClr val="363636"/>
+                </a:solidFill>
+                <a:latin typeface="BlinkMacSystemFont"/>
+              </a:rPr>
+              <a:t> developers</a:t>
+            </a:r>
+            <a:endParaRPr lang="en-US" b="0" i="0">
+              <a:solidFill>
+                <a:srgbClr val="363636"/>
+              </a:solidFill>
+              <a:effectLst/>
+              <a:latin typeface="BlinkMacSystemFont"/>
             </a:endParaRPr>
           </a:p>
-          <a:p>
-            <a:pPr marL="285750" indent="-285750">
-              <a:buFont typeface="Wingdings" panose="05000000000000000000" pitchFamily="2" charset="2"/>
-              <a:buChar char="q"/>
-            </a:pPr>
-            <a:r>
-              <a:rPr lang="en-US" b="1" dirty="0">
-                <a:latin typeface="SourceSansPro-Bold"/>
-              </a:rPr>
-              <a:t>Modern</a:t>
-            </a:r>
-            <a:r>
-              <a:rPr lang="en-US" dirty="0">
-                <a:latin typeface="SourceSansPro-Regular"/>
-              </a:rPr>
-              <a:t>: All of Bulma is based on CSS Flexbox.</a:t>
-            </a:r>
-            <a:r>
-              <a:rPr lang="en-US" dirty="0"/>
-              <a:t> A simple way to build responsive columns.</a:t>
-            </a:r>
-            <a:endParaRPr lang="en-US" dirty="0">
-              <a:latin typeface="SourceSansPro-Regular"/>
-            </a:endParaRPr>
-          </a:p>
-          <a:p>
-            <a:pPr marL="342900" indent="-342900">
-              <a:buFont typeface="Wingdings" panose="05000000000000000000" pitchFamily="2" charset="2"/>
-              <a:buChar char="q"/>
-            </a:pPr>
-            <a:r>
-              <a:rPr lang="en-US" b="1" dirty="0">
-                <a:latin typeface="SourceSansPro-Bold"/>
-              </a:rPr>
-              <a:t>100% responsive</a:t>
-            </a:r>
-            <a:r>
-              <a:rPr lang="en-US" dirty="0">
-                <a:latin typeface="SourceSansPro-Regular"/>
-              </a:rPr>
-              <a:t>: Bulma is designed to be both mobile and desktop friendly. Design</a:t>
-            </a:r>
-            <a:r>
-              <a:rPr lang="en-US" dirty="0"/>
-              <a:t> for a mobile-first.</a:t>
-            </a:r>
-            <a:br>
-              <a:rPr lang="en-US" dirty="0"/>
-            </a:br>
-            <a:r>
-              <a:rPr lang="en-US" dirty="0"/>
-              <a:t>Every element in Bulma is </a:t>
-            </a:r>
-            <a:r>
-              <a:rPr lang="en-US" b="1" dirty="0"/>
-              <a:t>mobile-first</a:t>
-            </a:r>
-            <a:r>
-              <a:rPr lang="en-US" dirty="0"/>
-              <a:t> and optimizes for </a:t>
-            </a:r>
-            <a:r>
-              <a:rPr lang="en-US" b="1" dirty="0"/>
-              <a:t>vertical reading</a:t>
-            </a:r>
-            <a:r>
-              <a:rPr lang="en-US" dirty="0"/>
-              <a:t>, so by default on mobile:</a:t>
-            </a:r>
-          </a:p>
-          <a:p>
-            <a:pPr marL="627063" indent="-285750">
-              <a:buFont typeface="Courier New" panose="02070309020205020404" pitchFamily="49" charset="0"/>
-              <a:buChar char="o"/>
-            </a:pPr>
-            <a:r>
-              <a:rPr lang="en-US" dirty="0"/>
-              <a:t>columns are stacked vertically</a:t>
-            </a:r>
-          </a:p>
-          <a:p>
-            <a:pPr marL="627063" indent="-285750">
-              <a:buFont typeface="Courier New" panose="02070309020205020404" pitchFamily="49" charset="0"/>
-              <a:buChar char="o"/>
-            </a:pPr>
-            <a:r>
-              <a:rPr lang="en-US" dirty="0"/>
-              <a:t>the level component will show its children stacked vertically</a:t>
-            </a:r>
-          </a:p>
-          <a:p>
-            <a:pPr marL="627063" indent="-285750">
-              <a:buFont typeface="Courier New" panose="02070309020205020404" pitchFamily="49" charset="0"/>
-              <a:buChar char="o"/>
-            </a:pPr>
-            <a:r>
-              <a:rPr lang="en-US" dirty="0"/>
-              <a:t>the nav menu will be hidden</a:t>
-            </a:r>
-          </a:p>
-          <a:p>
-            <a:pPr marL="285750" indent="-285750">
-              <a:buFont typeface="Wingdings" panose="05000000000000000000" pitchFamily="2" charset="2"/>
-              <a:buChar char="q"/>
-            </a:pPr>
-            <a:r>
-              <a:rPr lang="en-US" b="1" dirty="0"/>
-              <a:t>Modularity: </a:t>
-            </a:r>
-            <a:r>
-              <a:rPr lang="en-US" dirty="0"/>
-              <a:t>Bulma consists of </a:t>
-            </a:r>
-            <a:r>
-              <a:rPr lang="en-US" b="1" dirty="0"/>
-              <a:t>39</a:t>
-            </a:r>
-            <a:r>
-              <a:rPr lang="en-US" dirty="0"/>
-              <a:t> .sass files that you can import </a:t>
-            </a:r>
-            <a:r>
-              <a:rPr lang="en-US" b="1" dirty="0"/>
-              <a:t>individually. </a:t>
-            </a:r>
-            <a:r>
-              <a:rPr lang="en-US" dirty="0"/>
-              <a:t>Just import what you need.</a:t>
-            </a:r>
-            <a:endParaRPr lang="en-US" dirty="0">
-              <a:latin typeface="SourceSansPro-Regular"/>
-            </a:endParaRPr>
-          </a:p>
-          <a:p>
-            <a:pPr marL="285750" indent="-285750">
-              <a:buFont typeface="Wingdings" panose="05000000000000000000" pitchFamily="2" charset="2"/>
-              <a:buChar char="q"/>
-            </a:pPr>
-            <a:r>
-              <a:rPr lang="en-US" b="1" dirty="0">
-                <a:latin typeface="SourceSansPro-Bold"/>
-              </a:rPr>
-              <a:t>Easy to learn</a:t>
-            </a:r>
-            <a:r>
-              <a:rPr lang="en-US" dirty="0">
-                <a:latin typeface="SourceSansPro-Regular"/>
-              </a:rPr>
-              <a:t>: Most users get started within minutes</a:t>
-            </a:r>
-          </a:p>
-          <a:p>
-            <a:pPr marL="285750" indent="-285750">
-              <a:buFont typeface="Wingdings" panose="05000000000000000000" pitchFamily="2" charset="2"/>
-              <a:buChar char="q"/>
-            </a:pPr>
-            <a:r>
-              <a:rPr lang="en-US" b="1" dirty="0">
-                <a:latin typeface="SourceSansPro-Bold"/>
-              </a:rPr>
-              <a:t>Simple syntax</a:t>
-            </a:r>
-            <a:r>
-              <a:rPr lang="en-US" dirty="0">
-                <a:latin typeface="SourceSansPro-Regular"/>
-              </a:rPr>
-              <a:t>: Bulma makes sure to use the minimal HTML required, so your code is easy to read and write</a:t>
-            </a:r>
-          </a:p>
-          <a:p>
-            <a:pPr marL="285750" indent="-285750">
-              <a:buFont typeface="Wingdings" panose="05000000000000000000" pitchFamily="2" charset="2"/>
-              <a:buChar char="q"/>
-            </a:pPr>
-            <a:r>
-              <a:rPr lang="en-US" b="1" dirty="0">
-                <a:latin typeface="SourceSansPro-Bold"/>
-              </a:rPr>
-              <a:t>Customizable</a:t>
-            </a:r>
-            <a:r>
-              <a:rPr lang="en-US" dirty="0">
-                <a:latin typeface="SourceSansPro-Regular"/>
-              </a:rPr>
-              <a:t>: With over 300 SASS variables, you can apply your own branding to Bulma</a:t>
-            </a:r>
-          </a:p>
-          <a:p>
-            <a:pPr marL="285750" indent="-285750">
-              <a:buFont typeface="Wingdings" panose="05000000000000000000" pitchFamily="2" charset="2"/>
-              <a:buChar char="q"/>
-            </a:pPr>
-            <a:r>
-              <a:rPr lang="en-US" b="1" dirty="0">
-                <a:latin typeface="SourceSansPro-Bold"/>
-              </a:rPr>
-              <a:t>No JavaScript</a:t>
-            </a:r>
-            <a:r>
-              <a:rPr lang="en-US" dirty="0">
-                <a:latin typeface="SourceSansPro-Regular"/>
-              </a:rPr>
-              <a:t>: Because Bulma is CSS-only, it integrates gracefully with any JavaScript framework (Angular, VueJS, React, or just plain Vanilla JavaScript)</a:t>
-            </a:r>
-            <a:endParaRPr lang="en-US" dirty="0"/>
-          </a:p>
-        </p:txBody>
-      </p:sp>
-      <p:sp>
-        <p:nvSpPr>
-          <p:cNvPr id="6" name="Rectangle 5">
-            <a:extLst>
-              <a:ext uri="{FF2B5EF4-FFF2-40B4-BE49-F238E27FC236}">
-                <a16:creationId xmlns:a16="http://schemas.microsoft.com/office/drawing/2014/main" id="{1E0264A4-D6A9-432E-81A9-CAD9C0D7AF36}"/>
-              </a:ext>
-            </a:extLst>
-          </p:cNvPr>
-          <p:cNvSpPr/>
+        </p:txBody>
+      </p:sp>
+      <p:pic>
+        <p:nvPicPr>
+          <p:cNvPr id="6" name="Picture 5">
+            <a:extLst>
+              <a:ext uri="{FF2B5EF4-FFF2-40B4-BE49-F238E27FC236}">
+                <a16:creationId xmlns:a16="http://schemas.microsoft.com/office/drawing/2014/main" id="{34D32B3F-F6E8-411C-B3E8-027CBC29F6E4}"/>
+              </a:ext>
+            </a:extLst>
+          </p:cNvPr>
+          <p:cNvPicPr>
+            <a:picLocks noChangeAspect="1"/>
+          </p:cNvPicPr>
           <p:nvPr/>
-        </p:nvSpPr>
+        </p:nvPicPr>
+        <p:blipFill>
+          <a:blip r:embed="rId2">
+            <a:extLst>
+              <a:ext uri="{28A0092B-C50C-407E-A947-70E740481C1C}">
+                <a14:useLocalDpi xmlns:a14="http://schemas.microsoft.com/office/drawing/2010/main" val="0"/>
+              </a:ext>
+            </a:extLst>
+          </a:blip>
+          <a:stretch>
+            <a:fillRect/>
+          </a:stretch>
+        </p:blipFill>
         <p:spPr>
           <a:xfrm>
-            <a:off x="192549" y="517230"/>
-            <a:ext cx="7293407" cy="369332"/>
+            <a:off x="1009647" y="2345315"/>
+            <a:ext cx="10172700" cy="1762125"/>
+          </a:xfrm>
+          <a:prstGeom prst="rect">
+            <a:avLst/>
+          </a:prstGeom>
+          <a:solidFill>
+            <a:srgbClr val="FFFFFF">
+              <a:shade val="85000"/>
+            </a:srgbClr>
+          </a:solidFill>
+          <a:ln w="88900" cap="sq">
+            <a:solidFill>
+              <a:srgbClr val="FFFFFF"/>
+            </a:solidFill>
+            <a:miter lim="800000"/>
+          </a:ln>
+          <a:effectLst>
+            <a:outerShdw blurRad="55000" dist="18000" dir="5400000" algn="tl" rotWithShape="0">
+              <a:srgbClr val="000000">
+                <a:alpha val="40000"/>
+              </a:srgbClr>
+            </a:outerShdw>
+          </a:effectLst>
+          <a:scene3d>
+            <a:camera prst="orthographicFront"/>
+            <a:lightRig rig="twoPt" dir="t">
+              <a:rot lat="0" lon="0" rev="7200000"/>
+            </a:lightRig>
+          </a:scene3d>
+          <a:sp3d>
+            <a:bevelT w="25400" h="19050"/>
+            <a:contourClr>
+              <a:srgbClr val="FFFFFF"/>
+            </a:contourClr>
+          </a:sp3d>
+        </p:spPr>
+      </p:pic>
+      <p:pic>
+        <p:nvPicPr>
+          <p:cNvPr id="8" name="Picture 7">
+            <a:extLst>
+              <a:ext uri="{FF2B5EF4-FFF2-40B4-BE49-F238E27FC236}">
+                <a16:creationId xmlns:a16="http://schemas.microsoft.com/office/drawing/2014/main" id="{978984CB-ED27-40E7-B04D-428473BC8C5A}"/>
+              </a:ext>
+            </a:extLst>
+          </p:cNvPr>
+          <p:cNvPicPr>
+            <a:picLocks noChangeAspect="1"/>
+          </p:cNvPicPr>
+          <p:nvPr/>
+        </p:nvPicPr>
+        <p:blipFill>
+          <a:blip r:embed="rId3">
+            <a:extLst>
+              <a:ext uri="{28A0092B-C50C-407E-A947-70E740481C1C}">
+                <a14:useLocalDpi xmlns:a14="http://schemas.microsoft.com/office/drawing/2010/main" val="0"/>
+              </a:ext>
+            </a:extLst>
+          </a:blip>
+          <a:stretch>
+            <a:fillRect/>
+          </a:stretch>
+        </p:blipFill>
+        <p:spPr>
+          <a:xfrm>
+            <a:off x="0" y="4224886"/>
+            <a:ext cx="12192000" cy="2552031"/>
           </a:xfrm>
           <a:prstGeom prst="rect">
             <a:avLst/>
           </a:prstGeom>
         </p:spPr>
-        <p:txBody>
-          <a:bodyPr wrap="none">
-            <a:spAutoFit/>
-          </a:bodyPr>
-          <a:lstStyle/>
-          <a:p>
-            <a:r>
-              <a:rPr lang="en-US" b="1" dirty="0">
-                <a:latin typeface="SourceSansPro-Regular"/>
-              </a:rPr>
-              <a:t>Here are a few reasons why Bulma is different than other CSS frameworks:</a:t>
-            </a:r>
-          </a:p>
-        </p:txBody>
-      </p:sp>
+      </p:pic>
     </p:spTree>
     <p:extLst>
       <p:ext uri="{BB962C8B-B14F-4D97-AF65-F5344CB8AC3E}">
-        <p14:creationId xmlns:p14="http://schemas.microsoft.com/office/powerpoint/2010/main" val="2289369834"/>
+        <p14:creationId xmlns:p14="http://schemas.microsoft.com/office/powerpoint/2010/main" val="1105656596"/>
       </p:ext>
     </p:extLst>
   </p:cSld>
@@ -3644,108 +3641,771 @@
           <a:chExt cx="0" cy="0"/>
         </a:xfrm>
       </p:grpSpPr>
-      <p:sp>
-        <p:nvSpPr>
-          <p:cNvPr id="2" name="Rectangle 1">
-            <a:extLst>
-              <a:ext uri="{FF2B5EF4-FFF2-40B4-BE49-F238E27FC236}">
-                <a16:creationId xmlns:a16="http://schemas.microsoft.com/office/drawing/2014/main" id="{480BD4E2-D408-446D-BE7C-4535F412EDEE}"/>
-              </a:ext>
-            </a:extLst>
-          </p:cNvPr>
-          <p:cNvSpPr/>
+      <p:pic>
+        <p:nvPicPr>
+          <p:cNvPr id="2" name="Picture 1">
+            <a:extLst>
+              <a:ext uri="{FF2B5EF4-FFF2-40B4-BE49-F238E27FC236}">
+                <a16:creationId xmlns:a16="http://schemas.microsoft.com/office/drawing/2014/main" id="{C23EEF7E-9159-4C8F-B014-D91930CA1DEE}"/>
+              </a:ext>
+            </a:extLst>
+          </p:cNvPr>
+          <p:cNvPicPr>
+            <a:picLocks noChangeAspect="1"/>
+          </p:cNvPicPr>
           <p:nvPr/>
-        </p:nvSpPr>
+        </p:nvPicPr>
+        <p:blipFill>
+          <a:blip r:embed="rId2"/>
+          <a:stretch>
+            <a:fillRect/>
+          </a:stretch>
+        </p:blipFill>
         <p:spPr>
           <a:xfrm>
-            <a:off x="3048000" y="2828836"/>
-            <a:ext cx="6096000" cy="1754326"/>
+            <a:off x="0" y="1410252"/>
+            <a:ext cx="12192000" cy="4037496"/>
           </a:xfrm>
           <a:prstGeom prst="rect">
             <a:avLst/>
           </a:prstGeom>
         </p:spPr>
-        <p:txBody>
-          <a:bodyPr>
-            <a:spAutoFit/>
-          </a:bodyPr>
-          <a:lstStyle/>
-          <a:p>
-            <a:r>
-              <a:rPr lang="en-US" b="1" dirty="0">
-                <a:solidFill>
-                  <a:srgbClr val="222222"/>
-                </a:solidFill>
-                <a:latin typeface="Roboto"/>
-              </a:rPr>
-              <a:t>Bulma</a:t>
-            </a:r>
-            <a:r>
-              <a:rPr lang="en-US" dirty="0">
-                <a:solidFill>
-                  <a:srgbClr val="222222"/>
-                </a:solidFill>
-                <a:latin typeface="Roboto"/>
-              </a:rPr>
-              <a:t> is a free, open-source CSS </a:t>
-            </a:r>
-            <a:r>
-              <a:rPr lang="en-US" b="1" dirty="0">
-                <a:solidFill>
-                  <a:srgbClr val="222222"/>
-                </a:solidFill>
-                <a:latin typeface="Roboto"/>
-              </a:rPr>
-              <a:t>framework</a:t>
-            </a:r>
-            <a:r>
-              <a:rPr lang="en-US" dirty="0">
-                <a:solidFill>
-                  <a:srgbClr val="222222"/>
-                </a:solidFill>
-                <a:latin typeface="Roboto"/>
-              </a:rPr>
-              <a:t> based on Flexbox and used by more than 200,000 developers. The main advantage of using </a:t>
-            </a:r>
-            <a:r>
-              <a:rPr lang="en-US" b="1" dirty="0">
-                <a:solidFill>
-                  <a:srgbClr val="222222"/>
-                </a:solidFill>
-                <a:latin typeface="Roboto"/>
-              </a:rPr>
-              <a:t>Bulma</a:t>
-            </a:r>
-            <a:r>
-              <a:rPr lang="en-US" dirty="0">
-                <a:solidFill>
-                  <a:srgbClr val="222222"/>
-                </a:solidFill>
-                <a:latin typeface="Roboto"/>
-              </a:rPr>
-              <a:t> is that its box model is fully based on Flexbox.</a:t>
-            </a:r>
-            <a:r>
-              <a:rPr lang="en-US" dirty="0"/>
-              <a:t> no more CSS floats and percentages. CSS framework made easy to create </a:t>
-            </a:r>
-            <a:r>
-              <a:rPr lang="en-US" dirty="0">
-                <a:hlinkClick r:id="rId2"/>
-              </a:rPr>
-              <a:t>UI design</a:t>
-            </a:r>
-            <a:r>
-              <a:rPr lang="en-US" dirty="0"/>
-              <a:t> components and patterns.</a:t>
-            </a:r>
-          </a:p>
-        </p:txBody>
-      </p:sp>
+      </p:pic>
     </p:spTree>
     <p:extLst>
       <p:ext uri="{BB962C8B-B14F-4D97-AF65-F5344CB8AC3E}">
-        <p14:creationId xmlns:p14="http://schemas.microsoft.com/office/powerpoint/2010/main" val="1345013649"/>
+        <p14:creationId xmlns:p14="http://schemas.microsoft.com/office/powerpoint/2010/main" val="3586981736"/>
+      </p:ext>
+    </p:extLst>
+  </p:cSld>
+  <p:clrMapOvr>
+    <a:masterClrMapping/>
+  </p:clrMapOvr>
+</p:sld>
+</file>
+
+<file path=ppt/slides/slide3.xml><?xml version="1.0" encoding="utf-8"?>
+<p:sld xmlns:a="http://schemas.openxmlformats.org/drawingml/2006/main" xmlns:r="http://schemas.openxmlformats.org/officeDocument/2006/relationships" xmlns:p="http://schemas.openxmlformats.org/presentationml/2006/main">
+  <p:cSld>
+    <p:spTree>
+      <p:nvGrpSpPr>
+        <p:cNvPr id="1" name=""/>
+        <p:cNvGrpSpPr/>
+        <p:nvPr/>
+      </p:nvGrpSpPr>
+      <p:grpSpPr>
+        <a:xfrm>
+          <a:off x="0" y="0"/>
+          <a:ext cx="0" cy="0"/>
+          <a:chOff x="0" y="0"/>
+          <a:chExt cx="0" cy="0"/>
+        </a:xfrm>
+      </p:grpSpPr>
+      <p:pic>
+        <p:nvPicPr>
+          <p:cNvPr id="2" name="Picture 1">
+            <a:extLst>
+              <a:ext uri="{FF2B5EF4-FFF2-40B4-BE49-F238E27FC236}">
+                <a16:creationId xmlns:a16="http://schemas.microsoft.com/office/drawing/2014/main" id="{F3CDAF89-C7CA-4D67-97B7-22554154CC4E}"/>
+              </a:ext>
+            </a:extLst>
+          </p:cNvPr>
+          <p:cNvPicPr>
+            <a:picLocks noChangeAspect="1"/>
+          </p:cNvPicPr>
+          <p:nvPr/>
+        </p:nvPicPr>
+        <p:blipFill>
+          <a:blip r:embed="rId2"/>
+          <a:stretch>
+            <a:fillRect/>
+          </a:stretch>
+        </p:blipFill>
+        <p:spPr>
+          <a:xfrm>
+            <a:off x="1053143" y="1195666"/>
+            <a:ext cx="10085714" cy="4466667"/>
+          </a:xfrm>
+          <a:prstGeom prst="rect">
+            <a:avLst/>
+          </a:prstGeom>
+        </p:spPr>
+      </p:pic>
+    </p:spTree>
+    <p:extLst>
+      <p:ext uri="{BB962C8B-B14F-4D97-AF65-F5344CB8AC3E}">
+        <p14:creationId xmlns:p14="http://schemas.microsoft.com/office/powerpoint/2010/main" val="2059056810"/>
+      </p:ext>
+    </p:extLst>
+  </p:cSld>
+  <p:clrMapOvr>
+    <a:masterClrMapping/>
+  </p:clrMapOvr>
+</p:sld>
+</file>
+
+<file path=ppt/slides/slide4.xml><?xml version="1.0" encoding="utf-8"?>
+<p:sld xmlns:a="http://schemas.openxmlformats.org/drawingml/2006/main" xmlns:r="http://schemas.openxmlformats.org/officeDocument/2006/relationships" xmlns:p="http://schemas.openxmlformats.org/presentationml/2006/main">
+  <p:cSld>
+    <p:spTree>
+      <p:nvGrpSpPr>
+        <p:cNvPr id="1" name=""/>
+        <p:cNvGrpSpPr/>
+        <p:nvPr/>
+      </p:nvGrpSpPr>
+      <p:grpSpPr>
+        <a:xfrm>
+          <a:off x="0" y="0"/>
+          <a:ext cx="0" cy="0"/>
+          <a:chOff x="0" y="0"/>
+          <a:chExt cx="0" cy="0"/>
+        </a:xfrm>
+      </p:grpSpPr>
+      <p:pic>
+        <p:nvPicPr>
+          <p:cNvPr id="2" name="Picture 1">
+            <a:extLst>
+              <a:ext uri="{FF2B5EF4-FFF2-40B4-BE49-F238E27FC236}">
+                <a16:creationId xmlns:a16="http://schemas.microsoft.com/office/drawing/2014/main" id="{F762D1B3-BE8C-48A5-BDB5-94360E179146}"/>
+              </a:ext>
+            </a:extLst>
+          </p:cNvPr>
+          <p:cNvPicPr>
+            <a:picLocks noChangeAspect="1"/>
+          </p:cNvPicPr>
+          <p:nvPr/>
+        </p:nvPicPr>
+        <p:blipFill>
+          <a:blip r:embed="rId2"/>
+          <a:stretch>
+            <a:fillRect/>
+          </a:stretch>
+        </p:blipFill>
+        <p:spPr>
+          <a:xfrm>
+            <a:off x="3044509" y="468756"/>
+            <a:ext cx="6371429" cy="1038095"/>
+          </a:xfrm>
+          <a:prstGeom prst="rect">
+            <a:avLst/>
+          </a:prstGeom>
+        </p:spPr>
+      </p:pic>
+      <p:pic>
+        <p:nvPicPr>
+          <p:cNvPr id="3" name="Picture 2">
+            <a:extLst>
+              <a:ext uri="{FF2B5EF4-FFF2-40B4-BE49-F238E27FC236}">
+                <a16:creationId xmlns:a16="http://schemas.microsoft.com/office/drawing/2014/main" id="{AD01F9AB-9949-4DBE-8BD4-0B07698FCA1E}"/>
+              </a:ext>
+            </a:extLst>
+          </p:cNvPr>
+          <p:cNvPicPr>
+            <a:picLocks noChangeAspect="1"/>
+          </p:cNvPicPr>
+          <p:nvPr/>
+        </p:nvPicPr>
+        <p:blipFill>
+          <a:blip r:embed="rId3"/>
+          <a:stretch>
+            <a:fillRect/>
+          </a:stretch>
+        </p:blipFill>
+        <p:spPr>
+          <a:xfrm>
+            <a:off x="267429" y="1506851"/>
+            <a:ext cx="5828571" cy="4771429"/>
+          </a:xfrm>
+          <a:prstGeom prst="rect">
+            <a:avLst/>
+          </a:prstGeom>
+        </p:spPr>
+      </p:pic>
+      <p:pic>
+        <p:nvPicPr>
+          <p:cNvPr id="4" name="Picture 3">
+            <a:extLst>
+              <a:ext uri="{FF2B5EF4-FFF2-40B4-BE49-F238E27FC236}">
+                <a16:creationId xmlns:a16="http://schemas.microsoft.com/office/drawing/2014/main" id="{5FAAD36E-77C1-4472-91C6-C23228065849}"/>
+              </a:ext>
+            </a:extLst>
+          </p:cNvPr>
+          <p:cNvPicPr>
+            <a:picLocks noChangeAspect="1"/>
+          </p:cNvPicPr>
+          <p:nvPr/>
+        </p:nvPicPr>
+        <p:blipFill>
+          <a:blip r:embed="rId4"/>
+          <a:stretch>
+            <a:fillRect/>
+          </a:stretch>
+        </p:blipFill>
+        <p:spPr>
+          <a:xfrm>
+            <a:off x="6096000" y="1504369"/>
+            <a:ext cx="5896134" cy="4776393"/>
+          </a:xfrm>
+          <a:prstGeom prst="rect">
+            <a:avLst/>
+          </a:prstGeom>
+        </p:spPr>
+      </p:pic>
+    </p:spTree>
+    <p:extLst>
+      <p:ext uri="{BB962C8B-B14F-4D97-AF65-F5344CB8AC3E}">
+        <p14:creationId xmlns:p14="http://schemas.microsoft.com/office/powerpoint/2010/main" val="1685646392"/>
+      </p:ext>
+    </p:extLst>
+  </p:cSld>
+  <p:clrMapOvr>
+    <a:masterClrMapping/>
+  </p:clrMapOvr>
+</p:sld>
+</file>
+
+<file path=ppt/slides/slide5.xml><?xml version="1.0" encoding="utf-8"?>
+<p:sld xmlns:a="http://schemas.openxmlformats.org/drawingml/2006/main" xmlns:r="http://schemas.openxmlformats.org/officeDocument/2006/relationships" xmlns:p="http://schemas.openxmlformats.org/presentationml/2006/main">
+  <p:cSld>
+    <p:spTree>
+      <p:nvGrpSpPr>
+        <p:cNvPr id="1" name=""/>
+        <p:cNvGrpSpPr/>
+        <p:nvPr/>
+      </p:nvGrpSpPr>
+      <p:grpSpPr>
+        <a:xfrm>
+          <a:off x="0" y="0"/>
+          <a:ext cx="0" cy="0"/>
+          <a:chOff x="0" y="0"/>
+          <a:chExt cx="0" cy="0"/>
+        </a:xfrm>
+      </p:grpSpPr>
+      <p:pic>
+        <p:nvPicPr>
+          <p:cNvPr id="2" name="Picture 1">
+            <a:extLst>
+              <a:ext uri="{FF2B5EF4-FFF2-40B4-BE49-F238E27FC236}">
+                <a16:creationId xmlns:a16="http://schemas.microsoft.com/office/drawing/2014/main" id="{636D1066-CFB7-4885-BD10-784E43903CA6}"/>
+              </a:ext>
+            </a:extLst>
+          </p:cNvPr>
+          <p:cNvPicPr>
+            <a:picLocks noChangeAspect="1"/>
+          </p:cNvPicPr>
+          <p:nvPr/>
+        </p:nvPicPr>
+        <p:blipFill>
+          <a:blip r:embed="rId2"/>
+          <a:stretch>
+            <a:fillRect/>
+          </a:stretch>
+        </p:blipFill>
+        <p:spPr>
+          <a:xfrm>
+            <a:off x="3134095" y="2329000"/>
+            <a:ext cx="5923809" cy="2200000"/>
+          </a:xfrm>
+          <a:prstGeom prst="rect">
+            <a:avLst/>
+          </a:prstGeom>
+        </p:spPr>
+      </p:pic>
+    </p:spTree>
+    <p:extLst>
+      <p:ext uri="{BB962C8B-B14F-4D97-AF65-F5344CB8AC3E}">
+        <p14:creationId xmlns:p14="http://schemas.microsoft.com/office/powerpoint/2010/main" val="2724743834"/>
+      </p:ext>
+    </p:extLst>
+  </p:cSld>
+  <p:clrMapOvr>
+    <a:masterClrMapping/>
+  </p:clrMapOvr>
+</p:sld>
+</file>
+
+<file path=ppt/slides/slide6.xml><?xml version="1.0" encoding="utf-8"?>
+<p:sld xmlns:a="http://schemas.openxmlformats.org/drawingml/2006/main" xmlns:r="http://schemas.openxmlformats.org/officeDocument/2006/relationships" xmlns:p="http://schemas.openxmlformats.org/presentationml/2006/main">
+  <p:cSld>
+    <p:spTree>
+      <p:nvGrpSpPr>
+        <p:cNvPr id="1" name=""/>
+        <p:cNvGrpSpPr/>
+        <p:nvPr/>
+      </p:nvGrpSpPr>
+      <p:grpSpPr>
+        <a:xfrm>
+          <a:off x="0" y="0"/>
+          <a:ext cx="0" cy="0"/>
+          <a:chOff x="0" y="0"/>
+          <a:chExt cx="0" cy="0"/>
+        </a:xfrm>
+      </p:grpSpPr>
+      <p:pic>
+        <p:nvPicPr>
+          <p:cNvPr id="2" name="Picture 1">
+            <a:extLst>
+              <a:ext uri="{FF2B5EF4-FFF2-40B4-BE49-F238E27FC236}">
+                <a16:creationId xmlns:a16="http://schemas.microsoft.com/office/drawing/2014/main" id="{2B015D30-EB8F-42B3-8D0C-31EE60ACEE47}"/>
+              </a:ext>
+            </a:extLst>
+          </p:cNvPr>
+          <p:cNvPicPr>
+            <a:picLocks noChangeAspect="1"/>
+          </p:cNvPicPr>
+          <p:nvPr/>
+        </p:nvPicPr>
+        <p:blipFill>
+          <a:blip r:embed="rId2"/>
+          <a:stretch>
+            <a:fillRect/>
+          </a:stretch>
+        </p:blipFill>
+        <p:spPr>
+          <a:xfrm>
+            <a:off x="3196000" y="2833762"/>
+            <a:ext cx="5800000" cy="1190476"/>
+          </a:xfrm>
+          <a:prstGeom prst="rect">
+            <a:avLst/>
+          </a:prstGeom>
+        </p:spPr>
+      </p:pic>
+    </p:spTree>
+    <p:extLst>
+      <p:ext uri="{BB962C8B-B14F-4D97-AF65-F5344CB8AC3E}">
+        <p14:creationId xmlns:p14="http://schemas.microsoft.com/office/powerpoint/2010/main" val="1170324082"/>
+      </p:ext>
+    </p:extLst>
+  </p:cSld>
+  <p:clrMapOvr>
+    <a:masterClrMapping/>
+  </p:clrMapOvr>
+</p:sld>
+</file>
+
+<file path=ppt/slides/slide7.xml><?xml version="1.0" encoding="utf-8"?>
+<p:sld xmlns:a="http://schemas.openxmlformats.org/drawingml/2006/main" xmlns:r="http://schemas.openxmlformats.org/officeDocument/2006/relationships" xmlns:p="http://schemas.openxmlformats.org/presentationml/2006/main">
+  <p:cSld>
+    <p:spTree>
+      <p:nvGrpSpPr>
+        <p:cNvPr id="1" name=""/>
+        <p:cNvGrpSpPr/>
+        <p:nvPr/>
+      </p:nvGrpSpPr>
+      <p:grpSpPr>
+        <a:xfrm>
+          <a:off x="0" y="0"/>
+          <a:ext cx="0" cy="0"/>
+          <a:chOff x="0" y="0"/>
+          <a:chExt cx="0" cy="0"/>
+        </a:xfrm>
+      </p:grpSpPr>
+      <p:pic>
+        <p:nvPicPr>
+          <p:cNvPr id="3" name="Picture 2">
+            <a:extLst>
+              <a:ext uri="{FF2B5EF4-FFF2-40B4-BE49-F238E27FC236}">
+                <a16:creationId xmlns:a16="http://schemas.microsoft.com/office/drawing/2014/main" id="{4D8B6973-FA31-461A-B243-EA397260AF16}"/>
+              </a:ext>
+            </a:extLst>
+          </p:cNvPr>
+          <p:cNvPicPr>
+            <a:picLocks noChangeAspect="1"/>
+          </p:cNvPicPr>
+          <p:nvPr/>
+        </p:nvPicPr>
+        <p:blipFill>
+          <a:blip r:embed="rId2">
+            <a:extLst>
+              <a:ext uri="{28A0092B-C50C-407E-A947-70E740481C1C}">
+                <a14:useLocalDpi xmlns:a14="http://schemas.microsoft.com/office/drawing/2010/main" val="0"/>
+              </a:ext>
+            </a:extLst>
+          </a:blip>
+          <a:stretch>
+            <a:fillRect/>
+          </a:stretch>
+        </p:blipFill>
+        <p:spPr>
+          <a:xfrm>
+            <a:off x="609600" y="0"/>
+            <a:ext cx="10972799" cy="6858000"/>
+          </a:xfrm>
+          <a:prstGeom prst="rect">
+            <a:avLst/>
+          </a:prstGeom>
+        </p:spPr>
+      </p:pic>
+    </p:spTree>
+    <p:extLst>
+      <p:ext uri="{BB962C8B-B14F-4D97-AF65-F5344CB8AC3E}">
+        <p14:creationId xmlns:p14="http://schemas.microsoft.com/office/powerpoint/2010/main" val="2938535049"/>
+      </p:ext>
+    </p:extLst>
+  </p:cSld>
+  <p:clrMapOvr>
+    <a:masterClrMapping/>
+  </p:clrMapOvr>
+</p:sld>
+</file>
+
+<file path=ppt/slides/slide8.xml><?xml version="1.0" encoding="utf-8"?>
+<p:sld xmlns:a="http://schemas.openxmlformats.org/drawingml/2006/main" xmlns:r="http://schemas.openxmlformats.org/officeDocument/2006/relationships" xmlns:p="http://schemas.openxmlformats.org/presentationml/2006/main">
+  <p:cSld>
+    <p:spTree>
+      <p:nvGrpSpPr>
+        <p:cNvPr id="1" name=""/>
+        <p:cNvGrpSpPr/>
+        <p:nvPr/>
+      </p:nvGrpSpPr>
+      <p:grpSpPr>
+        <a:xfrm>
+          <a:off x="0" y="0"/>
+          <a:ext cx="0" cy="0"/>
+          <a:chOff x="0" y="0"/>
+          <a:chExt cx="0" cy="0"/>
+        </a:xfrm>
+      </p:grpSpPr>
+      <p:pic>
+        <p:nvPicPr>
+          <p:cNvPr id="2" name="Picture 1">
+            <a:extLst>
+              <a:ext uri="{FF2B5EF4-FFF2-40B4-BE49-F238E27FC236}">
+                <a16:creationId xmlns:a16="http://schemas.microsoft.com/office/drawing/2014/main" id="{281C7157-5E39-433C-839D-4B614A0E2B84}"/>
+              </a:ext>
+            </a:extLst>
+          </p:cNvPr>
+          <p:cNvPicPr>
+            <a:picLocks noChangeAspect="1"/>
+          </p:cNvPicPr>
+          <p:nvPr/>
+        </p:nvPicPr>
+        <p:blipFill>
+          <a:blip r:embed="rId2"/>
+          <a:stretch>
+            <a:fillRect/>
+          </a:stretch>
+        </p:blipFill>
+        <p:spPr>
+          <a:xfrm>
+            <a:off x="689827" y="0"/>
+            <a:ext cx="4218597" cy="6858000"/>
+          </a:xfrm>
+          <a:prstGeom prst="rect">
+            <a:avLst/>
+          </a:prstGeom>
+        </p:spPr>
+      </p:pic>
+    </p:spTree>
+    <p:extLst>
+      <p:ext uri="{BB962C8B-B14F-4D97-AF65-F5344CB8AC3E}">
+        <p14:creationId xmlns:p14="http://schemas.microsoft.com/office/powerpoint/2010/main" val="2350509829"/>
+      </p:ext>
+    </p:extLst>
+  </p:cSld>
+  <p:clrMapOvr>
+    <a:masterClrMapping/>
+  </p:clrMapOvr>
+</p:sld>
+</file>
+
+<file path=ppt/slides/slide9.xml><?xml version="1.0" encoding="utf-8"?>
+<p:sld xmlns:a="http://schemas.openxmlformats.org/drawingml/2006/main" xmlns:r="http://schemas.openxmlformats.org/officeDocument/2006/relationships" xmlns:p="http://schemas.openxmlformats.org/presentationml/2006/main">
+  <p:cSld>
+    <p:spTree>
+      <p:nvGrpSpPr>
+        <p:cNvPr id="1" name=""/>
+        <p:cNvGrpSpPr/>
+        <p:nvPr/>
+      </p:nvGrpSpPr>
+      <p:grpSpPr>
+        <a:xfrm>
+          <a:off x="0" y="0"/>
+          <a:ext cx="0" cy="0"/>
+          <a:chOff x="0" y="0"/>
+          <a:chExt cx="0" cy="0"/>
+        </a:xfrm>
+      </p:grpSpPr>
+      <p:sp>
+        <p:nvSpPr>
+          <p:cNvPr id="4" name="Rectangle 3">
+            <a:extLst>
+              <a:ext uri="{FF2B5EF4-FFF2-40B4-BE49-F238E27FC236}">
+                <a16:creationId xmlns:a16="http://schemas.microsoft.com/office/drawing/2014/main" id="{FAB9DD94-F73D-4682-BCD2-6221DEDF7E13}"/>
+              </a:ext>
+            </a:extLst>
+          </p:cNvPr>
+          <p:cNvSpPr/>
+          <p:nvPr/>
+        </p:nvSpPr>
+        <p:spPr>
+          <a:xfrm>
+            <a:off x="96520" y="1166843"/>
+            <a:ext cx="11866880" cy="3693319"/>
+          </a:xfrm>
+          <a:prstGeom prst="rect">
+            <a:avLst/>
+          </a:prstGeom>
+        </p:spPr>
+        <p:txBody>
+          <a:bodyPr wrap="square">
+            <a:spAutoFit/>
+          </a:bodyPr>
+          <a:lstStyle/>
+          <a:p>
+            <a:endParaRPr lang="en-US" dirty="0">
+              <a:latin typeface="SourceSansPro-Regular"/>
+            </a:endParaRPr>
+          </a:p>
+          <a:p>
+            <a:pPr marL="285750" indent="-285750">
+              <a:buFont typeface="Wingdings" panose="05000000000000000000" pitchFamily="2" charset="2"/>
+              <a:buChar char="q"/>
+            </a:pPr>
+            <a:r>
+              <a:rPr lang="en-US" b="1" dirty="0">
+                <a:latin typeface="SourceSansPro-Bold"/>
+              </a:rPr>
+              <a:t>Modern</a:t>
+            </a:r>
+            <a:r>
+              <a:rPr lang="en-US" dirty="0">
+                <a:latin typeface="SourceSansPro-Regular"/>
+              </a:rPr>
+              <a:t>: All of Bulma is based on CSS Flexbox.</a:t>
+            </a:r>
+            <a:r>
+              <a:rPr lang="en-US" dirty="0"/>
+              <a:t> A simple way to build responsive columns.</a:t>
+            </a:r>
+            <a:endParaRPr lang="en-US" dirty="0">
+              <a:latin typeface="SourceSansPro-Regular"/>
+            </a:endParaRPr>
+          </a:p>
+          <a:p>
+            <a:pPr marL="342900" indent="-342900">
+              <a:buFont typeface="Wingdings" panose="05000000000000000000" pitchFamily="2" charset="2"/>
+              <a:buChar char="q"/>
+            </a:pPr>
+            <a:r>
+              <a:rPr lang="en-US" b="1" dirty="0">
+                <a:latin typeface="SourceSansPro-Bold"/>
+              </a:rPr>
+              <a:t>100% responsive</a:t>
+            </a:r>
+            <a:r>
+              <a:rPr lang="en-US" dirty="0">
+                <a:latin typeface="SourceSansPro-Regular"/>
+              </a:rPr>
+              <a:t>: Bulma is designed to be both mobile and desktop friendly. Design</a:t>
+            </a:r>
+            <a:r>
+              <a:rPr lang="en-US" dirty="0"/>
+              <a:t> for a mobile-first.</a:t>
+            </a:r>
+            <a:br>
+              <a:rPr lang="en-US" dirty="0"/>
+            </a:br>
+            <a:r>
+              <a:rPr lang="en-US" dirty="0"/>
+              <a:t>Every element in Bulma is </a:t>
+            </a:r>
+            <a:r>
+              <a:rPr lang="en-US" b="1" dirty="0"/>
+              <a:t>mobile-first</a:t>
+            </a:r>
+            <a:r>
+              <a:rPr lang="en-US" dirty="0"/>
+              <a:t> and optimizes for </a:t>
+            </a:r>
+            <a:r>
+              <a:rPr lang="en-US" b="1" dirty="0"/>
+              <a:t>vertical reading</a:t>
+            </a:r>
+            <a:r>
+              <a:rPr lang="en-US" dirty="0"/>
+              <a:t>, so by default on mobile:</a:t>
+            </a:r>
+          </a:p>
+          <a:p>
+            <a:pPr marL="627063" indent="-285750">
+              <a:buFont typeface="Courier New" panose="02070309020205020404" pitchFamily="49" charset="0"/>
+              <a:buChar char="o"/>
+            </a:pPr>
+            <a:r>
+              <a:rPr lang="en-US" dirty="0"/>
+              <a:t>columns are stacked vertically</a:t>
+            </a:r>
+          </a:p>
+          <a:p>
+            <a:pPr marL="627063" indent="-285750">
+              <a:buFont typeface="Courier New" panose="02070309020205020404" pitchFamily="49" charset="0"/>
+              <a:buChar char="o"/>
+            </a:pPr>
+            <a:r>
+              <a:rPr lang="en-US" dirty="0"/>
+              <a:t>the level component will show its children stacked vertically</a:t>
+            </a:r>
+          </a:p>
+          <a:p>
+            <a:pPr marL="627063" indent="-285750">
+              <a:buFont typeface="Courier New" panose="02070309020205020404" pitchFamily="49" charset="0"/>
+              <a:buChar char="o"/>
+            </a:pPr>
+            <a:r>
+              <a:rPr lang="en-US" dirty="0"/>
+              <a:t>the nav menu will be hidden</a:t>
+            </a:r>
+          </a:p>
+          <a:p>
+            <a:pPr marL="285750" indent="-285750">
+              <a:buFont typeface="Wingdings" panose="05000000000000000000" pitchFamily="2" charset="2"/>
+              <a:buChar char="q"/>
+            </a:pPr>
+            <a:r>
+              <a:rPr lang="en-US" b="1" dirty="0"/>
+              <a:t>Modularity: </a:t>
+            </a:r>
+            <a:r>
+              <a:rPr lang="en-US" dirty="0"/>
+              <a:t>Bulma consists of </a:t>
+            </a:r>
+            <a:r>
+              <a:rPr lang="en-US" b="1" dirty="0"/>
+              <a:t>39</a:t>
+            </a:r>
+            <a:r>
+              <a:rPr lang="en-US" dirty="0"/>
+              <a:t> .sass files that you can import </a:t>
+            </a:r>
+            <a:r>
+              <a:rPr lang="en-US" b="1" dirty="0"/>
+              <a:t>individually. </a:t>
+            </a:r>
+            <a:r>
+              <a:rPr lang="en-US" dirty="0"/>
+              <a:t>Just import what you need.</a:t>
+            </a:r>
+            <a:endParaRPr lang="en-US" dirty="0">
+              <a:latin typeface="SourceSansPro-Regular"/>
+            </a:endParaRPr>
+          </a:p>
+          <a:p>
+            <a:pPr marL="285750" indent="-285750">
+              <a:buFont typeface="Wingdings" panose="05000000000000000000" pitchFamily="2" charset="2"/>
+              <a:buChar char="q"/>
+            </a:pPr>
+            <a:r>
+              <a:rPr lang="en-US" b="1" dirty="0">
+                <a:latin typeface="SourceSansPro-Bold"/>
+              </a:rPr>
+              <a:t>Easy to learn</a:t>
+            </a:r>
+            <a:r>
+              <a:rPr lang="en-US" dirty="0">
+                <a:latin typeface="SourceSansPro-Regular"/>
+              </a:rPr>
+              <a:t>: Most users get started within minutes</a:t>
+            </a:r>
+          </a:p>
+          <a:p>
+            <a:pPr marL="285750" indent="-285750">
+              <a:buFont typeface="Wingdings" panose="05000000000000000000" pitchFamily="2" charset="2"/>
+              <a:buChar char="q"/>
+            </a:pPr>
+            <a:r>
+              <a:rPr lang="en-US" b="1" dirty="0">
+                <a:latin typeface="SourceSansPro-Bold"/>
+              </a:rPr>
+              <a:t>Simple syntax</a:t>
+            </a:r>
+            <a:r>
+              <a:rPr lang="en-US" dirty="0">
+                <a:latin typeface="SourceSansPro-Regular"/>
+              </a:rPr>
+              <a:t>: Bulma makes sure to use the minimal HTML required, so your code is easy to read and write</a:t>
+            </a:r>
+          </a:p>
+          <a:p>
+            <a:pPr marL="285750" indent="-285750">
+              <a:buFont typeface="Wingdings" panose="05000000000000000000" pitchFamily="2" charset="2"/>
+              <a:buChar char="q"/>
+            </a:pPr>
+            <a:r>
+              <a:rPr lang="en-US" b="1" dirty="0">
+                <a:latin typeface="SourceSansPro-Bold"/>
+              </a:rPr>
+              <a:t>Customizable</a:t>
+            </a:r>
+            <a:r>
+              <a:rPr lang="en-US" dirty="0">
+                <a:latin typeface="SourceSansPro-Regular"/>
+              </a:rPr>
+              <a:t>: With over 300 SASS variables, you can apply your own branding to Bulma</a:t>
+            </a:r>
+          </a:p>
+          <a:p>
+            <a:pPr marL="285750" indent="-285750">
+              <a:buFont typeface="Wingdings" panose="05000000000000000000" pitchFamily="2" charset="2"/>
+              <a:buChar char="q"/>
+            </a:pPr>
+            <a:r>
+              <a:rPr lang="en-US" b="1" dirty="0">
+                <a:latin typeface="SourceSansPro-Bold"/>
+              </a:rPr>
+              <a:t>No JavaScript</a:t>
+            </a:r>
+            <a:r>
+              <a:rPr lang="en-US" dirty="0">
+                <a:latin typeface="SourceSansPro-Regular"/>
+              </a:rPr>
+              <a:t>: Because Bulma is CSS-only, it integrates gracefully with any JavaScript framework (Angular, VueJS, React, or just plain Vanilla JavaScript)</a:t>
+            </a:r>
+            <a:endParaRPr lang="en-US" dirty="0"/>
+          </a:p>
+        </p:txBody>
+      </p:sp>
+      <p:sp>
+        <p:nvSpPr>
+          <p:cNvPr id="6" name="Rectangle 5">
+            <a:extLst>
+              <a:ext uri="{FF2B5EF4-FFF2-40B4-BE49-F238E27FC236}">
+                <a16:creationId xmlns:a16="http://schemas.microsoft.com/office/drawing/2014/main" id="{1E0264A4-D6A9-432E-81A9-CAD9C0D7AF36}"/>
+              </a:ext>
+            </a:extLst>
+          </p:cNvPr>
+          <p:cNvSpPr/>
+          <p:nvPr/>
+        </p:nvSpPr>
+        <p:spPr>
+          <a:xfrm>
+            <a:off x="192549" y="517230"/>
+            <a:ext cx="7293407" cy="369332"/>
+          </a:xfrm>
+          <a:prstGeom prst="rect">
+            <a:avLst/>
+          </a:prstGeom>
+        </p:spPr>
+        <p:txBody>
+          <a:bodyPr wrap="none">
+            <a:spAutoFit/>
+          </a:bodyPr>
+          <a:lstStyle/>
+          <a:p>
+            <a:r>
+              <a:rPr lang="en-US" b="1" dirty="0">
+                <a:latin typeface="SourceSansPro-Regular"/>
+              </a:rPr>
+              <a:t>Here are a few reasons why Bulma is different than other CSS frameworks:</a:t>
+            </a:r>
+          </a:p>
+        </p:txBody>
+      </p:sp>
+    </p:spTree>
+    <p:extLst>
+      <p:ext uri="{BB962C8B-B14F-4D97-AF65-F5344CB8AC3E}">
+        <p14:creationId xmlns:p14="http://schemas.microsoft.com/office/powerpoint/2010/main" val="2289369834"/>
       </p:ext>
     </p:extLst>
   </p:cSld>

</xml_diff>

<commit_message>
Add some content to Bulma overview Presentation
</commit_message>
<xml_diff>
--- a/Course Materials/01- Introduction/01_04 - An Overview of Bulma Framework.pptx
+++ b/Course Materials/01- Introduction/01_04 - An Overview of Bulma Framework.pptx
@@ -6,14 +6,18 @@
   </p:sldMasterIdLst>
   <p:sldIdLst>
     <p:sldId id="258" r:id="rId2"/>
-    <p:sldId id="259" r:id="rId3"/>
-    <p:sldId id="260" r:id="rId4"/>
-    <p:sldId id="261" r:id="rId5"/>
-    <p:sldId id="262" r:id="rId6"/>
-    <p:sldId id="263" r:id="rId7"/>
-    <p:sldId id="267" r:id="rId8"/>
-    <p:sldId id="264" r:id="rId9"/>
-    <p:sldId id="256" r:id="rId10"/>
+    <p:sldId id="268" r:id="rId3"/>
+    <p:sldId id="263" r:id="rId4"/>
+    <p:sldId id="269" r:id="rId5"/>
+    <p:sldId id="259" r:id="rId6"/>
+    <p:sldId id="270" r:id="rId7"/>
+    <p:sldId id="260" r:id="rId8"/>
+    <p:sldId id="271" r:id="rId9"/>
+    <p:sldId id="272" r:id="rId10"/>
+    <p:sldId id="273" r:id="rId11"/>
+    <p:sldId id="274" r:id="rId12"/>
+    <p:sldId id="261" r:id="rId13"/>
+    <p:sldId id="267" r:id="rId14"/>
   </p:sldIdLst>
   <p:sldSz cx="12192000" cy="6858000"/>
   <p:notesSz cx="6858000" cy="9144000"/>
@@ -279,7 +283,7 @@
           <a:p>
             <a:fld id="{AE77EB8F-A44A-47BB-9CF9-CF844E8E2DD5}" type="datetimeFigureOut">
               <a:rPr lang="en-US" smtClean="0"/>
-              <a:t>12/2/2019</a:t>
+              <a:t>12/3/2019</a:t>
             </a:fld>
             <a:endParaRPr lang="en-US"/>
           </a:p>
@@ -477,7 +481,7 @@
           <a:p>
             <a:fld id="{AE77EB8F-A44A-47BB-9CF9-CF844E8E2DD5}" type="datetimeFigureOut">
               <a:rPr lang="en-US" smtClean="0"/>
-              <a:t>12/2/2019</a:t>
+              <a:t>12/3/2019</a:t>
             </a:fld>
             <a:endParaRPr lang="en-US"/>
           </a:p>
@@ -685,7 +689,7 @@
           <a:p>
             <a:fld id="{AE77EB8F-A44A-47BB-9CF9-CF844E8E2DD5}" type="datetimeFigureOut">
               <a:rPr lang="en-US" smtClean="0"/>
-              <a:t>12/2/2019</a:t>
+              <a:t>12/3/2019</a:t>
             </a:fld>
             <a:endParaRPr lang="en-US"/>
           </a:p>
@@ -883,7 +887,7 @@
           <a:p>
             <a:fld id="{AE77EB8F-A44A-47BB-9CF9-CF844E8E2DD5}" type="datetimeFigureOut">
               <a:rPr lang="en-US" smtClean="0"/>
-              <a:t>12/2/2019</a:t>
+              <a:t>12/3/2019</a:t>
             </a:fld>
             <a:endParaRPr lang="en-US"/>
           </a:p>
@@ -1158,7 +1162,7 @@
           <a:p>
             <a:fld id="{AE77EB8F-A44A-47BB-9CF9-CF844E8E2DD5}" type="datetimeFigureOut">
               <a:rPr lang="en-US" smtClean="0"/>
-              <a:t>12/2/2019</a:t>
+              <a:t>12/3/2019</a:t>
             </a:fld>
             <a:endParaRPr lang="en-US"/>
           </a:p>
@@ -1423,7 +1427,7 @@
           <a:p>
             <a:fld id="{AE77EB8F-A44A-47BB-9CF9-CF844E8E2DD5}" type="datetimeFigureOut">
               <a:rPr lang="en-US" smtClean="0"/>
-              <a:t>12/2/2019</a:t>
+              <a:t>12/3/2019</a:t>
             </a:fld>
             <a:endParaRPr lang="en-US"/>
           </a:p>
@@ -1835,7 +1839,7 @@
           <a:p>
             <a:fld id="{AE77EB8F-A44A-47BB-9CF9-CF844E8E2DD5}" type="datetimeFigureOut">
               <a:rPr lang="en-US" smtClean="0"/>
-              <a:t>12/2/2019</a:t>
+              <a:t>12/3/2019</a:t>
             </a:fld>
             <a:endParaRPr lang="en-US"/>
           </a:p>
@@ -1976,7 +1980,7 @@
           <a:p>
             <a:fld id="{AE77EB8F-A44A-47BB-9CF9-CF844E8E2DD5}" type="datetimeFigureOut">
               <a:rPr lang="en-US" smtClean="0"/>
-              <a:t>12/2/2019</a:t>
+              <a:t>12/3/2019</a:t>
             </a:fld>
             <a:endParaRPr lang="en-US"/>
           </a:p>
@@ -2089,7 +2093,7 @@
           <a:p>
             <a:fld id="{AE77EB8F-A44A-47BB-9CF9-CF844E8E2DD5}" type="datetimeFigureOut">
               <a:rPr lang="en-US" smtClean="0"/>
-              <a:t>12/2/2019</a:t>
+              <a:t>12/3/2019</a:t>
             </a:fld>
             <a:endParaRPr lang="en-US"/>
           </a:p>
@@ -2400,7 +2404,7 @@
           <a:p>
             <a:fld id="{AE77EB8F-A44A-47BB-9CF9-CF844E8E2DD5}" type="datetimeFigureOut">
               <a:rPr lang="en-US" smtClean="0"/>
-              <a:t>12/2/2019</a:t>
+              <a:t>12/3/2019</a:t>
             </a:fld>
             <a:endParaRPr lang="en-US"/>
           </a:p>
@@ -2688,7 +2692,7 @@
           <a:p>
             <a:fld id="{AE77EB8F-A44A-47BB-9CF9-CF844E8E2DD5}" type="datetimeFigureOut">
               <a:rPr lang="en-US" smtClean="0"/>
-              <a:t>12/2/2019</a:t>
+              <a:t>12/3/2019</a:t>
             </a:fld>
             <a:endParaRPr lang="en-US"/>
           </a:p>
@@ -2929,7 +2933,7 @@
           <a:p>
             <a:fld id="{AE77EB8F-A44A-47BB-9CF9-CF844E8E2DD5}" type="datetimeFigureOut">
               <a:rPr lang="en-US" smtClean="0"/>
-              <a:t>12/2/2019</a:t>
+              <a:t>12/3/2019</a:t>
             </a:fld>
             <a:endParaRPr lang="en-US"/>
           </a:p>
@@ -3360,8 +3364,8 @@
         </p:nvSpPr>
         <p:spPr>
           <a:xfrm>
-            <a:off x="4402908" y="383688"/>
-            <a:ext cx="3386183" cy="369332"/>
+            <a:off x="2506502" y="289049"/>
+            <a:ext cx="7313220" cy="584775"/>
           </a:xfrm>
           <a:prstGeom prst="rect">
             <a:avLst/>
@@ -3375,10 +3379,32 @@
           <a:lstStyle/>
           <a:p>
             <a:r>
-              <a:rPr lang="en-US"/>
-              <a:t>An Overview of Bulma Framework</a:t>
-            </a:r>
-            <a:endParaRPr lang="fa-IR"/>
+              <a:rPr lang="en-US" sz="3200" b="1">
+                <a:latin typeface="Poppins" panose="00000500000000000000" pitchFamily="50" charset="0"/>
+                <a:cs typeface="Poppins" panose="00000500000000000000" pitchFamily="50" charset="0"/>
+              </a:rPr>
+              <a:t>An Overview of </a:t>
+            </a:r>
+            <a:r>
+              <a:rPr lang="en-US" sz="3200" b="1">
+                <a:solidFill>
+                  <a:srgbClr val="00D1B2"/>
+                </a:solidFill>
+                <a:latin typeface="Poppins" panose="00000500000000000000" pitchFamily="50" charset="0"/>
+                <a:cs typeface="Poppins" panose="00000500000000000000" pitchFamily="50" charset="0"/>
+              </a:rPr>
+              <a:t>Bulma</a:t>
+            </a:r>
+            <a:r>
+              <a:rPr lang="en-US" sz="3200" b="1">
+                <a:latin typeface="Poppins" panose="00000500000000000000" pitchFamily="50" charset="0"/>
+                <a:cs typeface="Poppins" panose="00000500000000000000" pitchFamily="50" charset="0"/>
+              </a:rPr>
+              <a:t> Framework</a:t>
+            </a:r>
+            <a:endParaRPr lang="fa-IR" sz="3200" b="1">
+              <a:latin typeface="Poppins" panose="00000500000000000000" pitchFamily="50" charset="0"/>
+            </a:endParaRPr>
           </a:p>
         </p:txBody>
       </p:sp>
@@ -3396,8 +3422,8 @@
         </p:nvSpPr>
         <p:spPr>
           <a:xfrm>
-            <a:off x="5272150" y="893766"/>
-            <a:ext cx="1647695" cy="369332"/>
+            <a:off x="4766149" y="1007346"/>
+            <a:ext cx="2659702" cy="523220"/>
           </a:xfrm>
           <a:prstGeom prst="rect">
             <a:avLst/>
@@ -3411,10 +3437,33 @@
           <a:lstStyle/>
           <a:p>
             <a:r>
-              <a:rPr lang="en-US"/>
-              <a:t>What is Bulma?</a:t>
-            </a:r>
-            <a:endParaRPr lang="fa-IR"/>
+              <a:rPr lang="en-US" sz="2800">
+                <a:latin typeface="Roboto" panose="02000000000000000000" pitchFamily="2" charset="0"/>
+                <a:ea typeface="Roboto" panose="02000000000000000000" pitchFamily="2" charset="0"/>
+              </a:rPr>
+              <a:t>What is </a:t>
+            </a:r>
+            <a:r>
+              <a:rPr lang="en-US" sz="2800" b="1">
+                <a:solidFill>
+                  <a:srgbClr val="00D1B2"/>
+                </a:solidFill>
+                <a:latin typeface="Roboto" panose="02000000000000000000" pitchFamily="2" charset="0"/>
+                <a:ea typeface="Roboto" panose="02000000000000000000" pitchFamily="2" charset="0"/>
+              </a:rPr>
+              <a:t>Bulma</a:t>
+            </a:r>
+            <a:r>
+              <a:rPr lang="en-US" sz="2800">
+                <a:latin typeface="Roboto" panose="02000000000000000000" pitchFamily="2" charset="0"/>
+                <a:ea typeface="Roboto" panose="02000000000000000000" pitchFamily="2" charset="0"/>
+              </a:rPr>
+              <a:t>?</a:t>
+            </a:r>
+            <a:endParaRPr lang="fa-IR" sz="2800">
+              <a:latin typeface="Roboto" panose="02000000000000000000" pitchFamily="2" charset="0"/>
+              <a:ea typeface="Roboto" panose="02000000000000000000" pitchFamily="2" charset="0"/>
+            </a:endParaRPr>
           </a:p>
         </p:txBody>
       </p:sp>
@@ -3432,8 +3481,8 @@
         </p:nvSpPr>
         <p:spPr>
           <a:xfrm>
-            <a:off x="3266112" y="1411204"/>
-            <a:ext cx="6381228" cy="646331"/>
+            <a:off x="1856446" y="1831862"/>
+            <a:ext cx="8479108" cy="400110"/>
           </a:xfrm>
           <a:prstGeom prst="rect">
             <a:avLst/>
@@ -3446,75 +3495,92 @@
           <a:lstStyle/>
           <a:p>
             <a:r>
-              <a:rPr lang="en-US" b="1">
+              <a:rPr lang="en-US" sz="2000" b="1">
+                <a:solidFill>
+                  <a:srgbClr val="00D1B2"/>
+                </a:solidFill>
+                <a:latin typeface="Roboto" panose="02000000000000000000" pitchFamily="2" charset="0"/>
+                <a:ea typeface="Roboto" panose="02000000000000000000" pitchFamily="2" charset="0"/>
+              </a:rPr>
+              <a:t>Bulma</a:t>
+            </a:r>
+            <a:r>
+              <a:rPr lang="en-US" sz="2000">
                 <a:solidFill>
                   <a:srgbClr val="363636"/>
                 </a:solidFill>
-                <a:latin typeface="BlinkMacSystemFont"/>
-              </a:rPr>
-              <a:t>Bulma</a:t>
-            </a:r>
-            <a:r>
-              <a:rPr lang="en-US">
+                <a:latin typeface="Roboto" panose="02000000000000000000" pitchFamily="2" charset="0"/>
+                <a:ea typeface="Roboto" panose="02000000000000000000" pitchFamily="2" charset="0"/>
+              </a:rPr>
+              <a:t> is a </a:t>
+            </a:r>
+            <a:r>
+              <a:rPr lang="en-US" sz="2000" b="1">
                 <a:solidFill>
                   <a:srgbClr val="363636"/>
                 </a:solidFill>
-                <a:latin typeface="BlinkMacSystemFont"/>
-              </a:rPr>
-              <a:t> is a free, open source CSS framework based on </a:t>
-            </a:r>
-            <a:r>
-              <a:rPr lang="en-US" b="1">
+                <a:latin typeface="Roboto" panose="02000000000000000000" pitchFamily="2" charset="0"/>
+                <a:ea typeface="Roboto" panose="02000000000000000000" pitchFamily="2" charset="0"/>
+              </a:rPr>
+              <a:t>Free</a:t>
+            </a:r>
+            <a:r>
+              <a:rPr lang="en-US" sz="2000">
                 <a:solidFill>
                   <a:srgbClr val="363636"/>
                 </a:solidFill>
-                <a:latin typeface="BlinkMacSystemFont"/>
+                <a:latin typeface="Roboto" panose="02000000000000000000" pitchFamily="2" charset="0"/>
+                <a:ea typeface="Roboto" panose="02000000000000000000" pitchFamily="2" charset="0"/>
+              </a:rPr>
+              <a:t>, </a:t>
+            </a:r>
+            <a:r>
+              <a:rPr lang="en-US" sz="2000" b="1">
+                <a:solidFill>
+                  <a:srgbClr val="363636"/>
+                </a:solidFill>
+                <a:latin typeface="Roboto" panose="02000000000000000000" pitchFamily="2" charset="0"/>
+                <a:ea typeface="Roboto" panose="02000000000000000000" pitchFamily="2" charset="0"/>
+              </a:rPr>
+              <a:t>Modular, Responsive</a:t>
+            </a:r>
+            <a:r>
+              <a:rPr lang="en-US" sz="2000">
+                <a:solidFill>
+                  <a:srgbClr val="363636"/>
+                </a:solidFill>
+                <a:latin typeface="Roboto" panose="02000000000000000000" pitchFamily="2" charset="0"/>
+                <a:ea typeface="Roboto" panose="02000000000000000000" pitchFamily="2" charset="0"/>
+              </a:rPr>
+              <a:t> CSS framework based on </a:t>
+            </a:r>
+            <a:r>
+              <a:rPr lang="en-US" sz="2000" b="1">
+                <a:solidFill>
+                  <a:srgbClr val="363636"/>
+                </a:solidFill>
+                <a:latin typeface="Roboto" panose="02000000000000000000" pitchFamily="2" charset="0"/>
+                <a:ea typeface="Roboto" panose="02000000000000000000" pitchFamily="2" charset="0"/>
               </a:rPr>
               <a:t>Flexbox</a:t>
             </a:r>
-            <a:r>
-              <a:rPr lang="en-US">
-                <a:solidFill>
-                  <a:srgbClr val="363636"/>
-                </a:solidFill>
-                <a:latin typeface="BlinkMacSystemFont"/>
-              </a:rPr>
-              <a:t> and used by more than </a:t>
-            </a:r>
-            <a:r>
-              <a:rPr lang="en-US" b="1">
-                <a:solidFill>
-                  <a:srgbClr val="363636"/>
-                </a:solidFill>
-                <a:latin typeface="BlinkMacSystemFont"/>
-              </a:rPr>
-              <a:t>200,000</a:t>
-            </a:r>
-            <a:r>
-              <a:rPr lang="en-US">
-                <a:solidFill>
-                  <a:srgbClr val="363636"/>
-                </a:solidFill>
-                <a:latin typeface="BlinkMacSystemFont"/>
-              </a:rPr>
-              <a:t> developers</a:t>
-            </a:r>
-            <a:endParaRPr lang="en-US" b="0" i="0">
+            <a:endParaRPr lang="en-US" sz="2000" b="0" i="0">
               <a:solidFill>
                 <a:srgbClr val="363636"/>
               </a:solidFill>
               <a:effectLst/>
-              <a:latin typeface="BlinkMacSystemFont"/>
+              <a:latin typeface="Roboto" panose="02000000000000000000" pitchFamily="2" charset="0"/>
+              <a:ea typeface="Roboto" panose="02000000000000000000" pitchFamily="2" charset="0"/>
             </a:endParaRPr>
           </a:p>
         </p:txBody>
       </p:sp>
       <p:pic>
         <p:nvPicPr>
-          <p:cNvPr id="6" name="Picture 5">
-            <a:extLst>
-              <a:ext uri="{FF2B5EF4-FFF2-40B4-BE49-F238E27FC236}">
-                <a16:creationId xmlns:a16="http://schemas.microsoft.com/office/drawing/2014/main" id="{34D32B3F-F6E8-411C-B3E8-027CBC29F6E4}"/>
+          <p:cNvPr id="8" name="Picture 7">
+            <a:extLst>
+              <a:ext uri="{FF2B5EF4-FFF2-40B4-BE49-F238E27FC236}">
+                <a16:creationId xmlns:a16="http://schemas.microsoft.com/office/drawing/2014/main" id="{978984CB-ED27-40E7-B04D-428473BC8C5A}"/>
               </a:ext>
             </a:extLst>
           </p:cNvPr>
@@ -3537,50 +3603,20 @@
         </p:blipFill>
         <p:spPr>
           <a:xfrm>
-            <a:off x="1009647" y="2345315"/>
-            <a:ext cx="10172700" cy="1762125"/>
+            <a:off x="1108710" y="4394654"/>
+            <a:ext cx="9974580" cy="2087880"/>
           </a:xfrm>
           <a:prstGeom prst="rect">
             <a:avLst/>
           </a:prstGeom>
-          <a:solidFill>
-            <a:srgbClr val="FFFFFF">
-              <a:shade val="85000"/>
-            </a:srgbClr>
-          </a:solidFill>
-          <a:ln w="88900" cap="sq">
-            <a:solidFill>
-              <a:srgbClr val="FFFFFF"/>
-            </a:solidFill>
-            <a:miter lim="800000"/>
-          </a:ln>
-          <a:effectLst>
-            <a:outerShdw blurRad="55000" dist="18000" dir="5400000" algn="tl" rotWithShape="0">
-              <a:srgbClr val="000000">
-                <a:alpha val="40000"/>
-              </a:srgbClr>
-            </a:outerShdw>
-          </a:effectLst>
-          <a:scene3d>
-            <a:camera prst="orthographicFront"/>
-            <a:lightRig rig="twoPt" dir="t">
-              <a:rot lat="0" lon="0" rev="7200000"/>
-            </a:lightRig>
-          </a:scene3d>
-          <a:sp3d>
-            <a:bevelT w="25400" h="19050"/>
-            <a:contourClr>
-              <a:srgbClr val="FFFFFF"/>
-            </a:contourClr>
-          </a:sp3d>
         </p:spPr>
       </p:pic>
       <p:pic>
         <p:nvPicPr>
-          <p:cNvPr id="8" name="Picture 7">
-            <a:extLst>
-              <a:ext uri="{FF2B5EF4-FFF2-40B4-BE49-F238E27FC236}">
-                <a16:creationId xmlns:a16="http://schemas.microsoft.com/office/drawing/2014/main" id="{978984CB-ED27-40E7-B04D-428473BC8C5A}"/>
+          <p:cNvPr id="7" name="Picture 6">
+            <a:extLst>
+              <a:ext uri="{FF2B5EF4-FFF2-40B4-BE49-F238E27FC236}">
+                <a16:creationId xmlns:a16="http://schemas.microsoft.com/office/drawing/2014/main" id="{E0401D47-5DFC-4659-9777-C8F40DA6B1DD}"/>
               </a:ext>
             </a:extLst>
           </p:cNvPr>
@@ -3603,8 +3639,152 @@
         </p:blipFill>
         <p:spPr>
           <a:xfrm>
-            <a:off x="0" y="4224886"/>
-            <a:ext cx="12192000" cy="2552031"/>
+            <a:off x="6397660" y="2365491"/>
+            <a:ext cx="1962150" cy="1762125"/>
+          </a:xfrm>
+          <a:prstGeom prst="rect">
+            <a:avLst/>
+          </a:prstGeom>
+        </p:spPr>
+      </p:pic>
+      <p:pic>
+        <p:nvPicPr>
+          <p:cNvPr id="10" name="Picture 9">
+            <a:extLst>
+              <a:ext uri="{FF2B5EF4-FFF2-40B4-BE49-F238E27FC236}">
+                <a16:creationId xmlns:a16="http://schemas.microsoft.com/office/drawing/2014/main" id="{C5F612CC-7CA4-4797-A88B-22FF80F7FC15}"/>
+              </a:ext>
+            </a:extLst>
+          </p:cNvPr>
+          <p:cNvPicPr>
+            <a:picLocks noChangeAspect="1"/>
+          </p:cNvPicPr>
+          <p:nvPr/>
+        </p:nvPicPr>
+        <p:blipFill>
+          <a:blip r:embed="rId4">
+            <a:extLst>
+              <a:ext uri="{28A0092B-C50C-407E-A947-70E740481C1C}">
+                <a14:useLocalDpi xmlns:a14="http://schemas.microsoft.com/office/drawing/2010/main" val="0"/>
+              </a:ext>
+            </a:extLst>
+          </a:blip>
+          <a:stretch>
+            <a:fillRect/>
+          </a:stretch>
+        </p:blipFill>
+        <p:spPr>
+          <a:xfrm>
+            <a:off x="1356313" y="2365491"/>
+            <a:ext cx="1962150" cy="1762125"/>
+          </a:xfrm>
+          <a:prstGeom prst="rect">
+            <a:avLst/>
+          </a:prstGeom>
+        </p:spPr>
+      </p:pic>
+      <p:pic>
+        <p:nvPicPr>
+          <p:cNvPr id="12" name="Picture 11">
+            <a:extLst>
+              <a:ext uri="{FF2B5EF4-FFF2-40B4-BE49-F238E27FC236}">
+                <a16:creationId xmlns:a16="http://schemas.microsoft.com/office/drawing/2014/main" id="{FDE6C072-187E-4732-9428-0394E487B83F}"/>
+              </a:ext>
+            </a:extLst>
+          </p:cNvPr>
+          <p:cNvPicPr>
+            <a:picLocks noChangeAspect="1"/>
+          </p:cNvPicPr>
+          <p:nvPr/>
+        </p:nvPicPr>
+        <p:blipFill>
+          <a:blip r:embed="rId5">
+            <a:extLst>
+              <a:ext uri="{28A0092B-C50C-407E-A947-70E740481C1C}">
+                <a14:useLocalDpi xmlns:a14="http://schemas.microsoft.com/office/drawing/2010/main" val="0"/>
+              </a:ext>
+            </a:extLst>
+          </a:blip>
+          <a:stretch>
+            <a:fillRect/>
+          </a:stretch>
+        </p:blipFill>
+        <p:spPr>
+          <a:xfrm>
+            <a:off x="3876986" y="2365491"/>
+            <a:ext cx="1962150" cy="1762125"/>
+          </a:xfrm>
+          <a:prstGeom prst="rect">
+            <a:avLst/>
+          </a:prstGeom>
+        </p:spPr>
+      </p:pic>
+      <p:pic>
+        <p:nvPicPr>
+          <p:cNvPr id="14" name="Picture 13">
+            <a:extLst>
+              <a:ext uri="{FF2B5EF4-FFF2-40B4-BE49-F238E27FC236}">
+                <a16:creationId xmlns:a16="http://schemas.microsoft.com/office/drawing/2014/main" id="{01937E12-4C2E-4DEE-B893-619B78DA9547}"/>
+              </a:ext>
+            </a:extLst>
+          </p:cNvPr>
+          <p:cNvPicPr>
+            <a:picLocks noChangeAspect="1"/>
+          </p:cNvPicPr>
+          <p:nvPr/>
+        </p:nvPicPr>
+        <p:blipFill>
+          <a:blip r:embed="rId6">
+            <a:extLst>
+              <a:ext uri="{28A0092B-C50C-407E-A947-70E740481C1C}">
+                <a14:useLocalDpi xmlns:a14="http://schemas.microsoft.com/office/drawing/2010/main" val="0"/>
+              </a:ext>
+            </a:extLst>
+          </a:blip>
+          <a:stretch>
+            <a:fillRect/>
+          </a:stretch>
+        </p:blipFill>
+        <p:spPr>
+          <a:xfrm>
+            <a:off x="8918333" y="2365491"/>
+            <a:ext cx="1962150" cy="1762125"/>
+          </a:xfrm>
+          <a:prstGeom prst="rect">
+            <a:avLst/>
+          </a:prstGeom>
+        </p:spPr>
+      </p:pic>
+      <p:pic>
+        <p:nvPicPr>
+          <p:cNvPr id="16" name="Picture 15">
+            <a:extLst>
+              <a:ext uri="{FF2B5EF4-FFF2-40B4-BE49-F238E27FC236}">
+                <a16:creationId xmlns:a16="http://schemas.microsoft.com/office/drawing/2014/main" id="{3F1F8F41-988A-4AD7-967F-3105DDF3A31E}"/>
+              </a:ext>
+            </a:extLst>
+          </p:cNvPr>
+          <p:cNvPicPr>
+            <a:picLocks noChangeAspect="1"/>
+          </p:cNvPicPr>
+          <p:nvPr/>
+        </p:nvPicPr>
+        <p:blipFill>
+          <a:blip r:embed="rId7">
+            <a:extLst>
+              <a:ext uri="{28A0092B-C50C-407E-A947-70E740481C1C}">
+                <a14:useLocalDpi xmlns:a14="http://schemas.microsoft.com/office/drawing/2010/main" val="0"/>
+              </a:ext>
+            </a:extLst>
+          </a:blip>
+          <a:stretch>
+            <a:fillRect/>
+          </a:stretch>
+        </p:blipFill>
+        <p:spPr>
+          <a:xfrm>
+            <a:off x="3048000" y="2667000"/>
+            <a:ext cx="6096000" cy="1524000"/>
           </a:xfrm>
           <a:prstGeom prst="rect">
             <a:avLst/>
@@ -3624,7 +3804,1093 @@
 </p:sld>
 </file>
 
+<file path=ppt/slides/slide10.xml><?xml version="1.0" encoding="utf-8"?>
+<p:sld xmlns:a="http://schemas.openxmlformats.org/drawingml/2006/main" xmlns:r="http://schemas.openxmlformats.org/officeDocument/2006/relationships" xmlns:p="http://schemas.openxmlformats.org/presentationml/2006/main">
+  <p:cSld>
+    <p:spTree>
+      <p:nvGrpSpPr>
+        <p:cNvPr id="1" name=""/>
+        <p:cNvGrpSpPr/>
+        <p:nvPr/>
+      </p:nvGrpSpPr>
+      <p:grpSpPr>
+        <a:xfrm>
+          <a:off x="0" y="0"/>
+          <a:ext cx="0" cy="0"/>
+          <a:chOff x="0" y="0"/>
+          <a:chExt cx="0" cy="0"/>
+        </a:xfrm>
+      </p:grpSpPr>
+      <p:sp>
+        <p:nvSpPr>
+          <p:cNvPr id="9" name="Rectangle 8">
+            <a:extLst>
+              <a:ext uri="{FF2B5EF4-FFF2-40B4-BE49-F238E27FC236}">
+                <a16:creationId xmlns:a16="http://schemas.microsoft.com/office/drawing/2014/main" id="{4686E64A-884D-4CBC-B976-976D1B7B1F7E}"/>
+              </a:ext>
+            </a:extLst>
+          </p:cNvPr>
+          <p:cNvSpPr/>
+          <p:nvPr/>
+        </p:nvSpPr>
+        <p:spPr>
+          <a:xfrm>
+            <a:off x="3285554" y="1501457"/>
+            <a:ext cx="6819980" cy="2164695"/>
+          </a:xfrm>
+          <a:prstGeom prst="rect">
+            <a:avLst/>
+          </a:prstGeom>
+        </p:spPr>
+        <p:txBody>
+          <a:bodyPr wrap="square">
+            <a:spAutoFit/>
+          </a:bodyPr>
+          <a:lstStyle/>
+          <a:p>
+            <a:pPr algn="just">
+              <a:lnSpc>
+                <a:spcPct val="150000"/>
+              </a:lnSpc>
+            </a:pPr>
+            <a:r>
+              <a:rPr lang="en-US" sz="3200" b="1">
+                <a:solidFill>
+                  <a:srgbClr val="363636"/>
+                </a:solidFill>
+                <a:latin typeface="Roboto" panose="02000000000000000000" pitchFamily="2" charset="0"/>
+                <a:ea typeface="Roboto" panose="02000000000000000000" pitchFamily="2" charset="0"/>
+              </a:rPr>
+              <a:t>No JavaScript</a:t>
+            </a:r>
+          </a:p>
+          <a:p>
+            <a:pPr algn="just">
+              <a:lnSpc>
+                <a:spcPct val="150000"/>
+              </a:lnSpc>
+            </a:pPr>
+            <a:r>
+              <a:rPr lang="en-US" sz="2000">
+                <a:solidFill>
+                  <a:srgbClr val="363636"/>
+                </a:solidFill>
+                <a:latin typeface="Roboto" panose="02000000000000000000" pitchFamily="2" charset="0"/>
+                <a:ea typeface="Roboto" panose="02000000000000000000" pitchFamily="2" charset="0"/>
+              </a:rPr>
+              <a:t>By focusing only on CSS, Bulma provides a lightweight solution that can easily be implemented in any development context</a:t>
+            </a:r>
+          </a:p>
+        </p:txBody>
+      </p:sp>
+      <p:pic>
+        <p:nvPicPr>
+          <p:cNvPr id="3" name="Graphic 2">
+            <a:extLst>
+              <a:ext uri="{FF2B5EF4-FFF2-40B4-BE49-F238E27FC236}">
+                <a16:creationId xmlns:a16="http://schemas.microsoft.com/office/drawing/2014/main" id="{7D9B93CF-14BC-4E92-8416-EF38B542EFEF}"/>
+              </a:ext>
+            </a:extLst>
+          </p:cNvPr>
+          <p:cNvPicPr>
+            <a:picLocks noChangeAspect="1"/>
+          </p:cNvPicPr>
+          <p:nvPr/>
+        </p:nvPicPr>
+        <p:blipFill>
+          <a:blip r:embed="rId2">
+            <a:extLst>
+              <a:ext uri="{28A0092B-C50C-407E-A947-70E740481C1C}">
+                <a14:useLocalDpi xmlns:a14="http://schemas.microsoft.com/office/drawing/2010/main" val="0"/>
+              </a:ext>
+              <a:ext uri="{96DAC541-7B7A-43D3-8B79-37D633B846F1}">
+                <asvg:svgBlip xmlns:asvg="http://schemas.microsoft.com/office/drawing/2016/SVG/main" r:embed="rId3"/>
+              </a:ext>
+            </a:extLst>
+          </a:blip>
+          <a:stretch>
+            <a:fillRect/>
+          </a:stretch>
+        </p:blipFill>
+        <p:spPr>
+          <a:xfrm>
+            <a:off x="720000" y="1080000"/>
+            <a:ext cx="2520000" cy="2016000"/>
+          </a:xfrm>
+          <a:prstGeom prst="rect">
+            <a:avLst/>
+          </a:prstGeom>
+        </p:spPr>
+      </p:pic>
+      <p:pic>
+        <p:nvPicPr>
+          <p:cNvPr id="6" name="Picture 5">
+            <a:extLst>
+              <a:ext uri="{FF2B5EF4-FFF2-40B4-BE49-F238E27FC236}">
+                <a16:creationId xmlns:a16="http://schemas.microsoft.com/office/drawing/2014/main" id="{6E06FCD0-53CC-430A-9E31-529BD5C616DA}"/>
+              </a:ext>
+            </a:extLst>
+          </p:cNvPr>
+          <p:cNvPicPr>
+            <a:picLocks noChangeAspect="1"/>
+          </p:cNvPicPr>
+          <p:nvPr/>
+        </p:nvPicPr>
+        <p:blipFill>
+          <a:blip r:embed="rId4"/>
+          <a:stretch>
+            <a:fillRect/>
+          </a:stretch>
+        </p:blipFill>
+        <p:spPr>
+          <a:xfrm>
+            <a:off x="3733639" y="4063532"/>
+            <a:ext cx="5923809" cy="2200000"/>
+          </a:xfrm>
+          <a:prstGeom prst="rect">
+            <a:avLst/>
+          </a:prstGeom>
+        </p:spPr>
+      </p:pic>
+    </p:spTree>
+    <p:extLst>
+      <p:ext uri="{BB962C8B-B14F-4D97-AF65-F5344CB8AC3E}">
+        <p14:creationId xmlns:p14="http://schemas.microsoft.com/office/powerpoint/2010/main" val="3527048537"/>
+      </p:ext>
+    </p:extLst>
+  </p:cSld>
+  <p:clrMapOvr>
+    <a:masterClrMapping/>
+  </p:clrMapOvr>
+</p:sld>
+</file>
+
+<file path=ppt/slides/slide11.xml><?xml version="1.0" encoding="utf-8"?>
+<p:sld xmlns:a="http://schemas.openxmlformats.org/drawingml/2006/main" xmlns:r="http://schemas.openxmlformats.org/officeDocument/2006/relationships" xmlns:p="http://schemas.openxmlformats.org/presentationml/2006/main">
+  <p:cSld>
+    <p:spTree>
+      <p:nvGrpSpPr>
+        <p:cNvPr id="1" name=""/>
+        <p:cNvGrpSpPr/>
+        <p:nvPr/>
+      </p:nvGrpSpPr>
+      <p:grpSpPr>
+        <a:xfrm>
+          <a:off x="0" y="0"/>
+          <a:ext cx="0" cy="0"/>
+          <a:chOff x="0" y="0"/>
+          <a:chExt cx="0" cy="0"/>
+        </a:xfrm>
+      </p:grpSpPr>
+      <p:pic>
+        <p:nvPicPr>
+          <p:cNvPr id="11" name="Picture 10">
+            <a:extLst>
+              <a:ext uri="{FF2B5EF4-FFF2-40B4-BE49-F238E27FC236}">
+                <a16:creationId xmlns:a16="http://schemas.microsoft.com/office/drawing/2014/main" id="{E97AF638-94DE-4D79-9023-DBA3C0C37402}"/>
+              </a:ext>
+            </a:extLst>
+          </p:cNvPr>
+          <p:cNvPicPr>
+            <a:picLocks noChangeAspect="1"/>
+          </p:cNvPicPr>
+          <p:nvPr/>
+        </p:nvPicPr>
+        <p:blipFill>
+          <a:blip r:embed="rId2"/>
+          <a:stretch>
+            <a:fillRect/>
+          </a:stretch>
+        </p:blipFill>
+        <p:spPr>
+          <a:xfrm>
+            <a:off x="6096000" y="1504369"/>
+            <a:ext cx="5896134" cy="4776393"/>
+          </a:xfrm>
+          <a:prstGeom prst="rect">
+            <a:avLst/>
+          </a:prstGeom>
+        </p:spPr>
+      </p:pic>
+      <p:pic>
+        <p:nvPicPr>
+          <p:cNvPr id="10" name="Picture 9">
+            <a:extLst>
+              <a:ext uri="{FF2B5EF4-FFF2-40B4-BE49-F238E27FC236}">
+                <a16:creationId xmlns:a16="http://schemas.microsoft.com/office/drawing/2014/main" id="{B5078BB0-0F13-45D8-AD06-F0C65B8DBA64}"/>
+              </a:ext>
+            </a:extLst>
+          </p:cNvPr>
+          <p:cNvPicPr>
+            <a:picLocks noChangeAspect="1"/>
+          </p:cNvPicPr>
+          <p:nvPr/>
+        </p:nvPicPr>
+        <p:blipFill>
+          <a:blip r:embed="rId3"/>
+          <a:stretch>
+            <a:fillRect/>
+          </a:stretch>
+        </p:blipFill>
+        <p:spPr>
+          <a:xfrm>
+            <a:off x="267429" y="1506851"/>
+            <a:ext cx="5828571" cy="4771429"/>
+          </a:xfrm>
+          <a:prstGeom prst="rect">
+            <a:avLst/>
+          </a:prstGeom>
+        </p:spPr>
+      </p:pic>
+      <p:sp>
+        <p:nvSpPr>
+          <p:cNvPr id="9" name="Rectangle 8">
+            <a:extLst>
+              <a:ext uri="{FF2B5EF4-FFF2-40B4-BE49-F238E27FC236}">
+                <a16:creationId xmlns:a16="http://schemas.microsoft.com/office/drawing/2014/main" id="{4686E64A-884D-4CBC-B976-976D1B7B1F7E}"/>
+              </a:ext>
+            </a:extLst>
+          </p:cNvPr>
+          <p:cNvSpPr/>
+          <p:nvPr/>
+        </p:nvSpPr>
+        <p:spPr>
+          <a:xfrm>
+            <a:off x="3285554" y="1501457"/>
+            <a:ext cx="6819980" cy="1703030"/>
+          </a:xfrm>
+          <a:prstGeom prst="rect">
+            <a:avLst/>
+          </a:prstGeom>
+        </p:spPr>
+        <p:txBody>
+          <a:bodyPr wrap="square">
+            <a:spAutoFit/>
+          </a:bodyPr>
+          <a:lstStyle/>
+          <a:p>
+            <a:pPr algn="just">
+              <a:lnSpc>
+                <a:spcPct val="150000"/>
+              </a:lnSpc>
+            </a:pPr>
+            <a:r>
+              <a:rPr lang="en-US" sz="3200" b="1">
+                <a:solidFill>
+                  <a:srgbClr val="363636"/>
+                </a:solidFill>
+                <a:latin typeface="Roboto" panose="02000000000000000000" pitchFamily="2" charset="0"/>
+                <a:ea typeface="Roboto" panose="02000000000000000000" pitchFamily="2" charset="0"/>
+              </a:rPr>
+              <a:t>So quick to customize</a:t>
+            </a:r>
+          </a:p>
+          <a:p>
+            <a:pPr algn="just">
+              <a:lnSpc>
+                <a:spcPct val="150000"/>
+              </a:lnSpc>
+            </a:pPr>
+            <a:r>
+              <a:rPr lang="en-US" sz="2000">
+                <a:solidFill>
+                  <a:srgbClr val="363636"/>
+                </a:solidFill>
+                <a:latin typeface="Roboto" panose="02000000000000000000" pitchFamily="2" charset="0"/>
+                <a:ea typeface="Roboto" panose="02000000000000000000" pitchFamily="2" charset="0"/>
+              </a:rPr>
+              <a:t>Simply set your own Sass variables before importing Bulma</a:t>
+            </a:r>
+          </a:p>
+        </p:txBody>
+      </p:sp>
+      <p:pic>
+        <p:nvPicPr>
+          <p:cNvPr id="7" name="Picture 6">
+            <a:extLst>
+              <a:ext uri="{FF2B5EF4-FFF2-40B4-BE49-F238E27FC236}">
+                <a16:creationId xmlns:a16="http://schemas.microsoft.com/office/drawing/2014/main" id="{74B12414-13EA-4F59-BAE8-BE49E7704384}"/>
+              </a:ext>
+            </a:extLst>
+          </p:cNvPr>
+          <p:cNvPicPr>
+            <a:picLocks noChangeAspect="1"/>
+          </p:cNvPicPr>
+          <p:nvPr/>
+        </p:nvPicPr>
+        <p:blipFill>
+          <a:blip r:embed="rId4">
+            <a:extLst>
+              <a:ext uri="{28A0092B-C50C-407E-A947-70E740481C1C}">
+                <a14:useLocalDpi xmlns:a14="http://schemas.microsoft.com/office/drawing/2010/main" val="0"/>
+              </a:ext>
+            </a:extLst>
+          </a:blip>
+          <a:stretch>
+            <a:fillRect/>
+          </a:stretch>
+        </p:blipFill>
+        <p:spPr>
+          <a:xfrm>
+            <a:off x="720000" y="1080000"/>
+            <a:ext cx="2520000" cy="2520000"/>
+          </a:xfrm>
+          <a:prstGeom prst="rect">
+            <a:avLst/>
+          </a:prstGeom>
+        </p:spPr>
+      </p:pic>
+    </p:spTree>
+    <p:extLst>
+      <p:ext uri="{BB962C8B-B14F-4D97-AF65-F5344CB8AC3E}">
+        <p14:creationId xmlns:p14="http://schemas.microsoft.com/office/powerpoint/2010/main" val="3954460234"/>
+      </p:ext>
+    </p:extLst>
+  </p:cSld>
+  <p:clrMapOvr>
+    <a:masterClrMapping/>
+  </p:clrMapOvr>
+</p:sld>
+</file>
+
+<file path=ppt/slides/slide12.xml><?xml version="1.0" encoding="utf-8"?>
+<p:sld xmlns:a="http://schemas.openxmlformats.org/drawingml/2006/main" xmlns:r="http://schemas.openxmlformats.org/officeDocument/2006/relationships" xmlns:p="http://schemas.openxmlformats.org/presentationml/2006/main">
+  <p:cSld>
+    <p:spTree>
+      <p:nvGrpSpPr>
+        <p:cNvPr id="1" name=""/>
+        <p:cNvGrpSpPr/>
+        <p:nvPr/>
+      </p:nvGrpSpPr>
+      <p:grpSpPr>
+        <a:xfrm>
+          <a:off x="0" y="0"/>
+          <a:ext cx="0" cy="0"/>
+          <a:chOff x="0" y="0"/>
+          <a:chExt cx="0" cy="0"/>
+        </a:xfrm>
+      </p:grpSpPr>
+      <p:pic>
+        <p:nvPicPr>
+          <p:cNvPr id="2" name="Picture 1">
+            <a:extLst>
+              <a:ext uri="{FF2B5EF4-FFF2-40B4-BE49-F238E27FC236}">
+                <a16:creationId xmlns:a16="http://schemas.microsoft.com/office/drawing/2014/main" id="{F762D1B3-BE8C-48A5-BDB5-94360E179146}"/>
+              </a:ext>
+            </a:extLst>
+          </p:cNvPr>
+          <p:cNvPicPr>
+            <a:picLocks noChangeAspect="1"/>
+          </p:cNvPicPr>
+          <p:nvPr/>
+        </p:nvPicPr>
+        <p:blipFill>
+          <a:blip r:embed="rId2"/>
+          <a:stretch>
+            <a:fillRect/>
+          </a:stretch>
+        </p:blipFill>
+        <p:spPr>
+          <a:xfrm>
+            <a:off x="3044509" y="468756"/>
+            <a:ext cx="6371429" cy="1038095"/>
+          </a:xfrm>
+          <a:prstGeom prst="rect">
+            <a:avLst/>
+          </a:prstGeom>
+        </p:spPr>
+      </p:pic>
+      <p:pic>
+        <p:nvPicPr>
+          <p:cNvPr id="3" name="Picture 2">
+            <a:extLst>
+              <a:ext uri="{FF2B5EF4-FFF2-40B4-BE49-F238E27FC236}">
+                <a16:creationId xmlns:a16="http://schemas.microsoft.com/office/drawing/2014/main" id="{AD01F9AB-9949-4DBE-8BD4-0B07698FCA1E}"/>
+              </a:ext>
+            </a:extLst>
+          </p:cNvPr>
+          <p:cNvPicPr>
+            <a:picLocks noChangeAspect="1"/>
+          </p:cNvPicPr>
+          <p:nvPr/>
+        </p:nvPicPr>
+        <p:blipFill>
+          <a:blip r:embed="rId3"/>
+          <a:stretch>
+            <a:fillRect/>
+          </a:stretch>
+        </p:blipFill>
+        <p:spPr>
+          <a:xfrm>
+            <a:off x="267429" y="1506851"/>
+            <a:ext cx="5828571" cy="4771429"/>
+          </a:xfrm>
+          <a:prstGeom prst="rect">
+            <a:avLst/>
+          </a:prstGeom>
+        </p:spPr>
+      </p:pic>
+      <p:pic>
+        <p:nvPicPr>
+          <p:cNvPr id="4" name="Picture 3">
+            <a:extLst>
+              <a:ext uri="{FF2B5EF4-FFF2-40B4-BE49-F238E27FC236}">
+                <a16:creationId xmlns:a16="http://schemas.microsoft.com/office/drawing/2014/main" id="{5FAAD36E-77C1-4472-91C6-C23228065849}"/>
+              </a:ext>
+            </a:extLst>
+          </p:cNvPr>
+          <p:cNvPicPr>
+            <a:picLocks noChangeAspect="1"/>
+          </p:cNvPicPr>
+          <p:nvPr/>
+        </p:nvPicPr>
+        <p:blipFill>
+          <a:blip r:embed="rId4"/>
+          <a:stretch>
+            <a:fillRect/>
+          </a:stretch>
+        </p:blipFill>
+        <p:spPr>
+          <a:xfrm>
+            <a:off x="6096000" y="1504369"/>
+            <a:ext cx="5896134" cy="4776393"/>
+          </a:xfrm>
+          <a:prstGeom prst="rect">
+            <a:avLst/>
+          </a:prstGeom>
+        </p:spPr>
+      </p:pic>
+    </p:spTree>
+    <p:extLst>
+      <p:ext uri="{BB962C8B-B14F-4D97-AF65-F5344CB8AC3E}">
+        <p14:creationId xmlns:p14="http://schemas.microsoft.com/office/powerpoint/2010/main" val="1685646392"/>
+      </p:ext>
+    </p:extLst>
+  </p:cSld>
+  <p:clrMapOvr>
+    <a:masterClrMapping/>
+  </p:clrMapOvr>
+</p:sld>
+</file>
+
+<file path=ppt/slides/slide13.xml><?xml version="1.0" encoding="utf-8"?>
+<p:sld xmlns:a="http://schemas.openxmlformats.org/drawingml/2006/main" xmlns:r="http://schemas.openxmlformats.org/officeDocument/2006/relationships" xmlns:p="http://schemas.openxmlformats.org/presentationml/2006/main">
+  <p:cSld>
+    <p:spTree>
+      <p:nvGrpSpPr>
+        <p:cNvPr id="1" name=""/>
+        <p:cNvGrpSpPr/>
+        <p:nvPr/>
+      </p:nvGrpSpPr>
+      <p:grpSpPr>
+        <a:xfrm>
+          <a:off x="0" y="0"/>
+          <a:ext cx="0" cy="0"/>
+          <a:chOff x="0" y="0"/>
+          <a:chExt cx="0" cy="0"/>
+        </a:xfrm>
+      </p:grpSpPr>
+      <p:pic>
+        <p:nvPicPr>
+          <p:cNvPr id="3" name="Picture 2">
+            <a:extLst>
+              <a:ext uri="{FF2B5EF4-FFF2-40B4-BE49-F238E27FC236}">
+                <a16:creationId xmlns:a16="http://schemas.microsoft.com/office/drawing/2014/main" id="{4D8B6973-FA31-461A-B243-EA397260AF16}"/>
+              </a:ext>
+            </a:extLst>
+          </p:cNvPr>
+          <p:cNvPicPr>
+            <a:picLocks noChangeAspect="1"/>
+          </p:cNvPicPr>
+          <p:nvPr/>
+        </p:nvPicPr>
+        <p:blipFill>
+          <a:blip r:embed="rId2">
+            <a:extLst>
+              <a:ext uri="{28A0092B-C50C-407E-A947-70E740481C1C}">
+                <a14:useLocalDpi xmlns:a14="http://schemas.microsoft.com/office/drawing/2010/main" val="0"/>
+              </a:ext>
+            </a:extLst>
+          </a:blip>
+          <a:stretch>
+            <a:fillRect/>
+          </a:stretch>
+        </p:blipFill>
+        <p:spPr>
+          <a:xfrm>
+            <a:off x="609600" y="0"/>
+            <a:ext cx="10972799" cy="6858000"/>
+          </a:xfrm>
+          <a:prstGeom prst="rect">
+            <a:avLst/>
+          </a:prstGeom>
+        </p:spPr>
+      </p:pic>
+    </p:spTree>
+    <p:extLst>
+      <p:ext uri="{BB962C8B-B14F-4D97-AF65-F5344CB8AC3E}">
+        <p14:creationId xmlns:p14="http://schemas.microsoft.com/office/powerpoint/2010/main" val="2938535049"/>
+      </p:ext>
+    </p:extLst>
+  </p:cSld>
+  <p:clrMapOvr>
+    <a:masterClrMapping/>
+  </p:clrMapOvr>
+</p:sld>
+</file>
+
 <file path=ppt/slides/slide2.xml><?xml version="1.0" encoding="utf-8"?>
+<p:sld xmlns:a="http://schemas.openxmlformats.org/drawingml/2006/main" xmlns:r="http://schemas.openxmlformats.org/officeDocument/2006/relationships" xmlns:p="http://schemas.openxmlformats.org/presentationml/2006/main">
+  <p:cSld>
+    <p:spTree>
+      <p:nvGrpSpPr>
+        <p:cNvPr id="1" name=""/>
+        <p:cNvGrpSpPr/>
+        <p:nvPr/>
+      </p:nvGrpSpPr>
+      <p:grpSpPr>
+        <a:xfrm>
+          <a:off x="0" y="0"/>
+          <a:ext cx="0" cy="0"/>
+          <a:chOff x="0" y="0"/>
+          <a:chExt cx="0" cy="0"/>
+        </a:xfrm>
+      </p:grpSpPr>
+      <p:pic>
+        <p:nvPicPr>
+          <p:cNvPr id="2" name="Picture 1">
+            <a:extLst>
+              <a:ext uri="{FF2B5EF4-FFF2-40B4-BE49-F238E27FC236}">
+                <a16:creationId xmlns:a16="http://schemas.microsoft.com/office/drawing/2014/main" id="{7A8CDF8D-FE6E-46FD-90A6-2531E1EE2A6F}"/>
+              </a:ext>
+            </a:extLst>
+          </p:cNvPr>
+          <p:cNvPicPr>
+            <a:picLocks noChangeAspect="1"/>
+          </p:cNvPicPr>
+          <p:nvPr/>
+        </p:nvPicPr>
+        <p:blipFill>
+          <a:blip r:embed="rId2">
+            <a:extLst>
+              <a:ext uri="{28A0092B-C50C-407E-A947-70E740481C1C}">
+                <a14:useLocalDpi xmlns:a14="http://schemas.microsoft.com/office/drawing/2010/main" val="0"/>
+              </a:ext>
+            </a:extLst>
+          </a:blip>
+          <a:stretch>
+            <a:fillRect/>
+          </a:stretch>
+        </p:blipFill>
+        <p:spPr>
+          <a:xfrm>
+            <a:off x="3915265" y="3429000"/>
+            <a:ext cx="6096000" cy="1524000"/>
+          </a:xfrm>
+          <a:prstGeom prst="rect">
+            <a:avLst/>
+          </a:prstGeom>
+        </p:spPr>
+      </p:pic>
+      <p:sp>
+        <p:nvSpPr>
+          <p:cNvPr id="3" name="TextBox 2">
+            <a:extLst>
+              <a:ext uri="{FF2B5EF4-FFF2-40B4-BE49-F238E27FC236}">
+                <a16:creationId xmlns:a16="http://schemas.microsoft.com/office/drawing/2014/main" id="{2D74D4A5-78C3-45A3-B684-3122CBFB843F}"/>
+              </a:ext>
+            </a:extLst>
+          </p:cNvPr>
+          <p:cNvSpPr txBox="1"/>
+          <p:nvPr/>
+        </p:nvSpPr>
+        <p:spPr>
+          <a:xfrm>
+            <a:off x="671428" y="1514533"/>
+            <a:ext cx="7061549" cy="1569660"/>
+          </a:xfrm>
+          <a:prstGeom prst="rect">
+            <a:avLst/>
+          </a:prstGeom>
+          <a:noFill/>
+        </p:spPr>
+        <p:txBody>
+          <a:bodyPr wrap="none" rtlCol="1">
+            <a:spAutoFit/>
+          </a:bodyPr>
+          <a:lstStyle/>
+          <a:p>
+            <a:r>
+              <a:rPr lang="en-US" sz="9600" b="1">
+                <a:latin typeface="Roboto" panose="02000000000000000000" pitchFamily="2" charset="0"/>
+                <a:ea typeface="Roboto" panose="02000000000000000000" pitchFamily="2" charset="0"/>
+                <a:cs typeface="Poppins" panose="00000500000000000000" pitchFamily="50" charset="0"/>
+              </a:rPr>
+              <a:t>Why Choose</a:t>
+            </a:r>
+            <a:endParaRPr lang="fa-IR" sz="9600" b="1">
+              <a:latin typeface="Roboto" panose="02000000000000000000" pitchFamily="2" charset="0"/>
+              <a:ea typeface="Roboto" panose="02000000000000000000" pitchFamily="2" charset="0"/>
+            </a:endParaRPr>
+          </a:p>
+        </p:txBody>
+      </p:sp>
+      <p:sp>
+        <p:nvSpPr>
+          <p:cNvPr id="4" name="TextBox 3">
+            <a:extLst>
+              <a:ext uri="{FF2B5EF4-FFF2-40B4-BE49-F238E27FC236}">
+                <a16:creationId xmlns:a16="http://schemas.microsoft.com/office/drawing/2014/main" id="{6A843C1E-EC75-429A-802F-1988F97D0D23}"/>
+              </a:ext>
+            </a:extLst>
+          </p:cNvPr>
+          <p:cNvSpPr txBox="1"/>
+          <p:nvPr/>
+        </p:nvSpPr>
+        <p:spPr>
+          <a:xfrm>
+            <a:off x="10133486" y="3083005"/>
+            <a:ext cx="1064715" cy="2215991"/>
+          </a:xfrm>
+          <a:prstGeom prst="rect">
+            <a:avLst/>
+          </a:prstGeom>
+          <a:noFill/>
+        </p:spPr>
+        <p:txBody>
+          <a:bodyPr wrap="none" rtlCol="1">
+            <a:spAutoFit/>
+          </a:bodyPr>
+          <a:lstStyle/>
+          <a:p>
+            <a:r>
+              <a:rPr lang="en-US" sz="13800" b="1">
+                <a:latin typeface="Roboto" panose="02000000000000000000" pitchFamily="2" charset="0"/>
+                <a:ea typeface="Roboto" panose="02000000000000000000" pitchFamily="2" charset="0"/>
+                <a:cs typeface="Poppins" panose="00000500000000000000" pitchFamily="50" charset="0"/>
+              </a:rPr>
+              <a:t>?</a:t>
+            </a:r>
+            <a:endParaRPr lang="fa-IR" sz="13800" b="1">
+              <a:latin typeface="Roboto" panose="02000000000000000000" pitchFamily="2" charset="0"/>
+              <a:ea typeface="Roboto" panose="02000000000000000000" pitchFamily="2" charset="0"/>
+            </a:endParaRPr>
+          </a:p>
+        </p:txBody>
+      </p:sp>
+    </p:spTree>
+    <p:extLst>
+      <p:ext uri="{BB962C8B-B14F-4D97-AF65-F5344CB8AC3E}">
+        <p14:creationId xmlns:p14="http://schemas.microsoft.com/office/powerpoint/2010/main" val="3638545206"/>
+      </p:ext>
+    </p:extLst>
+  </p:cSld>
+  <p:clrMapOvr>
+    <a:masterClrMapping/>
+  </p:clrMapOvr>
+</p:sld>
+</file>
+
+<file path=ppt/slides/slide3.xml><?xml version="1.0" encoding="utf-8"?>
+<p:sld xmlns:a="http://schemas.openxmlformats.org/drawingml/2006/main" xmlns:r="http://schemas.openxmlformats.org/officeDocument/2006/relationships" xmlns:p="http://schemas.openxmlformats.org/presentationml/2006/main">
+  <p:cSld>
+    <p:spTree>
+      <p:nvGrpSpPr>
+        <p:cNvPr id="1" name=""/>
+        <p:cNvGrpSpPr/>
+        <p:nvPr/>
+      </p:nvGrpSpPr>
+      <p:grpSpPr>
+        <a:xfrm>
+          <a:off x="0" y="0"/>
+          <a:ext cx="0" cy="0"/>
+          <a:chOff x="0" y="0"/>
+          <a:chExt cx="0" cy="0"/>
+        </a:xfrm>
+      </p:grpSpPr>
+      <p:sp>
+        <p:nvSpPr>
+          <p:cNvPr id="9" name="Rectangle 8">
+            <a:extLst>
+              <a:ext uri="{FF2B5EF4-FFF2-40B4-BE49-F238E27FC236}">
+                <a16:creationId xmlns:a16="http://schemas.microsoft.com/office/drawing/2014/main" id="{4686E64A-884D-4CBC-B976-976D1B7B1F7E}"/>
+              </a:ext>
+            </a:extLst>
+          </p:cNvPr>
+          <p:cNvSpPr/>
+          <p:nvPr/>
+        </p:nvSpPr>
+        <p:spPr>
+          <a:xfrm>
+            <a:off x="3285554" y="1501457"/>
+            <a:ext cx="6819980" cy="2164695"/>
+          </a:xfrm>
+          <a:prstGeom prst="rect">
+            <a:avLst/>
+          </a:prstGeom>
+        </p:spPr>
+        <p:txBody>
+          <a:bodyPr wrap="square">
+            <a:spAutoFit/>
+          </a:bodyPr>
+          <a:lstStyle/>
+          <a:p>
+            <a:pPr algn="just">
+              <a:lnSpc>
+                <a:spcPct val="150000"/>
+              </a:lnSpc>
+            </a:pPr>
+            <a:r>
+              <a:rPr lang="en-US" sz="3200" b="1">
+                <a:solidFill>
+                  <a:srgbClr val="363636"/>
+                </a:solidFill>
+                <a:latin typeface="Roboto" panose="02000000000000000000" pitchFamily="2" charset="0"/>
+                <a:ea typeface="Roboto" panose="02000000000000000000" pitchFamily="2" charset="0"/>
+              </a:rPr>
+              <a:t>Modern features</a:t>
+            </a:r>
+          </a:p>
+          <a:p>
+            <a:pPr algn="just">
+              <a:lnSpc>
+                <a:spcPct val="150000"/>
+              </a:lnSpc>
+            </a:pPr>
+            <a:r>
+              <a:rPr lang="en-US" sz="2000">
+                <a:solidFill>
+                  <a:srgbClr val="4A4A4A"/>
+                </a:solidFill>
+                <a:latin typeface="Roboto" panose="02000000000000000000" pitchFamily="2" charset="0"/>
+                <a:ea typeface="Roboto" panose="02000000000000000000" pitchFamily="2" charset="0"/>
+              </a:rPr>
+              <a:t>By using the latest CSS3 features such as </a:t>
+            </a:r>
+            <a:r>
+              <a:rPr lang="en-US" sz="2000" b="1">
+                <a:solidFill>
+                  <a:srgbClr val="363636"/>
+                </a:solidFill>
+                <a:latin typeface="Roboto" panose="02000000000000000000" pitchFamily="2" charset="0"/>
+                <a:ea typeface="Roboto" panose="02000000000000000000" pitchFamily="2" charset="0"/>
+              </a:rPr>
+              <a:t>Flexbox</a:t>
+            </a:r>
+            <a:r>
+              <a:rPr lang="en-US" sz="2000">
+                <a:solidFill>
+                  <a:srgbClr val="4A4A4A"/>
+                </a:solidFill>
+                <a:latin typeface="Roboto" panose="02000000000000000000" pitchFamily="2" charset="0"/>
+                <a:ea typeface="Roboto" panose="02000000000000000000" pitchFamily="2" charset="0"/>
+              </a:rPr>
+              <a:t>, and planning on using </a:t>
+            </a:r>
+            <a:r>
+              <a:rPr lang="en-US" sz="2000" b="1">
+                <a:solidFill>
+                  <a:srgbClr val="FF0000"/>
+                </a:solidFill>
+                <a:latin typeface="Roboto" panose="02000000000000000000" pitchFamily="2" charset="0"/>
+                <a:ea typeface="Roboto" panose="02000000000000000000" pitchFamily="2" charset="0"/>
+              </a:rPr>
+              <a:t>CSS Variables</a:t>
+            </a:r>
+            <a:r>
+              <a:rPr lang="en-US" sz="2000">
+                <a:solidFill>
+                  <a:srgbClr val="4A4A4A"/>
+                </a:solidFill>
+                <a:latin typeface="Roboto" panose="02000000000000000000" pitchFamily="2" charset="0"/>
+                <a:ea typeface="Roboto" panose="02000000000000000000" pitchFamily="2" charset="0"/>
+              </a:rPr>
+              <a:t> and </a:t>
+            </a:r>
+            <a:r>
+              <a:rPr lang="en-US" sz="2000" b="1">
+                <a:solidFill>
+                  <a:srgbClr val="FF0000"/>
+                </a:solidFill>
+                <a:latin typeface="Roboto" panose="02000000000000000000" pitchFamily="2" charset="0"/>
+                <a:ea typeface="Roboto" panose="02000000000000000000" pitchFamily="2" charset="0"/>
+              </a:rPr>
+              <a:t>CSS Grid</a:t>
+            </a:r>
+            <a:r>
+              <a:rPr lang="en-US" sz="2000">
+                <a:solidFill>
+                  <a:srgbClr val="4A4A4A"/>
+                </a:solidFill>
+                <a:latin typeface="Roboto" panose="02000000000000000000" pitchFamily="2" charset="0"/>
+                <a:ea typeface="Roboto" panose="02000000000000000000" pitchFamily="2" charset="0"/>
+              </a:rPr>
+              <a:t>, Bulma aims to stay on the bleeding edge of browser technology</a:t>
+            </a:r>
+          </a:p>
+        </p:txBody>
+      </p:sp>
+      <p:pic>
+        <p:nvPicPr>
+          <p:cNvPr id="11" name="Graphic 10">
+            <a:extLst>
+              <a:ext uri="{FF2B5EF4-FFF2-40B4-BE49-F238E27FC236}">
+                <a16:creationId xmlns:a16="http://schemas.microsoft.com/office/drawing/2014/main" id="{BA60EFB6-3DBD-4E0B-BD6E-C4E080A7704A}"/>
+              </a:ext>
+            </a:extLst>
+          </p:cNvPr>
+          <p:cNvPicPr>
+            <a:picLocks noChangeAspect="1"/>
+          </p:cNvPicPr>
+          <p:nvPr/>
+        </p:nvPicPr>
+        <p:blipFill>
+          <a:blip r:embed="rId2">
+            <a:extLst>
+              <a:ext uri="{28A0092B-C50C-407E-A947-70E740481C1C}">
+                <a14:useLocalDpi xmlns:a14="http://schemas.microsoft.com/office/drawing/2010/main" val="0"/>
+              </a:ext>
+              <a:ext uri="{96DAC541-7B7A-43D3-8B79-37D633B846F1}">
+                <asvg:svgBlip xmlns:asvg="http://schemas.microsoft.com/office/drawing/2016/SVG/main" r:embed="rId3"/>
+              </a:ext>
+            </a:extLst>
+          </a:blip>
+          <a:stretch>
+            <a:fillRect/>
+          </a:stretch>
+        </p:blipFill>
+        <p:spPr>
+          <a:xfrm>
+            <a:off x="720000" y="1080000"/>
+            <a:ext cx="2520000" cy="2520000"/>
+          </a:xfrm>
+          <a:prstGeom prst="rect">
+            <a:avLst/>
+          </a:prstGeom>
+        </p:spPr>
+      </p:pic>
+    </p:spTree>
+    <p:extLst>
+      <p:ext uri="{BB962C8B-B14F-4D97-AF65-F5344CB8AC3E}">
+        <p14:creationId xmlns:p14="http://schemas.microsoft.com/office/powerpoint/2010/main" val="1170324082"/>
+      </p:ext>
+    </p:extLst>
+  </p:cSld>
+  <p:clrMapOvr>
+    <a:masterClrMapping/>
+  </p:clrMapOvr>
+</p:sld>
+</file>
+
+<file path=ppt/slides/slide4.xml><?xml version="1.0" encoding="utf-8"?>
+<p:sld xmlns:a="http://schemas.openxmlformats.org/drawingml/2006/main" xmlns:r="http://schemas.openxmlformats.org/officeDocument/2006/relationships" xmlns:p="http://schemas.openxmlformats.org/presentationml/2006/main">
+  <p:cSld>
+    <p:spTree>
+      <p:nvGrpSpPr>
+        <p:cNvPr id="1" name=""/>
+        <p:cNvGrpSpPr/>
+        <p:nvPr/>
+      </p:nvGrpSpPr>
+      <p:grpSpPr>
+        <a:xfrm>
+          <a:off x="0" y="0"/>
+          <a:ext cx="0" cy="0"/>
+          <a:chOff x="0" y="0"/>
+          <a:chExt cx="0" cy="0"/>
+        </a:xfrm>
+      </p:grpSpPr>
+      <p:pic>
+        <p:nvPicPr>
+          <p:cNvPr id="2" name="Picture 1">
+            <a:extLst>
+              <a:ext uri="{FF2B5EF4-FFF2-40B4-BE49-F238E27FC236}">
+                <a16:creationId xmlns:a16="http://schemas.microsoft.com/office/drawing/2014/main" id="{2B015D30-EB8F-42B3-8D0C-31EE60ACEE47}"/>
+              </a:ext>
+            </a:extLst>
+          </p:cNvPr>
+          <p:cNvPicPr>
+            <a:picLocks noChangeAspect="1"/>
+          </p:cNvPicPr>
+          <p:nvPr/>
+        </p:nvPicPr>
+        <p:blipFill>
+          <a:blip r:embed="rId2"/>
+          <a:stretch>
+            <a:fillRect/>
+          </a:stretch>
+        </p:blipFill>
+        <p:spPr>
+          <a:xfrm>
+            <a:off x="3285553" y="4436318"/>
+            <a:ext cx="6815315" cy="1398874"/>
+          </a:xfrm>
+          <a:prstGeom prst="rect">
+            <a:avLst/>
+          </a:prstGeom>
+        </p:spPr>
+      </p:pic>
+      <p:sp>
+        <p:nvSpPr>
+          <p:cNvPr id="9" name="Rectangle 8">
+            <a:extLst>
+              <a:ext uri="{FF2B5EF4-FFF2-40B4-BE49-F238E27FC236}">
+                <a16:creationId xmlns:a16="http://schemas.microsoft.com/office/drawing/2014/main" id="{4686E64A-884D-4CBC-B976-976D1B7B1F7E}"/>
+              </a:ext>
+            </a:extLst>
+          </p:cNvPr>
+          <p:cNvSpPr/>
+          <p:nvPr/>
+        </p:nvSpPr>
+        <p:spPr>
+          <a:xfrm>
+            <a:off x="3285554" y="1501457"/>
+            <a:ext cx="6819980" cy="1703030"/>
+          </a:xfrm>
+          <a:prstGeom prst="rect">
+            <a:avLst/>
+          </a:prstGeom>
+        </p:spPr>
+        <p:txBody>
+          <a:bodyPr wrap="square">
+            <a:spAutoFit/>
+          </a:bodyPr>
+          <a:lstStyle/>
+          <a:p>
+            <a:pPr algn="just">
+              <a:lnSpc>
+                <a:spcPct val="150000"/>
+              </a:lnSpc>
+            </a:pPr>
+            <a:r>
+              <a:rPr lang="en-US" sz="3200" b="1">
+                <a:solidFill>
+                  <a:srgbClr val="363636"/>
+                </a:solidFill>
+                <a:latin typeface="Roboto" panose="02000000000000000000" pitchFamily="2" charset="0"/>
+                <a:ea typeface="Roboto" panose="02000000000000000000" pitchFamily="2" charset="0"/>
+              </a:rPr>
+              <a:t>Simple grid system</a:t>
+            </a:r>
+          </a:p>
+          <a:p>
+            <a:pPr algn="just">
+              <a:lnSpc>
+                <a:spcPct val="150000"/>
+              </a:lnSpc>
+            </a:pPr>
+            <a:r>
+              <a:rPr lang="en-US" sz="2000" b="1">
+                <a:solidFill>
+                  <a:srgbClr val="363636"/>
+                </a:solidFill>
+                <a:latin typeface="Roboto" panose="02000000000000000000" pitchFamily="2" charset="0"/>
+                <a:ea typeface="Roboto" panose="02000000000000000000" pitchFamily="2" charset="0"/>
+              </a:rPr>
+              <a:t>To build a Bulma grid, you only need a single </a:t>
+            </a:r>
+            <a:r>
+              <a:rPr lang="en-US" sz="2000" b="1">
+                <a:solidFill>
+                  <a:srgbClr val="FF0000"/>
+                </a:solidFill>
+                <a:latin typeface="Roboto" panose="02000000000000000000" pitchFamily="2" charset="0"/>
+                <a:ea typeface="Roboto" panose="02000000000000000000" pitchFamily="2" charset="0"/>
+              </a:rPr>
+              <a:t>.columns </a:t>
+            </a:r>
+            <a:r>
+              <a:rPr lang="en-US" sz="2000" b="1">
+                <a:solidFill>
+                  <a:srgbClr val="363636"/>
+                </a:solidFill>
+                <a:latin typeface="Roboto" panose="02000000000000000000" pitchFamily="2" charset="0"/>
+                <a:ea typeface="Roboto" panose="02000000000000000000" pitchFamily="2" charset="0"/>
+              </a:rPr>
+              <a:t>container to wrap as many </a:t>
+            </a:r>
+            <a:r>
+              <a:rPr lang="en-US" sz="2000" b="1">
+                <a:solidFill>
+                  <a:srgbClr val="FF0000"/>
+                </a:solidFill>
+                <a:latin typeface="Roboto" panose="02000000000000000000" pitchFamily="2" charset="0"/>
+                <a:ea typeface="Roboto" panose="02000000000000000000" pitchFamily="2" charset="0"/>
+              </a:rPr>
+              <a:t>.column </a:t>
+            </a:r>
+            <a:r>
+              <a:rPr lang="en-US" sz="2000" b="1">
+                <a:solidFill>
+                  <a:srgbClr val="363636"/>
+                </a:solidFill>
+                <a:latin typeface="Roboto" panose="02000000000000000000" pitchFamily="2" charset="0"/>
+                <a:ea typeface="Roboto" panose="02000000000000000000" pitchFamily="2" charset="0"/>
+              </a:rPr>
+              <a:t>items as you want</a:t>
+            </a:r>
+            <a:endParaRPr lang="en-US" sz="2000">
+              <a:solidFill>
+                <a:srgbClr val="4A4A4A"/>
+              </a:solidFill>
+              <a:latin typeface="Roboto" panose="02000000000000000000" pitchFamily="2" charset="0"/>
+              <a:ea typeface="Roboto" panose="02000000000000000000" pitchFamily="2" charset="0"/>
+            </a:endParaRPr>
+          </a:p>
+        </p:txBody>
+      </p:sp>
+      <p:pic>
+        <p:nvPicPr>
+          <p:cNvPr id="6" name="Graphic 5">
+            <a:extLst>
+              <a:ext uri="{FF2B5EF4-FFF2-40B4-BE49-F238E27FC236}">
+                <a16:creationId xmlns:a16="http://schemas.microsoft.com/office/drawing/2014/main" id="{68994ED1-569A-4C90-AEE5-53FF2ED846A5}"/>
+              </a:ext>
+            </a:extLst>
+          </p:cNvPr>
+          <p:cNvPicPr>
+            <a:picLocks noChangeAspect="1"/>
+          </p:cNvPicPr>
+          <p:nvPr/>
+        </p:nvPicPr>
+        <p:blipFill>
+          <a:blip r:embed="rId3">
+            <a:extLst>
+              <a:ext uri="{28A0092B-C50C-407E-A947-70E740481C1C}">
+                <a14:useLocalDpi xmlns:a14="http://schemas.microsoft.com/office/drawing/2010/main" val="0"/>
+              </a:ext>
+              <a:ext uri="{96DAC541-7B7A-43D3-8B79-37D633B846F1}">
+                <asvg:svgBlip xmlns:asvg="http://schemas.microsoft.com/office/drawing/2016/SVG/main" r:embed="rId4"/>
+              </a:ext>
+            </a:extLst>
+          </a:blip>
+          <a:stretch>
+            <a:fillRect/>
+          </a:stretch>
+        </p:blipFill>
+        <p:spPr>
+          <a:xfrm>
+            <a:off x="720000" y="1080000"/>
+            <a:ext cx="2205000" cy="2520000"/>
+          </a:xfrm>
+          <a:prstGeom prst="rect">
+            <a:avLst/>
+          </a:prstGeom>
+        </p:spPr>
+      </p:pic>
+    </p:spTree>
+    <p:extLst>
+      <p:ext uri="{BB962C8B-B14F-4D97-AF65-F5344CB8AC3E}">
+        <p14:creationId xmlns:p14="http://schemas.microsoft.com/office/powerpoint/2010/main" val="3985192152"/>
+      </p:ext>
+    </p:extLst>
+  </p:cSld>
+  <p:clrMapOvr>
+    <a:masterClrMapping/>
+  </p:clrMapOvr>
+</p:sld>
+</file>
+
+<file path=ppt/slides/slide5.xml><?xml version="1.0" encoding="utf-8"?>
 <p:sld xmlns:a="http://schemas.openxmlformats.org/drawingml/2006/main" xmlns:r="http://schemas.openxmlformats.org/officeDocument/2006/relationships" xmlns:p="http://schemas.openxmlformats.org/presentationml/2006/main">
   <p:cSld>
     <p:spTree>
@@ -3684,7 +4950,225 @@
 </p:sld>
 </file>
 
-<file path=ppt/slides/slide3.xml><?xml version="1.0" encoding="utf-8"?>
+<file path=ppt/slides/slide6.xml><?xml version="1.0" encoding="utf-8"?>
+<p:sld xmlns:a="http://schemas.openxmlformats.org/drawingml/2006/main" xmlns:r="http://schemas.openxmlformats.org/officeDocument/2006/relationships" xmlns:p="http://schemas.openxmlformats.org/presentationml/2006/main">
+  <p:cSld>
+    <p:spTree>
+      <p:nvGrpSpPr>
+        <p:cNvPr id="1" name=""/>
+        <p:cNvGrpSpPr/>
+        <p:nvPr/>
+      </p:nvGrpSpPr>
+      <p:grpSpPr>
+        <a:xfrm>
+          <a:off x="0" y="0"/>
+          <a:ext cx="0" cy="0"/>
+          <a:chOff x="0" y="0"/>
+          <a:chExt cx="0" cy="0"/>
+        </a:xfrm>
+      </p:grpSpPr>
+      <p:sp>
+        <p:nvSpPr>
+          <p:cNvPr id="9" name="Rectangle 8">
+            <a:extLst>
+              <a:ext uri="{FF2B5EF4-FFF2-40B4-BE49-F238E27FC236}">
+                <a16:creationId xmlns:a16="http://schemas.microsoft.com/office/drawing/2014/main" id="{4686E64A-884D-4CBC-B976-976D1B7B1F7E}"/>
+              </a:ext>
+            </a:extLst>
+          </p:cNvPr>
+          <p:cNvSpPr/>
+          <p:nvPr/>
+        </p:nvSpPr>
+        <p:spPr>
+          <a:xfrm>
+            <a:off x="3285554" y="1501457"/>
+            <a:ext cx="6819980" cy="2164695"/>
+          </a:xfrm>
+          <a:prstGeom prst="rect">
+            <a:avLst/>
+          </a:prstGeom>
+        </p:spPr>
+        <p:txBody>
+          <a:bodyPr wrap="square">
+            <a:spAutoFit/>
+          </a:bodyPr>
+          <a:lstStyle/>
+          <a:p>
+            <a:pPr algn="just">
+              <a:lnSpc>
+                <a:spcPct val="150000"/>
+              </a:lnSpc>
+            </a:pPr>
+            <a:r>
+              <a:rPr lang="en-US" sz="3200" b="1">
+                <a:solidFill>
+                  <a:srgbClr val="363636"/>
+                </a:solidFill>
+                <a:latin typeface="Roboto" panose="02000000000000000000" pitchFamily="2" charset="0"/>
+                <a:ea typeface="Roboto" panose="02000000000000000000" pitchFamily="2" charset="0"/>
+              </a:rPr>
+              <a:t>Easy-to-learn syntax</a:t>
+            </a:r>
+          </a:p>
+          <a:p>
+            <a:pPr algn="just">
+              <a:lnSpc>
+                <a:spcPct val="150000"/>
+              </a:lnSpc>
+            </a:pPr>
+            <a:r>
+              <a:rPr lang="en-US" sz="2000" b="1">
+                <a:solidFill>
+                  <a:srgbClr val="363636"/>
+                </a:solidFill>
+                <a:latin typeface="Roboto" panose="02000000000000000000" pitchFamily="2" charset="0"/>
+                <a:ea typeface="Roboto" panose="02000000000000000000" pitchFamily="2" charset="0"/>
+              </a:rPr>
+              <a:t>With simple readable class names like </a:t>
+            </a:r>
+            <a:r>
+              <a:rPr lang="en-US" sz="2000" b="1">
+                <a:solidFill>
+                  <a:srgbClr val="FF0000"/>
+                </a:solidFill>
+                <a:latin typeface="Roboto" panose="02000000000000000000" pitchFamily="2" charset="0"/>
+                <a:ea typeface="Roboto" panose="02000000000000000000" pitchFamily="2" charset="0"/>
+              </a:rPr>
+              <a:t>.button</a:t>
+            </a:r>
+            <a:r>
+              <a:rPr lang="en-US" sz="2000" b="1">
+                <a:solidFill>
+                  <a:srgbClr val="363636"/>
+                </a:solidFill>
+                <a:latin typeface="Roboto" panose="02000000000000000000" pitchFamily="2" charset="0"/>
+                <a:ea typeface="Roboto" panose="02000000000000000000" pitchFamily="2" charset="0"/>
+              </a:rPr>
+              <a:t> or </a:t>
+            </a:r>
+            <a:r>
+              <a:rPr lang="en-US" sz="2000" b="1">
+                <a:solidFill>
+                  <a:srgbClr val="FF0000"/>
+                </a:solidFill>
+                <a:latin typeface="Roboto" panose="02000000000000000000" pitchFamily="2" charset="0"/>
+                <a:ea typeface="Roboto" panose="02000000000000000000" pitchFamily="2" charset="0"/>
+              </a:rPr>
+              <a:t>.title</a:t>
+            </a:r>
+            <a:r>
+              <a:rPr lang="en-US" sz="2000" b="1">
+                <a:solidFill>
+                  <a:srgbClr val="363636"/>
+                </a:solidFill>
+                <a:latin typeface="Roboto" panose="02000000000000000000" pitchFamily="2" charset="0"/>
+                <a:ea typeface="Roboto" panose="02000000000000000000" pitchFamily="2" charset="0"/>
+              </a:rPr>
+              <a:t>, and a straightforward modifiers system like </a:t>
+            </a:r>
+            <a:r>
+              <a:rPr lang="en-US" sz="2000" b="1">
+                <a:solidFill>
+                  <a:srgbClr val="FF0000"/>
+                </a:solidFill>
+                <a:latin typeface="Roboto" panose="02000000000000000000" pitchFamily="2" charset="0"/>
+                <a:ea typeface="Roboto" panose="02000000000000000000" pitchFamily="2" charset="0"/>
+              </a:rPr>
+              <a:t>.is-primary</a:t>
+            </a:r>
+            <a:r>
+              <a:rPr lang="en-US" sz="2000" b="1">
+                <a:solidFill>
+                  <a:srgbClr val="363636"/>
+                </a:solidFill>
+                <a:latin typeface="Roboto" panose="02000000000000000000" pitchFamily="2" charset="0"/>
+                <a:ea typeface="Roboto" panose="02000000000000000000" pitchFamily="2" charset="0"/>
+              </a:rPr>
+              <a:t> or </a:t>
+            </a:r>
+            <a:r>
+              <a:rPr lang="en-US" sz="2000" b="1">
+                <a:solidFill>
+                  <a:srgbClr val="FF0000"/>
+                </a:solidFill>
+                <a:latin typeface="Roboto" panose="02000000000000000000" pitchFamily="2" charset="0"/>
+                <a:ea typeface="Roboto" panose="02000000000000000000" pitchFamily="2" charset="0"/>
+              </a:rPr>
+              <a:t>.is-large</a:t>
+            </a:r>
+            <a:r>
+              <a:rPr lang="en-US" sz="2000" b="1">
+                <a:solidFill>
+                  <a:srgbClr val="363636"/>
+                </a:solidFill>
+                <a:latin typeface="Roboto" panose="02000000000000000000" pitchFamily="2" charset="0"/>
+                <a:ea typeface="Roboto" panose="02000000000000000000" pitchFamily="2" charset="0"/>
+              </a:rPr>
+              <a:t>, it’s easy to pick up Bulma in minutes</a:t>
+            </a:r>
+            <a:endParaRPr lang="en-US" sz="2000">
+              <a:solidFill>
+                <a:srgbClr val="4A4A4A"/>
+              </a:solidFill>
+              <a:latin typeface="Roboto" panose="02000000000000000000" pitchFamily="2" charset="0"/>
+              <a:ea typeface="Roboto" panose="02000000000000000000" pitchFamily="2" charset="0"/>
+            </a:endParaRPr>
+          </a:p>
+        </p:txBody>
+      </p:sp>
+      <p:pic>
+        <p:nvPicPr>
+          <p:cNvPr id="4" name="Graphic 3">
+            <a:extLst>
+              <a:ext uri="{FF2B5EF4-FFF2-40B4-BE49-F238E27FC236}">
+                <a16:creationId xmlns:a16="http://schemas.microsoft.com/office/drawing/2014/main" id="{03296EDB-16BD-4AB6-A201-C6ACDA66785E}"/>
+              </a:ext>
+            </a:extLst>
+          </p:cNvPr>
+          <p:cNvPicPr>
+            <a:picLocks noChangeAspect="1"/>
+          </p:cNvPicPr>
+          <p:nvPr/>
+        </p:nvPicPr>
+        <p:blipFill>
+          <a:blip r:embed="rId2">
+            <a:extLst>
+              <a:ext uri="{28A0092B-C50C-407E-A947-70E740481C1C}">
+                <a14:useLocalDpi xmlns:a14="http://schemas.microsoft.com/office/drawing/2010/main" val="0"/>
+              </a:ext>
+              <a:ext uri="{96DAC541-7B7A-43D3-8B79-37D633B846F1}">
+                <asvg:svgBlip xmlns:asvg="http://schemas.microsoft.com/office/drawing/2016/SVG/main" r:embed="rId3"/>
+              </a:ext>
+            </a:extLst>
+          </a:blip>
+          <a:stretch>
+            <a:fillRect/>
+          </a:stretch>
+        </p:blipFill>
+        <p:spPr>
+          <a:xfrm>
+            <a:off x="720000" y="1080000"/>
+            <a:ext cx="2520000" cy="2520000"/>
+          </a:xfrm>
+          <a:prstGeom prst="rect">
+            <a:avLst/>
+          </a:prstGeom>
+        </p:spPr>
+      </p:pic>
+    </p:spTree>
+    <p:extLst>
+      <p:ext uri="{BB962C8B-B14F-4D97-AF65-F5344CB8AC3E}">
+        <p14:creationId xmlns:p14="http://schemas.microsoft.com/office/powerpoint/2010/main" val="2404886026"/>
+      </p:ext>
+    </p:extLst>
+  </p:cSld>
+  <p:clrMapOvr>
+    <a:masterClrMapping/>
+  </p:clrMapOvr>
+</p:sld>
+</file>
+
+<file path=ppt/slides/slide7.xml><?xml version="1.0" encoding="utf-8"?>
 <p:sld xmlns:a="http://schemas.openxmlformats.org/drawingml/2006/main" xmlns:r="http://schemas.openxmlformats.org/officeDocument/2006/relationships" xmlns:p="http://schemas.openxmlformats.org/presentationml/2006/main">
   <p:cSld>
     <p:spTree>
@@ -3744,312 +5228,6 @@
 </p:sld>
 </file>
 
-<file path=ppt/slides/slide4.xml><?xml version="1.0" encoding="utf-8"?>
-<p:sld xmlns:a="http://schemas.openxmlformats.org/drawingml/2006/main" xmlns:r="http://schemas.openxmlformats.org/officeDocument/2006/relationships" xmlns:p="http://schemas.openxmlformats.org/presentationml/2006/main">
-  <p:cSld>
-    <p:spTree>
-      <p:nvGrpSpPr>
-        <p:cNvPr id="1" name=""/>
-        <p:cNvGrpSpPr/>
-        <p:nvPr/>
-      </p:nvGrpSpPr>
-      <p:grpSpPr>
-        <a:xfrm>
-          <a:off x="0" y="0"/>
-          <a:ext cx="0" cy="0"/>
-          <a:chOff x="0" y="0"/>
-          <a:chExt cx="0" cy="0"/>
-        </a:xfrm>
-      </p:grpSpPr>
-      <p:pic>
-        <p:nvPicPr>
-          <p:cNvPr id="2" name="Picture 1">
-            <a:extLst>
-              <a:ext uri="{FF2B5EF4-FFF2-40B4-BE49-F238E27FC236}">
-                <a16:creationId xmlns:a16="http://schemas.microsoft.com/office/drawing/2014/main" id="{F762D1B3-BE8C-48A5-BDB5-94360E179146}"/>
-              </a:ext>
-            </a:extLst>
-          </p:cNvPr>
-          <p:cNvPicPr>
-            <a:picLocks noChangeAspect="1"/>
-          </p:cNvPicPr>
-          <p:nvPr/>
-        </p:nvPicPr>
-        <p:blipFill>
-          <a:blip r:embed="rId2"/>
-          <a:stretch>
-            <a:fillRect/>
-          </a:stretch>
-        </p:blipFill>
-        <p:spPr>
-          <a:xfrm>
-            <a:off x="3044509" y="468756"/>
-            <a:ext cx="6371429" cy="1038095"/>
-          </a:xfrm>
-          <a:prstGeom prst="rect">
-            <a:avLst/>
-          </a:prstGeom>
-        </p:spPr>
-      </p:pic>
-      <p:pic>
-        <p:nvPicPr>
-          <p:cNvPr id="3" name="Picture 2">
-            <a:extLst>
-              <a:ext uri="{FF2B5EF4-FFF2-40B4-BE49-F238E27FC236}">
-                <a16:creationId xmlns:a16="http://schemas.microsoft.com/office/drawing/2014/main" id="{AD01F9AB-9949-4DBE-8BD4-0B07698FCA1E}"/>
-              </a:ext>
-            </a:extLst>
-          </p:cNvPr>
-          <p:cNvPicPr>
-            <a:picLocks noChangeAspect="1"/>
-          </p:cNvPicPr>
-          <p:nvPr/>
-        </p:nvPicPr>
-        <p:blipFill>
-          <a:blip r:embed="rId3"/>
-          <a:stretch>
-            <a:fillRect/>
-          </a:stretch>
-        </p:blipFill>
-        <p:spPr>
-          <a:xfrm>
-            <a:off x="267429" y="1506851"/>
-            <a:ext cx="5828571" cy="4771429"/>
-          </a:xfrm>
-          <a:prstGeom prst="rect">
-            <a:avLst/>
-          </a:prstGeom>
-        </p:spPr>
-      </p:pic>
-      <p:pic>
-        <p:nvPicPr>
-          <p:cNvPr id="4" name="Picture 3">
-            <a:extLst>
-              <a:ext uri="{FF2B5EF4-FFF2-40B4-BE49-F238E27FC236}">
-                <a16:creationId xmlns:a16="http://schemas.microsoft.com/office/drawing/2014/main" id="{5FAAD36E-77C1-4472-91C6-C23228065849}"/>
-              </a:ext>
-            </a:extLst>
-          </p:cNvPr>
-          <p:cNvPicPr>
-            <a:picLocks noChangeAspect="1"/>
-          </p:cNvPicPr>
-          <p:nvPr/>
-        </p:nvPicPr>
-        <p:blipFill>
-          <a:blip r:embed="rId4"/>
-          <a:stretch>
-            <a:fillRect/>
-          </a:stretch>
-        </p:blipFill>
-        <p:spPr>
-          <a:xfrm>
-            <a:off x="6096000" y="1504369"/>
-            <a:ext cx="5896134" cy="4776393"/>
-          </a:xfrm>
-          <a:prstGeom prst="rect">
-            <a:avLst/>
-          </a:prstGeom>
-        </p:spPr>
-      </p:pic>
-    </p:spTree>
-    <p:extLst>
-      <p:ext uri="{BB962C8B-B14F-4D97-AF65-F5344CB8AC3E}">
-        <p14:creationId xmlns:p14="http://schemas.microsoft.com/office/powerpoint/2010/main" val="1685646392"/>
-      </p:ext>
-    </p:extLst>
-  </p:cSld>
-  <p:clrMapOvr>
-    <a:masterClrMapping/>
-  </p:clrMapOvr>
-</p:sld>
-</file>
-
-<file path=ppt/slides/slide5.xml><?xml version="1.0" encoding="utf-8"?>
-<p:sld xmlns:a="http://schemas.openxmlformats.org/drawingml/2006/main" xmlns:r="http://schemas.openxmlformats.org/officeDocument/2006/relationships" xmlns:p="http://schemas.openxmlformats.org/presentationml/2006/main">
-  <p:cSld>
-    <p:spTree>
-      <p:nvGrpSpPr>
-        <p:cNvPr id="1" name=""/>
-        <p:cNvGrpSpPr/>
-        <p:nvPr/>
-      </p:nvGrpSpPr>
-      <p:grpSpPr>
-        <a:xfrm>
-          <a:off x="0" y="0"/>
-          <a:ext cx="0" cy="0"/>
-          <a:chOff x="0" y="0"/>
-          <a:chExt cx="0" cy="0"/>
-        </a:xfrm>
-      </p:grpSpPr>
-      <p:pic>
-        <p:nvPicPr>
-          <p:cNvPr id="2" name="Picture 1">
-            <a:extLst>
-              <a:ext uri="{FF2B5EF4-FFF2-40B4-BE49-F238E27FC236}">
-                <a16:creationId xmlns:a16="http://schemas.microsoft.com/office/drawing/2014/main" id="{636D1066-CFB7-4885-BD10-784E43903CA6}"/>
-              </a:ext>
-            </a:extLst>
-          </p:cNvPr>
-          <p:cNvPicPr>
-            <a:picLocks noChangeAspect="1"/>
-          </p:cNvPicPr>
-          <p:nvPr/>
-        </p:nvPicPr>
-        <p:blipFill>
-          <a:blip r:embed="rId2"/>
-          <a:stretch>
-            <a:fillRect/>
-          </a:stretch>
-        </p:blipFill>
-        <p:spPr>
-          <a:xfrm>
-            <a:off x="3134095" y="2329000"/>
-            <a:ext cx="5923809" cy="2200000"/>
-          </a:xfrm>
-          <a:prstGeom prst="rect">
-            <a:avLst/>
-          </a:prstGeom>
-        </p:spPr>
-      </p:pic>
-    </p:spTree>
-    <p:extLst>
-      <p:ext uri="{BB962C8B-B14F-4D97-AF65-F5344CB8AC3E}">
-        <p14:creationId xmlns:p14="http://schemas.microsoft.com/office/powerpoint/2010/main" val="2724743834"/>
-      </p:ext>
-    </p:extLst>
-  </p:cSld>
-  <p:clrMapOvr>
-    <a:masterClrMapping/>
-  </p:clrMapOvr>
-</p:sld>
-</file>
-
-<file path=ppt/slides/slide6.xml><?xml version="1.0" encoding="utf-8"?>
-<p:sld xmlns:a="http://schemas.openxmlformats.org/drawingml/2006/main" xmlns:r="http://schemas.openxmlformats.org/officeDocument/2006/relationships" xmlns:p="http://schemas.openxmlformats.org/presentationml/2006/main">
-  <p:cSld>
-    <p:spTree>
-      <p:nvGrpSpPr>
-        <p:cNvPr id="1" name=""/>
-        <p:cNvGrpSpPr/>
-        <p:nvPr/>
-      </p:nvGrpSpPr>
-      <p:grpSpPr>
-        <a:xfrm>
-          <a:off x="0" y="0"/>
-          <a:ext cx="0" cy="0"/>
-          <a:chOff x="0" y="0"/>
-          <a:chExt cx="0" cy="0"/>
-        </a:xfrm>
-      </p:grpSpPr>
-      <p:pic>
-        <p:nvPicPr>
-          <p:cNvPr id="2" name="Picture 1">
-            <a:extLst>
-              <a:ext uri="{FF2B5EF4-FFF2-40B4-BE49-F238E27FC236}">
-                <a16:creationId xmlns:a16="http://schemas.microsoft.com/office/drawing/2014/main" id="{2B015D30-EB8F-42B3-8D0C-31EE60ACEE47}"/>
-              </a:ext>
-            </a:extLst>
-          </p:cNvPr>
-          <p:cNvPicPr>
-            <a:picLocks noChangeAspect="1"/>
-          </p:cNvPicPr>
-          <p:nvPr/>
-        </p:nvPicPr>
-        <p:blipFill>
-          <a:blip r:embed="rId2"/>
-          <a:stretch>
-            <a:fillRect/>
-          </a:stretch>
-        </p:blipFill>
-        <p:spPr>
-          <a:xfrm>
-            <a:off x="3196000" y="2833762"/>
-            <a:ext cx="5800000" cy="1190476"/>
-          </a:xfrm>
-          <a:prstGeom prst="rect">
-            <a:avLst/>
-          </a:prstGeom>
-        </p:spPr>
-      </p:pic>
-    </p:spTree>
-    <p:extLst>
-      <p:ext uri="{BB962C8B-B14F-4D97-AF65-F5344CB8AC3E}">
-        <p14:creationId xmlns:p14="http://schemas.microsoft.com/office/powerpoint/2010/main" val="1170324082"/>
-      </p:ext>
-    </p:extLst>
-  </p:cSld>
-  <p:clrMapOvr>
-    <a:masterClrMapping/>
-  </p:clrMapOvr>
-</p:sld>
-</file>
-
-<file path=ppt/slides/slide7.xml><?xml version="1.0" encoding="utf-8"?>
-<p:sld xmlns:a="http://schemas.openxmlformats.org/drawingml/2006/main" xmlns:r="http://schemas.openxmlformats.org/officeDocument/2006/relationships" xmlns:p="http://schemas.openxmlformats.org/presentationml/2006/main">
-  <p:cSld>
-    <p:spTree>
-      <p:nvGrpSpPr>
-        <p:cNvPr id="1" name=""/>
-        <p:cNvGrpSpPr/>
-        <p:nvPr/>
-      </p:nvGrpSpPr>
-      <p:grpSpPr>
-        <a:xfrm>
-          <a:off x="0" y="0"/>
-          <a:ext cx="0" cy="0"/>
-          <a:chOff x="0" y="0"/>
-          <a:chExt cx="0" cy="0"/>
-        </a:xfrm>
-      </p:grpSpPr>
-      <p:pic>
-        <p:nvPicPr>
-          <p:cNvPr id="3" name="Picture 2">
-            <a:extLst>
-              <a:ext uri="{FF2B5EF4-FFF2-40B4-BE49-F238E27FC236}">
-                <a16:creationId xmlns:a16="http://schemas.microsoft.com/office/drawing/2014/main" id="{4D8B6973-FA31-461A-B243-EA397260AF16}"/>
-              </a:ext>
-            </a:extLst>
-          </p:cNvPr>
-          <p:cNvPicPr>
-            <a:picLocks noChangeAspect="1"/>
-          </p:cNvPicPr>
-          <p:nvPr/>
-        </p:nvPicPr>
-        <p:blipFill>
-          <a:blip r:embed="rId2">
-            <a:extLst>
-              <a:ext uri="{28A0092B-C50C-407E-A947-70E740481C1C}">
-                <a14:useLocalDpi xmlns:a14="http://schemas.microsoft.com/office/drawing/2010/main" val="0"/>
-              </a:ext>
-            </a:extLst>
-          </a:blip>
-          <a:stretch>
-            <a:fillRect/>
-          </a:stretch>
-        </p:blipFill>
-        <p:spPr>
-          <a:xfrm>
-            <a:off x="609600" y="0"/>
-            <a:ext cx="10972799" cy="6858000"/>
-          </a:xfrm>
-          <a:prstGeom prst="rect">
-            <a:avLst/>
-          </a:prstGeom>
-        </p:spPr>
-      </p:pic>
-    </p:spTree>
-    <p:extLst>
-      <p:ext uri="{BB962C8B-B14F-4D97-AF65-F5344CB8AC3E}">
-        <p14:creationId xmlns:p14="http://schemas.microsoft.com/office/powerpoint/2010/main" val="2938535049"/>
-      </p:ext>
-    </p:extLst>
-  </p:cSld>
-  <p:clrMapOvr>
-    <a:masterClrMapping/>
-  </p:clrMapOvr>
-</p:sld>
-</file>
-
 <file path=ppt/slides/slide8.xml><?xml version="1.0" encoding="utf-8"?>
 <p:sld xmlns:a="http://schemas.openxmlformats.org/drawingml/2006/main" xmlns:r="http://schemas.openxmlformats.org/officeDocument/2006/relationships" xmlns:p="http://schemas.openxmlformats.org/presentationml/2006/main">
   <p:cSld>
@@ -4067,12 +5245,161 @@
           <a:chExt cx="0" cy="0"/>
         </a:xfrm>
       </p:grpSpPr>
+      <p:sp>
+        <p:nvSpPr>
+          <p:cNvPr id="9" name="Rectangle 8">
+            <a:extLst>
+              <a:ext uri="{FF2B5EF4-FFF2-40B4-BE49-F238E27FC236}">
+                <a16:creationId xmlns:a16="http://schemas.microsoft.com/office/drawing/2014/main" id="{4686E64A-884D-4CBC-B976-976D1B7B1F7E}"/>
+              </a:ext>
+            </a:extLst>
+          </p:cNvPr>
+          <p:cNvSpPr/>
+          <p:nvPr/>
+        </p:nvSpPr>
+        <p:spPr>
+          <a:xfrm>
+            <a:off x="3285554" y="1501457"/>
+            <a:ext cx="6819980" cy="1703030"/>
+          </a:xfrm>
+          <a:prstGeom prst="rect">
+            <a:avLst/>
+          </a:prstGeom>
+        </p:spPr>
+        <p:txBody>
+          <a:bodyPr wrap="square">
+            <a:spAutoFit/>
+          </a:bodyPr>
+          <a:lstStyle/>
+          <a:p>
+            <a:pPr algn="just">
+              <a:lnSpc>
+                <a:spcPct val="150000"/>
+              </a:lnSpc>
+            </a:pPr>
+            <a:r>
+              <a:rPr lang="en-US" sz="3200" b="1">
+                <a:solidFill>
+                  <a:srgbClr val="363636"/>
+                </a:solidFill>
+                <a:latin typeface="Roboto" panose="02000000000000000000" pitchFamily="2" charset="0"/>
+                <a:ea typeface="Roboto" panose="02000000000000000000" pitchFamily="2" charset="0"/>
+              </a:rPr>
+              <a:t>Font Awesome 5 support</a:t>
+            </a:r>
+          </a:p>
+          <a:p>
+            <a:pPr algn="just">
+              <a:lnSpc>
+                <a:spcPct val="150000"/>
+              </a:lnSpc>
+            </a:pPr>
+            <a:r>
+              <a:rPr lang="en-US" sz="2000">
+                <a:solidFill>
+                  <a:srgbClr val="363636"/>
+                </a:solidFill>
+                <a:latin typeface="Roboto" panose="02000000000000000000" pitchFamily="2" charset="0"/>
+                <a:ea typeface="Roboto" panose="02000000000000000000" pitchFamily="2" charset="0"/>
+              </a:rPr>
+              <a:t>Bulma is compatible with both </a:t>
+            </a:r>
+            <a:r>
+              <a:rPr lang="en-US" sz="2000" b="1">
+                <a:solidFill>
+                  <a:srgbClr val="FF0000"/>
+                </a:solidFill>
+                <a:latin typeface="Roboto" panose="02000000000000000000" pitchFamily="2" charset="0"/>
+                <a:ea typeface="Roboto" panose="02000000000000000000" pitchFamily="2" charset="0"/>
+              </a:rPr>
+              <a:t>Font Awesome 4 </a:t>
+            </a:r>
+            <a:r>
+              <a:rPr lang="en-US" sz="2000">
+                <a:solidFill>
+                  <a:srgbClr val="363636"/>
+                </a:solidFill>
+                <a:latin typeface="Roboto" panose="02000000000000000000" pitchFamily="2" charset="0"/>
+                <a:ea typeface="Roboto" panose="02000000000000000000" pitchFamily="2" charset="0"/>
+              </a:rPr>
+              <a:t>and Font</a:t>
+            </a:r>
+            <a:r>
+              <a:rPr lang="en-US" sz="2000" b="1">
+                <a:solidFill>
+                  <a:srgbClr val="363636"/>
+                </a:solidFill>
+                <a:latin typeface="Roboto" panose="02000000000000000000" pitchFamily="2" charset="0"/>
+                <a:ea typeface="Roboto" panose="02000000000000000000" pitchFamily="2" charset="0"/>
+              </a:rPr>
+              <a:t> </a:t>
+            </a:r>
+            <a:r>
+              <a:rPr lang="en-US" sz="2000" b="1">
+                <a:solidFill>
+                  <a:srgbClr val="FF0000"/>
+                </a:solidFill>
+                <a:latin typeface="Roboto" panose="02000000000000000000" pitchFamily="2" charset="0"/>
+                <a:ea typeface="Roboto" panose="02000000000000000000" pitchFamily="2" charset="0"/>
+              </a:rPr>
+              <a:t>Awesome 5</a:t>
+            </a:r>
+            <a:r>
+              <a:rPr lang="en-US" sz="2000" b="1">
+                <a:solidFill>
+                  <a:srgbClr val="363636"/>
+                </a:solidFill>
+                <a:latin typeface="Roboto" panose="02000000000000000000" pitchFamily="2" charset="0"/>
+                <a:ea typeface="Roboto" panose="02000000000000000000" pitchFamily="2" charset="0"/>
+              </a:rPr>
+              <a:t> </a:t>
+            </a:r>
+            <a:r>
+              <a:rPr lang="en-US" sz="2000">
+                <a:solidFill>
+                  <a:srgbClr val="363636"/>
+                </a:solidFill>
+                <a:latin typeface="Roboto" panose="02000000000000000000" pitchFamily="2" charset="0"/>
+                <a:ea typeface="Roboto" panose="02000000000000000000" pitchFamily="2" charset="0"/>
+              </a:rPr>
+              <a:t>thanks to the </a:t>
+            </a:r>
+            <a:r>
+              <a:rPr lang="en-US" sz="2000" b="1">
+                <a:solidFill>
+                  <a:srgbClr val="FF0000"/>
+                </a:solidFill>
+                <a:latin typeface="Roboto" panose="02000000000000000000" pitchFamily="2" charset="0"/>
+                <a:ea typeface="Roboto" panose="02000000000000000000" pitchFamily="2" charset="0"/>
+              </a:rPr>
+              <a:t>.icon </a:t>
+            </a:r>
+            <a:r>
+              <a:rPr lang="en-US" sz="2000">
+                <a:solidFill>
+                  <a:srgbClr val="363636"/>
+                </a:solidFill>
+                <a:latin typeface="Roboto" panose="02000000000000000000" pitchFamily="2" charset="0"/>
+                <a:ea typeface="Roboto" panose="02000000000000000000" pitchFamily="2" charset="0"/>
+              </a:rPr>
+              <a:t>element</a:t>
+            </a:r>
+            <a:endParaRPr lang="en-US" sz="2000">
+              <a:solidFill>
+                <a:srgbClr val="4A4A4A"/>
+              </a:solidFill>
+              <a:latin typeface="Roboto" panose="02000000000000000000" pitchFamily="2" charset="0"/>
+              <a:ea typeface="Roboto" panose="02000000000000000000" pitchFamily="2" charset="0"/>
+            </a:endParaRPr>
+          </a:p>
+        </p:txBody>
+      </p:sp>
       <p:pic>
         <p:nvPicPr>
-          <p:cNvPr id="2" name="Picture 1">
-            <a:extLst>
-              <a:ext uri="{FF2B5EF4-FFF2-40B4-BE49-F238E27FC236}">
-                <a16:creationId xmlns:a16="http://schemas.microsoft.com/office/drawing/2014/main" id="{281C7157-5E39-433C-839D-4B614A0E2B84}"/>
+          <p:cNvPr id="3" name="Graphic 2">
+            <a:extLst>
+              <a:ext uri="{FF2B5EF4-FFF2-40B4-BE49-F238E27FC236}">
+                <a16:creationId xmlns:a16="http://schemas.microsoft.com/office/drawing/2014/main" id="{521E5AEC-3F6E-4933-9752-CC94FF374970}"/>
               </a:ext>
             </a:extLst>
           </p:cNvPr>
@@ -4082,15 +5409,24 @@
           <p:nvPr/>
         </p:nvPicPr>
         <p:blipFill>
-          <a:blip r:embed="rId2"/>
+          <a:blip r:embed="rId2">
+            <a:extLst>
+              <a:ext uri="{28A0092B-C50C-407E-A947-70E740481C1C}">
+                <a14:useLocalDpi xmlns:a14="http://schemas.microsoft.com/office/drawing/2010/main" val="0"/>
+              </a:ext>
+              <a:ext uri="{96DAC541-7B7A-43D3-8B79-37D633B846F1}">
+                <asvg:svgBlip xmlns:asvg="http://schemas.microsoft.com/office/drawing/2016/SVG/main" r:embed="rId3"/>
+              </a:ext>
+            </a:extLst>
+          </a:blip>
           <a:stretch>
             <a:fillRect/>
           </a:stretch>
         </p:blipFill>
         <p:spPr>
           <a:xfrm>
-            <a:off x="689827" y="0"/>
-            <a:ext cx="4218597" cy="6858000"/>
+            <a:off x="720000" y="1080000"/>
+            <a:ext cx="2205000" cy="2520000"/>
           </a:xfrm>
           <a:prstGeom prst="rect">
             <a:avLst/>
@@ -4100,7 +5436,7 @@
     </p:spTree>
     <p:extLst>
       <p:ext uri="{BB962C8B-B14F-4D97-AF65-F5344CB8AC3E}">
-        <p14:creationId xmlns:p14="http://schemas.microsoft.com/office/powerpoint/2010/main" val="2350509829"/>
+        <p14:creationId xmlns:p14="http://schemas.microsoft.com/office/powerpoint/2010/main" val="535976546"/>
       </p:ext>
     </p:extLst>
   </p:cSld>
@@ -4129,10 +5465,10 @@
       </p:grpSpPr>
       <p:sp>
         <p:nvSpPr>
-          <p:cNvPr id="4" name="Rectangle 3">
-            <a:extLst>
-              <a:ext uri="{FF2B5EF4-FFF2-40B4-BE49-F238E27FC236}">
-                <a16:creationId xmlns:a16="http://schemas.microsoft.com/office/drawing/2014/main" id="{FAB9DD94-F73D-4682-BCD2-6221DEDF7E13}"/>
+          <p:cNvPr id="9" name="Rectangle 8">
+            <a:extLst>
+              <a:ext uri="{FF2B5EF4-FFF2-40B4-BE49-F238E27FC236}">
+                <a16:creationId xmlns:a16="http://schemas.microsoft.com/office/drawing/2014/main" id="{4686E64A-884D-4CBC-B976-976D1B7B1F7E}"/>
               </a:ext>
             </a:extLst>
           </p:cNvPr>
@@ -4141,8 +5477,8 @@
         </p:nvSpPr>
         <p:spPr>
           <a:xfrm>
-            <a:off x="96520" y="1166843"/>
-            <a:ext cx="11866880" cy="3693319"/>
+            <a:off x="3285554" y="1501457"/>
+            <a:ext cx="6819980" cy="2626360"/>
           </a:xfrm>
           <a:prstGeom prst="rect">
             <a:avLst/>
@@ -4154,258 +5490,175 @@
           </a:bodyPr>
           <a:lstStyle/>
           <a:p>
-            <a:endParaRPr lang="en-US" dirty="0">
-              <a:latin typeface="SourceSansPro-Regular"/>
+            <a:pPr algn="just">
+              <a:lnSpc>
+                <a:spcPct val="150000"/>
+              </a:lnSpc>
+            </a:pPr>
+            <a:r>
+              <a:rPr lang="en-US" sz="3200" b="1">
+                <a:solidFill>
+                  <a:srgbClr val="363636"/>
+                </a:solidFill>
+                <a:latin typeface="Roboto" panose="02000000000000000000" pitchFamily="2" charset="0"/>
+                <a:ea typeface="Roboto" panose="02000000000000000000" pitchFamily="2" charset="0"/>
+              </a:rPr>
+              <a:t>100+ useful CSS helpers</a:t>
+            </a:r>
+          </a:p>
+          <a:p>
+            <a:pPr algn="just">
+              <a:lnSpc>
+                <a:spcPct val="150000"/>
+              </a:lnSpc>
+            </a:pPr>
+            <a:r>
+              <a:rPr lang="en-US" sz="2000">
+                <a:solidFill>
+                  <a:srgbClr val="363636"/>
+                </a:solidFill>
+                <a:latin typeface="Roboto" panose="02000000000000000000" pitchFamily="2" charset="0"/>
+                <a:ea typeface="Roboto" panose="02000000000000000000" pitchFamily="2" charset="0"/>
+              </a:rPr>
+              <a:t>Bulma ships with more than </a:t>
+            </a:r>
+            <a:r>
+              <a:rPr lang="en-US" sz="2000" b="1">
+                <a:solidFill>
+                  <a:srgbClr val="FF0000"/>
+                </a:solidFill>
+                <a:latin typeface="Roboto" panose="02000000000000000000" pitchFamily="2" charset="0"/>
+                <a:ea typeface="Roboto" panose="02000000000000000000" pitchFamily="2" charset="0"/>
+              </a:rPr>
+              <a:t>100 helpers</a:t>
+            </a:r>
+            <a:r>
+              <a:rPr lang="en-US" sz="2000">
+                <a:solidFill>
+                  <a:srgbClr val="363636"/>
+                </a:solidFill>
+                <a:latin typeface="Roboto" panose="02000000000000000000" pitchFamily="2" charset="0"/>
+                <a:ea typeface="Roboto" panose="02000000000000000000" pitchFamily="2" charset="0"/>
+              </a:rPr>
+              <a:t> to specify color, display, and spacing.</a:t>
+            </a:r>
+          </a:p>
+          <a:p>
+            <a:pPr algn="just">
+              <a:lnSpc>
+                <a:spcPct val="150000"/>
+              </a:lnSpc>
+            </a:pPr>
+            <a:endParaRPr lang="en-US" sz="2000">
+              <a:solidFill>
+                <a:srgbClr val="363636"/>
+              </a:solidFill>
+              <a:latin typeface="Roboto" panose="02000000000000000000" pitchFamily="2" charset="0"/>
+              <a:ea typeface="Roboto" panose="02000000000000000000" pitchFamily="2" charset="0"/>
             </a:endParaRPr>
           </a:p>
           <a:p>
-            <a:pPr marL="285750" indent="-285750">
-              <a:buFont typeface="Wingdings" panose="05000000000000000000" pitchFamily="2" charset="2"/>
-              <a:buChar char="q"/>
+            <a:pPr algn="just">
+              <a:lnSpc>
+                <a:spcPct val="150000"/>
+              </a:lnSpc>
             </a:pPr>
             <a:r>
-              <a:rPr lang="en-US" b="1" dirty="0">
-                <a:latin typeface="SourceSansPro-Bold"/>
-              </a:rPr>
-              <a:t>Modern</a:t>
-            </a:r>
-            <a:r>
-              <a:rPr lang="en-US" dirty="0">
-                <a:latin typeface="SourceSansPro-Regular"/>
-              </a:rPr>
-              <a:t>: All of Bulma is based on CSS Flexbox.</a:t>
-            </a:r>
-            <a:r>
-              <a:rPr lang="en-US" dirty="0"/>
-              <a:t> A simple way to build responsive columns.</a:t>
-            </a:r>
-            <a:endParaRPr lang="en-US" dirty="0">
-              <a:latin typeface="SourceSansPro-Regular"/>
-            </a:endParaRPr>
-          </a:p>
-          <a:p>
-            <a:pPr marL="342900" indent="-342900">
-              <a:buFont typeface="Wingdings" panose="05000000000000000000" pitchFamily="2" charset="2"/>
-              <a:buChar char="q"/>
-            </a:pPr>
-            <a:r>
-              <a:rPr lang="en-US" b="1" dirty="0">
-                <a:latin typeface="SourceSansPro-Bold"/>
-              </a:rPr>
-              <a:t>100% responsive</a:t>
-            </a:r>
-            <a:r>
-              <a:rPr lang="en-US" dirty="0">
-                <a:latin typeface="SourceSansPro-Regular"/>
-              </a:rPr>
-              <a:t>: Bulma is designed to be both mobile and desktop friendly. Design</a:t>
-            </a:r>
-            <a:r>
-              <a:rPr lang="en-US" dirty="0"/>
-              <a:t> for a mobile-first.</a:t>
-            </a:r>
-            <a:br>
-              <a:rPr lang="en-US" dirty="0"/>
-            </a:br>
-            <a:r>
-              <a:rPr lang="en-US" dirty="0"/>
-              <a:t>Every element in Bulma is </a:t>
-            </a:r>
-            <a:r>
-              <a:rPr lang="en-US" b="1" dirty="0"/>
-              <a:t>mobile-first</a:t>
-            </a:r>
-            <a:r>
-              <a:rPr lang="en-US" dirty="0"/>
-              <a:t> and optimizes for </a:t>
-            </a:r>
-            <a:r>
-              <a:rPr lang="en-US" b="1" dirty="0"/>
-              <a:t>vertical reading</a:t>
-            </a:r>
-            <a:r>
-              <a:rPr lang="en-US" dirty="0"/>
-              <a:t>, so by default on mobile:</a:t>
-            </a:r>
-          </a:p>
-          <a:p>
-            <a:pPr marL="627063" indent="-285750">
-              <a:buFont typeface="Courier New" panose="02070309020205020404" pitchFamily="49" charset="0"/>
-              <a:buChar char="o"/>
-            </a:pPr>
-            <a:r>
-              <a:rPr lang="en-US" dirty="0"/>
-              <a:t>columns are stacked vertically</a:t>
-            </a:r>
-          </a:p>
-          <a:p>
-            <a:pPr marL="627063" indent="-285750">
-              <a:buFont typeface="Courier New" panose="02070309020205020404" pitchFamily="49" charset="0"/>
-              <a:buChar char="o"/>
-            </a:pPr>
-            <a:r>
-              <a:rPr lang="en-US" dirty="0"/>
-              <a:t>the level component will show its children stacked vertically</a:t>
-            </a:r>
-          </a:p>
-          <a:p>
-            <a:pPr marL="627063" indent="-285750">
-              <a:buFont typeface="Courier New" panose="02070309020205020404" pitchFamily="49" charset="0"/>
-              <a:buChar char="o"/>
-            </a:pPr>
-            <a:r>
-              <a:rPr lang="en-US" dirty="0"/>
-              <a:t>the nav menu will be hidden</a:t>
-            </a:r>
-          </a:p>
-          <a:p>
-            <a:pPr marL="285750" indent="-285750">
-              <a:buFont typeface="Wingdings" panose="05000000000000000000" pitchFamily="2" charset="2"/>
-              <a:buChar char="q"/>
-            </a:pPr>
-            <a:r>
-              <a:rPr lang="en-US" b="1" dirty="0"/>
-              <a:t>Modularity: </a:t>
-            </a:r>
-            <a:r>
-              <a:rPr lang="en-US" dirty="0"/>
-              <a:t>Bulma consists of </a:t>
-            </a:r>
-            <a:r>
-              <a:rPr lang="en-US" b="1" dirty="0"/>
-              <a:t>39</a:t>
-            </a:r>
-            <a:r>
-              <a:rPr lang="en-US" dirty="0"/>
-              <a:t> .sass files that you can import </a:t>
-            </a:r>
-            <a:r>
-              <a:rPr lang="en-US" b="1" dirty="0"/>
-              <a:t>individually. </a:t>
-            </a:r>
-            <a:r>
-              <a:rPr lang="en-US" dirty="0"/>
-              <a:t>Just import what you need.</a:t>
-            </a:r>
-            <a:endParaRPr lang="en-US" dirty="0">
-              <a:latin typeface="SourceSansPro-Regular"/>
-            </a:endParaRPr>
-          </a:p>
-          <a:p>
-            <a:pPr marL="285750" indent="-285750">
-              <a:buFont typeface="Wingdings" panose="05000000000000000000" pitchFamily="2" charset="2"/>
-              <a:buChar char="q"/>
-            </a:pPr>
-            <a:r>
-              <a:rPr lang="en-US" b="1" dirty="0">
-                <a:latin typeface="SourceSansPro-Bold"/>
-              </a:rPr>
-              <a:t>Easy to learn</a:t>
-            </a:r>
-            <a:r>
-              <a:rPr lang="en-US" dirty="0">
-                <a:latin typeface="SourceSansPro-Regular"/>
-              </a:rPr>
-              <a:t>: Most users get started within minutes</a:t>
-            </a:r>
-          </a:p>
-          <a:p>
-            <a:pPr marL="285750" indent="-285750">
-              <a:buFont typeface="Wingdings" panose="05000000000000000000" pitchFamily="2" charset="2"/>
-              <a:buChar char="q"/>
-            </a:pPr>
-            <a:r>
-              <a:rPr lang="en-US" b="1" dirty="0">
-                <a:latin typeface="SourceSansPro-Bold"/>
-              </a:rPr>
-              <a:t>Simple syntax</a:t>
-            </a:r>
-            <a:r>
-              <a:rPr lang="en-US" dirty="0">
-                <a:latin typeface="SourceSansPro-Regular"/>
-              </a:rPr>
-              <a:t>: Bulma makes sure to use the minimal HTML required, so your code is easy to read and write</a:t>
-            </a:r>
-          </a:p>
-          <a:p>
-            <a:pPr marL="285750" indent="-285750">
-              <a:buFont typeface="Wingdings" panose="05000000000000000000" pitchFamily="2" charset="2"/>
-              <a:buChar char="q"/>
-            </a:pPr>
-            <a:r>
-              <a:rPr lang="en-US" b="1" dirty="0">
-                <a:latin typeface="SourceSansPro-Bold"/>
-              </a:rPr>
-              <a:t>Customizable</a:t>
-            </a:r>
-            <a:r>
-              <a:rPr lang="en-US" dirty="0">
-                <a:latin typeface="SourceSansPro-Regular"/>
-              </a:rPr>
-              <a:t>: With over 300 SASS variables, you can apply your own branding to Bulma</a:t>
-            </a:r>
-          </a:p>
-          <a:p>
-            <a:pPr marL="285750" indent="-285750">
-              <a:buFont typeface="Wingdings" panose="05000000000000000000" pitchFamily="2" charset="2"/>
-              <a:buChar char="q"/>
-            </a:pPr>
-            <a:r>
-              <a:rPr lang="en-US" b="1" dirty="0">
-                <a:latin typeface="SourceSansPro-Bold"/>
-              </a:rPr>
-              <a:t>No JavaScript</a:t>
-            </a:r>
-            <a:r>
-              <a:rPr lang="en-US" dirty="0">
-                <a:latin typeface="SourceSansPro-Regular"/>
-              </a:rPr>
-              <a:t>: Because Bulma is CSS-only, it integrates gracefully with any JavaScript framework (Angular, VueJS, React, or just plain Vanilla JavaScript)</a:t>
-            </a:r>
-            <a:endParaRPr lang="en-US" dirty="0"/>
-          </a:p>
-        </p:txBody>
-      </p:sp>
-      <p:sp>
-        <p:nvSpPr>
-          <p:cNvPr id="6" name="Rectangle 5">
-            <a:extLst>
-              <a:ext uri="{FF2B5EF4-FFF2-40B4-BE49-F238E27FC236}">
-                <a16:creationId xmlns:a16="http://schemas.microsoft.com/office/drawing/2014/main" id="{1E0264A4-D6A9-432E-81A9-CAD9C0D7AF36}"/>
-              </a:ext>
-            </a:extLst>
-          </p:cNvPr>
-          <p:cNvSpPr/>
+              <a:rPr lang="en-US" sz="2000" b="1">
+                <a:solidFill>
+                  <a:srgbClr val="0070C0"/>
+                </a:solidFill>
+                <a:latin typeface="Roboto" panose="02000000000000000000" pitchFamily="2" charset="0"/>
+                <a:ea typeface="Roboto" panose="02000000000000000000" pitchFamily="2" charset="0"/>
+              </a:rPr>
+              <a:t>Responsive helpers </a:t>
+            </a:r>
+            <a:r>
+              <a:rPr lang="en-US" sz="2000" b="1">
+                <a:solidFill>
+                  <a:srgbClr val="363636"/>
+                </a:solidFill>
+                <a:latin typeface="Roboto" panose="02000000000000000000" pitchFamily="2" charset="0"/>
+                <a:ea typeface="Roboto" panose="02000000000000000000" pitchFamily="2" charset="0"/>
+              </a:rPr>
+              <a:t>– </a:t>
+            </a:r>
+            <a:r>
+              <a:rPr lang="en-US" sz="2000" b="1">
+                <a:solidFill>
+                  <a:srgbClr val="0070C0"/>
+                </a:solidFill>
+                <a:latin typeface="Roboto" panose="02000000000000000000" pitchFamily="2" charset="0"/>
+                <a:ea typeface="Roboto" panose="02000000000000000000" pitchFamily="2" charset="0"/>
+              </a:rPr>
+              <a:t>Typography helpers</a:t>
+            </a:r>
+            <a:r>
+              <a:rPr lang="en-US" sz="2000" b="1">
+                <a:solidFill>
+                  <a:srgbClr val="363636"/>
+                </a:solidFill>
+                <a:latin typeface="Roboto" panose="02000000000000000000" pitchFamily="2" charset="0"/>
+                <a:ea typeface="Roboto" panose="02000000000000000000" pitchFamily="2" charset="0"/>
+              </a:rPr>
+              <a:t> – </a:t>
+            </a:r>
+            <a:r>
+              <a:rPr lang="en-US" sz="2000" b="1">
+                <a:solidFill>
+                  <a:srgbClr val="0070C0"/>
+                </a:solidFill>
+                <a:latin typeface="Roboto" panose="02000000000000000000" pitchFamily="2" charset="0"/>
+                <a:ea typeface="Roboto" panose="02000000000000000000" pitchFamily="2" charset="0"/>
+              </a:rPr>
+              <a:t>Other helpers</a:t>
+            </a:r>
+          </a:p>
+        </p:txBody>
+      </p:sp>
+      <p:pic>
+        <p:nvPicPr>
+          <p:cNvPr id="4" name="Graphic 3">
+            <a:extLst>
+              <a:ext uri="{FF2B5EF4-FFF2-40B4-BE49-F238E27FC236}">
+                <a16:creationId xmlns:a16="http://schemas.microsoft.com/office/drawing/2014/main" id="{EA7F3B7F-07B0-4252-B74D-4F61E45FB3F2}"/>
+              </a:ext>
+            </a:extLst>
+          </p:cNvPr>
+          <p:cNvPicPr>
+            <a:picLocks noChangeAspect="1"/>
+          </p:cNvPicPr>
           <p:nvPr/>
-        </p:nvSpPr>
+        </p:nvPicPr>
+        <p:blipFill>
+          <a:blip r:embed="rId2">
+            <a:extLst>
+              <a:ext uri="{28A0092B-C50C-407E-A947-70E740481C1C}">
+                <a14:useLocalDpi xmlns:a14="http://schemas.microsoft.com/office/drawing/2010/main" val="0"/>
+              </a:ext>
+              <a:ext uri="{96DAC541-7B7A-43D3-8B79-37D633B846F1}">
+                <asvg:svgBlip xmlns:asvg="http://schemas.microsoft.com/office/drawing/2016/SVG/main" r:embed="rId3"/>
+              </a:ext>
+            </a:extLst>
+          </a:blip>
+          <a:stretch>
+            <a:fillRect/>
+          </a:stretch>
+        </p:blipFill>
         <p:spPr>
           <a:xfrm>
-            <a:off x="192549" y="517230"/>
-            <a:ext cx="7293407" cy="369332"/>
+            <a:off x="720000" y="1080000"/>
+            <a:ext cx="2205000" cy="2520000"/>
           </a:xfrm>
           <a:prstGeom prst="rect">
             <a:avLst/>
           </a:prstGeom>
         </p:spPr>
-        <p:txBody>
-          <a:bodyPr wrap="none">
-            <a:spAutoFit/>
-          </a:bodyPr>
-          <a:lstStyle/>
-          <a:p>
-            <a:r>
-              <a:rPr lang="en-US" b="1" dirty="0">
-                <a:latin typeface="SourceSansPro-Regular"/>
-              </a:rPr>
-              <a:t>Here are a few reasons why Bulma is different than other CSS frameworks:</a:t>
-            </a:r>
-          </a:p>
-        </p:txBody>
-      </p:sp>
+      </p:pic>
     </p:spTree>
     <p:extLst>
       <p:ext uri="{BB962C8B-B14F-4D97-AF65-F5344CB8AC3E}">
-        <p14:creationId xmlns:p14="http://schemas.microsoft.com/office/powerpoint/2010/main" val="2289369834"/>
+        <p14:creationId xmlns:p14="http://schemas.microsoft.com/office/powerpoint/2010/main" val="1794533717"/>
       </p:ext>
     </p:extLst>
   </p:cSld>

</xml_diff>

<commit_message>
Contiue more on Bulma Overview Presentation
</commit_message>
<xml_diff>
--- a/Course Materials/01- Introduction/01_04 - An Overview of Bulma Framework.pptx
+++ b/Course Materials/01- Introduction/01_04 - An Overview of Bulma Framework.pptx
@@ -8,16 +8,15 @@
     <p:sldId id="258" r:id="rId2"/>
     <p:sldId id="268" r:id="rId3"/>
     <p:sldId id="263" r:id="rId4"/>
-    <p:sldId id="269" r:id="rId5"/>
+    <p:sldId id="276" r:id="rId5"/>
     <p:sldId id="259" r:id="rId6"/>
-    <p:sldId id="270" r:id="rId7"/>
-    <p:sldId id="260" r:id="rId8"/>
-    <p:sldId id="271" r:id="rId9"/>
-    <p:sldId id="272" r:id="rId10"/>
-    <p:sldId id="273" r:id="rId11"/>
-    <p:sldId id="274" r:id="rId12"/>
-    <p:sldId id="261" r:id="rId13"/>
-    <p:sldId id="267" r:id="rId14"/>
+    <p:sldId id="277" r:id="rId7"/>
+    <p:sldId id="278" r:id="rId8"/>
+    <p:sldId id="279" r:id="rId9"/>
+    <p:sldId id="280" r:id="rId10"/>
+    <p:sldId id="274" r:id="rId11"/>
+    <p:sldId id="261" r:id="rId12"/>
+    <p:sldId id="267" r:id="rId13"/>
   </p:sldIdLst>
   <p:sldSz cx="12192000" cy="6858000"/>
   <p:notesSz cx="6858000" cy="9144000"/>
@@ -283,7 +282,7 @@
           <a:p>
             <a:fld id="{AE77EB8F-A44A-47BB-9CF9-CF844E8E2DD5}" type="datetimeFigureOut">
               <a:rPr lang="en-US" smtClean="0"/>
-              <a:t>12/3/2019</a:t>
+              <a:t>12/4/2019</a:t>
             </a:fld>
             <a:endParaRPr lang="en-US"/>
           </a:p>
@@ -481,7 +480,7 @@
           <a:p>
             <a:fld id="{AE77EB8F-A44A-47BB-9CF9-CF844E8E2DD5}" type="datetimeFigureOut">
               <a:rPr lang="en-US" smtClean="0"/>
-              <a:t>12/3/2019</a:t>
+              <a:t>12/4/2019</a:t>
             </a:fld>
             <a:endParaRPr lang="en-US"/>
           </a:p>
@@ -689,7 +688,7 @@
           <a:p>
             <a:fld id="{AE77EB8F-A44A-47BB-9CF9-CF844E8E2DD5}" type="datetimeFigureOut">
               <a:rPr lang="en-US" smtClean="0"/>
-              <a:t>12/3/2019</a:t>
+              <a:t>12/4/2019</a:t>
             </a:fld>
             <a:endParaRPr lang="en-US"/>
           </a:p>
@@ -887,7 +886,7 @@
           <a:p>
             <a:fld id="{AE77EB8F-A44A-47BB-9CF9-CF844E8E2DD5}" type="datetimeFigureOut">
               <a:rPr lang="en-US" smtClean="0"/>
-              <a:t>12/3/2019</a:t>
+              <a:t>12/4/2019</a:t>
             </a:fld>
             <a:endParaRPr lang="en-US"/>
           </a:p>
@@ -1162,7 +1161,7 @@
           <a:p>
             <a:fld id="{AE77EB8F-A44A-47BB-9CF9-CF844E8E2DD5}" type="datetimeFigureOut">
               <a:rPr lang="en-US" smtClean="0"/>
-              <a:t>12/3/2019</a:t>
+              <a:t>12/4/2019</a:t>
             </a:fld>
             <a:endParaRPr lang="en-US"/>
           </a:p>
@@ -1427,7 +1426,7 @@
           <a:p>
             <a:fld id="{AE77EB8F-A44A-47BB-9CF9-CF844E8E2DD5}" type="datetimeFigureOut">
               <a:rPr lang="en-US" smtClean="0"/>
-              <a:t>12/3/2019</a:t>
+              <a:t>12/4/2019</a:t>
             </a:fld>
             <a:endParaRPr lang="en-US"/>
           </a:p>
@@ -1839,7 +1838,7 @@
           <a:p>
             <a:fld id="{AE77EB8F-A44A-47BB-9CF9-CF844E8E2DD5}" type="datetimeFigureOut">
               <a:rPr lang="en-US" smtClean="0"/>
-              <a:t>12/3/2019</a:t>
+              <a:t>12/4/2019</a:t>
             </a:fld>
             <a:endParaRPr lang="en-US"/>
           </a:p>
@@ -1980,7 +1979,7 @@
           <a:p>
             <a:fld id="{AE77EB8F-A44A-47BB-9CF9-CF844E8E2DD5}" type="datetimeFigureOut">
               <a:rPr lang="en-US" smtClean="0"/>
-              <a:t>12/3/2019</a:t>
+              <a:t>12/4/2019</a:t>
             </a:fld>
             <a:endParaRPr lang="en-US"/>
           </a:p>
@@ -2093,7 +2092,7 @@
           <a:p>
             <a:fld id="{AE77EB8F-A44A-47BB-9CF9-CF844E8E2DD5}" type="datetimeFigureOut">
               <a:rPr lang="en-US" smtClean="0"/>
-              <a:t>12/3/2019</a:t>
+              <a:t>12/4/2019</a:t>
             </a:fld>
             <a:endParaRPr lang="en-US"/>
           </a:p>
@@ -2404,7 +2403,7 @@
           <a:p>
             <a:fld id="{AE77EB8F-A44A-47BB-9CF9-CF844E8E2DD5}" type="datetimeFigureOut">
               <a:rPr lang="en-US" smtClean="0"/>
-              <a:t>12/3/2019</a:t>
+              <a:t>12/4/2019</a:t>
             </a:fld>
             <a:endParaRPr lang="en-US"/>
           </a:p>
@@ -2692,7 +2691,7 @@
           <a:p>
             <a:fld id="{AE77EB8F-A44A-47BB-9CF9-CF844E8E2DD5}" type="datetimeFigureOut">
               <a:rPr lang="en-US" smtClean="0"/>
-              <a:t>12/3/2019</a:t>
+              <a:t>12/4/2019</a:t>
             </a:fld>
             <a:endParaRPr lang="en-US"/>
           </a:p>
@@ -2933,7 +2932,7 @@
           <a:p>
             <a:fld id="{AE77EB8F-A44A-47BB-9CF9-CF844E8E2DD5}" type="datetimeFigureOut">
               <a:rPr lang="en-US" smtClean="0"/>
-              <a:t>12/3/2019</a:t>
+              <a:t>12/4/2019</a:t>
             </a:fld>
             <a:endParaRPr lang="en-US"/>
           </a:p>
@@ -3350,6 +3349,78 @@
           <a:chExt cx="0" cy="0"/>
         </a:xfrm>
       </p:grpSpPr>
+      <p:pic>
+        <p:nvPicPr>
+          <p:cNvPr id="8" name="Picture 7">
+            <a:extLst>
+              <a:ext uri="{FF2B5EF4-FFF2-40B4-BE49-F238E27FC236}">
+                <a16:creationId xmlns:a16="http://schemas.microsoft.com/office/drawing/2014/main" id="{978984CB-ED27-40E7-B04D-428473BC8C5A}"/>
+              </a:ext>
+            </a:extLst>
+          </p:cNvPr>
+          <p:cNvPicPr>
+            <a:picLocks noChangeAspect="1"/>
+          </p:cNvPicPr>
+          <p:nvPr/>
+        </p:nvPicPr>
+        <p:blipFill>
+          <a:blip r:embed="rId2">
+            <a:extLst>
+              <a:ext uri="{28A0092B-C50C-407E-A947-70E740481C1C}">
+                <a14:useLocalDpi xmlns:a14="http://schemas.microsoft.com/office/drawing/2010/main" val="0"/>
+              </a:ext>
+            </a:extLst>
+          </a:blip>
+          <a:stretch>
+            <a:fillRect/>
+          </a:stretch>
+        </p:blipFill>
+        <p:spPr>
+          <a:xfrm>
+            <a:off x="1108710" y="3058567"/>
+            <a:ext cx="9974580" cy="2087880"/>
+          </a:xfrm>
+          <a:prstGeom prst="rect">
+            <a:avLst/>
+          </a:prstGeom>
+        </p:spPr>
+      </p:pic>
+      <p:pic>
+        <p:nvPicPr>
+          <p:cNvPr id="16" name="Picture 15">
+            <a:extLst>
+              <a:ext uri="{FF2B5EF4-FFF2-40B4-BE49-F238E27FC236}">
+                <a16:creationId xmlns:a16="http://schemas.microsoft.com/office/drawing/2014/main" id="{3F1F8F41-988A-4AD7-967F-3105DDF3A31E}"/>
+              </a:ext>
+            </a:extLst>
+          </p:cNvPr>
+          <p:cNvPicPr>
+            <a:picLocks noChangeAspect="1"/>
+          </p:cNvPicPr>
+          <p:nvPr/>
+        </p:nvPicPr>
+        <p:blipFill>
+          <a:blip r:embed="rId3">
+            <a:extLst>
+              <a:ext uri="{28A0092B-C50C-407E-A947-70E740481C1C}">
+                <a14:useLocalDpi xmlns:a14="http://schemas.microsoft.com/office/drawing/2010/main" val="0"/>
+              </a:ext>
+            </a:extLst>
+          </a:blip>
+          <a:stretch>
+            <a:fillRect/>
+          </a:stretch>
+        </p:blipFill>
+        <p:spPr>
+          <a:xfrm>
+            <a:off x="3048000" y="2667000"/>
+            <a:ext cx="6096000" cy="1524000"/>
+          </a:xfrm>
+          <a:prstGeom prst="rect">
+            <a:avLst/>
+          </a:prstGeom>
+        </p:spPr>
+      </p:pic>
       <p:sp>
         <p:nvSpPr>
           <p:cNvPr id="2" name="TextBox 1">
@@ -3364,7 +3435,7 @@
         </p:nvSpPr>
         <p:spPr>
           <a:xfrm>
-            <a:off x="2506502" y="289049"/>
+            <a:off x="2439390" y="4270256"/>
             <a:ext cx="7313220" cy="584775"/>
           </a:xfrm>
           <a:prstGeom prst="rect">
@@ -3422,8 +3493,8 @@
         </p:nvSpPr>
         <p:spPr>
           <a:xfrm>
-            <a:off x="4766149" y="1007346"/>
-            <a:ext cx="2659702" cy="523220"/>
+            <a:off x="4390072" y="1460679"/>
+            <a:ext cx="3015569" cy="584775"/>
           </a:xfrm>
           <a:prstGeom prst="rect">
             <a:avLst/>
@@ -3444,12 +3515,13 @@
               <a:t>What is </a:t>
             </a:r>
             <a:r>
-              <a:rPr lang="en-US" sz="2800" b="1">
+              <a:rPr lang="en-US" sz="3200" b="1">
                 <a:solidFill>
                   <a:srgbClr val="00D1B2"/>
                 </a:solidFill>
-                <a:latin typeface="Roboto" panose="02000000000000000000" pitchFamily="2" charset="0"/>
+                <a:latin typeface="Poppins" panose="00000500000000000000" pitchFamily="50" charset="0"/>
                 <a:ea typeface="Roboto" panose="02000000000000000000" pitchFamily="2" charset="0"/>
+                <a:cs typeface="Poppins" panose="00000500000000000000" pitchFamily="50" charset="0"/>
               </a:rPr>
               <a:t>Bulma</a:t>
             </a:r>
@@ -3481,8 +3553,8 @@
         </p:nvSpPr>
         <p:spPr>
           <a:xfrm>
-            <a:off x="1722770" y="1831862"/>
-            <a:ext cx="8880684" cy="400110"/>
+            <a:off x="1208338" y="2279337"/>
+            <a:ext cx="9775324" cy="400110"/>
           </a:xfrm>
           <a:prstGeom prst="rect">
             <a:avLst/>
@@ -3552,7 +3624,7 @@
                 <a:latin typeface="Roboto" panose="02000000000000000000" pitchFamily="2" charset="0"/>
                 <a:ea typeface="Roboto" panose="02000000000000000000" pitchFamily="2" charset="0"/>
               </a:rPr>
-              <a:t>and</a:t>
+              <a:t>And</a:t>
             </a:r>
             <a:r>
               <a:rPr lang="en-US" sz="2000" b="1">
@@ -3562,7 +3634,7 @@
                 <a:latin typeface="Roboto" panose="02000000000000000000" pitchFamily="2" charset="0"/>
                 <a:ea typeface="Roboto" panose="02000000000000000000" pitchFamily="2" charset="0"/>
               </a:rPr>
-              <a:t> Responsive</a:t>
+              <a:t> Modern Responsive</a:t>
             </a:r>
             <a:r>
               <a:rPr lang="en-US" sz="2000">
@@ -3597,10 +3669,10 @@
       </p:sp>
       <p:pic>
         <p:nvPicPr>
-          <p:cNvPr id="8" name="Picture 7">
-            <a:extLst>
-              <a:ext uri="{FF2B5EF4-FFF2-40B4-BE49-F238E27FC236}">
-                <a16:creationId xmlns:a16="http://schemas.microsoft.com/office/drawing/2014/main" id="{978984CB-ED27-40E7-B04D-428473BC8C5A}"/>
+          <p:cNvPr id="7" name="Picture 6">
+            <a:extLst>
+              <a:ext uri="{FF2B5EF4-FFF2-40B4-BE49-F238E27FC236}">
+                <a16:creationId xmlns:a16="http://schemas.microsoft.com/office/drawing/2014/main" id="{E0401D47-5DFC-4659-9777-C8F40DA6B1DD}"/>
               </a:ext>
             </a:extLst>
           </p:cNvPr>
@@ -3610,7 +3682,7 @@
           <p:nvPr/>
         </p:nvPicPr>
         <p:blipFill>
-          <a:blip r:embed="rId2">
+          <a:blip r:embed="rId4">
             <a:extLst>
               <a:ext uri="{28A0092B-C50C-407E-A947-70E740481C1C}">
                 <a14:useLocalDpi xmlns:a14="http://schemas.microsoft.com/office/drawing/2010/main" val="0"/>
@@ -3623,43 +3695,7 @@
         </p:blipFill>
         <p:spPr>
           <a:xfrm>
-            <a:off x="1108710" y="4394654"/>
-            <a:ext cx="9974580" cy="2087880"/>
-          </a:xfrm>
-          <a:prstGeom prst="rect">
-            <a:avLst/>
-          </a:prstGeom>
-        </p:spPr>
-      </p:pic>
-      <p:pic>
-        <p:nvPicPr>
-          <p:cNvPr id="7" name="Picture 6">
-            <a:extLst>
-              <a:ext uri="{FF2B5EF4-FFF2-40B4-BE49-F238E27FC236}">
-                <a16:creationId xmlns:a16="http://schemas.microsoft.com/office/drawing/2014/main" id="{E0401D47-5DFC-4659-9777-C8F40DA6B1DD}"/>
-              </a:ext>
-            </a:extLst>
-          </p:cNvPr>
-          <p:cNvPicPr>
-            <a:picLocks noChangeAspect="1"/>
-          </p:cNvPicPr>
-          <p:nvPr/>
-        </p:nvPicPr>
-        <p:blipFill>
-          <a:blip r:embed="rId3">
-            <a:extLst>
-              <a:ext uri="{28A0092B-C50C-407E-A947-70E740481C1C}">
-                <a14:useLocalDpi xmlns:a14="http://schemas.microsoft.com/office/drawing/2010/main" val="0"/>
-              </a:ext>
-            </a:extLst>
-          </a:blip>
-          <a:stretch>
-            <a:fillRect/>
-          </a:stretch>
-        </p:blipFill>
-        <p:spPr>
-          <a:xfrm>
-            <a:off x="6397660" y="2365491"/>
+            <a:off x="9077197" y="3058355"/>
             <a:ext cx="1962150" cy="1762125"/>
           </a:xfrm>
           <a:prstGeom prst="rect">
@@ -3682,7 +3718,7 @@
           <p:nvPr/>
         </p:nvPicPr>
         <p:blipFill>
-          <a:blip r:embed="rId4">
+          <a:blip r:embed="rId5">
             <a:extLst>
               <a:ext uri="{28A0092B-C50C-407E-A947-70E740481C1C}">
                 <a14:useLocalDpi xmlns:a14="http://schemas.microsoft.com/office/drawing/2010/main" val="0"/>
@@ -3695,7 +3731,7 @@
         </p:blipFill>
         <p:spPr>
           <a:xfrm>
-            <a:off x="1356313" y="2365491"/>
+            <a:off x="1208338" y="3058355"/>
             <a:ext cx="1962150" cy="1762125"/>
           </a:xfrm>
           <a:prstGeom prst="rect">
@@ -3718,7 +3754,7 @@
           <p:nvPr/>
         </p:nvPicPr>
         <p:blipFill>
-          <a:blip r:embed="rId5">
+          <a:blip r:embed="rId6">
             <a:extLst>
               <a:ext uri="{28A0092B-C50C-407E-A947-70E740481C1C}">
                 <a14:useLocalDpi xmlns:a14="http://schemas.microsoft.com/office/drawing/2010/main" val="0"/>
@@ -3731,7 +3767,7 @@
         </p:blipFill>
         <p:spPr>
           <a:xfrm>
-            <a:off x="3876986" y="2365491"/>
+            <a:off x="3831291" y="3058355"/>
             <a:ext cx="1962150" cy="1762125"/>
           </a:xfrm>
           <a:prstGeom prst="rect">
@@ -3754,7 +3790,7 @@
           <p:nvPr/>
         </p:nvPicPr>
         <p:blipFill>
-          <a:blip r:embed="rId6">
+          <a:blip r:embed="rId7">
             <a:extLst>
               <a:ext uri="{28A0092B-C50C-407E-A947-70E740481C1C}">
                 <a14:useLocalDpi xmlns:a14="http://schemas.microsoft.com/office/drawing/2010/main" val="0"/>
@@ -3767,44 +3803,8 @@
         </p:blipFill>
         <p:spPr>
           <a:xfrm>
-            <a:off x="8918333" y="2365491"/>
+            <a:off x="6454244" y="3058355"/>
             <a:ext cx="1962150" cy="1762125"/>
-          </a:xfrm>
-          <a:prstGeom prst="rect">
-            <a:avLst/>
-          </a:prstGeom>
-        </p:spPr>
-      </p:pic>
-      <p:pic>
-        <p:nvPicPr>
-          <p:cNvPr id="16" name="Picture 15">
-            <a:extLst>
-              <a:ext uri="{FF2B5EF4-FFF2-40B4-BE49-F238E27FC236}">
-                <a16:creationId xmlns:a16="http://schemas.microsoft.com/office/drawing/2014/main" id="{3F1F8F41-988A-4AD7-967F-3105DDF3A31E}"/>
-              </a:ext>
-            </a:extLst>
-          </p:cNvPr>
-          <p:cNvPicPr>
-            <a:picLocks noChangeAspect="1"/>
-          </p:cNvPicPr>
-          <p:nvPr/>
-        </p:nvPicPr>
-        <p:blipFill>
-          <a:blip r:embed="rId7">
-            <a:extLst>
-              <a:ext uri="{28A0092B-C50C-407E-A947-70E740481C1C}">
-                <a14:useLocalDpi xmlns:a14="http://schemas.microsoft.com/office/drawing/2010/main" val="0"/>
-              </a:ext>
-            </a:extLst>
-          </a:blip>
-          <a:stretch>
-            <a:fillRect/>
-          </a:stretch>
-        </p:blipFill>
-        <p:spPr>
-          <a:xfrm>
-            <a:off x="3048000" y="2667000"/>
-            <a:ext cx="6096000" cy="1524000"/>
           </a:xfrm>
           <a:prstGeom prst="rect">
             <a:avLst/>
@@ -3821,171 +3821,933 @@
   <p:clrMapOvr>
     <a:masterClrMapping/>
   </p:clrMapOvr>
+  <mc:AlternateContent xmlns:mc="http://schemas.openxmlformats.org/markup-compatibility/2006">
+    <mc:Choice xmlns:p14="http://schemas.microsoft.com/office/powerpoint/2010/main" Requires="p14">
+      <p:transition spd="slow" p14:dur="2000" advClick="0"/>
+    </mc:Choice>
+    <mc:Fallback>
+      <p:transition spd="slow" advClick="0"/>
+    </mc:Fallback>
+  </mc:AlternateContent>
+  <p:timing>
+    <p:tnLst>
+      <p:par>
+        <p:cTn id="1" dur="indefinite" restart="never" nodeType="tmRoot">
+          <p:childTnLst>
+            <p:seq concurrent="1" nextAc="seek">
+              <p:cTn id="2" dur="indefinite" nodeType="mainSeq">
+                <p:childTnLst>
+                  <p:par>
+                    <p:cTn id="3" fill="hold">
+                      <p:stCondLst>
+                        <p:cond delay="indefinite"/>
+                        <p:cond evt="onBegin" delay="0">
+                          <p:tn val="2"/>
+                        </p:cond>
+                      </p:stCondLst>
+                      <p:childTnLst>
+                        <p:par>
+                          <p:cTn id="4" fill="hold">
+                            <p:stCondLst>
+                              <p:cond delay="0"/>
+                            </p:stCondLst>
+                            <p:childTnLst>
+                              <p:par>
+                                <p:cTn id="5" presetID="3" presetClass="entr" presetSubtype="10" fill="hold" nodeType="afterEffect">
+                                  <p:stCondLst>
+                                    <p:cond delay="750"/>
+                                  </p:stCondLst>
+                                  <p:childTnLst>
+                                    <p:set>
+                                      <p:cBhvr>
+                                        <p:cTn id="6" dur="1" fill="hold">
+                                          <p:stCondLst>
+                                            <p:cond delay="0"/>
+                                          </p:stCondLst>
+                                        </p:cTn>
+                                        <p:tgtEl>
+                                          <p:spTgt spid="16"/>
+                                        </p:tgtEl>
+                                        <p:attrNameLst>
+                                          <p:attrName>style.visibility</p:attrName>
+                                        </p:attrNameLst>
+                                      </p:cBhvr>
+                                      <p:to>
+                                        <p:strVal val="visible"/>
+                                      </p:to>
+                                    </p:set>
+                                    <p:animEffect transition="in" filter="blinds(horizontal)">
+                                      <p:cBhvr>
+                                        <p:cTn id="7" dur="500"/>
+                                        <p:tgtEl>
+                                          <p:spTgt spid="16"/>
+                                        </p:tgtEl>
+                                      </p:cBhvr>
+                                    </p:animEffect>
+                                  </p:childTnLst>
+                                </p:cTn>
+                              </p:par>
+                            </p:childTnLst>
+                          </p:cTn>
+                        </p:par>
+                        <p:par>
+                          <p:cTn id="8" fill="hold">
+                            <p:stCondLst>
+                              <p:cond delay="1250"/>
+                            </p:stCondLst>
+                            <p:childTnLst>
+                              <p:par>
+                                <p:cTn id="9" presetID="3" presetClass="entr" presetSubtype="10" fill="hold" grpId="0" nodeType="afterEffect">
+                                  <p:stCondLst>
+                                    <p:cond delay="250"/>
+                                  </p:stCondLst>
+                                  <p:childTnLst>
+                                    <p:set>
+                                      <p:cBhvr>
+                                        <p:cTn id="10" dur="1" fill="hold">
+                                          <p:stCondLst>
+                                            <p:cond delay="0"/>
+                                          </p:stCondLst>
+                                        </p:cTn>
+                                        <p:tgtEl>
+                                          <p:spTgt spid="2"/>
+                                        </p:tgtEl>
+                                        <p:attrNameLst>
+                                          <p:attrName>style.visibility</p:attrName>
+                                        </p:attrNameLst>
+                                      </p:cBhvr>
+                                      <p:to>
+                                        <p:strVal val="visible"/>
+                                      </p:to>
+                                    </p:set>
+                                    <p:animEffect transition="in" filter="blinds(horizontal)">
+                                      <p:cBhvr>
+                                        <p:cTn id="11" dur="500"/>
+                                        <p:tgtEl>
+                                          <p:spTgt spid="2"/>
+                                        </p:tgtEl>
+                                      </p:cBhvr>
+                                    </p:animEffect>
+                                  </p:childTnLst>
+                                </p:cTn>
+                              </p:par>
+                            </p:childTnLst>
+                          </p:cTn>
+                        </p:par>
+                      </p:childTnLst>
+                    </p:cTn>
+                  </p:par>
+                  <p:par>
+                    <p:cTn id="12" fill="hold">
+                      <p:stCondLst>
+                        <p:cond delay="indefinite"/>
+                      </p:stCondLst>
+                      <p:childTnLst>
+                        <p:par>
+                          <p:cTn id="13" fill="hold">
+                            <p:stCondLst>
+                              <p:cond delay="0"/>
+                            </p:stCondLst>
+                            <p:childTnLst>
+                              <p:par>
+                                <p:cTn id="14" presetID="10" presetClass="exit" presetSubtype="0" fill="hold" nodeType="clickEffect">
+                                  <p:stCondLst>
+                                    <p:cond delay="0"/>
+                                  </p:stCondLst>
+                                  <p:childTnLst>
+                                    <p:animEffect transition="out" filter="fade">
+                                      <p:cBhvr>
+                                        <p:cTn id="15" dur="500"/>
+                                        <p:tgtEl>
+                                          <p:spTgt spid="16"/>
+                                        </p:tgtEl>
+                                      </p:cBhvr>
+                                    </p:animEffect>
+                                    <p:set>
+                                      <p:cBhvr>
+                                        <p:cTn id="16" dur="1" fill="hold">
+                                          <p:stCondLst>
+                                            <p:cond delay="499"/>
+                                          </p:stCondLst>
+                                        </p:cTn>
+                                        <p:tgtEl>
+                                          <p:spTgt spid="16"/>
+                                        </p:tgtEl>
+                                        <p:attrNameLst>
+                                          <p:attrName>style.visibility</p:attrName>
+                                        </p:attrNameLst>
+                                      </p:cBhvr>
+                                      <p:to>
+                                        <p:strVal val="hidden"/>
+                                      </p:to>
+                                    </p:set>
+                                  </p:childTnLst>
+                                </p:cTn>
+                              </p:par>
+                            </p:childTnLst>
+                          </p:cTn>
+                        </p:par>
+                        <p:par>
+                          <p:cTn id="17" fill="hold">
+                            <p:stCondLst>
+                              <p:cond delay="500"/>
+                            </p:stCondLst>
+                            <p:childTnLst>
+                              <p:par>
+                                <p:cTn id="18" presetID="42" presetClass="path" presetSubtype="0" accel="50000" decel="50000" fill="hold" grpId="1" nodeType="afterEffect">
+                                  <p:stCondLst>
+                                    <p:cond delay="500"/>
+                                  </p:stCondLst>
+                                  <p:childTnLst>
+                                    <p:animMotion origin="layout" path="M 0 2.22222E-6 L 0 -0.56227 " pathEditMode="relative" rAng="0" ptsTypes="AA">
+                                      <p:cBhvr>
+                                        <p:cTn id="19" dur="1000" fill="hold"/>
+                                        <p:tgtEl>
+                                          <p:spTgt spid="2"/>
+                                        </p:tgtEl>
+                                        <p:attrNameLst>
+                                          <p:attrName>ppt_x</p:attrName>
+                                          <p:attrName>ppt_y</p:attrName>
+                                        </p:attrNameLst>
+                                      </p:cBhvr>
+                                      <p:rCtr x="0" y="-28125"/>
+                                    </p:animMotion>
+                                  </p:childTnLst>
+                                </p:cTn>
+                              </p:par>
+                            </p:childTnLst>
+                          </p:cTn>
+                        </p:par>
+                        <p:par>
+                          <p:cTn id="20" fill="hold">
+                            <p:stCondLst>
+                              <p:cond delay="2000"/>
+                            </p:stCondLst>
+                            <p:childTnLst>
+                              <p:par>
+                                <p:cTn id="21" presetID="10" presetClass="entr" presetSubtype="0" fill="hold" grpId="0" nodeType="afterEffect">
+                                  <p:stCondLst>
+                                    <p:cond delay="250"/>
+                                  </p:stCondLst>
+                                  <p:childTnLst>
+                                    <p:set>
+                                      <p:cBhvr>
+                                        <p:cTn id="22" dur="1" fill="hold">
+                                          <p:stCondLst>
+                                            <p:cond delay="0"/>
+                                          </p:stCondLst>
+                                        </p:cTn>
+                                        <p:tgtEl>
+                                          <p:spTgt spid="3"/>
+                                        </p:tgtEl>
+                                        <p:attrNameLst>
+                                          <p:attrName>style.visibility</p:attrName>
+                                        </p:attrNameLst>
+                                      </p:cBhvr>
+                                      <p:to>
+                                        <p:strVal val="visible"/>
+                                      </p:to>
+                                    </p:set>
+                                    <p:animEffect transition="in" filter="fade">
+                                      <p:cBhvr>
+                                        <p:cTn id="23" dur="500"/>
+                                        <p:tgtEl>
+                                          <p:spTgt spid="3"/>
+                                        </p:tgtEl>
+                                      </p:cBhvr>
+                                    </p:animEffect>
+                                  </p:childTnLst>
+                                </p:cTn>
+                              </p:par>
+                            </p:childTnLst>
+                          </p:cTn>
+                        </p:par>
+                      </p:childTnLst>
+                    </p:cTn>
+                  </p:par>
+                  <p:par>
+                    <p:cTn id="24" fill="hold">
+                      <p:stCondLst>
+                        <p:cond delay="indefinite"/>
+                      </p:stCondLst>
+                      <p:childTnLst>
+                        <p:par>
+                          <p:cTn id="25" fill="hold">
+                            <p:stCondLst>
+                              <p:cond delay="0"/>
+                            </p:stCondLst>
+                            <p:childTnLst>
+                              <p:par>
+                                <p:cTn id="26" presetID="10" presetClass="entr" presetSubtype="0" fill="hold" grpId="0" nodeType="clickEffect">
+                                  <p:stCondLst>
+                                    <p:cond delay="0"/>
+                                  </p:stCondLst>
+                                  <p:childTnLst>
+                                    <p:set>
+                                      <p:cBhvr>
+                                        <p:cTn id="27" dur="1" fill="hold">
+                                          <p:stCondLst>
+                                            <p:cond delay="0"/>
+                                          </p:stCondLst>
+                                        </p:cTn>
+                                        <p:tgtEl>
+                                          <p:spTgt spid="4"/>
+                                        </p:tgtEl>
+                                        <p:attrNameLst>
+                                          <p:attrName>style.visibility</p:attrName>
+                                        </p:attrNameLst>
+                                      </p:cBhvr>
+                                      <p:to>
+                                        <p:strVal val="visible"/>
+                                      </p:to>
+                                    </p:set>
+                                    <p:animEffect transition="in" filter="fade">
+                                      <p:cBhvr>
+                                        <p:cTn id="28" dur="500"/>
+                                        <p:tgtEl>
+                                          <p:spTgt spid="4"/>
+                                        </p:tgtEl>
+                                      </p:cBhvr>
+                                    </p:animEffect>
+                                  </p:childTnLst>
+                                </p:cTn>
+                              </p:par>
+                            </p:childTnLst>
+                          </p:cTn>
+                        </p:par>
+                      </p:childTnLst>
+                    </p:cTn>
+                  </p:par>
+                  <p:par>
+                    <p:cTn id="29" fill="hold">
+                      <p:stCondLst>
+                        <p:cond delay="indefinite"/>
+                      </p:stCondLst>
+                      <p:childTnLst>
+                        <p:par>
+                          <p:cTn id="30" fill="hold">
+                            <p:stCondLst>
+                              <p:cond delay="0"/>
+                            </p:stCondLst>
+                            <p:childTnLst>
+                              <p:par>
+                                <p:cTn id="31" presetID="42" presetClass="entr" presetSubtype="0" fill="hold" nodeType="clickEffect">
+                                  <p:stCondLst>
+                                    <p:cond delay="0"/>
+                                  </p:stCondLst>
+                                  <p:childTnLst>
+                                    <p:set>
+                                      <p:cBhvr>
+                                        <p:cTn id="32" dur="1" fill="hold">
+                                          <p:stCondLst>
+                                            <p:cond delay="0"/>
+                                          </p:stCondLst>
+                                        </p:cTn>
+                                        <p:tgtEl>
+                                          <p:spTgt spid="10"/>
+                                        </p:tgtEl>
+                                        <p:attrNameLst>
+                                          <p:attrName>style.visibility</p:attrName>
+                                        </p:attrNameLst>
+                                      </p:cBhvr>
+                                      <p:to>
+                                        <p:strVal val="visible"/>
+                                      </p:to>
+                                    </p:set>
+                                    <p:animEffect transition="in" filter="fade">
+                                      <p:cBhvr>
+                                        <p:cTn id="33" dur="750"/>
+                                        <p:tgtEl>
+                                          <p:spTgt spid="10"/>
+                                        </p:tgtEl>
+                                      </p:cBhvr>
+                                    </p:animEffect>
+                                    <p:anim calcmode="lin" valueType="num">
+                                      <p:cBhvr>
+                                        <p:cTn id="34" dur="750" fill="hold"/>
+                                        <p:tgtEl>
+                                          <p:spTgt spid="10"/>
+                                        </p:tgtEl>
+                                        <p:attrNameLst>
+                                          <p:attrName>ppt_x</p:attrName>
+                                        </p:attrNameLst>
+                                      </p:cBhvr>
+                                      <p:tavLst>
+                                        <p:tav tm="0">
+                                          <p:val>
+                                            <p:strVal val="#ppt_x"/>
+                                          </p:val>
+                                        </p:tav>
+                                        <p:tav tm="100000">
+                                          <p:val>
+                                            <p:strVal val="#ppt_x"/>
+                                          </p:val>
+                                        </p:tav>
+                                      </p:tavLst>
+                                    </p:anim>
+                                    <p:anim calcmode="lin" valueType="num">
+                                      <p:cBhvr>
+                                        <p:cTn id="35" dur="750" fill="hold"/>
+                                        <p:tgtEl>
+                                          <p:spTgt spid="10"/>
+                                        </p:tgtEl>
+                                        <p:attrNameLst>
+                                          <p:attrName>ppt_y</p:attrName>
+                                        </p:attrNameLst>
+                                      </p:cBhvr>
+                                      <p:tavLst>
+                                        <p:tav tm="0">
+                                          <p:val>
+                                            <p:strVal val="#ppt_y+.1"/>
+                                          </p:val>
+                                        </p:tav>
+                                        <p:tav tm="100000">
+                                          <p:val>
+                                            <p:strVal val="#ppt_y"/>
+                                          </p:val>
+                                        </p:tav>
+                                      </p:tavLst>
+                                    </p:anim>
+                                  </p:childTnLst>
+                                </p:cTn>
+                              </p:par>
+                            </p:childTnLst>
+                          </p:cTn>
+                        </p:par>
+                      </p:childTnLst>
+                    </p:cTn>
+                  </p:par>
+                  <p:par>
+                    <p:cTn id="36" fill="hold">
+                      <p:stCondLst>
+                        <p:cond delay="indefinite"/>
+                      </p:stCondLst>
+                      <p:childTnLst>
+                        <p:par>
+                          <p:cTn id="37" fill="hold">
+                            <p:stCondLst>
+                              <p:cond delay="0"/>
+                            </p:stCondLst>
+                            <p:childTnLst>
+                              <p:par>
+                                <p:cTn id="38" presetID="42" presetClass="entr" presetSubtype="0" fill="hold" nodeType="clickEffect">
+                                  <p:stCondLst>
+                                    <p:cond delay="0"/>
+                                  </p:stCondLst>
+                                  <p:childTnLst>
+                                    <p:set>
+                                      <p:cBhvr>
+                                        <p:cTn id="39" dur="1" fill="hold">
+                                          <p:stCondLst>
+                                            <p:cond delay="0"/>
+                                          </p:stCondLst>
+                                        </p:cTn>
+                                        <p:tgtEl>
+                                          <p:spTgt spid="12"/>
+                                        </p:tgtEl>
+                                        <p:attrNameLst>
+                                          <p:attrName>style.visibility</p:attrName>
+                                        </p:attrNameLst>
+                                      </p:cBhvr>
+                                      <p:to>
+                                        <p:strVal val="visible"/>
+                                      </p:to>
+                                    </p:set>
+                                    <p:animEffect transition="in" filter="fade">
+                                      <p:cBhvr>
+                                        <p:cTn id="40" dur="750"/>
+                                        <p:tgtEl>
+                                          <p:spTgt spid="12"/>
+                                        </p:tgtEl>
+                                      </p:cBhvr>
+                                    </p:animEffect>
+                                    <p:anim calcmode="lin" valueType="num">
+                                      <p:cBhvr>
+                                        <p:cTn id="41" dur="750" fill="hold"/>
+                                        <p:tgtEl>
+                                          <p:spTgt spid="12"/>
+                                        </p:tgtEl>
+                                        <p:attrNameLst>
+                                          <p:attrName>ppt_x</p:attrName>
+                                        </p:attrNameLst>
+                                      </p:cBhvr>
+                                      <p:tavLst>
+                                        <p:tav tm="0">
+                                          <p:val>
+                                            <p:strVal val="#ppt_x"/>
+                                          </p:val>
+                                        </p:tav>
+                                        <p:tav tm="100000">
+                                          <p:val>
+                                            <p:strVal val="#ppt_x"/>
+                                          </p:val>
+                                        </p:tav>
+                                      </p:tavLst>
+                                    </p:anim>
+                                    <p:anim calcmode="lin" valueType="num">
+                                      <p:cBhvr>
+                                        <p:cTn id="42" dur="750" fill="hold"/>
+                                        <p:tgtEl>
+                                          <p:spTgt spid="12"/>
+                                        </p:tgtEl>
+                                        <p:attrNameLst>
+                                          <p:attrName>ppt_y</p:attrName>
+                                        </p:attrNameLst>
+                                      </p:cBhvr>
+                                      <p:tavLst>
+                                        <p:tav tm="0">
+                                          <p:val>
+                                            <p:strVal val="#ppt_y+.1"/>
+                                          </p:val>
+                                        </p:tav>
+                                        <p:tav tm="100000">
+                                          <p:val>
+                                            <p:strVal val="#ppt_y"/>
+                                          </p:val>
+                                        </p:tav>
+                                      </p:tavLst>
+                                    </p:anim>
+                                  </p:childTnLst>
+                                </p:cTn>
+                              </p:par>
+                            </p:childTnLst>
+                          </p:cTn>
+                        </p:par>
+                      </p:childTnLst>
+                    </p:cTn>
+                  </p:par>
+                  <p:par>
+                    <p:cTn id="43" fill="hold">
+                      <p:stCondLst>
+                        <p:cond delay="indefinite"/>
+                      </p:stCondLst>
+                      <p:childTnLst>
+                        <p:par>
+                          <p:cTn id="44" fill="hold">
+                            <p:stCondLst>
+                              <p:cond delay="0"/>
+                            </p:stCondLst>
+                            <p:childTnLst>
+                              <p:par>
+                                <p:cTn id="45" presetID="42" presetClass="entr" presetSubtype="0" fill="hold" nodeType="clickEffect">
+                                  <p:stCondLst>
+                                    <p:cond delay="0"/>
+                                  </p:stCondLst>
+                                  <p:childTnLst>
+                                    <p:set>
+                                      <p:cBhvr>
+                                        <p:cTn id="46" dur="1" fill="hold">
+                                          <p:stCondLst>
+                                            <p:cond delay="0"/>
+                                          </p:stCondLst>
+                                        </p:cTn>
+                                        <p:tgtEl>
+                                          <p:spTgt spid="14"/>
+                                        </p:tgtEl>
+                                        <p:attrNameLst>
+                                          <p:attrName>style.visibility</p:attrName>
+                                        </p:attrNameLst>
+                                      </p:cBhvr>
+                                      <p:to>
+                                        <p:strVal val="visible"/>
+                                      </p:to>
+                                    </p:set>
+                                    <p:animEffect transition="in" filter="fade">
+                                      <p:cBhvr>
+                                        <p:cTn id="47" dur="750"/>
+                                        <p:tgtEl>
+                                          <p:spTgt spid="14"/>
+                                        </p:tgtEl>
+                                      </p:cBhvr>
+                                    </p:animEffect>
+                                    <p:anim calcmode="lin" valueType="num">
+                                      <p:cBhvr>
+                                        <p:cTn id="48" dur="750" fill="hold"/>
+                                        <p:tgtEl>
+                                          <p:spTgt spid="14"/>
+                                        </p:tgtEl>
+                                        <p:attrNameLst>
+                                          <p:attrName>ppt_x</p:attrName>
+                                        </p:attrNameLst>
+                                      </p:cBhvr>
+                                      <p:tavLst>
+                                        <p:tav tm="0">
+                                          <p:val>
+                                            <p:strVal val="#ppt_x"/>
+                                          </p:val>
+                                        </p:tav>
+                                        <p:tav tm="100000">
+                                          <p:val>
+                                            <p:strVal val="#ppt_x"/>
+                                          </p:val>
+                                        </p:tav>
+                                      </p:tavLst>
+                                    </p:anim>
+                                    <p:anim calcmode="lin" valueType="num">
+                                      <p:cBhvr>
+                                        <p:cTn id="49" dur="750" fill="hold"/>
+                                        <p:tgtEl>
+                                          <p:spTgt spid="14"/>
+                                        </p:tgtEl>
+                                        <p:attrNameLst>
+                                          <p:attrName>ppt_y</p:attrName>
+                                        </p:attrNameLst>
+                                      </p:cBhvr>
+                                      <p:tavLst>
+                                        <p:tav tm="0">
+                                          <p:val>
+                                            <p:strVal val="#ppt_y+.1"/>
+                                          </p:val>
+                                        </p:tav>
+                                        <p:tav tm="100000">
+                                          <p:val>
+                                            <p:strVal val="#ppt_y"/>
+                                          </p:val>
+                                        </p:tav>
+                                      </p:tavLst>
+                                    </p:anim>
+                                  </p:childTnLst>
+                                </p:cTn>
+                              </p:par>
+                            </p:childTnLst>
+                          </p:cTn>
+                        </p:par>
+                      </p:childTnLst>
+                    </p:cTn>
+                  </p:par>
+                  <p:par>
+                    <p:cTn id="50" fill="hold">
+                      <p:stCondLst>
+                        <p:cond delay="indefinite"/>
+                      </p:stCondLst>
+                      <p:childTnLst>
+                        <p:par>
+                          <p:cTn id="51" fill="hold">
+                            <p:stCondLst>
+                              <p:cond delay="0"/>
+                            </p:stCondLst>
+                            <p:childTnLst>
+                              <p:par>
+                                <p:cTn id="52" presetID="42" presetClass="entr" presetSubtype="0" fill="hold" nodeType="clickEffect">
+                                  <p:stCondLst>
+                                    <p:cond delay="0"/>
+                                  </p:stCondLst>
+                                  <p:childTnLst>
+                                    <p:set>
+                                      <p:cBhvr>
+                                        <p:cTn id="53" dur="1" fill="hold">
+                                          <p:stCondLst>
+                                            <p:cond delay="0"/>
+                                          </p:stCondLst>
+                                        </p:cTn>
+                                        <p:tgtEl>
+                                          <p:spTgt spid="7"/>
+                                        </p:tgtEl>
+                                        <p:attrNameLst>
+                                          <p:attrName>style.visibility</p:attrName>
+                                        </p:attrNameLst>
+                                      </p:cBhvr>
+                                      <p:to>
+                                        <p:strVal val="visible"/>
+                                      </p:to>
+                                    </p:set>
+                                    <p:animEffect transition="in" filter="fade">
+                                      <p:cBhvr>
+                                        <p:cTn id="54" dur="750"/>
+                                        <p:tgtEl>
+                                          <p:spTgt spid="7"/>
+                                        </p:tgtEl>
+                                      </p:cBhvr>
+                                    </p:animEffect>
+                                    <p:anim calcmode="lin" valueType="num">
+                                      <p:cBhvr>
+                                        <p:cTn id="55" dur="750" fill="hold"/>
+                                        <p:tgtEl>
+                                          <p:spTgt spid="7"/>
+                                        </p:tgtEl>
+                                        <p:attrNameLst>
+                                          <p:attrName>ppt_x</p:attrName>
+                                        </p:attrNameLst>
+                                      </p:cBhvr>
+                                      <p:tavLst>
+                                        <p:tav tm="0">
+                                          <p:val>
+                                            <p:strVal val="#ppt_x"/>
+                                          </p:val>
+                                        </p:tav>
+                                        <p:tav tm="100000">
+                                          <p:val>
+                                            <p:strVal val="#ppt_x"/>
+                                          </p:val>
+                                        </p:tav>
+                                      </p:tavLst>
+                                    </p:anim>
+                                    <p:anim calcmode="lin" valueType="num">
+                                      <p:cBhvr>
+                                        <p:cTn id="56" dur="750" fill="hold"/>
+                                        <p:tgtEl>
+                                          <p:spTgt spid="7"/>
+                                        </p:tgtEl>
+                                        <p:attrNameLst>
+                                          <p:attrName>ppt_y</p:attrName>
+                                        </p:attrNameLst>
+                                      </p:cBhvr>
+                                      <p:tavLst>
+                                        <p:tav tm="0">
+                                          <p:val>
+                                            <p:strVal val="#ppt_y+.1"/>
+                                          </p:val>
+                                        </p:tav>
+                                        <p:tav tm="100000">
+                                          <p:val>
+                                            <p:strVal val="#ppt_y"/>
+                                          </p:val>
+                                        </p:tav>
+                                      </p:tavLst>
+                                    </p:anim>
+                                  </p:childTnLst>
+                                </p:cTn>
+                              </p:par>
+                            </p:childTnLst>
+                          </p:cTn>
+                        </p:par>
+                      </p:childTnLst>
+                    </p:cTn>
+                  </p:par>
+                  <p:par>
+                    <p:cTn id="57" fill="hold">
+                      <p:stCondLst>
+                        <p:cond delay="indefinite"/>
+                      </p:stCondLst>
+                      <p:childTnLst>
+                        <p:par>
+                          <p:cTn id="58" fill="hold">
+                            <p:stCondLst>
+                              <p:cond delay="0"/>
+                            </p:stCondLst>
+                            <p:childTnLst>
+                              <p:par>
+                                <p:cTn id="59" presetID="10" presetClass="exit" presetSubtype="0" fill="hold" nodeType="clickEffect">
+                                  <p:stCondLst>
+                                    <p:cond delay="0"/>
+                                  </p:stCondLst>
+                                  <p:childTnLst>
+                                    <p:animEffect transition="out" filter="fade">
+                                      <p:cBhvr>
+                                        <p:cTn id="60" dur="500"/>
+                                        <p:tgtEl>
+                                          <p:spTgt spid="10"/>
+                                        </p:tgtEl>
+                                      </p:cBhvr>
+                                    </p:animEffect>
+                                    <p:set>
+                                      <p:cBhvr>
+                                        <p:cTn id="61" dur="1" fill="hold">
+                                          <p:stCondLst>
+                                            <p:cond delay="499"/>
+                                          </p:stCondLst>
+                                        </p:cTn>
+                                        <p:tgtEl>
+                                          <p:spTgt spid="10"/>
+                                        </p:tgtEl>
+                                        <p:attrNameLst>
+                                          <p:attrName>style.visibility</p:attrName>
+                                        </p:attrNameLst>
+                                      </p:cBhvr>
+                                      <p:to>
+                                        <p:strVal val="hidden"/>
+                                      </p:to>
+                                    </p:set>
+                                  </p:childTnLst>
+                                </p:cTn>
+                              </p:par>
+                              <p:par>
+                                <p:cTn id="62" presetID="10" presetClass="exit" presetSubtype="0" fill="hold" nodeType="withEffect">
+                                  <p:stCondLst>
+                                    <p:cond delay="0"/>
+                                  </p:stCondLst>
+                                  <p:childTnLst>
+                                    <p:animEffect transition="out" filter="fade">
+                                      <p:cBhvr>
+                                        <p:cTn id="63" dur="500"/>
+                                        <p:tgtEl>
+                                          <p:spTgt spid="12"/>
+                                        </p:tgtEl>
+                                      </p:cBhvr>
+                                    </p:animEffect>
+                                    <p:set>
+                                      <p:cBhvr>
+                                        <p:cTn id="64" dur="1" fill="hold">
+                                          <p:stCondLst>
+                                            <p:cond delay="499"/>
+                                          </p:stCondLst>
+                                        </p:cTn>
+                                        <p:tgtEl>
+                                          <p:spTgt spid="12"/>
+                                        </p:tgtEl>
+                                        <p:attrNameLst>
+                                          <p:attrName>style.visibility</p:attrName>
+                                        </p:attrNameLst>
+                                      </p:cBhvr>
+                                      <p:to>
+                                        <p:strVal val="hidden"/>
+                                      </p:to>
+                                    </p:set>
+                                  </p:childTnLst>
+                                </p:cTn>
+                              </p:par>
+                              <p:par>
+                                <p:cTn id="65" presetID="10" presetClass="exit" presetSubtype="0" fill="hold" nodeType="withEffect">
+                                  <p:stCondLst>
+                                    <p:cond delay="0"/>
+                                  </p:stCondLst>
+                                  <p:childTnLst>
+                                    <p:animEffect transition="out" filter="fade">
+                                      <p:cBhvr>
+                                        <p:cTn id="66" dur="500"/>
+                                        <p:tgtEl>
+                                          <p:spTgt spid="7"/>
+                                        </p:tgtEl>
+                                      </p:cBhvr>
+                                    </p:animEffect>
+                                    <p:set>
+                                      <p:cBhvr>
+                                        <p:cTn id="67" dur="1" fill="hold">
+                                          <p:stCondLst>
+                                            <p:cond delay="499"/>
+                                          </p:stCondLst>
+                                        </p:cTn>
+                                        <p:tgtEl>
+                                          <p:spTgt spid="7"/>
+                                        </p:tgtEl>
+                                        <p:attrNameLst>
+                                          <p:attrName>style.visibility</p:attrName>
+                                        </p:attrNameLst>
+                                      </p:cBhvr>
+                                      <p:to>
+                                        <p:strVal val="hidden"/>
+                                      </p:to>
+                                    </p:set>
+                                  </p:childTnLst>
+                                </p:cTn>
+                              </p:par>
+                              <p:par>
+                                <p:cTn id="68" presetID="10" presetClass="exit" presetSubtype="0" fill="hold" nodeType="withEffect">
+                                  <p:stCondLst>
+                                    <p:cond delay="0"/>
+                                  </p:stCondLst>
+                                  <p:childTnLst>
+                                    <p:animEffect transition="out" filter="fade">
+                                      <p:cBhvr>
+                                        <p:cTn id="69" dur="500"/>
+                                        <p:tgtEl>
+                                          <p:spTgt spid="14"/>
+                                        </p:tgtEl>
+                                      </p:cBhvr>
+                                    </p:animEffect>
+                                    <p:set>
+                                      <p:cBhvr>
+                                        <p:cTn id="70" dur="1" fill="hold">
+                                          <p:stCondLst>
+                                            <p:cond delay="499"/>
+                                          </p:stCondLst>
+                                        </p:cTn>
+                                        <p:tgtEl>
+                                          <p:spTgt spid="14"/>
+                                        </p:tgtEl>
+                                        <p:attrNameLst>
+                                          <p:attrName>style.visibility</p:attrName>
+                                        </p:attrNameLst>
+                                      </p:cBhvr>
+                                      <p:to>
+                                        <p:strVal val="hidden"/>
+                                      </p:to>
+                                    </p:set>
+                                  </p:childTnLst>
+                                </p:cTn>
+                              </p:par>
+                            </p:childTnLst>
+                          </p:cTn>
+                        </p:par>
+                        <p:par>
+                          <p:cTn id="71" fill="hold">
+                            <p:stCondLst>
+                              <p:cond delay="500"/>
+                            </p:stCondLst>
+                            <p:childTnLst>
+                              <p:par>
+                                <p:cTn id="72" presetID="14" presetClass="entr" presetSubtype="10" fill="hold" nodeType="afterEffect">
+                                  <p:stCondLst>
+                                    <p:cond delay="250"/>
+                                  </p:stCondLst>
+                                  <p:childTnLst>
+                                    <p:set>
+                                      <p:cBhvr>
+                                        <p:cTn id="73" dur="1" fill="hold">
+                                          <p:stCondLst>
+                                            <p:cond delay="0"/>
+                                          </p:stCondLst>
+                                        </p:cTn>
+                                        <p:tgtEl>
+                                          <p:spTgt spid="8"/>
+                                        </p:tgtEl>
+                                        <p:attrNameLst>
+                                          <p:attrName>style.visibility</p:attrName>
+                                        </p:attrNameLst>
+                                      </p:cBhvr>
+                                      <p:to>
+                                        <p:strVal val="visible"/>
+                                      </p:to>
+                                    </p:set>
+                                    <p:animEffect transition="in" filter="randombar(horizontal)">
+                                      <p:cBhvr>
+                                        <p:cTn id="74" dur="500"/>
+                                        <p:tgtEl>
+                                          <p:spTgt spid="8"/>
+                                        </p:tgtEl>
+                                      </p:cBhvr>
+                                    </p:animEffect>
+                                  </p:childTnLst>
+                                </p:cTn>
+                              </p:par>
+                            </p:childTnLst>
+                          </p:cTn>
+                        </p:par>
+                      </p:childTnLst>
+                    </p:cTn>
+                  </p:par>
+                </p:childTnLst>
+              </p:cTn>
+              <p:prevCondLst>
+                <p:cond evt="onPrev" delay="0">
+                  <p:tgtEl>
+                    <p:sldTgt/>
+                  </p:tgtEl>
+                </p:cond>
+              </p:prevCondLst>
+              <p:nextCondLst>
+                <p:cond evt="onNext" delay="0">
+                  <p:tgtEl>
+                    <p:sldTgt/>
+                  </p:tgtEl>
+                </p:cond>
+              </p:nextCondLst>
+            </p:seq>
+          </p:childTnLst>
+        </p:cTn>
+      </p:par>
+    </p:tnLst>
+    <p:bldLst>
+      <p:bldP spid="2" grpId="0"/>
+      <p:bldP spid="2" grpId="1"/>
+      <p:bldP spid="3" grpId="0"/>
+      <p:bldP spid="4" grpId="0"/>
+    </p:bldLst>
+  </p:timing>
 </p:sld>
 </file>
 
 <file path=ppt/slides/slide10.xml><?xml version="1.0" encoding="utf-8"?>
-<p:sld xmlns:a="http://schemas.openxmlformats.org/drawingml/2006/main" xmlns:r="http://schemas.openxmlformats.org/officeDocument/2006/relationships" xmlns:p="http://schemas.openxmlformats.org/presentationml/2006/main">
-  <p:cSld>
-    <p:spTree>
-      <p:nvGrpSpPr>
-        <p:cNvPr id="1" name=""/>
-        <p:cNvGrpSpPr/>
-        <p:nvPr/>
-      </p:nvGrpSpPr>
-      <p:grpSpPr>
-        <a:xfrm>
-          <a:off x="0" y="0"/>
-          <a:ext cx="0" cy="0"/>
-          <a:chOff x="0" y="0"/>
-          <a:chExt cx="0" cy="0"/>
-        </a:xfrm>
-      </p:grpSpPr>
-      <p:sp>
-        <p:nvSpPr>
-          <p:cNvPr id="9" name="Rectangle 8">
-            <a:extLst>
-              <a:ext uri="{FF2B5EF4-FFF2-40B4-BE49-F238E27FC236}">
-                <a16:creationId xmlns:a16="http://schemas.microsoft.com/office/drawing/2014/main" id="{4686E64A-884D-4CBC-B976-976D1B7B1F7E}"/>
-              </a:ext>
-            </a:extLst>
-          </p:cNvPr>
-          <p:cNvSpPr/>
-          <p:nvPr/>
-        </p:nvSpPr>
-        <p:spPr>
-          <a:xfrm>
-            <a:off x="3285554" y="1501457"/>
-            <a:ext cx="6819980" cy="2164695"/>
-          </a:xfrm>
-          <a:prstGeom prst="rect">
-            <a:avLst/>
-          </a:prstGeom>
-        </p:spPr>
-        <p:txBody>
-          <a:bodyPr wrap="square">
-            <a:spAutoFit/>
-          </a:bodyPr>
-          <a:lstStyle/>
-          <a:p>
-            <a:pPr algn="just">
-              <a:lnSpc>
-                <a:spcPct val="150000"/>
-              </a:lnSpc>
-            </a:pPr>
-            <a:r>
-              <a:rPr lang="en-US" sz="3200" b="1">
-                <a:solidFill>
-                  <a:srgbClr val="363636"/>
-                </a:solidFill>
-                <a:latin typeface="Roboto" panose="02000000000000000000" pitchFamily="2" charset="0"/>
-                <a:ea typeface="Roboto" panose="02000000000000000000" pitchFamily="2" charset="0"/>
-              </a:rPr>
-              <a:t>No JavaScript</a:t>
-            </a:r>
-          </a:p>
-          <a:p>
-            <a:pPr algn="just">
-              <a:lnSpc>
-                <a:spcPct val="150000"/>
-              </a:lnSpc>
-            </a:pPr>
-            <a:r>
-              <a:rPr lang="en-US" sz="2000">
-                <a:solidFill>
-                  <a:srgbClr val="363636"/>
-                </a:solidFill>
-                <a:latin typeface="Roboto" panose="02000000000000000000" pitchFamily="2" charset="0"/>
-                <a:ea typeface="Roboto" panose="02000000000000000000" pitchFamily="2" charset="0"/>
-              </a:rPr>
-              <a:t>By focusing only on CSS, Bulma provides a lightweight solution that can easily be implemented in any development context</a:t>
-            </a:r>
-          </a:p>
-        </p:txBody>
-      </p:sp>
-      <p:pic>
-        <p:nvPicPr>
-          <p:cNvPr id="3" name="Graphic 2">
-            <a:extLst>
-              <a:ext uri="{FF2B5EF4-FFF2-40B4-BE49-F238E27FC236}">
-                <a16:creationId xmlns:a16="http://schemas.microsoft.com/office/drawing/2014/main" id="{7D9B93CF-14BC-4E92-8416-EF38B542EFEF}"/>
-              </a:ext>
-            </a:extLst>
-          </p:cNvPr>
-          <p:cNvPicPr>
-            <a:picLocks noChangeAspect="1"/>
-          </p:cNvPicPr>
-          <p:nvPr/>
-        </p:nvPicPr>
-        <p:blipFill>
-          <a:blip r:embed="rId2">
-            <a:extLst>
-              <a:ext uri="{28A0092B-C50C-407E-A947-70E740481C1C}">
-                <a14:useLocalDpi xmlns:a14="http://schemas.microsoft.com/office/drawing/2010/main" val="0"/>
-              </a:ext>
-              <a:ext uri="{96DAC541-7B7A-43D3-8B79-37D633B846F1}">
-                <asvg:svgBlip xmlns:asvg="http://schemas.microsoft.com/office/drawing/2016/SVG/main" r:embed="rId3"/>
-              </a:ext>
-            </a:extLst>
-          </a:blip>
-          <a:stretch>
-            <a:fillRect/>
-          </a:stretch>
-        </p:blipFill>
-        <p:spPr>
-          <a:xfrm>
-            <a:off x="720000" y="1080000"/>
-            <a:ext cx="2520000" cy="2016000"/>
-          </a:xfrm>
-          <a:prstGeom prst="rect">
-            <a:avLst/>
-          </a:prstGeom>
-        </p:spPr>
-      </p:pic>
-      <p:pic>
-        <p:nvPicPr>
-          <p:cNvPr id="6" name="Picture 5">
-            <a:extLst>
-              <a:ext uri="{FF2B5EF4-FFF2-40B4-BE49-F238E27FC236}">
-                <a16:creationId xmlns:a16="http://schemas.microsoft.com/office/drawing/2014/main" id="{6E06FCD0-53CC-430A-9E31-529BD5C616DA}"/>
-              </a:ext>
-            </a:extLst>
-          </p:cNvPr>
-          <p:cNvPicPr>
-            <a:picLocks noChangeAspect="1"/>
-          </p:cNvPicPr>
-          <p:nvPr/>
-        </p:nvPicPr>
-        <p:blipFill>
-          <a:blip r:embed="rId4"/>
-          <a:stretch>
-            <a:fillRect/>
-          </a:stretch>
-        </p:blipFill>
-        <p:spPr>
-          <a:xfrm>
-            <a:off x="3733639" y="4063532"/>
-            <a:ext cx="5923809" cy="2200000"/>
-          </a:xfrm>
-          <a:prstGeom prst="rect">
-            <a:avLst/>
-          </a:prstGeom>
-        </p:spPr>
-      </p:pic>
-    </p:spTree>
-    <p:extLst>
-      <p:ext uri="{BB962C8B-B14F-4D97-AF65-F5344CB8AC3E}">
-        <p14:creationId xmlns:p14="http://schemas.microsoft.com/office/powerpoint/2010/main" val="3527048537"/>
-      </p:ext>
-    </p:extLst>
-  </p:cSld>
-  <p:clrMapOvr>
-    <a:masterClrMapping/>
-  </p:clrMapOvr>
-</p:sld>
-</file>
-
-<file path=ppt/slides/slide11.xml><?xml version="1.0" encoding="utf-8"?>
 <p:sld xmlns:a="http://schemas.openxmlformats.org/drawingml/2006/main" xmlns:r="http://schemas.openxmlformats.org/officeDocument/2006/relationships" xmlns:p="http://schemas.openxmlformats.org/presentationml/2006/main">
   <p:cSld>
     <p:spTree>
@@ -4173,7 +4935,7 @@
 </p:sld>
 </file>
 
-<file path=ppt/slides/slide12.xml><?xml version="1.0" encoding="utf-8"?>
+<file path=ppt/slides/slide11.xml><?xml version="1.0" encoding="utf-8"?>
 <p:sld xmlns:a="http://schemas.openxmlformats.org/drawingml/2006/main" xmlns:r="http://schemas.openxmlformats.org/officeDocument/2006/relationships" xmlns:p="http://schemas.openxmlformats.org/presentationml/2006/main">
   <p:cSld>
     <p:spTree>
@@ -4293,7 +5055,7 @@
 </p:sld>
 </file>
 
-<file path=ppt/slides/slide13.xml><?xml version="1.0" encoding="utf-8"?>
+<file path=ppt/slides/slide12.xml><?xml version="1.0" encoding="utf-8"?>
 <p:sld xmlns:a="http://schemas.openxmlformats.org/drawingml/2006/main" xmlns:r="http://schemas.openxmlformats.org/officeDocument/2006/relationships" xmlns:p="http://schemas.openxmlformats.org/presentationml/2006/main">
   <p:cSld>
     <p:spTree>
@@ -4508,6 +5270,18 @@
   <p:clrMapOvr>
     <a:masterClrMapping/>
   </p:clrMapOvr>
+  <mc:AlternateContent xmlns:mc="http://schemas.openxmlformats.org/markup-compatibility/2006">
+    <mc:Choice xmlns:p14="http://schemas.microsoft.com/office/powerpoint/2010/main" Requires="p14">
+      <p:transition spd="med" p14:dur="700">
+        <p:fade/>
+      </p:transition>
+    </mc:Choice>
+    <mc:Fallback>
+      <p:transition spd="med">
+        <p:fade/>
+      </p:transition>
+    </mc:Fallback>
+  </mc:AlternateContent>
 </p:sld>
 </file>
 
@@ -4542,8 +5316,8 @@
         </p:nvSpPr>
         <p:spPr>
           <a:xfrm>
-            <a:off x="3285554" y="1501457"/>
-            <a:ext cx="6819980" cy="2164695"/>
+            <a:off x="4551695" y="2108125"/>
+            <a:ext cx="5838989" cy="2318583"/>
           </a:xfrm>
           <a:prstGeom prst="rect">
             <a:avLst/>
@@ -4572,10 +5346,12 @@
             </a:r>
           </a:p>
           <a:p>
-            <a:pPr algn="just">
+            <a:pPr marL="342900" indent="-342900" algn="just">
               <a:lnSpc>
                 <a:spcPct val="150000"/>
               </a:lnSpc>
+              <a:buFont typeface="Wingdings" panose="05000000000000000000" pitchFamily="2" charset="2"/>
+              <a:buChar char="q"/>
             </a:pPr>
             <a:r>
               <a:rPr lang="en-US" sz="2000">
@@ -4585,18 +5361,17 @@
                 <a:latin typeface="Roboto" panose="02000000000000000000" pitchFamily="2" charset="0"/>
                 <a:ea typeface="Roboto" panose="02000000000000000000" pitchFamily="2" charset="0"/>
               </a:rPr>
-              <a:t>By using the latest CSS3 features such as </a:t>
-            </a:r>
-            <a:r>
-              <a:rPr lang="en-US" sz="2000" b="1">
-                <a:solidFill>
-                  <a:srgbClr val="363636"/>
-                </a:solidFill>
-                <a:latin typeface="Roboto" panose="02000000000000000000" pitchFamily="2" charset="0"/>
-                <a:ea typeface="Roboto" panose="02000000000000000000" pitchFamily="2" charset="0"/>
-              </a:rPr>
-              <a:t>Flexbox</a:t>
-            </a:r>
+              <a:t>Using the latest CSS3 features such as Flexbox</a:t>
+            </a:r>
+          </a:p>
+          <a:p>
+            <a:pPr marL="342900" indent="-342900" algn="just">
+              <a:lnSpc>
+                <a:spcPct val="200000"/>
+              </a:lnSpc>
+              <a:buFont typeface="Wingdings" panose="05000000000000000000" pitchFamily="2" charset="2"/>
+              <a:buChar char="q"/>
+            </a:pPr>
             <a:r>
               <a:rPr lang="en-US" sz="2000">
                 <a:solidFill>
@@ -4605,48 +5380,24 @@
                 <a:latin typeface="Roboto" panose="02000000000000000000" pitchFamily="2" charset="0"/>
                 <a:ea typeface="Roboto" panose="02000000000000000000" pitchFamily="2" charset="0"/>
               </a:rPr>
-              <a:t>, and planning on using </a:t>
-            </a:r>
-            <a:r>
-              <a:rPr lang="en-US" sz="2000" b="1">
-                <a:solidFill>
-                  <a:srgbClr val="FF0000"/>
-                </a:solidFill>
-                <a:latin typeface="Roboto" panose="02000000000000000000" pitchFamily="2" charset="0"/>
-                <a:ea typeface="Roboto" panose="02000000000000000000" pitchFamily="2" charset="0"/>
-              </a:rPr>
-              <a:t>CSS Variables</a:t>
-            </a:r>
-            <a:r>
-              <a:rPr lang="en-US" sz="2000">
-                <a:solidFill>
-                  <a:srgbClr val="4A4A4A"/>
-                </a:solidFill>
-                <a:latin typeface="Roboto" panose="02000000000000000000" pitchFamily="2" charset="0"/>
-                <a:ea typeface="Roboto" panose="02000000000000000000" pitchFamily="2" charset="0"/>
-              </a:rPr>
-              <a:t> and </a:t>
-            </a:r>
-            <a:r>
-              <a:rPr lang="en-US" sz="2000" b="1">
-                <a:solidFill>
-                  <a:srgbClr val="FF0000"/>
-                </a:solidFill>
-                <a:latin typeface="Roboto" panose="02000000000000000000" pitchFamily="2" charset="0"/>
-                <a:ea typeface="Roboto" panose="02000000000000000000" pitchFamily="2" charset="0"/>
-              </a:rPr>
-              <a:t>CSS Grid</a:t>
-            </a:r>
-            <a:r>
-              <a:rPr lang="en-US" sz="2000">
-                <a:solidFill>
-                  <a:srgbClr val="4A4A4A"/>
-                </a:solidFill>
-                <a:latin typeface="Roboto" panose="02000000000000000000" pitchFamily="2" charset="0"/>
-                <a:ea typeface="Roboto" panose="02000000000000000000" pitchFamily="2" charset="0"/>
-              </a:rPr>
-              <a:t>, Bulma aims to stay on the bleeding edge of browser technology</a:t>
-            </a:r>
+              <a:t>Planning on using CSS Variables and CSS Grid</a:t>
+            </a:r>
+          </a:p>
+          <a:p>
+            <a:pPr marL="342900" indent="-342900" algn="just">
+              <a:lnSpc>
+                <a:spcPct val="150000"/>
+              </a:lnSpc>
+              <a:buFont typeface="Wingdings" panose="05000000000000000000" pitchFamily="2" charset="2"/>
+              <a:buChar char="q"/>
+            </a:pPr>
+            <a:endParaRPr lang="en-US" sz="2000">
+              <a:solidFill>
+                <a:srgbClr val="4A4A4A"/>
+              </a:solidFill>
+              <a:latin typeface="Roboto" panose="02000000000000000000" pitchFamily="2" charset="0"/>
+              <a:ea typeface="Roboto" panose="02000000000000000000" pitchFamily="2" charset="0"/>
+            </a:endParaRPr>
           </a:p>
         </p:txBody>
       </p:sp>
@@ -4681,7 +5432,7 @@
         </p:blipFill>
         <p:spPr>
           <a:xfrm>
-            <a:off x="720000" y="1080000"/>
+            <a:off x="720000" y="2108125"/>
             <a:ext cx="2520000" cy="2520000"/>
           </a:xfrm>
           <a:prstGeom prst="rect">
@@ -4699,6 +5450,270 @@
   <p:clrMapOvr>
     <a:masterClrMapping/>
   </p:clrMapOvr>
+  <p:timing>
+    <p:tnLst>
+      <p:par>
+        <p:cTn id="1" dur="indefinite" restart="never" nodeType="tmRoot">
+          <p:childTnLst>
+            <p:seq concurrent="1" nextAc="seek">
+              <p:cTn id="2" dur="indefinite" nodeType="mainSeq">
+                <p:childTnLst>
+                  <p:par>
+                    <p:cTn id="3" fill="hold">
+                      <p:stCondLst>
+                        <p:cond delay="indefinite"/>
+                        <p:cond evt="onBegin" delay="0">
+                          <p:tn val="2"/>
+                        </p:cond>
+                      </p:stCondLst>
+                      <p:childTnLst>
+                        <p:par>
+                          <p:cTn id="4" fill="hold">
+                            <p:stCondLst>
+                              <p:cond delay="0"/>
+                            </p:stCondLst>
+                            <p:childTnLst>
+                              <p:par>
+                                <p:cTn id="5" presetID="10" presetClass="entr" presetSubtype="0" fill="hold" nodeType="afterEffect">
+                                  <p:stCondLst>
+                                    <p:cond delay="500"/>
+                                  </p:stCondLst>
+                                  <p:childTnLst>
+                                    <p:set>
+                                      <p:cBhvr>
+                                        <p:cTn id="6" dur="1" fill="hold">
+                                          <p:stCondLst>
+                                            <p:cond delay="0"/>
+                                          </p:stCondLst>
+                                        </p:cTn>
+                                        <p:tgtEl>
+                                          <p:spTgt spid="11"/>
+                                        </p:tgtEl>
+                                        <p:attrNameLst>
+                                          <p:attrName>style.visibility</p:attrName>
+                                        </p:attrNameLst>
+                                      </p:cBhvr>
+                                      <p:to>
+                                        <p:strVal val="visible"/>
+                                      </p:to>
+                                    </p:set>
+                                    <p:animEffect transition="in" filter="fade">
+                                      <p:cBhvr>
+                                        <p:cTn id="7" dur="1250"/>
+                                        <p:tgtEl>
+                                          <p:spTgt spid="11"/>
+                                        </p:tgtEl>
+                                      </p:cBhvr>
+                                    </p:animEffect>
+                                  </p:childTnLst>
+                                </p:cTn>
+                              </p:par>
+                              <p:par>
+                                <p:cTn id="8" presetID="63" presetClass="path" presetSubtype="0" accel="50000" decel="50000" fill="hold" nodeType="withEffect">
+                                  <p:stCondLst>
+                                    <p:cond delay="500"/>
+                                  </p:stCondLst>
+                                  <p:childTnLst>
+                                    <p:animMotion origin="layout" path="M 2.08333E-7 -2.22222E-6 L 0.07448 -2.22222E-6 " pathEditMode="relative" rAng="0" ptsTypes="AA">
+                                      <p:cBhvr>
+                                        <p:cTn id="9" dur="1000" fill="hold"/>
+                                        <p:tgtEl>
+                                          <p:spTgt spid="11"/>
+                                        </p:tgtEl>
+                                        <p:attrNameLst>
+                                          <p:attrName>ppt_x</p:attrName>
+                                          <p:attrName>ppt_y</p:attrName>
+                                        </p:attrNameLst>
+                                      </p:cBhvr>
+                                      <p:rCtr x="3724" y="0"/>
+                                    </p:animMotion>
+                                  </p:childTnLst>
+                                </p:cTn>
+                              </p:par>
+                            </p:childTnLst>
+                          </p:cTn>
+                        </p:par>
+                        <p:par>
+                          <p:cTn id="10" fill="hold">
+                            <p:stCondLst>
+                              <p:cond delay="1750"/>
+                            </p:stCondLst>
+                            <p:childTnLst>
+                              <p:par>
+                                <p:cTn id="11" presetID="10" presetClass="entr" presetSubtype="0" fill="hold" nodeType="afterEffect">
+                                  <p:stCondLst>
+                                    <p:cond delay="0"/>
+                                  </p:stCondLst>
+                                  <p:childTnLst>
+                                    <p:set>
+                                      <p:cBhvr>
+                                        <p:cTn id="12" dur="1" fill="hold">
+                                          <p:stCondLst>
+                                            <p:cond delay="0"/>
+                                          </p:stCondLst>
+                                        </p:cTn>
+                                        <p:tgtEl>
+                                          <p:spTgt spid="9">
+                                            <p:txEl>
+                                              <p:pRg st="0" end="0"/>
+                                            </p:txEl>
+                                          </p:spTgt>
+                                        </p:tgtEl>
+                                        <p:attrNameLst>
+                                          <p:attrName>style.visibility</p:attrName>
+                                        </p:attrNameLst>
+                                      </p:cBhvr>
+                                      <p:to>
+                                        <p:strVal val="visible"/>
+                                      </p:to>
+                                    </p:set>
+                                    <p:animEffect transition="in" filter="fade">
+                                      <p:cBhvr>
+                                        <p:cTn id="13" dur="500"/>
+                                        <p:tgtEl>
+                                          <p:spTgt spid="9">
+                                            <p:txEl>
+                                              <p:pRg st="0" end="0"/>
+                                            </p:txEl>
+                                          </p:spTgt>
+                                        </p:tgtEl>
+                                      </p:cBhvr>
+                                    </p:animEffect>
+                                  </p:childTnLst>
+                                </p:cTn>
+                              </p:par>
+                            </p:childTnLst>
+                          </p:cTn>
+                        </p:par>
+                        <p:par>
+                          <p:cTn id="14" fill="hold">
+                            <p:stCondLst>
+                              <p:cond delay="2250"/>
+                            </p:stCondLst>
+                            <p:childTnLst>
+                              <p:par>
+                                <p:cTn id="15" presetID="3" presetClass="entr" presetSubtype="10" fill="hold" nodeType="afterEffect">
+                                  <p:stCondLst>
+                                    <p:cond delay="0"/>
+                                  </p:stCondLst>
+                                  <p:childTnLst>
+                                    <p:set>
+                                      <p:cBhvr>
+                                        <p:cTn id="16" dur="1" fill="hold">
+                                          <p:stCondLst>
+                                            <p:cond delay="0"/>
+                                          </p:stCondLst>
+                                        </p:cTn>
+                                        <p:tgtEl>
+                                          <p:spTgt spid="9">
+                                            <p:txEl>
+                                              <p:pRg st="1" end="1"/>
+                                            </p:txEl>
+                                          </p:spTgt>
+                                        </p:tgtEl>
+                                        <p:attrNameLst>
+                                          <p:attrName>style.visibility</p:attrName>
+                                        </p:attrNameLst>
+                                      </p:cBhvr>
+                                      <p:to>
+                                        <p:strVal val="visible"/>
+                                      </p:to>
+                                    </p:set>
+                                    <p:animEffect transition="in" filter="blinds(horizontal)">
+                                      <p:cBhvr>
+                                        <p:cTn id="17" dur="500"/>
+                                        <p:tgtEl>
+                                          <p:spTgt spid="9">
+                                            <p:txEl>
+                                              <p:pRg st="1" end="1"/>
+                                            </p:txEl>
+                                          </p:spTgt>
+                                        </p:tgtEl>
+                                      </p:cBhvr>
+                                    </p:animEffect>
+                                  </p:childTnLst>
+                                </p:cTn>
+                              </p:par>
+                            </p:childTnLst>
+                          </p:cTn>
+                        </p:par>
+                        <p:par>
+                          <p:cTn id="18" fill="hold">
+                            <p:stCondLst>
+                              <p:cond delay="2750"/>
+                            </p:stCondLst>
+                            <p:childTnLst>
+                              <p:par>
+                                <p:cTn id="19" presetID="3" presetClass="entr" presetSubtype="10" fill="hold" nodeType="afterEffect">
+                                  <p:stCondLst>
+                                    <p:cond delay="0"/>
+                                  </p:stCondLst>
+                                  <p:childTnLst>
+                                    <p:set>
+                                      <p:cBhvr>
+                                        <p:cTn id="20" dur="1" fill="hold">
+                                          <p:stCondLst>
+                                            <p:cond delay="0"/>
+                                          </p:stCondLst>
+                                        </p:cTn>
+                                        <p:tgtEl>
+                                          <p:spTgt spid="9">
+                                            <p:txEl>
+                                              <p:pRg st="2" end="2"/>
+                                            </p:txEl>
+                                          </p:spTgt>
+                                        </p:tgtEl>
+                                        <p:attrNameLst>
+                                          <p:attrName>style.visibility</p:attrName>
+                                        </p:attrNameLst>
+                                      </p:cBhvr>
+                                      <p:to>
+                                        <p:strVal val="visible"/>
+                                      </p:to>
+                                    </p:set>
+                                    <p:animEffect transition="in" filter="blinds(horizontal)">
+                                      <p:cBhvr>
+                                        <p:cTn id="21" dur="500"/>
+                                        <p:tgtEl>
+                                          <p:spTgt spid="9">
+                                            <p:txEl>
+                                              <p:pRg st="2" end="2"/>
+                                            </p:txEl>
+                                          </p:spTgt>
+                                        </p:tgtEl>
+                                      </p:cBhvr>
+                                    </p:animEffect>
+                                  </p:childTnLst>
+                                </p:cTn>
+                              </p:par>
+                            </p:childTnLst>
+                          </p:cTn>
+                        </p:par>
+                      </p:childTnLst>
+                    </p:cTn>
+                  </p:par>
+                </p:childTnLst>
+              </p:cTn>
+              <p:prevCondLst>
+                <p:cond evt="onPrev" delay="0">
+                  <p:tgtEl>
+                    <p:sldTgt/>
+                  </p:tgtEl>
+                </p:cond>
+              </p:prevCondLst>
+              <p:nextCondLst>
+                <p:cond evt="onNext" delay="0">
+                  <p:tgtEl>
+                    <p:sldTgt/>
+                  </p:tgtEl>
+                </p:cond>
+              </p:nextCondLst>
+            </p:seq>
+          </p:childTnLst>
+        </p:cTn>
+      </p:par>
+    </p:tnLst>
+  </p:timing>
 </p:sld>
 </file>
 
@@ -4719,36 +5734,6 @@
           <a:chExt cx="0" cy="0"/>
         </a:xfrm>
       </p:grpSpPr>
-      <p:pic>
-        <p:nvPicPr>
-          <p:cNvPr id="2" name="Picture 1">
-            <a:extLst>
-              <a:ext uri="{FF2B5EF4-FFF2-40B4-BE49-F238E27FC236}">
-                <a16:creationId xmlns:a16="http://schemas.microsoft.com/office/drawing/2014/main" id="{2B015D30-EB8F-42B3-8D0C-31EE60ACEE47}"/>
-              </a:ext>
-            </a:extLst>
-          </p:cNvPr>
-          <p:cNvPicPr>
-            <a:picLocks noChangeAspect="1"/>
-          </p:cNvPicPr>
-          <p:nvPr/>
-        </p:nvPicPr>
-        <p:blipFill>
-          <a:blip r:embed="rId2"/>
-          <a:stretch>
-            <a:fillRect/>
-          </a:stretch>
-        </p:blipFill>
-        <p:spPr>
-          <a:xfrm>
-            <a:off x="3285553" y="4436318"/>
-            <a:ext cx="6815315" cy="1398874"/>
-          </a:xfrm>
-          <a:prstGeom prst="rect">
-            <a:avLst/>
-          </a:prstGeom>
-        </p:spPr>
-      </p:pic>
       <p:sp>
         <p:nvSpPr>
           <p:cNvPr id="9" name="Rectangle 8">
@@ -4763,8 +5748,8 @@
         </p:nvSpPr>
         <p:spPr>
           <a:xfrm>
-            <a:off x="3285554" y="1501457"/>
-            <a:ext cx="6819980" cy="1703030"/>
+            <a:off x="4551695" y="2108125"/>
+            <a:ext cx="6300789" cy="1703030"/>
           </a:xfrm>
           <a:prstGeom prst="rect">
             <a:avLst/>
@@ -4789,19 +5774,19 @@
                 <a:latin typeface="Roboto" panose="02000000000000000000" pitchFamily="2" charset="0"/>
                 <a:ea typeface="Roboto" panose="02000000000000000000" pitchFamily="2" charset="0"/>
               </a:rPr>
-              <a:t>Simple grid system</a:t>
-            </a:r>
-          </a:p>
-          <a:p>
-            <a:pPr algn="just">
+              <a:t>Simple grid System</a:t>
+            </a:r>
+          </a:p>
+          <a:p>
+            <a:pPr>
               <a:lnSpc>
                 <a:spcPct val="150000"/>
               </a:lnSpc>
             </a:pPr>
             <a:r>
-              <a:rPr lang="en-US" sz="2000" b="1">
+              <a:rPr lang="en-US" sz="2000">
                 <a:solidFill>
-                  <a:srgbClr val="363636"/>
+                  <a:srgbClr val="4A4A4A"/>
                 </a:solidFill>
                 <a:latin typeface="Roboto" panose="02000000000000000000" pitchFamily="2" charset="0"/>
                 <a:ea typeface="Roboto" panose="02000000000000000000" pitchFamily="2" charset="0"/>
@@ -4809,7 +5794,7 @@
               <a:t>To build a Bulma grid, you only need a single </a:t>
             </a:r>
             <a:r>
-              <a:rPr lang="en-US" sz="2000" b="1">
+              <a:rPr lang="en-US" sz="2000">
                 <a:solidFill>
                   <a:srgbClr val="FF0000"/>
                 </a:solidFill>
@@ -4819,9 +5804,9 @@
               <a:t>.columns </a:t>
             </a:r>
             <a:r>
-              <a:rPr lang="en-US" sz="2000" b="1">
+              <a:rPr lang="en-US" sz="2000">
                 <a:solidFill>
-                  <a:srgbClr val="363636"/>
+                  <a:srgbClr val="4A4A4A"/>
                 </a:solidFill>
                 <a:latin typeface="Roboto" panose="02000000000000000000" pitchFamily="2" charset="0"/>
                 <a:ea typeface="Roboto" panose="02000000000000000000" pitchFamily="2" charset="0"/>
@@ -4829,7 +5814,7 @@
               <a:t>container to wrap as many </a:t>
             </a:r>
             <a:r>
-              <a:rPr lang="en-US" sz="2000" b="1">
+              <a:rPr lang="en-US" sz="2000">
                 <a:solidFill>
                   <a:srgbClr val="FF0000"/>
                 </a:solidFill>
@@ -4839,31 +5824,24 @@
               <a:t>.column </a:t>
             </a:r>
             <a:r>
-              <a:rPr lang="en-US" sz="2000" b="1">
+              <a:rPr lang="en-US" sz="2000">
                 <a:solidFill>
-                  <a:srgbClr val="363636"/>
+                  <a:srgbClr val="4A4A4A"/>
                 </a:solidFill>
                 <a:latin typeface="Roboto" panose="02000000000000000000" pitchFamily="2" charset="0"/>
                 <a:ea typeface="Roboto" panose="02000000000000000000" pitchFamily="2" charset="0"/>
               </a:rPr>
               <a:t>items as you want</a:t>
             </a:r>
-            <a:endParaRPr lang="en-US" sz="2000">
-              <a:solidFill>
-                <a:srgbClr val="4A4A4A"/>
-              </a:solidFill>
-              <a:latin typeface="Roboto" panose="02000000000000000000" pitchFamily="2" charset="0"/>
-              <a:ea typeface="Roboto" panose="02000000000000000000" pitchFamily="2" charset="0"/>
-            </a:endParaRPr>
           </a:p>
         </p:txBody>
       </p:sp>
       <p:pic>
         <p:nvPicPr>
-          <p:cNvPr id="6" name="Graphic 5">
-            <a:extLst>
-              <a:ext uri="{FF2B5EF4-FFF2-40B4-BE49-F238E27FC236}">
-                <a16:creationId xmlns:a16="http://schemas.microsoft.com/office/drawing/2014/main" id="{68994ED1-569A-4C90-AEE5-53FF2ED846A5}"/>
+          <p:cNvPr id="11" name="Graphic 10">
+            <a:extLst>
+              <a:ext uri="{FF2B5EF4-FFF2-40B4-BE49-F238E27FC236}">
+                <a16:creationId xmlns:a16="http://schemas.microsoft.com/office/drawing/2014/main" id="{BA60EFB6-3DBD-4E0B-BD6E-C4E080A7704A}"/>
               </a:ext>
             </a:extLst>
           </p:cNvPr>
@@ -4873,13 +5851,13 @@
           <p:nvPr/>
         </p:nvPicPr>
         <p:blipFill>
-          <a:blip r:embed="rId3">
+          <a:blip r:embed="rId2">
             <a:extLst>
               <a:ext uri="{28A0092B-C50C-407E-A947-70E740481C1C}">
                 <a14:useLocalDpi xmlns:a14="http://schemas.microsoft.com/office/drawing/2010/main" val="0"/>
               </a:ext>
               <a:ext uri="{96DAC541-7B7A-43D3-8B79-37D633B846F1}">
-                <asvg:svgBlip xmlns:asvg="http://schemas.microsoft.com/office/drawing/2016/SVG/main" r:embed="rId4"/>
+                <asvg:svgBlip xmlns:asvg="http://schemas.microsoft.com/office/drawing/2016/SVG/main" r:embed="rId3"/>
               </a:ext>
             </a:extLst>
           </a:blip>
@@ -4889,7 +5867,7 @@
         </p:blipFill>
         <p:spPr>
           <a:xfrm>
-            <a:off x="720000" y="1080000"/>
+            <a:off x="877500" y="2108125"/>
             <a:ext cx="2205000" cy="2520000"/>
           </a:xfrm>
           <a:prstGeom prst="rect">
@@ -4900,13 +5878,225 @@
     </p:spTree>
     <p:extLst>
       <p:ext uri="{BB962C8B-B14F-4D97-AF65-F5344CB8AC3E}">
-        <p14:creationId xmlns:p14="http://schemas.microsoft.com/office/powerpoint/2010/main" val="3985192152"/>
+        <p14:creationId xmlns:p14="http://schemas.microsoft.com/office/powerpoint/2010/main" val="1628068560"/>
       </p:ext>
     </p:extLst>
   </p:cSld>
   <p:clrMapOvr>
     <a:masterClrMapping/>
   </p:clrMapOvr>
+  <p:timing>
+    <p:tnLst>
+      <p:par>
+        <p:cTn id="1" dur="indefinite" restart="never" nodeType="tmRoot">
+          <p:childTnLst>
+            <p:seq concurrent="1" nextAc="seek">
+              <p:cTn id="2" dur="indefinite" nodeType="mainSeq">
+                <p:childTnLst>
+                  <p:par>
+                    <p:cTn id="3" fill="hold">
+                      <p:stCondLst>
+                        <p:cond delay="indefinite"/>
+                        <p:cond evt="onBegin" delay="0">
+                          <p:tn val="2"/>
+                        </p:cond>
+                      </p:stCondLst>
+                      <p:childTnLst>
+                        <p:par>
+                          <p:cTn id="4" fill="hold">
+                            <p:stCondLst>
+                              <p:cond delay="0"/>
+                            </p:stCondLst>
+                            <p:childTnLst>
+                              <p:par>
+                                <p:cTn id="5" presetID="10" presetClass="entr" presetSubtype="0" fill="hold" nodeType="afterEffect">
+                                  <p:stCondLst>
+                                    <p:cond delay="500"/>
+                                  </p:stCondLst>
+                                  <p:childTnLst>
+                                    <p:set>
+                                      <p:cBhvr>
+                                        <p:cTn id="6" dur="1" fill="hold">
+                                          <p:stCondLst>
+                                            <p:cond delay="0"/>
+                                          </p:stCondLst>
+                                        </p:cTn>
+                                        <p:tgtEl>
+                                          <p:spTgt spid="11"/>
+                                        </p:tgtEl>
+                                        <p:attrNameLst>
+                                          <p:attrName>style.visibility</p:attrName>
+                                        </p:attrNameLst>
+                                      </p:cBhvr>
+                                      <p:to>
+                                        <p:strVal val="visible"/>
+                                      </p:to>
+                                    </p:set>
+                                    <p:animEffect transition="in" filter="fade">
+                                      <p:cBhvr>
+                                        <p:cTn id="7" dur="1250"/>
+                                        <p:tgtEl>
+                                          <p:spTgt spid="11"/>
+                                        </p:tgtEl>
+                                      </p:cBhvr>
+                                    </p:animEffect>
+                                  </p:childTnLst>
+                                </p:cTn>
+                              </p:par>
+                              <p:par>
+                                <p:cTn id="8" presetID="63" presetClass="path" presetSubtype="0" accel="50000" decel="50000" fill="hold" nodeType="withEffect">
+                                  <p:stCondLst>
+                                    <p:cond delay="500"/>
+                                  </p:stCondLst>
+                                  <p:childTnLst>
+                                    <p:animMotion origin="layout" path="M 2.08333E-7 -2.22222E-6 L 0.07448 -2.22222E-6 " pathEditMode="relative" rAng="0" ptsTypes="AA">
+                                      <p:cBhvr>
+                                        <p:cTn id="9" dur="1000" fill="hold"/>
+                                        <p:tgtEl>
+                                          <p:spTgt spid="11"/>
+                                        </p:tgtEl>
+                                        <p:attrNameLst>
+                                          <p:attrName>ppt_x</p:attrName>
+                                          <p:attrName>ppt_y</p:attrName>
+                                        </p:attrNameLst>
+                                      </p:cBhvr>
+                                      <p:rCtr x="3724" y="0"/>
+                                    </p:animMotion>
+                                  </p:childTnLst>
+                                </p:cTn>
+                              </p:par>
+                            </p:childTnLst>
+                          </p:cTn>
+                        </p:par>
+                        <p:par>
+                          <p:cTn id="10" fill="hold">
+                            <p:stCondLst>
+                              <p:cond delay="1750"/>
+                            </p:stCondLst>
+                            <p:childTnLst>
+                              <p:par>
+                                <p:cTn id="11" presetID="10" presetClass="entr" presetSubtype="0" fill="hold" nodeType="afterEffect">
+                                  <p:stCondLst>
+                                    <p:cond delay="0"/>
+                                  </p:stCondLst>
+                                  <p:childTnLst>
+                                    <p:set>
+                                      <p:cBhvr>
+                                        <p:cTn id="12" dur="1" fill="hold">
+                                          <p:stCondLst>
+                                            <p:cond delay="0"/>
+                                          </p:stCondLst>
+                                        </p:cTn>
+                                        <p:tgtEl>
+                                          <p:spTgt spid="9">
+                                            <p:txEl>
+                                              <p:pRg st="0" end="0"/>
+                                            </p:txEl>
+                                          </p:spTgt>
+                                        </p:tgtEl>
+                                        <p:attrNameLst>
+                                          <p:attrName>style.visibility</p:attrName>
+                                        </p:attrNameLst>
+                                      </p:cBhvr>
+                                      <p:to>
+                                        <p:strVal val="visible"/>
+                                      </p:to>
+                                    </p:set>
+                                    <p:animEffect transition="in" filter="fade">
+                                      <p:cBhvr>
+                                        <p:cTn id="13" dur="500"/>
+                                        <p:tgtEl>
+                                          <p:spTgt spid="9">
+                                            <p:txEl>
+                                              <p:pRg st="0" end="0"/>
+                                            </p:txEl>
+                                          </p:spTgt>
+                                        </p:tgtEl>
+                                      </p:cBhvr>
+                                    </p:animEffect>
+                                  </p:childTnLst>
+                                </p:cTn>
+                              </p:par>
+                            </p:childTnLst>
+                          </p:cTn>
+                        </p:par>
+                        <p:par>
+                          <p:cTn id="14" fill="hold">
+                            <p:stCondLst>
+                              <p:cond delay="2250"/>
+                            </p:stCondLst>
+                            <p:childTnLst>
+                              <p:par>
+                                <p:cTn id="15" presetID="3" presetClass="entr" presetSubtype="10" fill="hold" nodeType="afterEffect">
+                                  <p:stCondLst>
+                                    <p:cond delay="0"/>
+                                  </p:stCondLst>
+                                  <p:childTnLst>
+                                    <p:set>
+                                      <p:cBhvr>
+                                        <p:cTn id="16" dur="1" fill="hold">
+                                          <p:stCondLst>
+                                            <p:cond delay="0"/>
+                                          </p:stCondLst>
+                                        </p:cTn>
+                                        <p:tgtEl>
+                                          <p:spTgt spid="9">
+                                            <p:txEl>
+                                              <p:pRg st="1" end="1"/>
+                                            </p:txEl>
+                                          </p:spTgt>
+                                        </p:tgtEl>
+                                        <p:attrNameLst>
+                                          <p:attrName>style.visibility</p:attrName>
+                                        </p:attrNameLst>
+                                      </p:cBhvr>
+                                      <p:to>
+                                        <p:strVal val="visible"/>
+                                      </p:to>
+                                    </p:set>
+                                    <p:animEffect transition="in" filter="blinds(horizontal)">
+                                      <p:cBhvr>
+                                        <p:cTn id="17" dur="500"/>
+                                        <p:tgtEl>
+                                          <p:spTgt spid="9">
+                                            <p:txEl>
+                                              <p:pRg st="1" end="1"/>
+                                            </p:txEl>
+                                          </p:spTgt>
+                                        </p:tgtEl>
+                                      </p:cBhvr>
+                                    </p:animEffect>
+                                  </p:childTnLst>
+                                </p:cTn>
+                              </p:par>
+                            </p:childTnLst>
+                          </p:cTn>
+                        </p:par>
+                      </p:childTnLst>
+                    </p:cTn>
+                  </p:par>
+                </p:childTnLst>
+              </p:cTn>
+              <p:prevCondLst>
+                <p:cond evt="onPrev" delay="0">
+                  <p:tgtEl>
+                    <p:sldTgt/>
+                  </p:tgtEl>
+                </p:cond>
+              </p:prevCondLst>
+              <p:nextCondLst>
+                <p:cond evt="onNext" delay="0">
+                  <p:tgtEl>
+                    <p:sldTgt/>
+                  </p:tgtEl>
+                </p:cond>
+              </p:nextCondLst>
+            </p:seq>
+          </p:childTnLst>
+        </p:cTn>
+      </p:par>
+    </p:tnLst>
+  </p:timing>
 </p:sld>
 </file>
 
@@ -4987,6 +6177,42 @@
           <a:chExt cx="0" cy="0"/>
         </a:xfrm>
       </p:grpSpPr>
+      <p:pic>
+        <p:nvPicPr>
+          <p:cNvPr id="3" name="Picture 2">
+            <a:extLst>
+              <a:ext uri="{FF2B5EF4-FFF2-40B4-BE49-F238E27FC236}">
+                <a16:creationId xmlns:a16="http://schemas.microsoft.com/office/drawing/2014/main" id="{4AF2EA28-659A-496C-918B-89ED44252BB7}"/>
+              </a:ext>
+            </a:extLst>
+          </p:cNvPr>
+          <p:cNvPicPr>
+            <a:picLocks noChangeAspect="1"/>
+          </p:cNvPicPr>
+          <p:nvPr/>
+        </p:nvPicPr>
+        <p:blipFill>
+          <a:blip r:embed="rId2">
+            <a:extLst>
+              <a:ext uri="{28A0092B-C50C-407E-A947-70E740481C1C}">
+                <a14:useLocalDpi xmlns:a14="http://schemas.microsoft.com/office/drawing/2010/main" val="0"/>
+              </a:ext>
+            </a:extLst>
+          </a:blip>
+          <a:stretch>
+            <a:fillRect/>
+          </a:stretch>
+        </p:blipFill>
+        <p:spPr>
+          <a:xfrm>
+            <a:off x="8233905" y="1100901"/>
+            <a:ext cx="3238095" cy="4295238"/>
+          </a:xfrm>
+          <a:prstGeom prst="rect">
+            <a:avLst/>
+          </a:prstGeom>
+        </p:spPr>
+      </p:pic>
       <p:sp>
         <p:nvSpPr>
           <p:cNvPr id="9" name="Rectangle 8">
@@ -5001,8 +6227,8 @@
         </p:nvSpPr>
         <p:spPr>
           <a:xfrm>
-            <a:off x="3285554" y="1501457"/>
-            <a:ext cx="6819980" cy="2164695"/>
+            <a:off x="4551695" y="1927645"/>
+            <a:ext cx="6156410" cy="2318583"/>
           </a:xfrm>
           <a:prstGeom prst="rect">
             <a:avLst/>
@@ -5027,47 +6253,49 @@
                 <a:latin typeface="Roboto" panose="02000000000000000000" pitchFamily="2" charset="0"/>
                 <a:ea typeface="Roboto" panose="02000000000000000000" pitchFamily="2" charset="0"/>
               </a:rPr>
-              <a:t>Easy-to-learn syntax</a:t>
-            </a:r>
-          </a:p>
-          <a:p>
-            <a:pPr algn="just">
+              <a:t>Modern features</a:t>
+            </a:r>
+          </a:p>
+          <a:p>
+            <a:pPr marL="342900" indent="-342900" algn="just">
               <a:lnSpc>
                 <a:spcPct val="150000"/>
               </a:lnSpc>
+              <a:buFont typeface="Wingdings" panose="05000000000000000000" pitchFamily="2" charset="2"/>
+              <a:buChar char="q"/>
             </a:pPr>
             <a:r>
-              <a:rPr lang="en-US" sz="2000" b="1">
+              <a:rPr lang="en-US" sz="2000">
                 <a:solidFill>
-                  <a:srgbClr val="363636"/>
+                  <a:srgbClr val="4A4A4A"/>
                 </a:solidFill>
                 <a:latin typeface="Roboto" panose="02000000000000000000" pitchFamily="2" charset="0"/>
                 <a:ea typeface="Roboto" panose="02000000000000000000" pitchFamily="2" charset="0"/>
               </a:rPr>
-              <a:t>With simple readable class names like </a:t>
-            </a:r>
-            <a:r>
-              <a:rPr lang="en-US" sz="2000" b="1">
+              <a:t>Simple readable class names like </a:t>
+            </a:r>
+            <a:r>
+              <a:rPr lang="en-US" sz="2000">
                 <a:solidFill>
                   <a:srgbClr val="FF0000"/>
                 </a:solidFill>
                 <a:latin typeface="Roboto" panose="02000000000000000000" pitchFamily="2" charset="0"/>
                 <a:ea typeface="Roboto" panose="02000000000000000000" pitchFamily="2" charset="0"/>
               </a:rPr>
-              <a:t>.button</a:t>
-            </a:r>
-            <a:r>
-              <a:rPr lang="en-US" sz="2000" b="1">
+              <a:t>.button </a:t>
+            </a:r>
+            <a:r>
+              <a:rPr lang="en-US" sz="2000">
                 <a:solidFill>
-                  <a:srgbClr val="363636"/>
+                  <a:srgbClr val="4A4A4A"/>
                 </a:solidFill>
                 <a:latin typeface="Roboto" panose="02000000000000000000" pitchFamily="2" charset="0"/>
                 <a:ea typeface="Roboto" panose="02000000000000000000" pitchFamily="2" charset="0"/>
               </a:rPr>
-              <a:t> or </a:t>
-            </a:r>
-            <a:r>
-              <a:rPr lang="en-US" sz="2000" b="1">
+              <a:t>or </a:t>
+            </a:r>
+            <a:r>
+              <a:rPr lang="en-US" sz="2000">
                 <a:solidFill>
                   <a:srgbClr val="FF0000"/>
                 </a:solidFill>
@@ -5076,18 +6304,47 @@
               </a:rPr>
               <a:t>.title</a:t>
             </a:r>
-            <a:r>
-              <a:rPr lang="en-US" sz="2000" b="1">
+          </a:p>
+          <a:p>
+            <a:pPr marL="342900" indent="-342900" algn="just">
+              <a:lnSpc>
+                <a:spcPct val="200000"/>
+              </a:lnSpc>
+              <a:buFont typeface="Wingdings" panose="05000000000000000000" pitchFamily="2" charset="2"/>
+              <a:buChar char="q"/>
+            </a:pPr>
+            <a:r>
+              <a:rPr lang="en-US" sz="2000">
                 <a:solidFill>
-                  <a:srgbClr val="363636"/>
+                  <a:srgbClr val="4A4A4A"/>
                 </a:solidFill>
                 <a:latin typeface="Roboto" panose="02000000000000000000" pitchFamily="2" charset="0"/>
                 <a:ea typeface="Roboto" panose="02000000000000000000" pitchFamily="2" charset="0"/>
               </a:rPr>
-              <a:t>, and a straightforward modifiers system like </a:t>
-            </a:r>
-            <a:r>
-              <a:rPr lang="en-US" sz="2000" b="1">
+              <a:t>Straightforward </a:t>
+            </a:r>
+            <a:r>
+              <a:rPr lang="en-US" sz="2000">
+                <a:solidFill>
+                  <a:srgbClr val="FF0000"/>
+                </a:solidFill>
+                <a:latin typeface="Roboto" panose="02000000000000000000" pitchFamily="2" charset="0"/>
+                <a:ea typeface="Roboto" panose="02000000000000000000" pitchFamily="2" charset="0"/>
+              </a:rPr>
+              <a:t>modifiers</a:t>
+            </a:r>
+            <a:r>
+              <a:rPr lang="en-US" sz="2000">
+                <a:solidFill>
+                  <a:srgbClr val="4A4A4A"/>
+                </a:solidFill>
+                <a:latin typeface="Roboto" panose="02000000000000000000" pitchFamily="2" charset="0"/>
+                <a:ea typeface="Roboto" panose="02000000000000000000" pitchFamily="2" charset="0"/>
+              </a:rPr>
+              <a:t> system like </a:t>
+            </a:r>
+            <a:r>
+              <a:rPr lang="en-US" sz="2000">
                 <a:solidFill>
                   <a:srgbClr val="FF0000"/>
                 </a:solidFill>
@@ -5096,36 +6353,15 @@
               </a:rPr>
               <a:t>.is-primary</a:t>
             </a:r>
-            <a:r>
-              <a:rPr lang="en-US" sz="2000" b="1">
-                <a:solidFill>
-                  <a:srgbClr val="363636"/>
-                </a:solidFill>
-                <a:latin typeface="Roboto" panose="02000000000000000000" pitchFamily="2" charset="0"/>
-                <a:ea typeface="Roboto" panose="02000000000000000000" pitchFamily="2" charset="0"/>
-              </a:rPr>
-              <a:t> or </a:t>
-            </a:r>
-            <a:r>
-              <a:rPr lang="en-US" sz="2000" b="1">
-                <a:solidFill>
-                  <a:srgbClr val="FF0000"/>
-                </a:solidFill>
-                <a:latin typeface="Roboto" panose="02000000000000000000" pitchFamily="2" charset="0"/>
-                <a:ea typeface="Roboto" panose="02000000000000000000" pitchFamily="2" charset="0"/>
-              </a:rPr>
-              <a:t>.is-large</a:t>
-            </a:r>
-            <a:r>
-              <a:rPr lang="en-US" sz="2000" b="1">
-                <a:solidFill>
-                  <a:srgbClr val="363636"/>
-                </a:solidFill>
-                <a:latin typeface="Roboto" panose="02000000000000000000" pitchFamily="2" charset="0"/>
-                <a:ea typeface="Roboto" panose="02000000000000000000" pitchFamily="2" charset="0"/>
-              </a:rPr>
-              <a:t>, it’s easy to pick up Bulma in minutes</a:t>
-            </a:r>
+          </a:p>
+          <a:p>
+            <a:pPr marL="342900" indent="-342900" algn="just">
+              <a:lnSpc>
+                <a:spcPct val="150000"/>
+              </a:lnSpc>
+              <a:buFont typeface="Wingdings" panose="05000000000000000000" pitchFamily="2" charset="2"/>
+              <a:buChar char="q"/>
+            </a:pPr>
             <a:endParaRPr lang="en-US" sz="2000">
               <a:solidFill>
                 <a:srgbClr val="4A4A4A"/>
@@ -5138,10 +6374,10 @@
       </p:sp>
       <p:pic>
         <p:nvPicPr>
-          <p:cNvPr id="4" name="Graphic 3">
-            <a:extLst>
-              <a:ext uri="{FF2B5EF4-FFF2-40B4-BE49-F238E27FC236}">
-                <a16:creationId xmlns:a16="http://schemas.microsoft.com/office/drawing/2014/main" id="{03296EDB-16BD-4AB6-A201-C6ACDA66785E}"/>
+          <p:cNvPr id="11" name="Graphic 10">
+            <a:extLst>
+              <a:ext uri="{FF2B5EF4-FFF2-40B4-BE49-F238E27FC236}">
+                <a16:creationId xmlns:a16="http://schemas.microsoft.com/office/drawing/2014/main" id="{BA60EFB6-3DBD-4E0B-BD6E-C4E080A7704A}"/>
               </a:ext>
             </a:extLst>
           </p:cNvPr>
@@ -5151,13 +6387,13 @@
           <p:nvPr/>
         </p:nvPicPr>
         <p:blipFill>
-          <a:blip r:embed="rId2">
+          <a:blip r:embed="rId3">
             <a:extLst>
               <a:ext uri="{28A0092B-C50C-407E-A947-70E740481C1C}">
                 <a14:useLocalDpi xmlns:a14="http://schemas.microsoft.com/office/drawing/2010/main" val="0"/>
               </a:ext>
               <a:ext uri="{96DAC541-7B7A-43D3-8B79-37D633B846F1}">
-                <asvg:svgBlip xmlns:asvg="http://schemas.microsoft.com/office/drawing/2016/SVG/main" r:embed="rId3"/>
+                <asvg:svgBlip xmlns:asvg="http://schemas.microsoft.com/office/drawing/2016/SVG/main" r:embed="rId4"/>
               </a:ext>
             </a:extLst>
           </a:blip>
@@ -5167,7 +6403,7 @@
         </p:blipFill>
         <p:spPr>
           <a:xfrm>
-            <a:off x="720000" y="1080000"/>
+            <a:off x="720000" y="1927645"/>
             <a:ext cx="2520000" cy="2520000"/>
           </a:xfrm>
           <a:prstGeom prst="rect">
@@ -5175,16 +6411,667 @@
           </a:prstGeom>
         </p:spPr>
       </p:pic>
+      <p:sp>
+        <p:nvSpPr>
+          <p:cNvPr id="4" name="Rectangle 3">
+            <a:extLst>
+              <a:ext uri="{FF2B5EF4-FFF2-40B4-BE49-F238E27FC236}">
+                <a16:creationId xmlns:a16="http://schemas.microsoft.com/office/drawing/2014/main" id="{DB787332-746A-494D-ADAA-F5996D444CC8}"/>
+              </a:ext>
+            </a:extLst>
+          </p:cNvPr>
+          <p:cNvSpPr/>
+          <p:nvPr/>
+        </p:nvSpPr>
+        <p:spPr>
+          <a:xfrm>
+            <a:off x="1515727" y="4447645"/>
+            <a:ext cx="5590674" cy="1138773"/>
+          </a:xfrm>
+          <a:prstGeom prst="rect">
+            <a:avLst/>
+          </a:prstGeom>
+        </p:spPr>
+        <p:txBody>
+          <a:bodyPr wrap="square">
+            <a:spAutoFit/>
+          </a:bodyPr>
+          <a:lstStyle/>
+          <a:p>
+            <a:r>
+              <a:rPr lang="en-US" sz="3200" b="1">
+                <a:latin typeface="Roboto" panose="02000000000000000000" pitchFamily="2" charset="0"/>
+                <a:ea typeface="Roboto" panose="02000000000000000000" pitchFamily="2" charset="0"/>
+              </a:rPr>
+              <a:t>So</a:t>
+            </a:r>
+            <a:r>
+              <a:rPr lang="en-US" sz="3200" b="1">
+                <a:solidFill>
+                  <a:srgbClr val="B5B5B5"/>
+                </a:solidFill>
+                <a:latin typeface="Roboto" panose="02000000000000000000" pitchFamily="2" charset="0"/>
+                <a:ea typeface="Roboto" panose="02000000000000000000" pitchFamily="2" charset="0"/>
+              </a:rPr>
+              <a:t> </a:t>
+            </a:r>
+            <a:r>
+              <a:rPr lang="en-US" sz="3200" b="1">
+                <a:solidFill>
+                  <a:srgbClr val="00D1B2"/>
+                </a:solidFill>
+                <a:latin typeface="Roboto" panose="02000000000000000000" pitchFamily="2" charset="0"/>
+                <a:ea typeface="Roboto" panose="02000000000000000000" pitchFamily="2" charset="0"/>
+              </a:rPr>
+              <a:t>easy</a:t>
+            </a:r>
+            <a:r>
+              <a:rPr lang="en-US" sz="3200" b="1">
+                <a:solidFill>
+                  <a:srgbClr val="B5B5B5"/>
+                </a:solidFill>
+                <a:latin typeface="Roboto" panose="02000000000000000000" pitchFamily="2" charset="0"/>
+                <a:ea typeface="Roboto" panose="02000000000000000000" pitchFamily="2" charset="0"/>
+              </a:rPr>
+              <a:t> </a:t>
+            </a:r>
+            <a:r>
+              <a:rPr lang="en-US" sz="3200" b="1">
+                <a:latin typeface="Roboto" panose="02000000000000000000" pitchFamily="2" charset="0"/>
+                <a:ea typeface="Roboto" panose="02000000000000000000" pitchFamily="2" charset="0"/>
+              </a:rPr>
+              <a:t>to learn</a:t>
+            </a:r>
+          </a:p>
+          <a:p>
+            <a:endParaRPr lang="en-US" sz="1400">
+              <a:solidFill>
+                <a:srgbClr val="B5B5B5"/>
+              </a:solidFill>
+              <a:latin typeface="Poppins" panose="00000500000000000000" pitchFamily="50" charset="0"/>
+              <a:ea typeface="Roboto" panose="02000000000000000000" pitchFamily="2" charset="0"/>
+              <a:cs typeface="Poppins" panose="00000500000000000000" pitchFamily="50" charset="0"/>
+            </a:endParaRPr>
+          </a:p>
+          <a:p>
+            <a:r>
+              <a:rPr lang="en-US" sz="2000">
+                <a:solidFill>
+                  <a:srgbClr val="B5B5B5"/>
+                </a:solidFill>
+                <a:latin typeface="Roboto" panose="02000000000000000000" pitchFamily="2" charset="0"/>
+                <a:ea typeface="Roboto" panose="02000000000000000000" pitchFamily="2" charset="0"/>
+                <a:cs typeface="Poppins" panose="00000500000000000000" pitchFamily="50" charset="0"/>
+              </a:rPr>
+              <a:t>Get a design started within minutes</a:t>
+            </a:r>
+          </a:p>
+        </p:txBody>
+      </p:sp>
     </p:spTree>
     <p:extLst>
       <p:ext uri="{BB962C8B-B14F-4D97-AF65-F5344CB8AC3E}">
-        <p14:creationId xmlns:p14="http://schemas.microsoft.com/office/powerpoint/2010/main" val="2404886026"/>
+        <p14:creationId xmlns:p14="http://schemas.microsoft.com/office/powerpoint/2010/main" val="2223711066"/>
       </p:ext>
     </p:extLst>
   </p:cSld>
   <p:clrMapOvr>
     <a:masterClrMapping/>
   </p:clrMapOvr>
+  <p:timing>
+    <p:tnLst>
+      <p:par>
+        <p:cTn id="1" dur="indefinite" restart="never" nodeType="tmRoot">
+          <p:childTnLst>
+            <p:seq concurrent="1" nextAc="seek">
+              <p:cTn id="2" dur="indefinite" nodeType="mainSeq">
+                <p:childTnLst>
+                  <p:par>
+                    <p:cTn id="3" fill="hold">
+                      <p:stCondLst>
+                        <p:cond delay="indefinite"/>
+                        <p:cond evt="onBegin" delay="0">
+                          <p:tn val="2"/>
+                        </p:cond>
+                      </p:stCondLst>
+                      <p:childTnLst>
+                        <p:par>
+                          <p:cTn id="4" fill="hold">
+                            <p:stCondLst>
+                              <p:cond delay="0"/>
+                            </p:stCondLst>
+                            <p:childTnLst>
+                              <p:par>
+                                <p:cTn id="5" presetID="10" presetClass="entr" presetSubtype="0" fill="hold" nodeType="afterEffect">
+                                  <p:stCondLst>
+                                    <p:cond delay="500"/>
+                                  </p:stCondLst>
+                                  <p:childTnLst>
+                                    <p:set>
+                                      <p:cBhvr>
+                                        <p:cTn id="6" dur="1" fill="hold">
+                                          <p:stCondLst>
+                                            <p:cond delay="0"/>
+                                          </p:stCondLst>
+                                        </p:cTn>
+                                        <p:tgtEl>
+                                          <p:spTgt spid="11"/>
+                                        </p:tgtEl>
+                                        <p:attrNameLst>
+                                          <p:attrName>style.visibility</p:attrName>
+                                        </p:attrNameLst>
+                                      </p:cBhvr>
+                                      <p:to>
+                                        <p:strVal val="visible"/>
+                                      </p:to>
+                                    </p:set>
+                                    <p:animEffect transition="in" filter="fade">
+                                      <p:cBhvr>
+                                        <p:cTn id="7" dur="1250"/>
+                                        <p:tgtEl>
+                                          <p:spTgt spid="11"/>
+                                        </p:tgtEl>
+                                      </p:cBhvr>
+                                    </p:animEffect>
+                                  </p:childTnLst>
+                                </p:cTn>
+                              </p:par>
+                              <p:par>
+                                <p:cTn id="8" presetID="63" presetClass="path" presetSubtype="0" accel="50000" decel="50000" fill="hold" nodeType="withEffect">
+                                  <p:stCondLst>
+                                    <p:cond delay="500"/>
+                                  </p:stCondLst>
+                                  <p:childTnLst>
+                                    <p:animMotion origin="layout" path="M 2.08333E-7 -4.81481E-6 L 0.07448 -4.81481E-6 " pathEditMode="relative" rAng="0" ptsTypes="AA">
+                                      <p:cBhvr>
+                                        <p:cTn id="9" dur="1000" fill="hold"/>
+                                        <p:tgtEl>
+                                          <p:spTgt spid="11"/>
+                                        </p:tgtEl>
+                                        <p:attrNameLst>
+                                          <p:attrName>ppt_x</p:attrName>
+                                          <p:attrName>ppt_y</p:attrName>
+                                        </p:attrNameLst>
+                                      </p:cBhvr>
+                                      <p:rCtr x="3724" y="0"/>
+                                    </p:animMotion>
+                                  </p:childTnLst>
+                                </p:cTn>
+                              </p:par>
+                            </p:childTnLst>
+                          </p:cTn>
+                        </p:par>
+                        <p:par>
+                          <p:cTn id="10" fill="hold">
+                            <p:stCondLst>
+                              <p:cond delay="1750"/>
+                            </p:stCondLst>
+                            <p:childTnLst>
+                              <p:par>
+                                <p:cTn id="11" presetID="10" presetClass="entr" presetSubtype="0" fill="hold" nodeType="afterEffect">
+                                  <p:stCondLst>
+                                    <p:cond delay="0"/>
+                                  </p:stCondLst>
+                                  <p:childTnLst>
+                                    <p:set>
+                                      <p:cBhvr>
+                                        <p:cTn id="12" dur="1" fill="hold">
+                                          <p:stCondLst>
+                                            <p:cond delay="0"/>
+                                          </p:stCondLst>
+                                        </p:cTn>
+                                        <p:tgtEl>
+                                          <p:spTgt spid="9">
+                                            <p:txEl>
+                                              <p:pRg st="0" end="0"/>
+                                            </p:txEl>
+                                          </p:spTgt>
+                                        </p:tgtEl>
+                                        <p:attrNameLst>
+                                          <p:attrName>style.visibility</p:attrName>
+                                        </p:attrNameLst>
+                                      </p:cBhvr>
+                                      <p:to>
+                                        <p:strVal val="visible"/>
+                                      </p:to>
+                                    </p:set>
+                                    <p:animEffect transition="in" filter="fade">
+                                      <p:cBhvr>
+                                        <p:cTn id="13" dur="500"/>
+                                        <p:tgtEl>
+                                          <p:spTgt spid="9">
+                                            <p:txEl>
+                                              <p:pRg st="0" end="0"/>
+                                            </p:txEl>
+                                          </p:spTgt>
+                                        </p:tgtEl>
+                                      </p:cBhvr>
+                                    </p:animEffect>
+                                  </p:childTnLst>
+                                </p:cTn>
+                              </p:par>
+                            </p:childTnLst>
+                          </p:cTn>
+                        </p:par>
+                        <p:par>
+                          <p:cTn id="14" fill="hold">
+                            <p:stCondLst>
+                              <p:cond delay="2250"/>
+                            </p:stCondLst>
+                            <p:childTnLst>
+                              <p:par>
+                                <p:cTn id="15" presetID="3" presetClass="entr" presetSubtype="10" fill="hold" nodeType="afterEffect">
+                                  <p:stCondLst>
+                                    <p:cond delay="0"/>
+                                  </p:stCondLst>
+                                  <p:childTnLst>
+                                    <p:set>
+                                      <p:cBhvr>
+                                        <p:cTn id="16" dur="1" fill="hold">
+                                          <p:stCondLst>
+                                            <p:cond delay="0"/>
+                                          </p:stCondLst>
+                                        </p:cTn>
+                                        <p:tgtEl>
+                                          <p:spTgt spid="9">
+                                            <p:txEl>
+                                              <p:pRg st="1" end="1"/>
+                                            </p:txEl>
+                                          </p:spTgt>
+                                        </p:tgtEl>
+                                        <p:attrNameLst>
+                                          <p:attrName>style.visibility</p:attrName>
+                                        </p:attrNameLst>
+                                      </p:cBhvr>
+                                      <p:to>
+                                        <p:strVal val="visible"/>
+                                      </p:to>
+                                    </p:set>
+                                    <p:animEffect transition="in" filter="blinds(horizontal)">
+                                      <p:cBhvr>
+                                        <p:cTn id="17" dur="500"/>
+                                        <p:tgtEl>
+                                          <p:spTgt spid="9">
+                                            <p:txEl>
+                                              <p:pRg st="1" end="1"/>
+                                            </p:txEl>
+                                          </p:spTgt>
+                                        </p:tgtEl>
+                                      </p:cBhvr>
+                                    </p:animEffect>
+                                  </p:childTnLst>
+                                </p:cTn>
+                              </p:par>
+                            </p:childTnLst>
+                          </p:cTn>
+                        </p:par>
+                        <p:par>
+                          <p:cTn id="18" fill="hold">
+                            <p:stCondLst>
+                              <p:cond delay="2750"/>
+                            </p:stCondLst>
+                            <p:childTnLst>
+                              <p:par>
+                                <p:cTn id="19" presetID="3" presetClass="entr" presetSubtype="10" fill="hold" nodeType="afterEffect">
+                                  <p:stCondLst>
+                                    <p:cond delay="0"/>
+                                  </p:stCondLst>
+                                  <p:childTnLst>
+                                    <p:set>
+                                      <p:cBhvr>
+                                        <p:cTn id="20" dur="1" fill="hold">
+                                          <p:stCondLst>
+                                            <p:cond delay="0"/>
+                                          </p:stCondLst>
+                                        </p:cTn>
+                                        <p:tgtEl>
+                                          <p:spTgt spid="9">
+                                            <p:txEl>
+                                              <p:pRg st="2" end="2"/>
+                                            </p:txEl>
+                                          </p:spTgt>
+                                        </p:tgtEl>
+                                        <p:attrNameLst>
+                                          <p:attrName>style.visibility</p:attrName>
+                                        </p:attrNameLst>
+                                      </p:cBhvr>
+                                      <p:to>
+                                        <p:strVal val="visible"/>
+                                      </p:to>
+                                    </p:set>
+                                    <p:animEffect transition="in" filter="blinds(horizontal)">
+                                      <p:cBhvr>
+                                        <p:cTn id="21" dur="500"/>
+                                        <p:tgtEl>
+                                          <p:spTgt spid="9">
+                                            <p:txEl>
+                                              <p:pRg st="2" end="2"/>
+                                            </p:txEl>
+                                          </p:spTgt>
+                                        </p:tgtEl>
+                                      </p:cBhvr>
+                                    </p:animEffect>
+                                  </p:childTnLst>
+                                </p:cTn>
+                              </p:par>
+                            </p:childTnLst>
+                          </p:cTn>
+                        </p:par>
+                      </p:childTnLst>
+                    </p:cTn>
+                  </p:par>
+                  <p:par>
+                    <p:cTn id="22" fill="hold">
+                      <p:stCondLst>
+                        <p:cond delay="indefinite"/>
+                      </p:stCondLst>
+                      <p:childTnLst>
+                        <p:par>
+                          <p:cTn id="23" fill="hold">
+                            <p:stCondLst>
+                              <p:cond delay="0"/>
+                            </p:stCondLst>
+                            <p:childTnLst>
+                              <p:par>
+                                <p:cTn id="24" presetID="35" presetClass="path" presetSubtype="0" accel="50000" decel="50000" fill="hold" grpId="0" nodeType="clickEffect">
+                                  <p:stCondLst>
+                                    <p:cond delay="0"/>
+                                  </p:stCondLst>
+                                  <p:childTnLst>
+                                    <p:animMotion origin="layout" path="M 5E-6 -2.22222E-6 L -0.24362 -2.22222E-6 " pathEditMode="relative" rAng="0" ptsTypes="AA">
+                                      <p:cBhvr>
+                                        <p:cTn id="25" dur="1250" fill="hold"/>
+                                        <p:tgtEl>
+                                          <p:spTgt spid="9">
+                                            <p:txEl>
+                                              <p:pRg st="0" end="0"/>
+                                            </p:txEl>
+                                          </p:spTgt>
+                                        </p:tgtEl>
+                                        <p:attrNameLst>
+                                          <p:attrName>ppt_x</p:attrName>
+                                          <p:attrName>ppt_y</p:attrName>
+                                        </p:attrNameLst>
+                                      </p:cBhvr>
+                                      <p:rCtr x="-12188" y="0"/>
+                                    </p:animMotion>
+                                  </p:childTnLst>
+                                </p:cTn>
+                              </p:par>
+                              <p:par>
+                                <p:cTn id="26" presetID="35" presetClass="path" presetSubtype="0" accel="50000" decel="50000" fill="hold" grpId="0" nodeType="withEffect">
+                                  <p:stCondLst>
+                                    <p:cond delay="0"/>
+                                  </p:stCondLst>
+                                  <p:childTnLst>
+                                    <p:animMotion origin="layout" path="M 2.70833E-6 2.22222E-6 L -0.25 2.22222E-6 " pathEditMode="relative" rAng="0" ptsTypes="AA">
+                                      <p:cBhvr>
+                                        <p:cTn id="27" dur="1250" fill="hold"/>
+                                        <p:tgtEl>
+                                          <p:spTgt spid="9">
+                                            <p:txEl>
+                                              <p:pRg st="1" end="1"/>
+                                            </p:txEl>
+                                          </p:spTgt>
+                                        </p:tgtEl>
+                                        <p:attrNameLst>
+                                          <p:attrName>ppt_x</p:attrName>
+                                          <p:attrName>ppt_y</p:attrName>
+                                        </p:attrNameLst>
+                                      </p:cBhvr>
+                                      <p:rCtr x="-12500" y="0"/>
+                                    </p:animMotion>
+                                  </p:childTnLst>
+                                </p:cTn>
+                              </p:par>
+                              <p:par>
+                                <p:cTn id="28" presetID="35" presetClass="path" presetSubtype="0" accel="50000" decel="50000" fill="hold" grpId="0" nodeType="withEffect">
+                                  <p:stCondLst>
+                                    <p:cond delay="0"/>
+                                  </p:stCondLst>
+                                  <p:childTnLst>
+                                    <p:animMotion origin="layout" path="M 1.45833E-6 4.44444E-6 L -0.25 4.44444E-6 " pathEditMode="relative" rAng="0" ptsTypes="AA">
+                                      <p:cBhvr>
+                                        <p:cTn id="29" dur="1250" fill="hold"/>
+                                        <p:tgtEl>
+                                          <p:spTgt spid="9">
+                                            <p:txEl>
+                                              <p:pRg st="2" end="2"/>
+                                            </p:txEl>
+                                          </p:spTgt>
+                                        </p:tgtEl>
+                                        <p:attrNameLst>
+                                          <p:attrName>ppt_x</p:attrName>
+                                          <p:attrName>ppt_y</p:attrName>
+                                        </p:attrNameLst>
+                                      </p:cBhvr>
+                                      <p:rCtr x="-12500" y="0"/>
+                                    </p:animMotion>
+                                  </p:childTnLst>
+                                </p:cTn>
+                              </p:par>
+                              <p:par>
+                                <p:cTn id="30" presetID="2" presetClass="exit" presetSubtype="8" fill="hold" nodeType="withEffect">
+                                  <p:stCondLst>
+                                    <p:cond delay="0"/>
+                                  </p:stCondLst>
+                                  <p:childTnLst>
+                                    <p:anim calcmode="lin" valueType="num">
+                                      <p:cBhvr additive="base">
+                                        <p:cTn id="31" dur="500"/>
+                                        <p:tgtEl>
+                                          <p:spTgt spid="11"/>
+                                        </p:tgtEl>
+                                        <p:attrNameLst>
+                                          <p:attrName>ppt_x</p:attrName>
+                                        </p:attrNameLst>
+                                      </p:cBhvr>
+                                      <p:tavLst>
+                                        <p:tav tm="0">
+                                          <p:val>
+                                            <p:strVal val="ppt_x"/>
+                                          </p:val>
+                                        </p:tav>
+                                        <p:tav tm="100000">
+                                          <p:val>
+                                            <p:strVal val="0-ppt_w/2"/>
+                                          </p:val>
+                                        </p:tav>
+                                      </p:tavLst>
+                                    </p:anim>
+                                    <p:anim calcmode="lin" valueType="num">
+                                      <p:cBhvr additive="base">
+                                        <p:cTn id="32" dur="500"/>
+                                        <p:tgtEl>
+                                          <p:spTgt spid="11"/>
+                                        </p:tgtEl>
+                                        <p:attrNameLst>
+                                          <p:attrName>ppt_y</p:attrName>
+                                        </p:attrNameLst>
+                                      </p:cBhvr>
+                                      <p:tavLst>
+                                        <p:tav tm="0">
+                                          <p:val>
+                                            <p:strVal val="ppt_y"/>
+                                          </p:val>
+                                        </p:tav>
+                                        <p:tav tm="100000">
+                                          <p:val>
+                                            <p:strVal val="ppt_y"/>
+                                          </p:val>
+                                        </p:tav>
+                                      </p:tavLst>
+                                    </p:anim>
+                                    <p:set>
+                                      <p:cBhvr>
+                                        <p:cTn id="33" dur="1" fill="hold">
+                                          <p:stCondLst>
+                                            <p:cond delay="499"/>
+                                          </p:stCondLst>
+                                        </p:cTn>
+                                        <p:tgtEl>
+                                          <p:spTgt spid="11"/>
+                                        </p:tgtEl>
+                                        <p:attrNameLst>
+                                          <p:attrName>style.visibility</p:attrName>
+                                        </p:attrNameLst>
+                                      </p:cBhvr>
+                                      <p:to>
+                                        <p:strVal val="hidden"/>
+                                      </p:to>
+                                    </p:set>
+                                  </p:childTnLst>
+                                </p:cTn>
+                              </p:par>
+                              <p:par>
+                                <p:cTn id="34" presetID="2" presetClass="entr" presetSubtype="2" fill="hold" nodeType="withEffect">
+                                  <p:stCondLst>
+                                    <p:cond delay="350"/>
+                                  </p:stCondLst>
+                                  <p:childTnLst>
+                                    <p:set>
+                                      <p:cBhvr>
+                                        <p:cTn id="35" dur="1" fill="hold">
+                                          <p:stCondLst>
+                                            <p:cond delay="0"/>
+                                          </p:stCondLst>
+                                        </p:cTn>
+                                        <p:tgtEl>
+                                          <p:spTgt spid="3"/>
+                                        </p:tgtEl>
+                                        <p:attrNameLst>
+                                          <p:attrName>style.visibility</p:attrName>
+                                        </p:attrNameLst>
+                                      </p:cBhvr>
+                                      <p:to>
+                                        <p:strVal val="visible"/>
+                                      </p:to>
+                                    </p:set>
+                                    <p:anim calcmode="lin" valueType="num">
+                                      <p:cBhvr additive="base">
+                                        <p:cTn id="36" dur="750" fill="hold"/>
+                                        <p:tgtEl>
+                                          <p:spTgt spid="3"/>
+                                        </p:tgtEl>
+                                        <p:attrNameLst>
+                                          <p:attrName>ppt_x</p:attrName>
+                                        </p:attrNameLst>
+                                      </p:cBhvr>
+                                      <p:tavLst>
+                                        <p:tav tm="0">
+                                          <p:val>
+                                            <p:strVal val="1+#ppt_w/2"/>
+                                          </p:val>
+                                        </p:tav>
+                                        <p:tav tm="100000">
+                                          <p:val>
+                                            <p:strVal val="#ppt_x"/>
+                                          </p:val>
+                                        </p:tav>
+                                      </p:tavLst>
+                                    </p:anim>
+                                    <p:anim calcmode="lin" valueType="num">
+                                      <p:cBhvr additive="base">
+                                        <p:cTn id="37" dur="750" fill="hold"/>
+                                        <p:tgtEl>
+                                          <p:spTgt spid="3"/>
+                                        </p:tgtEl>
+                                        <p:attrNameLst>
+                                          <p:attrName>ppt_y</p:attrName>
+                                        </p:attrNameLst>
+                                      </p:cBhvr>
+                                      <p:tavLst>
+                                        <p:tav tm="0">
+                                          <p:val>
+                                            <p:strVal val="#ppt_y"/>
+                                          </p:val>
+                                        </p:tav>
+                                        <p:tav tm="100000">
+                                          <p:val>
+                                            <p:strVal val="#ppt_y"/>
+                                          </p:val>
+                                        </p:tav>
+                                      </p:tavLst>
+                                    </p:anim>
+                                  </p:childTnLst>
+                                </p:cTn>
+                              </p:par>
+                            </p:childTnLst>
+                          </p:cTn>
+                        </p:par>
+                        <p:par>
+                          <p:cTn id="38" fill="hold">
+                            <p:stCondLst>
+                              <p:cond delay="1250"/>
+                            </p:stCondLst>
+                            <p:childTnLst>
+                              <p:par>
+                                <p:cTn id="39" presetID="10" presetClass="entr" presetSubtype="0" fill="hold" grpId="0" nodeType="afterEffect">
+                                  <p:stCondLst>
+                                    <p:cond delay="1000"/>
+                                  </p:stCondLst>
+                                  <p:childTnLst>
+                                    <p:set>
+                                      <p:cBhvr>
+                                        <p:cTn id="40" dur="1" fill="hold">
+                                          <p:stCondLst>
+                                            <p:cond delay="0"/>
+                                          </p:stCondLst>
+                                        </p:cTn>
+                                        <p:tgtEl>
+                                          <p:spTgt spid="4"/>
+                                        </p:tgtEl>
+                                        <p:attrNameLst>
+                                          <p:attrName>style.visibility</p:attrName>
+                                        </p:attrNameLst>
+                                      </p:cBhvr>
+                                      <p:to>
+                                        <p:strVal val="visible"/>
+                                      </p:to>
+                                    </p:set>
+                                    <p:animEffect transition="in" filter="fade">
+                                      <p:cBhvr>
+                                        <p:cTn id="41" dur="500"/>
+                                        <p:tgtEl>
+                                          <p:spTgt spid="4"/>
+                                        </p:tgtEl>
+                                      </p:cBhvr>
+                                    </p:animEffect>
+                                  </p:childTnLst>
+                                </p:cTn>
+                              </p:par>
+                            </p:childTnLst>
+                          </p:cTn>
+                        </p:par>
+                      </p:childTnLst>
+                    </p:cTn>
+                  </p:par>
+                </p:childTnLst>
+              </p:cTn>
+              <p:prevCondLst>
+                <p:cond evt="onPrev" delay="0">
+                  <p:tgtEl>
+                    <p:sldTgt/>
+                  </p:tgtEl>
+                </p:cond>
+              </p:prevCondLst>
+              <p:nextCondLst>
+                <p:cond evt="onNext" delay="0">
+                  <p:tgtEl>
+                    <p:sldTgt/>
+                  </p:tgtEl>
+                </p:cond>
+              </p:nextCondLst>
+            </p:seq>
+          </p:childTnLst>
+        </p:cTn>
+      </p:par>
+    </p:tnLst>
+    <p:bldLst>
+      <p:bldP spid="9" grpId="0" uiExpand="1" build="allAtOnce"/>
+      <p:bldP spid="4" grpId="0"/>
+    </p:bldLst>
+  </p:timing>
 </p:sld>
 </file>
 
@@ -5205,12 +7092,134 @@
           <a:chExt cx="0" cy="0"/>
         </a:xfrm>
       </p:grpSpPr>
+      <p:sp>
+        <p:nvSpPr>
+          <p:cNvPr id="9" name="Rectangle 8">
+            <a:extLst>
+              <a:ext uri="{FF2B5EF4-FFF2-40B4-BE49-F238E27FC236}">
+                <a16:creationId xmlns:a16="http://schemas.microsoft.com/office/drawing/2014/main" id="{4686E64A-884D-4CBC-B976-976D1B7B1F7E}"/>
+              </a:ext>
+            </a:extLst>
+          </p:cNvPr>
+          <p:cNvSpPr/>
+          <p:nvPr/>
+        </p:nvSpPr>
+        <p:spPr>
+          <a:xfrm>
+            <a:off x="4551695" y="2108125"/>
+            <a:ext cx="6300789" cy="1703030"/>
+          </a:xfrm>
+          <a:prstGeom prst="rect">
+            <a:avLst/>
+          </a:prstGeom>
+        </p:spPr>
+        <p:txBody>
+          <a:bodyPr wrap="square">
+            <a:spAutoFit/>
+          </a:bodyPr>
+          <a:lstStyle/>
+          <a:p>
+            <a:pPr algn="just">
+              <a:lnSpc>
+                <a:spcPct val="150000"/>
+              </a:lnSpc>
+            </a:pPr>
+            <a:r>
+              <a:rPr lang="en-US" sz="3200" b="1">
+                <a:solidFill>
+                  <a:srgbClr val="363636"/>
+                </a:solidFill>
+                <a:latin typeface="Roboto" panose="02000000000000000000" pitchFamily="2" charset="0"/>
+                <a:ea typeface="Roboto" panose="02000000000000000000" pitchFamily="2" charset="0"/>
+              </a:rPr>
+              <a:t>Font Awesome 5 support</a:t>
+            </a:r>
+          </a:p>
+          <a:p>
+            <a:pPr>
+              <a:lnSpc>
+                <a:spcPct val="150000"/>
+              </a:lnSpc>
+            </a:pPr>
+            <a:r>
+              <a:rPr lang="en-US" sz="2000">
+                <a:solidFill>
+                  <a:srgbClr val="4A4A4A"/>
+                </a:solidFill>
+                <a:latin typeface="Roboto" panose="02000000000000000000" pitchFamily="2" charset="0"/>
+                <a:ea typeface="Roboto" panose="02000000000000000000" pitchFamily="2" charset="0"/>
+              </a:rPr>
+              <a:t>Bulma is compatible with both </a:t>
+            </a:r>
+            <a:r>
+              <a:rPr lang="en-US" sz="2000">
+                <a:solidFill>
+                  <a:srgbClr val="FF0000"/>
+                </a:solidFill>
+                <a:latin typeface="Roboto" panose="02000000000000000000" pitchFamily="2" charset="0"/>
+                <a:ea typeface="Roboto" panose="02000000000000000000" pitchFamily="2" charset="0"/>
+              </a:rPr>
+              <a:t>Font Awesome 4 </a:t>
+            </a:r>
+            <a:r>
+              <a:rPr lang="en-US" sz="2000">
+                <a:solidFill>
+                  <a:srgbClr val="4A4A4A"/>
+                </a:solidFill>
+                <a:latin typeface="Roboto" panose="02000000000000000000" pitchFamily="2" charset="0"/>
+                <a:ea typeface="Roboto" panose="02000000000000000000" pitchFamily="2" charset="0"/>
+              </a:rPr>
+              <a:t>and </a:t>
+            </a:r>
+            <a:r>
+              <a:rPr lang="en-US" sz="2000">
+                <a:solidFill>
+                  <a:srgbClr val="FF0000"/>
+                </a:solidFill>
+                <a:latin typeface="Roboto" panose="02000000000000000000" pitchFamily="2" charset="0"/>
+                <a:ea typeface="Roboto" panose="02000000000000000000" pitchFamily="2" charset="0"/>
+              </a:rPr>
+              <a:t>Font Awesome 5 </a:t>
+            </a:r>
+            <a:r>
+              <a:rPr lang="en-US" sz="2000">
+                <a:solidFill>
+                  <a:srgbClr val="4A4A4A"/>
+                </a:solidFill>
+                <a:latin typeface="Roboto" panose="02000000000000000000" pitchFamily="2" charset="0"/>
+                <a:ea typeface="Roboto" panose="02000000000000000000" pitchFamily="2" charset="0"/>
+              </a:rPr>
+              <a:t>thanks to the </a:t>
+            </a:r>
+            <a:r>
+              <a:rPr lang="en-US" sz="2000">
+                <a:solidFill>
+                  <a:srgbClr val="FF0000"/>
+                </a:solidFill>
+                <a:latin typeface="Roboto" panose="02000000000000000000" pitchFamily="2" charset="0"/>
+                <a:ea typeface="Roboto" panose="02000000000000000000" pitchFamily="2" charset="0"/>
+              </a:rPr>
+              <a:t>.icon </a:t>
+            </a:r>
+            <a:r>
+              <a:rPr lang="en-US" sz="2000">
+                <a:solidFill>
+                  <a:srgbClr val="4A4A4A"/>
+                </a:solidFill>
+                <a:latin typeface="Roboto" panose="02000000000000000000" pitchFamily="2" charset="0"/>
+                <a:ea typeface="Roboto" panose="02000000000000000000" pitchFamily="2" charset="0"/>
+              </a:rPr>
+              <a:t>element</a:t>
+            </a:r>
+          </a:p>
+        </p:txBody>
+      </p:sp>
       <p:pic>
         <p:nvPicPr>
-          <p:cNvPr id="2" name="Picture 1">
-            <a:extLst>
-              <a:ext uri="{FF2B5EF4-FFF2-40B4-BE49-F238E27FC236}">
-                <a16:creationId xmlns:a16="http://schemas.microsoft.com/office/drawing/2014/main" id="{F3CDAF89-C7CA-4D67-97B7-22554154CC4E}"/>
+          <p:cNvPr id="11" name="Graphic 10">
+            <a:extLst>
+              <a:ext uri="{FF2B5EF4-FFF2-40B4-BE49-F238E27FC236}">
+                <a16:creationId xmlns:a16="http://schemas.microsoft.com/office/drawing/2014/main" id="{BA60EFB6-3DBD-4E0B-BD6E-C4E080A7704A}"/>
               </a:ext>
             </a:extLst>
           </p:cNvPr>
@@ -5220,15 +7229,24 @@
           <p:nvPr/>
         </p:nvPicPr>
         <p:blipFill>
-          <a:blip r:embed="rId2"/>
+          <a:blip r:embed="rId2">
+            <a:extLst>
+              <a:ext uri="{28A0092B-C50C-407E-A947-70E740481C1C}">
+                <a14:useLocalDpi xmlns:a14="http://schemas.microsoft.com/office/drawing/2010/main" val="0"/>
+              </a:ext>
+              <a:ext uri="{96DAC541-7B7A-43D3-8B79-37D633B846F1}">
+                <asvg:svgBlip xmlns:asvg="http://schemas.microsoft.com/office/drawing/2016/SVG/main" r:embed="rId3"/>
+              </a:ext>
+            </a:extLst>
+          </a:blip>
           <a:stretch>
             <a:fillRect/>
           </a:stretch>
         </p:blipFill>
         <p:spPr>
           <a:xfrm>
-            <a:off x="1053143" y="1195666"/>
-            <a:ext cx="10085714" cy="4466667"/>
+            <a:off x="877500" y="2108125"/>
+            <a:ext cx="2205000" cy="2520000"/>
           </a:xfrm>
           <a:prstGeom prst="rect">
             <a:avLst/>
@@ -5238,13 +7256,225 @@
     </p:spTree>
     <p:extLst>
       <p:ext uri="{BB962C8B-B14F-4D97-AF65-F5344CB8AC3E}">
-        <p14:creationId xmlns:p14="http://schemas.microsoft.com/office/powerpoint/2010/main" val="2059056810"/>
+        <p14:creationId xmlns:p14="http://schemas.microsoft.com/office/powerpoint/2010/main" val="2146593241"/>
       </p:ext>
     </p:extLst>
   </p:cSld>
   <p:clrMapOvr>
     <a:masterClrMapping/>
   </p:clrMapOvr>
+  <p:timing>
+    <p:tnLst>
+      <p:par>
+        <p:cTn id="1" dur="indefinite" restart="never" nodeType="tmRoot">
+          <p:childTnLst>
+            <p:seq concurrent="1" nextAc="seek">
+              <p:cTn id="2" dur="indefinite" nodeType="mainSeq">
+                <p:childTnLst>
+                  <p:par>
+                    <p:cTn id="3" fill="hold">
+                      <p:stCondLst>
+                        <p:cond delay="indefinite"/>
+                        <p:cond evt="onBegin" delay="0">
+                          <p:tn val="2"/>
+                        </p:cond>
+                      </p:stCondLst>
+                      <p:childTnLst>
+                        <p:par>
+                          <p:cTn id="4" fill="hold">
+                            <p:stCondLst>
+                              <p:cond delay="0"/>
+                            </p:stCondLst>
+                            <p:childTnLst>
+                              <p:par>
+                                <p:cTn id="5" presetID="10" presetClass="entr" presetSubtype="0" fill="hold" nodeType="afterEffect">
+                                  <p:stCondLst>
+                                    <p:cond delay="500"/>
+                                  </p:stCondLst>
+                                  <p:childTnLst>
+                                    <p:set>
+                                      <p:cBhvr>
+                                        <p:cTn id="6" dur="1" fill="hold">
+                                          <p:stCondLst>
+                                            <p:cond delay="0"/>
+                                          </p:stCondLst>
+                                        </p:cTn>
+                                        <p:tgtEl>
+                                          <p:spTgt spid="11"/>
+                                        </p:tgtEl>
+                                        <p:attrNameLst>
+                                          <p:attrName>style.visibility</p:attrName>
+                                        </p:attrNameLst>
+                                      </p:cBhvr>
+                                      <p:to>
+                                        <p:strVal val="visible"/>
+                                      </p:to>
+                                    </p:set>
+                                    <p:animEffect transition="in" filter="fade">
+                                      <p:cBhvr>
+                                        <p:cTn id="7" dur="1250"/>
+                                        <p:tgtEl>
+                                          <p:spTgt spid="11"/>
+                                        </p:tgtEl>
+                                      </p:cBhvr>
+                                    </p:animEffect>
+                                  </p:childTnLst>
+                                </p:cTn>
+                              </p:par>
+                              <p:par>
+                                <p:cTn id="8" presetID="63" presetClass="path" presetSubtype="0" accel="50000" decel="50000" fill="hold" nodeType="withEffect">
+                                  <p:stCondLst>
+                                    <p:cond delay="500"/>
+                                  </p:stCondLst>
+                                  <p:childTnLst>
+                                    <p:animMotion origin="layout" path="M 2.08333E-7 -2.22222E-6 L 0.07448 -2.22222E-6 " pathEditMode="relative" rAng="0" ptsTypes="AA">
+                                      <p:cBhvr>
+                                        <p:cTn id="9" dur="1000" fill="hold"/>
+                                        <p:tgtEl>
+                                          <p:spTgt spid="11"/>
+                                        </p:tgtEl>
+                                        <p:attrNameLst>
+                                          <p:attrName>ppt_x</p:attrName>
+                                          <p:attrName>ppt_y</p:attrName>
+                                        </p:attrNameLst>
+                                      </p:cBhvr>
+                                      <p:rCtr x="3724" y="0"/>
+                                    </p:animMotion>
+                                  </p:childTnLst>
+                                </p:cTn>
+                              </p:par>
+                            </p:childTnLst>
+                          </p:cTn>
+                        </p:par>
+                        <p:par>
+                          <p:cTn id="10" fill="hold">
+                            <p:stCondLst>
+                              <p:cond delay="1750"/>
+                            </p:stCondLst>
+                            <p:childTnLst>
+                              <p:par>
+                                <p:cTn id="11" presetID="10" presetClass="entr" presetSubtype="0" fill="hold" nodeType="afterEffect">
+                                  <p:stCondLst>
+                                    <p:cond delay="0"/>
+                                  </p:stCondLst>
+                                  <p:childTnLst>
+                                    <p:set>
+                                      <p:cBhvr>
+                                        <p:cTn id="12" dur="1" fill="hold">
+                                          <p:stCondLst>
+                                            <p:cond delay="0"/>
+                                          </p:stCondLst>
+                                        </p:cTn>
+                                        <p:tgtEl>
+                                          <p:spTgt spid="9">
+                                            <p:txEl>
+                                              <p:pRg st="0" end="0"/>
+                                            </p:txEl>
+                                          </p:spTgt>
+                                        </p:tgtEl>
+                                        <p:attrNameLst>
+                                          <p:attrName>style.visibility</p:attrName>
+                                        </p:attrNameLst>
+                                      </p:cBhvr>
+                                      <p:to>
+                                        <p:strVal val="visible"/>
+                                      </p:to>
+                                    </p:set>
+                                    <p:animEffect transition="in" filter="fade">
+                                      <p:cBhvr>
+                                        <p:cTn id="13" dur="500"/>
+                                        <p:tgtEl>
+                                          <p:spTgt spid="9">
+                                            <p:txEl>
+                                              <p:pRg st="0" end="0"/>
+                                            </p:txEl>
+                                          </p:spTgt>
+                                        </p:tgtEl>
+                                      </p:cBhvr>
+                                    </p:animEffect>
+                                  </p:childTnLst>
+                                </p:cTn>
+                              </p:par>
+                            </p:childTnLst>
+                          </p:cTn>
+                        </p:par>
+                        <p:par>
+                          <p:cTn id="14" fill="hold">
+                            <p:stCondLst>
+                              <p:cond delay="2250"/>
+                            </p:stCondLst>
+                            <p:childTnLst>
+                              <p:par>
+                                <p:cTn id="15" presetID="3" presetClass="entr" presetSubtype="10" fill="hold" nodeType="afterEffect">
+                                  <p:stCondLst>
+                                    <p:cond delay="0"/>
+                                  </p:stCondLst>
+                                  <p:childTnLst>
+                                    <p:set>
+                                      <p:cBhvr>
+                                        <p:cTn id="16" dur="1" fill="hold">
+                                          <p:stCondLst>
+                                            <p:cond delay="0"/>
+                                          </p:stCondLst>
+                                        </p:cTn>
+                                        <p:tgtEl>
+                                          <p:spTgt spid="9">
+                                            <p:txEl>
+                                              <p:pRg st="1" end="1"/>
+                                            </p:txEl>
+                                          </p:spTgt>
+                                        </p:tgtEl>
+                                        <p:attrNameLst>
+                                          <p:attrName>style.visibility</p:attrName>
+                                        </p:attrNameLst>
+                                      </p:cBhvr>
+                                      <p:to>
+                                        <p:strVal val="visible"/>
+                                      </p:to>
+                                    </p:set>
+                                    <p:animEffect transition="in" filter="blinds(horizontal)">
+                                      <p:cBhvr>
+                                        <p:cTn id="17" dur="500"/>
+                                        <p:tgtEl>
+                                          <p:spTgt spid="9">
+                                            <p:txEl>
+                                              <p:pRg st="1" end="1"/>
+                                            </p:txEl>
+                                          </p:spTgt>
+                                        </p:tgtEl>
+                                      </p:cBhvr>
+                                    </p:animEffect>
+                                  </p:childTnLst>
+                                </p:cTn>
+                              </p:par>
+                            </p:childTnLst>
+                          </p:cTn>
+                        </p:par>
+                      </p:childTnLst>
+                    </p:cTn>
+                  </p:par>
+                </p:childTnLst>
+              </p:cTn>
+              <p:prevCondLst>
+                <p:cond evt="onPrev" delay="0">
+                  <p:tgtEl>
+                    <p:sldTgt/>
+                  </p:tgtEl>
+                </p:cond>
+              </p:prevCondLst>
+              <p:nextCondLst>
+                <p:cond evt="onNext" delay="0">
+                  <p:tgtEl>
+                    <p:sldTgt/>
+                  </p:tgtEl>
+                </p:cond>
+              </p:nextCondLst>
+            </p:seq>
+          </p:childTnLst>
+        </p:cTn>
+      </p:par>
+    </p:tnLst>
+  </p:timing>
 </p:sld>
 </file>
 
@@ -5279,8 +7509,8 @@
         </p:nvSpPr>
         <p:spPr>
           <a:xfrm>
-            <a:off x="3285554" y="1501457"/>
-            <a:ext cx="6819980" cy="1703030"/>
+            <a:off x="4551695" y="2108125"/>
+            <a:ext cx="6300789" cy="3562514"/>
           </a:xfrm>
           <a:prstGeom prst="rect">
             <a:avLst/>
@@ -5305,11 +7535,11 @@
                 <a:latin typeface="Roboto" panose="02000000000000000000" pitchFamily="2" charset="0"/>
                 <a:ea typeface="Roboto" panose="02000000000000000000" pitchFamily="2" charset="0"/>
               </a:rPr>
-              <a:t>Font Awesome 5 support</a:t>
-            </a:r>
-          </a:p>
-          <a:p>
-            <a:pPr algn="just">
+              <a:t>100+ useful CSS helpers</a:t>
+            </a:r>
+          </a:p>
+          <a:p>
+            <a:pPr>
               <a:lnSpc>
                 <a:spcPct val="150000"/>
               </a:lnSpc>
@@ -5317,93 +7547,20 @@
             <a:r>
               <a:rPr lang="en-US" sz="2000">
                 <a:solidFill>
-                  <a:srgbClr val="363636"/>
+                  <a:srgbClr val="4A4A4A"/>
                 </a:solidFill>
                 <a:latin typeface="Roboto" panose="02000000000000000000" pitchFamily="2" charset="0"/>
                 <a:ea typeface="Roboto" panose="02000000000000000000" pitchFamily="2" charset="0"/>
               </a:rPr>
-              <a:t>Bulma is compatible with both </a:t>
-            </a:r>
-            <a:r>
-              <a:rPr lang="en-US" sz="2000" b="1">
-                <a:solidFill>
-                  <a:srgbClr val="FF0000"/>
-                </a:solidFill>
-                <a:latin typeface="Roboto" panose="02000000000000000000" pitchFamily="2" charset="0"/>
-                <a:ea typeface="Roboto" panose="02000000000000000000" pitchFamily="2" charset="0"/>
-              </a:rPr>
-              <a:t>Font Awesome 4 </a:t>
-            </a:r>
-            <a:r>
-              <a:rPr lang="en-US" sz="2000">
-                <a:solidFill>
-                  <a:srgbClr val="363636"/>
-                </a:solidFill>
-                <a:latin typeface="Roboto" panose="02000000000000000000" pitchFamily="2" charset="0"/>
-                <a:ea typeface="Roboto" panose="02000000000000000000" pitchFamily="2" charset="0"/>
-              </a:rPr>
-              <a:t>and Font</a:t>
-            </a:r>
-            <a:r>
-              <a:rPr lang="en-US" sz="2000" b="1">
-                <a:solidFill>
-                  <a:srgbClr val="363636"/>
-                </a:solidFill>
-                <a:latin typeface="Roboto" panose="02000000000000000000" pitchFamily="2" charset="0"/>
-                <a:ea typeface="Roboto" panose="02000000000000000000" pitchFamily="2" charset="0"/>
-              </a:rPr>
-              <a:t> </a:t>
-            </a:r>
-            <a:r>
-              <a:rPr lang="en-US" sz="2000" b="1">
-                <a:solidFill>
-                  <a:srgbClr val="FF0000"/>
-                </a:solidFill>
-                <a:latin typeface="Roboto" panose="02000000000000000000" pitchFamily="2" charset="0"/>
-                <a:ea typeface="Roboto" panose="02000000000000000000" pitchFamily="2" charset="0"/>
-              </a:rPr>
-              <a:t>Awesome 5</a:t>
-            </a:r>
-            <a:r>
-              <a:rPr lang="en-US" sz="2000" b="1">
-                <a:solidFill>
-                  <a:srgbClr val="363636"/>
-                </a:solidFill>
-                <a:latin typeface="Roboto" panose="02000000000000000000" pitchFamily="2" charset="0"/>
-                <a:ea typeface="Roboto" panose="02000000000000000000" pitchFamily="2" charset="0"/>
-              </a:rPr>
-              <a:t> </a:t>
-            </a:r>
-            <a:r>
-              <a:rPr lang="en-US" sz="2000">
-                <a:solidFill>
-                  <a:srgbClr val="363636"/>
-                </a:solidFill>
-                <a:latin typeface="Roboto" panose="02000000000000000000" pitchFamily="2" charset="0"/>
-                <a:ea typeface="Roboto" panose="02000000000000000000" pitchFamily="2" charset="0"/>
-              </a:rPr>
-              <a:t>thanks to the </a:t>
-            </a:r>
-            <a:r>
-              <a:rPr lang="en-US" sz="2000" b="1">
-                <a:solidFill>
-                  <a:srgbClr val="FF0000"/>
-                </a:solidFill>
-                <a:latin typeface="Roboto" panose="02000000000000000000" pitchFamily="2" charset="0"/>
-                <a:ea typeface="Roboto" panose="02000000000000000000" pitchFamily="2" charset="0"/>
-              </a:rPr>
-              <a:t>.icon </a:t>
-            </a:r>
-            <a:r>
-              <a:rPr lang="en-US" sz="2000">
-                <a:solidFill>
-                  <a:srgbClr val="363636"/>
-                </a:solidFill>
-                <a:latin typeface="Roboto" panose="02000000000000000000" pitchFamily="2" charset="0"/>
-                <a:ea typeface="Roboto" panose="02000000000000000000" pitchFamily="2" charset="0"/>
-              </a:rPr>
-              <a:t>element</a:t>
-            </a:r>
+              <a:t>Bulma ships with more than 100 helpers to specify color, display, and spacing</a:t>
+            </a:r>
+          </a:p>
+          <a:p>
+            <a:pPr>
+              <a:lnSpc>
+                <a:spcPct val="150000"/>
+              </a:lnSpc>
+            </a:pPr>
             <a:endParaRPr lang="en-US" sz="2000">
               <a:solidFill>
                 <a:srgbClr val="4A4A4A"/>
@@ -5412,14 +7569,82 @@
               <a:ea typeface="Roboto" panose="02000000000000000000" pitchFamily="2" charset="0"/>
             </a:endParaRPr>
           </a:p>
+          <a:p>
+            <a:pPr marL="803275" indent="-342900" algn="just">
+              <a:lnSpc>
+                <a:spcPct val="150000"/>
+              </a:lnSpc>
+              <a:buFont typeface="Wingdings" panose="05000000000000000000" pitchFamily="2" charset="2"/>
+              <a:buChar char="q"/>
+            </a:pPr>
+            <a:r>
+              <a:rPr lang="en-US" sz="2000">
+                <a:solidFill>
+                  <a:srgbClr val="0070C0"/>
+                </a:solidFill>
+                <a:latin typeface="Poppins" panose="00000500000000000000" pitchFamily="50" charset="0"/>
+                <a:ea typeface="Roboto" panose="02000000000000000000" pitchFamily="2" charset="0"/>
+                <a:cs typeface="Poppins" panose="00000500000000000000" pitchFamily="50" charset="0"/>
+              </a:rPr>
+              <a:t>Responsive helpers</a:t>
+            </a:r>
+          </a:p>
+          <a:p>
+            <a:pPr marL="803275" indent="-342900" algn="just">
+              <a:lnSpc>
+                <a:spcPct val="150000"/>
+              </a:lnSpc>
+              <a:buFont typeface="Wingdings" panose="05000000000000000000" pitchFamily="2" charset="2"/>
+              <a:buChar char="q"/>
+            </a:pPr>
+            <a:r>
+              <a:rPr lang="en-US" sz="2000">
+                <a:solidFill>
+                  <a:srgbClr val="0070C0"/>
+                </a:solidFill>
+                <a:latin typeface="Poppins" panose="00000500000000000000" pitchFamily="50" charset="0"/>
+                <a:ea typeface="Roboto" panose="02000000000000000000" pitchFamily="2" charset="0"/>
+                <a:cs typeface="Poppins" panose="00000500000000000000" pitchFamily="50" charset="0"/>
+              </a:rPr>
+              <a:t>Typography helpers</a:t>
+            </a:r>
+            <a:endParaRPr lang="en-US" sz="2000">
+              <a:solidFill>
+                <a:srgbClr val="363636"/>
+              </a:solidFill>
+              <a:latin typeface="Poppins" panose="00000500000000000000" pitchFamily="50" charset="0"/>
+              <a:ea typeface="Roboto" panose="02000000000000000000" pitchFamily="2" charset="0"/>
+              <a:cs typeface="Poppins" panose="00000500000000000000" pitchFamily="50" charset="0"/>
+            </a:endParaRPr>
+          </a:p>
+          <a:p>
+            <a:pPr marL="803275" indent="-342900" algn="just">
+              <a:lnSpc>
+                <a:spcPct val="150000"/>
+              </a:lnSpc>
+              <a:buFont typeface="Wingdings" panose="05000000000000000000" pitchFamily="2" charset="2"/>
+              <a:buChar char="q"/>
+            </a:pPr>
+            <a:r>
+              <a:rPr lang="en-US" sz="2000">
+                <a:solidFill>
+                  <a:srgbClr val="0070C0"/>
+                </a:solidFill>
+                <a:latin typeface="Poppins" panose="00000500000000000000" pitchFamily="50" charset="0"/>
+                <a:ea typeface="Roboto" panose="02000000000000000000" pitchFamily="2" charset="0"/>
+                <a:cs typeface="Poppins" panose="00000500000000000000" pitchFamily="50" charset="0"/>
+              </a:rPr>
+              <a:t>Other helpers</a:t>
+            </a:r>
+          </a:p>
         </p:txBody>
       </p:sp>
       <p:pic>
         <p:nvPicPr>
-          <p:cNvPr id="3" name="Graphic 2">
-            <a:extLst>
-              <a:ext uri="{FF2B5EF4-FFF2-40B4-BE49-F238E27FC236}">
-                <a16:creationId xmlns:a16="http://schemas.microsoft.com/office/drawing/2014/main" id="{521E5AEC-3F6E-4933-9752-CC94FF374970}"/>
+          <p:cNvPr id="11" name="Graphic 10">
+            <a:extLst>
+              <a:ext uri="{FF2B5EF4-FFF2-40B4-BE49-F238E27FC236}">
+                <a16:creationId xmlns:a16="http://schemas.microsoft.com/office/drawing/2014/main" id="{BA60EFB6-3DBD-4E0B-BD6E-C4E080A7704A}"/>
               </a:ext>
             </a:extLst>
           </p:cNvPr>
@@ -5445,7 +7670,7 @@
         </p:blipFill>
         <p:spPr>
           <a:xfrm>
-            <a:off x="720000" y="1080000"/>
+            <a:off x="877500" y="2108125"/>
             <a:ext cx="2205000" cy="2520000"/>
           </a:xfrm>
           <a:prstGeom prst="rect">
@@ -5456,13 +7681,381 @@
     </p:spTree>
     <p:extLst>
       <p:ext uri="{BB962C8B-B14F-4D97-AF65-F5344CB8AC3E}">
-        <p14:creationId xmlns:p14="http://schemas.microsoft.com/office/powerpoint/2010/main" val="535976546"/>
+        <p14:creationId xmlns:p14="http://schemas.microsoft.com/office/powerpoint/2010/main" val="1891397624"/>
       </p:ext>
     </p:extLst>
   </p:cSld>
   <p:clrMapOvr>
     <a:masterClrMapping/>
   </p:clrMapOvr>
+  <p:timing>
+    <p:tnLst>
+      <p:par>
+        <p:cTn id="1" dur="indefinite" restart="never" nodeType="tmRoot">
+          <p:childTnLst>
+            <p:seq concurrent="1" nextAc="seek">
+              <p:cTn id="2" dur="indefinite" nodeType="mainSeq">
+                <p:childTnLst>
+                  <p:par>
+                    <p:cTn id="3" fill="hold">
+                      <p:stCondLst>
+                        <p:cond delay="indefinite"/>
+                        <p:cond evt="onBegin" delay="0">
+                          <p:tn val="2"/>
+                        </p:cond>
+                      </p:stCondLst>
+                      <p:childTnLst>
+                        <p:par>
+                          <p:cTn id="4" fill="hold">
+                            <p:stCondLst>
+                              <p:cond delay="0"/>
+                            </p:stCondLst>
+                            <p:childTnLst>
+                              <p:par>
+                                <p:cTn id="5" presetID="10" presetClass="entr" presetSubtype="0" fill="hold" nodeType="afterEffect">
+                                  <p:stCondLst>
+                                    <p:cond delay="500"/>
+                                  </p:stCondLst>
+                                  <p:childTnLst>
+                                    <p:set>
+                                      <p:cBhvr>
+                                        <p:cTn id="6" dur="1" fill="hold">
+                                          <p:stCondLst>
+                                            <p:cond delay="0"/>
+                                          </p:stCondLst>
+                                        </p:cTn>
+                                        <p:tgtEl>
+                                          <p:spTgt spid="11"/>
+                                        </p:tgtEl>
+                                        <p:attrNameLst>
+                                          <p:attrName>style.visibility</p:attrName>
+                                        </p:attrNameLst>
+                                      </p:cBhvr>
+                                      <p:to>
+                                        <p:strVal val="visible"/>
+                                      </p:to>
+                                    </p:set>
+                                    <p:animEffect transition="in" filter="fade">
+                                      <p:cBhvr>
+                                        <p:cTn id="7" dur="1250"/>
+                                        <p:tgtEl>
+                                          <p:spTgt spid="11"/>
+                                        </p:tgtEl>
+                                      </p:cBhvr>
+                                    </p:animEffect>
+                                  </p:childTnLst>
+                                </p:cTn>
+                              </p:par>
+                              <p:par>
+                                <p:cTn id="8" presetID="63" presetClass="path" presetSubtype="0" accel="50000" decel="50000" fill="hold" nodeType="withEffect">
+                                  <p:stCondLst>
+                                    <p:cond delay="500"/>
+                                  </p:stCondLst>
+                                  <p:childTnLst>
+                                    <p:animMotion origin="layout" path="M 2.08333E-7 -2.22222E-6 L 0.07448 -2.22222E-6 " pathEditMode="relative" rAng="0" ptsTypes="AA">
+                                      <p:cBhvr>
+                                        <p:cTn id="9" dur="1000" fill="hold"/>
+                                        <p:tgtEl>
+                                          <p:spTgt spid="11"/>
+                                        </p:tgtEl>
+                                        <p:attrNameLst>
+                                          <p:attrName>ppt_x</p:attrName>
+                                          <p:attrName>ppt_y</p:attrName>
+                                        </p:attrNameLst>
+                                      </p:cBhvr>
+                                      <p:rCtr x="3724" y="0"/>
+                                    </p:animMotion>
+                                  </p:childTnLst>
+                                </p:cTn>
+                              </p:par>
+                            </p:childTnLst>
+                          </p:cTn>
+                        </p:par>
+                        <p:par>
+                          <p:cTn id="10" fill="hold">
+                            <p:stCondLst>
+                              <p:cond delay="1750"/>
+                            </p:stCondLst>
+                            <p:childTnLst>
+                              <p:par>
+                                <p:cTn id="11" presetID="3" presetClass="entr" presetSubtype="10" fill="hold" nodeType="afterEffect">
+                                  <p:stCondLst>
+                                    <p:cond delay="0"/>
+                                  </p:stCondLst>
+                                  <p:childTnLst>
+                                    <p:set>
+                                      <p:cBhvr>
+                                        <p:cTn id="12" dur="1" fill="hold">
+                                          <p:stCondLst>
+                                            <p:cond delay="0"/>
+                                          </p:stCondLst>
+                                        </p:cTn>
+                                        <p:tgtEl>
+                                          <p:spTgt spid="9">
+                                            <p:txEl>
+                                              <p:pRg st="0" end="0"/>
+                                            </p:txEl>
+                                          </p:spTgt>
+                                        </p:tgtEl>
+                                        <p:attrNameLst>
+                                          <p:attrName>style.visibility</p:attrName>
+                                        </p:attrNameLst>
+                                      </p:cBhvr>
+                                      <p:to>
+                                        <p:strVal val="visible"/>
+                                      </p:to>
+                                    </p:set>
+                                    <p:animEffect transition="in" filter="blinds(horizontal)">
+                                      <p:cBhvr>
+                                        <p:cTn id="13" dur="500"/>
+                                        <p:tgtEl>
+                                          <p:spTgt spid="9">
+                                            <p:txEl>
+                                              <p:pRg st="0" end="0"/>
+                                            </p:txEl>
+                                          </p:spTgt>
+                                        </p:tgtEl>
+                                      </p:cBhvr>
+                                    </p:animEffect>
+                                  </p:childTnLst>
+                                </p:cTn>
+                              </p:par>
+                            </p:childTnLst>
+                          </p:cTn>
+                        </p:par>
+                        <p:par>
+                          <p:cTn id="14" fill="hold">
+                            <p:stCondLst>
+                              <p:cond delay="2250"/>
+                            </p:stCondLst>
+                            <p:childTnLst>
+                              <p:par>
+                                <p:cTn id="15" presetID="3" presetClass="entr" presetSubtype="10" fill="hold" nodeType="afterEffect">
+                                  <p:stCondLst>
+                                    <p:cond delay="0"/>
+                                  </p:stCondLst>
+                                  <p:childTnLst>
+                                    <p:set>
+                                      <p:cBhvr>
+                                        <p:cTn id="16" dur="1" fill="hold">
+                                          <p:stCondLst>
+                                            <p:cond delay="0"/>
+                                          </p:stCondLst>
+                                        </p:cTn>
+                                        <p:tgtEl>
+                                          <p:spTgt spid="9">
+                                            <p:txEl>
+                                              <p:pRg st="1" end="1"/>
+                                            </p:txEl>
+                                          </p:spTgt>
+                                        </p:tgtEl>
+                                        <p:attrNameLst>
+                                          <p:attrName>style.visibility</p:attrName>
+                                        </p:attrNameLst>
+                                      </p:cBhvr>
+                                      <p:to>
+                                        <p:strVal val="visible"/>
+                                      </p:to>
+                                    </p:set>
+                                    <p:animEffect transition="in" filter="blinds(horizontal)">
+                                      <p:cBhvr>
+                                        <p:cTn id="17" dur="500"/>
+                                        <p:tgtEl>
+                                          <p:spTgt spid="9">
+                                            <p:txEl>
+                                              <p:pRg st="1" end="1"/>
+                                            </p:txEl>
+                                          </p:spTgt>
+                                        </p:tgtEl>
+                                      </p:cBhvr>
+                                    </p:animEffect>
+                                  </p:childTnLst>
+                                </p:cTn>
+                              </p:par>
+                            </p:childTnLst>
+                          </p:cTn>
+                        </p:par>
+                        <p:par>
+                          <p:cTn id="18" fill="hold">
+                            <p:stCondLst>
+                              <p:cond delay="2750"/>
+                            </p:stCondLst>
+                            <p:childTnLst>
+                              <p:par>
+                                <p:cTn id="19" presetID="9" presetClass="entr" presetSubtype="0" fill="hold" nodeType="afterEffect">
+                                  <p:stCondLst>
+                                    <p:cond delay="0"/>
+                                  </p:stCondLst>
+                                  <p:childTnLst>
+                                    <p:set>
+                                      <p:cBhvr>
+                                        <p:cTn id="20" dur="1" fill="hold">
+                                          <p:stCondLst>
+                                            <p:cond delay="0"/>
+                                          </p:stCondLst>
+                                        </p:cTn>
+                                        <p:tgtEl>
+                                          <p:spTgt spid="9">
+                                            <p:txEl>
+                                              <p:pRg st="3" end="3"/>
+                                            </p:txEl>
+                                          </p:spTgt>
+                                        </p:tgtEl>
+                                        <p:attrNameLst>
+                                          <p:attrName>style.visibility</p:attrName>
+                                        </p:attrNameLst>
+                                      </p:cBhvr>
+                                      <p:to>
+                                        <p:strVal val="visible"/>
+                                      </p:to>
+                                    </p:set>
+                                    <p:animEffect transition="in" filter="dissolve">
+                                      <p:cBhvr>
+                                        <p:cTn id="21" dur="500"/>
+                                        <p:tgtEl>
+                                          <p:spTgt spid="9">
+                                            <p:txEl>
+                                              <p:pRg st="3" end="3"/>
+                                            </p:txEl>
+                                          </p:spTgt>
+                                        </p:tgtEl>
+                                      </p:cBhvr>
+                                    </p:animEffect>
+                                  </p:childTnLst>
+                                </p:cTn>
+                              </p:par>
+                            </p:childTnLst>
+                          </p:cTn>
+                        </p:par>
+                        <p:par>
+                          <p:cTn id="22" fill="hold">
+                            <p:stCondLst>
+                              <p:cond delay="3250"/>
+                            </p:stCondLst>
+                            <p:childTnLst>
+                              <p:par>
+                                <p:cTn id="23" presetID="9" presetClass="entr" presetSubtype="0" fill="hold" nodeType="afterEffect">
+                                  <p:stCondLst>
+                                    <p:cond delay="0"/>
+                                  </p:stCondLst>
+                                  <p:childTnLst>
+                                    <p:set>
+                                      <p:cBhvr>
+                                        <p:cTn id="24" dur="1" fill="hold">
+                                          <p:stCondLst>
+                                            <p:cond delay="0"/>
+                                          </p:stCondLst>
+                                        </p:cTn>
+                                        <p:tgtEl>
+                                          <p:spTgt spid="9">
+                                            <p:txEl>
+                                              <p:pRg st="4" end="4"/>
+                                            </p:txEl>
+                                          </p:spTgt>
+                                        </p:tgtEl>
+                                        <p:attrNameLst>
+                                          <p:attrName>style.visibility</p:attrName>
+                                        </p:attrNameLst>
+                                      </p:cBhvr>
+                                      <p:to>
+                                        <p:strVal val="visible"/>
+                                      </p:to>
+                                    </p:set>
+                                    <p:animEffect transition="in" filter="dissolve">
+                                      <p:cBhvr>
+                                        <p:cTn id="25" dur="500"/>
+                                        <p:tgtEl>
+                                          <p:spTgt spid="9">
+                                            <p:txEl>
+                                              <p:pRg st="4" end="4"/>
+                                            </p:txEl>
+                                          </p:spTgt>
+                                        </p:tgtEl>
+                                      </p:cBhvr>
+                                    </p:animEffect>
+                                  </p:childTnLst>
+                                </p:cTn>
+                              </p:par>
+                            </p:childTnLst>
+                          </p:cTn>
+                        </p:par>
+                        <p:par>
+                          <p:cTn id="26" fill="hold">
+                            <p:stCondLst>
+                              <p:cond delay="3750"/>
+                            </p:stCondLst>
+                            <p:childTnLst>
+                              <p:par>
+                                <p:cTn id="27" presetID="9" presetClass="entr" presetSubtype="0" fill="hold" nodeType="afterEffect">
+                                  <p:stCondLst>
+                                    <p:cond delay="0"/>
+                                  </p:stCondLst>
+                                  <p:childTnLst>
+                                    <p:set>
+                                      <p:cBhvr>
+                                        <p:cTn id="28" dur="1" fill="hold">
+                                          <p:stCondLst>
+                                            <p:cond delay="0"/>
+                                          </p:stCondLst>
+                                        </p:cTn>
+                                        <p:tgtEl>
+                                          <p:spTgt spid="9">
+                                            <p:txEl>
+                                              <p:pRg st="5" end="5"/>
+                                            </p:txEl>
+                                          </p:spTgt>
+                                        </p:tgtEl>
+                                        <p:attrNameLst>
+                                          <p:attrName>style.visibility</p:attrName>
+                                        </p:attrNameLst>
+                                      </p:cBhvr>
+                                      <p:to>
+                                        <p:strVal val="visible"/>
+                                      </p:to>
+                                    </p:set>
+                                    <p:animEffect transition="in" filter="dissolve">
+                                      <p:cBhvr>
+                                        <p:cTn id="29" dur="500"/>
+                                        <p:tgtEl>
+                                          <p:spTgt spid="9">
+                                            <p:txEl>
+                                              <p:pRg st="5" end="5"/>
+                                            </p:txEl>
+                                          </p:spTgt>
+                                        </p:tgtEl>
+                                      </p:cBhvr>
+                                    </p:animEffect>
+                                  </p:childTnLst>
+                                </p:cTn>
+                              </p:par>
+                            </p:childTnLst>
+                          </p:cTn>
+                        </p:par>
+                      </p:childTnLst>
+                    </p:cTn>
+                  </p:par>
+                </p:childTnLst>
+              </p:cTn>
+              <p:prevCondLst>
+                <p:cond evt="onPrev" delay="0">
+                  <p:tgtEl>
+                    <p:sldTgt/>
+                  </p:tgtEl>
+                </p:cond>
+              </p:prevCondLst>
+              <p:nextCondLst>
+                <p:cond evt="onNext" delay="0">
+                  <p:tgtEl>
+                    <p:sldTgt/>
+                  </p:tgtEl>
+                </p:cond>
+              </p:nextCondLst>
+            </p:seq>
+          </p:childTnLst>
+        </p:cTn>
+      </p:par>
+    </p:tnLst>
+  </p:timing>
 </p:sld>
 </file>
 
@@ -5497,8 +8090,8 @@
         </p:nvSpPr>
         <p:spPr>
           <a:xfrm>
-            <a:off x="3285554" y="1501457"/>
-            <a:ext cx="6819980" cy="2626360"/>
+            <a:off x="4551695" y="2108125"/>
+            <a:ext cx="6300789" cy="2164695"/>
           </a:xfrm>
           <a:prstGeom prst="rect">
             <a:avLst/>
@@ -5523,11 +8116,11 @@
                 <a:latin typeface="Roboto" panose="02000000000000000000" pitchFamily="2" charset="0"/>
                 <a:ea typeface="Roboto" panose="02000000000000000000" pitchFamily="2" charset="0"/>
               </a:rPr>
-              <a:t>100+ useful CSS helpers</a:t>
-            </a:r>
-          </a:p>
-          <a:p>
-            <a:pPr algn="just">
+              <a:t>No JavaScript</a:t>
+            </a:r>
+          </a:p>
+          <a:p>
+            <a:pPr>
               <a:lnSpc>
                 <a:spcPct val="150000"/>
               </a:lnSpc>
@@ -5535,113 +8128,62 @@
             <a:r>
               <a:rPr lang="en-US" sz="2000">
                 <a:solidFill>
-                  <a:srgbClr val="363636"/>
+                  <a:srgbClr val="4A4A4A"/>
                 </a:solidFill>
                 <a:latin typeface="Roboto" panose="02000000000000000000" pitchFamily="2" charset="0"/>
                 <a:ea typeface="Roboto" panose="02000000000000000000" pitchFamily="2" charset="0"/>
               </a:rPr>
-              <a:t>Bulma ships with more than </a:t>
-            </a:r>
-            <a:r>
-              <a:rPr lang="en-US" sz="2000" b="1">
+              <a:t>By focusing only on </a:t>
+            </a:r>
+            <a:r>
+              <a:rPr lang="en-US" sz="2000">
                 <a:solidFill>
                   <a:srgbClr val="FF0000"/>
                 </a:solidFill>
                 <a:latin typeface="Roboto" panose="02000000000000000000" pitchFamily="2" charset="0"/>
                 <a:ea typeface="Roboto" panose="02000000000000000000" pitchFamily="2" charset="0"/>
               </a:rPr>
-              <a:t>100 helpers</a:t>
+              <a:t>CSS</a:t>
             </a:r>
             <a:r>
               <a:rPr lang="en-US" sz="2000">
                 <a:solidFill>
-                  <a:srgbClr val="363636"/>
+                  <a:srgbClr val="4A4A4A"/>
                 </a:solidFill>
                 <a:latin typeface="Roboto" panose="02000000000000000000" pitchFamily="2" charset="0"/>
                 <a:ea typeface="Roboto" panose="02000000000000000000" pitchFamily="2" charset="0"/>
               </a:rPr>
-              <a:t> to specify color, display, and spacing.</a:t>
-            </a:r>
-          </a:p>
-          <a:p>
-            <a:pPr algn="just">
-              <a:lnSpc>
-                <a:spcPct val="150000"/>
-              </a:lnSpc>
-            </a:pPr>
-            <a:endParaRPr lang="en-US" sz="2000">
-              <a:solidFill>
-                <a:srgbClr val="363636"/>
-              </a:solidFill>
-              <a:latin typeface="Roboto" panose="02000000000000000000" pitchFamily="2" charset="0"/>
-              <a:ea typeface="Roboto" panose="02000000000000000000" pitchFamily="2" charset="0"/>
-            </a:endParaRPr>
-          </a:p>
-          <a:p>
-            <a:pPr algn="just">
-              <a:lnSpc>
-                <a:spcPct val="150000"/>
-              </a:lnSpc>
-            </a:pPr>
-            <a:r>
-              <a:rPr lang="en-US" sz="2000" b="1">
+              <a:t>, Bulma provides a </a:t>
+            </a:r>
+            <a:r>
+              <a:rPr lang="en-US" sz="2000">
                 <a:solidFill>
-                  <a:srgbClr val="0070C0"/>
+                  <a:srgbClr val="FF0000"/>
                 </a:solidFill>
                 <a:latin typeface="Roboto" panose="02000000000000000000" pitchFamily="2" charset="0"/>
                 <a:ea typeface="Roboto" panose="02000000000000000000" pitchFamily="2" charset="0"/>
               </a:rPr>
-              <a:t>Responsive helpers </a:t>
-            </a:r>
-            <a:r>
-              <a:rPr lang="en-US" sz="2000" b="1">
+              <a:t>lightweight</a:t>
+            </a:r>
+            <a:r>
+              <a:rPr lang="en-US" sz="2000">
                 <a:solidFill>
-                  <a:srgbClr val="363636"/>
+                  <a:srgbClr val="4A4A4A"/>
                 </a:solidFill>
                 <a:latin typeface="Roboto" panose="02000000000000000000" pitchFamily="2" charset="0"/>
                 <a:ea typeface="Roboto" panose="02000000000000000000" pitchFamily="2" charset="0"/>
               </a:rPr>
-              <a:t>– </a:t>
-            </a:r>
-            <a:r>
-              <a:rPr lang="en-US" sz="2000" b="1">
-                <a:solidFill>
-                  <a:srgbClr val="0070C0"/>
-                </a:solidFill>
-                <a:latin typeface="Roboto" panose="02000000000000000000" pitchFamily="2" charset="0"/>
-                <a:ea typeface="Roboto" panose="02000000000000000000" pitchFamily="2" charset="0"/>
-              </a:rPr>
-              <a:t>Typography helpers</a:t>
-            </a:r>
-            <a:r>
-              <a:rPr lang="en-US" sz="2000" b="1">
-                <a:solidFill>
-                  <a:srgbClr val="363636"/>
-                </a:solidFill>
-                <a:latin typeface="Roboto" panose="02000000000000000000" pitchFamily="2" charset="0"/>
-                <a:ea typeface="Roboto" panose="02000000000000000000" pitchFamily="2" charset="0"/>
-              </a:rPr>
-              <a:t> – </a:t>
-            </a:r>
-            <a:r>
-              <a:rPr lang="en-US" sz="2000" b="1">
-                <a:solidFill>
-                  <a:srgbClr val="0070C0"/>
-                </a:solidFill>
-                <a:latin typeface="Roboto" panose="02000000000000000000" pitchFamily="2" charset="0"/>
-                <a:ea typeface="Roboto" panose="02000000000000000000" pitchFamily="2" charset="0"/>
-              </a:rPr>
-              <a:t>Other helpers</a:t>
+              <a:t> solution that can easily be implemented in any development context</a:t>
             </a:r>
           </a:p>
         </p:txBody>
       </p:sp>
       <p:pic>
         <p:nvPicPr>
-          <p:cNvPr id="4" name="Graphic 3">
-            <a:extLst>
-              <a:ext uri="{FF2B5EF4-FFF2-40B4-BE49-F238E27FC236}">
-                <a16:creationId xmlns:a16="http://schemas.microsoft.com/office/drawing/2014/main" id="{EA7F3B7F-07B0-4252-B74D-4F61E45FB3F2}"/>
+          <p:cNvPr id="11" name="Graphic 10">
+            <a:extLst>
+              <a:ext uri="{FF2B5EF4-FFF2-40B4-BE49-F238E27FC236}">
+                <a16:creationId xmlns:a16="http://schemas.microsoft.com/office/drawing/2014/main" id="{BA60EFB6-3DBD-4E0B-BD6E-C4E080A7704A}"/>
               </a:ext>
             </a:extLst>
           </p:cNvPr>
@@ -5667,8 +8209,38 @@
         </p:blipFill>
         <p:spPr>
           <a:xfrm>
-            <a:off x="720000" y="1080000"/>
-            <a:ext cx="2205000" cy="2520000"/>
+            <a:off x="877500" y="2486125"/>
+            <a:ext cx="2205000" cy="1764000"/>
+          </a:xfrm>
+          <a:prstGeom prst="rect">
+            <a:avLst/>
+          </a:prstGeom>
+        </p:spPr>
+      </p:pic>
+      <p:pic>
+        <p:nvPicPr>
+          <p:cNvPr id="6" name="Picture 5">
+            <a:extLst>
+              <a:ext uri="{FF2B5EF4-FFF2-40B4-BE49-F238E27FC236}">
+                <a16:creationId xmlns:a16="http://schemas.microsoft.com/office/drawing/2014/main" id="{3F6DD162-2BB2-40E0-A3B5-910AEC2743BD}"/>
+              </a:ext>
+            </a:extLst>
+          </p:cNvPr>
+          <p:cNvPicPr>
+            <a:picLocks noChangeAspect="1"/>
+          </p:cNvPicPr>
+          <p:nvPr/>
+        </p:nvPicPr>
+        <p:blipFill>
+          <a:blip r:embed="rId4"/>
+          <a:stretch>
+            <a:fillRect/>
+          </a:stretch>
+        </p:blipFill>
+        <p:spPr>
+          <a:xfrm>
+            <a:off x="4326763" y="3150125"/>
+            <a:ext cx="5923809" cy="2200000"/>
           </a:xfrm>
           <a:prstGeom prst="rect">
             <a:avLst/>
@@ -5678,13 +8250,391 @@
     </p:spTree>
     <p:extLst>
       <p:ext uri="{BB962C8B-B14F-4D97-AF65-F5344CB8AC3E}">
-        <p14:creationId xmlns:p14="http://schemas.microsoft.com/office/powerpoint/2010/main" val="1794533717"/>
+        <p14:creationId xmlns:p14="http://schemas.microsoft.com/office/powerpoint/2010/main" val="2523930018"/>
       </p:ext>
     </p:extLst>
   </p:cSld>
   <p:clrMapOvr>
     <a:masterClrMapping/>
   </p:clrMapOvr>
+  <p:timing>
+    <p:tnLst>
+      <p:par>
+        <p:cTn id="1" dur="indefinite" restart="never" nodeType="tmRoot">
+          <p:childTnLst>
+            <p:seq concurrent="1" nextAc="seek">
+              <p:cTn id="2" dur="indefinite" nodeType="mainSeq">
+                <p:childTnLst>
+                  <p:par>
+                    <p:cTn id="3" fill="hold">
+                      <p:stCondLst>
+                        <p:cond delay="indefinite"/>
+                        <p:cond evt="onBegin" delay="0">
+                          <p:tn val="2"/>
+                        </p:cond>
+                      </p:stCondLst>
+                      <p:childTnLst>
+                        <p:par>
+                          <p:cTn id="4" fill="hold">
+                            <p:stCondLst>
+                              <p:cond delay="0"/>
+                            </p:stCondLst>
+                            <p:childTnLst>
+                              <p:par>
+                                <p:cTn id="5" presetID="10" presetClass="entr" presetSubtype="0" fill="hold" nodeType="afterEffect">
+                                  <p:stCondLst>
+                                    <p:cond delay="500"/>
+                                  </p:stCondLst>
+                                  <p:childTnLst>
+                                    <p:set>
+                                      <p:cBhvr>
+                                        <p:cTn id="6" dur="1" fill="hold">
+                                          <p:stCondLst>
+                                            <p:cond delay="0"/>
+                                          </p:stCondLst>
+                                        </p:cTn>
+                                        <p:tgtEl>
+                                          <p:spTgt spid="11"/>
+                                        </p:tgtEl>
+                                        <p:attrNameLst>
+                                          <p:attrName>style.visibility</p:attrName>
+                                        </p:attrNameLst>
+                                      </p:cBhvr>
+                                      <p:to>
+                                        <p:strVal val="visible"/>
+                                      </p:to>
+                                    </p:set>
+                                    <p:animEffect transition="in" filter="fade">
+                                      <p:cBhvr>
+                                        <p:cTn id="7" dur="1250"/>
+                                        <p:tgtEl>
+                                          <p:spTgt spid="11"/>
+                                        </p:tgtEl>
+                                      </p:cBhvr>
+                                    </p:animEffect>
+                                  </p:childTnLst>
+                                </p:cTn>
+                              </p:par>
+                              <p:par>
+                                <p:cTn id="8" presetID="63" presetClass="path" presetSubtype="0" accel="50000" decel="50000" fill="hold" nodeType="withEffect">
+                                  <p:stCondLst>
+                                    <p:cond delay="500"/>
+                                  </p:stCondLst>
+                                  <p:childTnLst>
+                                    <p:animMotion origin="layout" path="M 2.08333E-7 -2.22222E-6 L 0.07448 -2.22222E-6 " pathEditMode="relative" rAng="0" ptsTypes="AA">
+                                      <p:cBhvr>
+                                        <p:cTn id="9" dur="1000" fill="hold"/>
+                                        <p:tgtEl>
+                                          <p:spTgt spid="11"/>
+                                        </p:tgtEl>
+                                        <p:attrNameLst>
+                                          <p:attrName>ppt_x</p:attrName>
+                                          <p:attrName>ppt_y</p:attrName>
+                                        </p:attrNameLst>
+                                      </p:cBhvr>
+                                      <p:rCtr x="3724" y="0"/>
+                                    </p:animMotion>
+                                  </p:childTnLst>
+                                </p:cTn>
+                              </p:par>
+                            </p:childTnLst>
+                          </p:cTn>
+                        </p:par>
+                        <p:par>
+                          <p:cTn id="10" fill="hold">
+                            <p:stCondLst>
+                              <p:cond delay="1750"/>
+                            </p:stCondLst>
+                            <p:childTnLst>
+                              <p:par>
+                                <p:cTn id="11" presetID="3" presetClass="entr" presetSubtype="10" fill="hold" nodeType="afterEffect">
+                                  <p:stCondLst>
+                                    <p:cond delay="0"/>
+                                  </p:stCondLst>
+                                  <p:childTnLst>
+                                    <p:set>
+                                      <p:cBhvr>
+                                        <p:cTn id="12" dur="1" fill="hold">
+                                          <p:stCondLst>
+                                            <p:cond delay="0"/>
+                                          </p:stCondLst>
+                                        </p:cTn>
+                                        <p:tgtEl>
+                                          <p:spTgt spid="9">
+                                            <p:txEl>
+                                              <p:pRg st="0" end="0"/>
+                                            </p:txEl>
+                                          </p:spTgt>
+                                        </p:tgtEl>
+                                        <p:attrNameLst>
+                                          <p:attrName>style.visibility</p:attrName>
+                                        </p:attrNameLst>
+                                      </p:cBhvr>
+                                      <p:to>
+                                        <p:strVal val="visible"/>
+                                      </p:to>
+                                    </p:set>
+                                    <p:animEffect transition="in" filter="blinds(horizontal)">
+                                      <p:cBhvr>
+                                        <p:cTn id="13" dur="500"/>
+                                        <p:tgtEl>
+                                          <p:spTgt spid="9">
+                                            <p:txEl>
+                                              <p:pRg st="0" end="0"/>
+                                            </p:txEl>
+                                          </p:spTgt>
+                                        </p:tgtEl>
+                                      </p:cBhvr>
+                                    </p:animEffect>
+                                  </p:childTnLst>
+                                </p:cTn>
+                              </p:par>
+                            </p:childTnLst>
+                          </p:cTn>
+                        </p:par>
+                        <p:par>
+                          <p:cTn id="14" fill="hold">
+                            <p:stCondLst>
+                              <p:cond delay="2250"/>
+                            </p:stCondLst>
+                            <p:childTnLst>
+                              <p:par>
+                                <p:cTn id="15" presetID="3" presetClass="entr" presetSubtype="10" fill="hold" nodeType="afterEffect">
+                                  <p:stCondLst>
+                                    <p:cond delay="0"/>
+                                  </p:stCondLst>
+                                  <p:childTnLst>
+                                    <p:set>
+                                      <p:cBhvr>
+                                        <p:cTn id="16" dur="1" fill="hold">
+                                          <p:stCondLst>
+                                            <p:cond delay="0"/>
+                                          </p:stCondLst>
+                                        </p:cTn>
+                                        <p:tgtEl>
+                                          <p:spTgt spid="9">
+                                            <p:txEl>
+                                              <p:pRg st="1" end="1"/>
+                                            </p:txEl>
+                                          </p:spTgt>
+                                        </p:tgtEl>
+                                        <p:attrNameLst>
+                                          <p:attrName>style.visibility</p:attrName>
+                                        </p:attrNameLst>
+                                      </p:cBhvr>
+                                      <p:to>
+                                        <p:strVal val="visible"/>
+                                      </p:to>
+                                    </p:set>
+                                    <p:animEffect transition="in" filter="blinds(horizontal)">
+                                      <p:cBhvr>
+                                        <p:cTn id="17" dur="500"/>
+                                        <p:tgtEl>
+                                          <p:spTgt spid="9">
+                                            <p:txEl>
+                                              <p:pRg st="1" end="1"/>
+                                            </p:txEl>
+                                          </p:spTgt>
+                                        </p:tgtEl>
+                                      </p:cBhvr>
+                                    </p:animEffect>
+                                  </p:childTnLst>
+                                </p:cTn>
+                              </p:par>
+                            </p:childTnLst>
+                          </p:cTn>
+                        </p:par>
+                      </p:childTnLst>
+                    </p:cTn>
+                  </p:par>
+                  <p:par>
+                    <p:cTn id="18" fill="hold">
+                      <p:stCondLst>
+                        <p:cond delay="indefinite"/>
+                      </p:stCondLst>
+                      <p:childTnLst>
+                        <p:par>
+                          <p:cTn id="19" fill="hold">
+                            <p:stCondLst>
+                              <p:cond delay="0"/>
+                            </p:stCondLst>
+                            <p:childTnLst>
+                              <p:par>
+                                <p:cTn id="20" presetID="64" presetClass="path" presetSubtype="0" accel="50000" decel="50000" fill="hold" nodeType="clickEffect">
+                                  <p:stCondLst>
+                                    <p:cond delay="0"/>
+                                  </p:stCondLst>
+                                  <p:childTnLst>
+                                    <p:animMotion origin="layout" path="M 0.07448 -2.22222E-6 L 0.07448 -0.25 " pathEditMode="relative" rAng="0" ptsTypes="AA">
+                                      <p:cBhvr>
+                                        <p:cTn id="21" dur="2000" fill="hold"/>
+                                        <p:tgtEl>
+                                          <p:spTgt spid="11"/>
+                                        </p:tgtEl>
+                                        <p:attrNameLst>
+                                          <p:attrName>ppt_x</p:attrName>
+                                          <p:attrName>ppt_y</p:attrName>
+                                        </p:attrNameLst>
+                                      </p:cBhvr>
+                                      <p:rCtr x="0" y="-12500"/>
+                                    </p:animMotion>
+                                  </p:childTnLst>
+                                </p:cTn>
+                              </p:par>
+                              <p:par>
+                                <p:cTn id="22" presetID="64" presetClass="path" presetSubtype="0" accel="50000" decel="50000" fill="hold" grpId="0" nodeType="withEffect">
+                                  <p:stCondLst>
+                                    <p:cond delay="0"/>
+                                  </p:stCondLst>
+                                  <p:childTnLst>
+                                    <p:animMotion origin="layout" path="M 0 0 L 0 -0.25 E" pathEditMode="relative" ptsTypes="">
+                                      <p:cBhvr>
+                                        <p:cTn id="23" dur="2000" fill="hold"/>
+                                        <p:tgtEl>
+                                          <p:spTgt spid="9">
+                                            <p:txEl>
+                                              <p:pRg st="0" end="0"/>
+                                            </p:txEl>
+                                          </p:spTgt>
+                                        </p:tgtEl>
+                                        <p:attrNameLst>
+                                          <p:attrName>ppt_x</p:attrName>
+                                          <p:attrName>ppt_y</p:attrName>
+                                        </p:attrNameLst>
+                                      </p:cBhvr>
+                                    </p:animMotion>
+                                  </p:childTnLst>
+                                </p:cTn>
+                              </p:par>
+                              <p:par>
+                                <p:cTn id="24" presetID="64" presetClass="path" presetSubtype="0" accel="50000" decel="50000" fill="hold" grpId="0" nodeType="withEffect">
+                                  <p:stCondLst>
+                                    <p:cond delay="0"/>
+                                  </p:stCondLst>
+                                  <p:childTnLst>
+                                    <p:animMotion origin="layout" path="M 0 0 L 0 -0.25 E" pathEditMode="relative" ptsTypes="">
+                                      <p:cBhvr>
+                                        <p:cTn id="25" dur="2000" fill="hold"/>
+                                        <p:tgtEl>
+                                          <p:spTgt spid="9">
+                                            <p:txEl>
+                                              <p:pRg st="1" end="1"/>
+                                            </p:txEl>
+                                          </p:spTgt>
+                                        </p:tgtEl>
+                                        <p:attrNameLst>
+                                          <p:attrName>ppt_x</p:attrName>
+                                          <p:attrName>ppt_y</p:attrName>
+                                        </p:attrNameLst>
+                                      </p:cBhvr>
+                                    </p:animMotion>
+                                  </p:childTnLst>
+                                </p:cTn>
+                              </p:par>
+                              <p:par>
+                                <p:cTn id="26" presetID="2" presetClass="entr" presetSubtype="4" fill="hold" nodeType="withEffect">
+                                  <p:stCondLst>
+                                    <p:cond delay="300"/>
+                                  </p:stCondLst>
+                                  <p:childTnLst>
+                                    <p:set>
+                                      <p:cBhvr>
+                                        <p:cTn id="27" dur="1" fill="hold">
+                                          <p:stCondLst>
+                                            <p:cond delay="0"/>
+                                          </p:stCondLst>
+                                        </p:cTn>
+                                        <p:tgtEl>
+                                          <p:spTgt spid="6"/>
+                                        </p:tgtEl>
+                                        <p:attrNameLst>
+                                          <p:attrName>style.visibility</p:attrName>
+                                        </p:attrNameLst>
+                                      </p:cBhvr>
+                                      <p:to>
+                                        <p:strVal val="visible"/>
+                                      </p:to>
+                                    </p:set>
+                                    <p:anim calcmode="lin" valueType="num">
+                                      <p:cBhvr additive="base">
+                                        <p:cTn id="28" dur="1000" fill="hold"/>
+                                        <p:tgtEl>
+                                          <p:spTgt spid="6"/>
+                                        </p:tgtEl>
+                                        <p:attrNameLst>
+                                          <p:attrName>ppt_x</p:attrName>
+                                        </p:attrNameLst>
+                                      </p:cBhvr>
+                                      <p:tavLst>
+                                        <p:tav tm="0">
+                                          <p:val>
+                                            <p:strVal val="#ppt_x"/>
+                                          </p:val>
+                                        </p:tav>
+                                        <p:tav tm="100000">
+                                          <p:val>
+                                            <p:strVal val="#ppt_x"/>
+                                          </p:val>
+                                        </p:tav>
+                                      </p:tavLst>
+                                    </p:anim>
+                                    <p:anim calcmode="lin" valueType="num">
+                                      <p:cBhvr additive="base">
+                                        <p:cTn id="29" dur="1000" fill="hold"/>
+                                        <p:tgtEl>
+                                          <p:spTgt spid="6"/>
+                                        </p:tgtEl>
+                                        <p:attrNameLst>
+                                          <p:attrName>ppt_y</p:attrName>
+                                        </p:attrNameLst>
+                                      </p:cBhvr>
+                                      <p:tavLst>
+                                        <p:tav tm="0">
+                                          <p:val>
+                                            <p:strVal val="1+#ppt_h/2"/>
+                                          </p:val>
+                                        </p:tav>
+                                        <p:tav tm="100000">
+                                          <p:val>
+                                            <p:strVal val="#ppt_y"/>
+                                          </p:val>
+                                        </p:tav>
+                                      </p:tavLst>
+                                    </p:anim>
+                                  </p:childTnLst>
+                                </p:cTn>
+                              </p:par>
+                            </p:childTnLst>
+                          </p:cTn>
+                        </p:par>
+                      </p:childTnLst>
+                    </p:cTn>
+                  </p:par>
+                </p:childTnLst>
+              </p:cTn>
+              <p:prevCondLst>
+                <p:cond evt="onPrev" delay="0">
+                  <p:tgtEl>
+                    <p:sldTgt/>
+                  </p:tgtEl>
+                </p:cond>
+              </p:prevCondLst>
+              <p:nextCondLst>
+                <p:cond evt="onNext" delay="0">
+                  <p:tgtEl>
+                    <p:sldTgt/>
+                  </p:tgtEl>
+                </p:cond>
+              </p:nextCondLst>
+            </p:seq>
+          </p:childTnLst>
+        </p:cTn>
+      </p:par>
+    </p:tnLst>
+    <p:bldLst>
+      <p:bldP spid="9" grpId="0" build="allAtOnce"/>
+    </p:bldLst>
+  </p:timing>
 </p:sld>
 </file>
 

</xml_diff>